<commit_message>
Se marcan en rojo las áreas por completar
</commit_message>
<xml_diff>
--- a/2018/TT IQQ 2018 Camara y Garay.pptx
+++ b/2018/TT IQQ 2018 Camara y Garay.pptx
@@ -108,6 +108,11 @@
       </a:defRPr>
     </a:lvl9pPr>
   </p:defaultTextStyle>
+  <p:extLst>
+    <p:ext uri="{EFAFB233-063F-42B5-8137-9DF3F51BA10A}">
+      <p15:sldGuideLst xmlns:p15="http://schemas.microsoft.com/office/powerpoint/2012/main"/>
+    </p:ext>
+  </p:extLst>
 </p:presentation>
 </file>
 
@@ -6962,19 +6967,31 @@
           <a:lstStyle/>
           <a:p>
             <a:r>
-              <a:rPr lang="es-CL" dirty="0"/>
+              <a:rPr lang="es-CL" dirty="0">
+                <a:solidFill>
+                  <a:srgbClr val="FF0000"/>
+                </a:solidFill>
+              </a:rPr>
               <a:t>&lt;&lt; Reseña breve &gt;&gt;</a:t>
             </a:r>
           </a:p>
           <a:p>
             <a:r>
-              <a:rPr lang="es-CL" dirty="0"/>
+              <a:rPr lang="es-CL" dirty="0">
+                <a:solidFill>
+                  <a:srgbClr val="FF0000"/>
+                </a:solidFill>
+              </a:rPr>
               <a:t>&lt;&lt; Principal actividad &gt;&gt;</a:t>
             </a:r>
           </a:p>
           <a:p>
             <a:r>
-              <a:rPr lang="es-CL" dirty="0"/>
+              <a:rPr lang="es-CL" dirty="0">
+                <a:solidFill>
+                  <a:srgbClr val="FF0000"/>
+                </a:solidFill>
+              </a:rPr>
               <a:t>&lt;&lt; Ubicación &gt;&gt;</a:t>
             </a:r>
           </a:p>
@@ -7779,7 +7796,7 @@
         </p:nvSpPr>
         <p:spPr>
           <a:xfrm>
-            <a:off x="7960167" y="2673599"/>
+            <a:off x="7691810" y="2285973"/>
             <a:ext cx="2263602" cy="2600326"/>
           </a:xfrm>
         </p:spPr>
@@ -7790,19 +7807,41 @@
           <a:lstStyle/>
           <a:p>
             <a:r>
-              <a:rPr lang="es-CL" sz="2000" dirty="0"/>
+              <a:rPr lang="es-CL" sz="2000" dirty="0">
+                <a:solidFill>
+                  <a:srgbClr val="FF0000"/>
+                </a:solidFill>
+              </a:rPr>
               <a:t>Directores</a:t>
             </a:r>
           </a:p>
           <a:p>
             <a:r>
-              <a:rPr lang="es-CL" sz="2000" dirty="0"/>
+              <a:rPr lang="es-CL" sz="2000" dirty="0">
+                <a:solidFill>
+                  <a:srgbClr val="FF0000"/>
+                </a:solidFill>
+              </a:rPr>
               <a:t>Gerentes</a:t>
             </a:r>
           </a:p>
           <a:p>
             <a:r>
-              <a:rPr lang="es-CL" sz="2000" dirty="0"/>
+              <a:rPr lang="es-CL" sz="2000" dirty="0">
+                <a:solidFill>
+                  <a:srgbClr val="FF0000"/>
+                </a:solidFill>
+              </a:rPr>
+              <a:t>Ejecutivos</a:t>
+            </a:r>
+          </a:p>
+          <a:p>
+            <a:r>
+              <a:rPr lang="es-CL" sz="2000" dirty="0">
+                <a:solidFill>
+                  <a:srgbClr val="FF0000"/>
+                </a:solidFill>
+              </a:rPr>
               <a:t>Dotación</a:t>
             </a:r>
           </a:p>

</xml_diff>

<commit_message>
Se mejora el patrón de la presentación
</commit_message>
<xml_diff>
--- a/2018/TT IQQ 2018 Camara y Garay.pptx
+++ b/2018/TT IQQ 2018 Camara y Garay.pptx
@@ -4,6 +4,9 @@
   <p:sldMasterIdLst>
     <p:sldMasterId id="2147483967" r:id="rId1"/>
   </p:sldMasterIdLst>
+  <p:handoutMasterIdLst>
+    <p:handoutMasterId r:id="rId7"/>
+  </p:handoutMasterIdLst>
   <p:sldIdLst>
     <p:sldId id="258" r:id="rId2"/>
     <p:sldId id="262" r:id="rId3"/>
@@ -114,6 +117,195 @@
     </p:ext>
   </p:extLst>
 </p:presentation>
+</file>
+
+<file path=ppt/handoutMasters/handoutMaster1.xml><?xml version="1.0" encoding="utf-8"?>
+<p:handoutMaster xmlns:a="http://schemas.openxmlformats.org/drawingml/2006/main" xmlns:r="http://schemas.openxmlformats.org/officeDocument/2006/relationships" xmlns:p="http://schemas.openxmlformats.org/presentationml/2006/main">
+  <p:cSld>
+    <p:bg>
+      <p:bgRef idx="1001">
+        <a:schemeClr val="bg1"/>
+      </p:bgRef>
+    </p:bg>
+    <p:spTree>
+      <p:nvGrpSpPr>
+        <p:cNvPr id="1" name=""/>
+        <p:cNvGrpSpPr/>
+        <p:nvPr/>
+      </p:nvGrpSpPr>
+      <p:grpSpPr>
+        <a:xfrm>
+          <a:off x="0" y="0"/>
+          <a:ext cx="0" cy="0"/>
+          <a:chOff x="0" y="0"/>
+          <a:chExt cx="0" cy="0"/>
+        </a:xfrm>
+      </p:grpSpPr>
+      <p:sp>
+        <p:nvSpPr>
+          <p:cNvPr id="2" name="Marcador de encabezado 1">
+            <a:extLst>
+              <a:ext uri="{FF2B5EF4-FFF2-40B4-BE49-F238E27FC236}">
+                <a16:creationId xmlns:a16="http://schemas.microsoft.com/office/drawing/2014/main" id="{7D77CD8B-49E8-4D46-BD1B-0263B07BE12E}"/>
+              </a:ext>
+            </a:extLst>
+          </p:cNvPr>
+          <p:cNvSpPr>
+            <a:spLocks noGrp="1"/>
+          </p:cNvSpPr>
+          <p:nvPr>
+            <p:ph type="hdr" sz="quarter"/>
+          </p:nvPr>
+        </p:nvSpPr>
+        <p:spPr>
+          <a:xfrm>
+            <a:off x="0" y="0"/>
+            <a:ext cx="2971800" cy="458788"/>
+          </a:xfrm>
+          <a:prstGeom prst="rect">
+            <a:avLst/>
+          </a:prstGeom>
+        </p:spPr>
+        <p:txBody>
+          <a:bodyPr vert="horz" lIns="91440" tIns="45720" rIns="91440" bIns="45720" rtlCol="0"/>
+          <a:lstStyle>
+            <a:lvl1pPr algn="l">
+              <a:defRPr sz="1200"/>
+            </a:lvl1pPr>
+          </a:lstStyle>
+          <a:p>
+            <a:endParaRPr lang="es-CL"/>
+          </a:p>
+        </p:txBody>
+      </p:sp>
+      <p:sp>
+        <p:nvSpPr>
+          <p:cNvPr id="3" name="Marcador de fecha 2">
+            <a:extLst>
+              <a:ext uri="{FF2B5EF4-FFF2-40B4-BE49-F238E27FC236}">
+                <a16:creationId xmlns:a16="http://schemas.microsoft.com/office/drawing/2014/main" id="{6B98300F-69BC-4B93-9934-C8EA88FEFA9D}"/>
+              </a:ext>
+            </a:extLst>
+          </p:cNvPr>
+          <p:cNvSpPr>
+            <a:spLocks noGrp="1"/>
+          </p:cNvSpPr>
+          <p:nvPr>
+            <p:ph type="dt" sz="quarter" idx="1"/>
+          </p:nvPr>
+        </p:nvSpPr>
+        <p:spPr>
+          <a:xfrm>
+            <a:off x="3884613" y="0"/>
+            <a:ext cx="2971800" cy="458788"/>
+          </a:xfrm>
+          <a:prstGeom prst="rect">
+            <a:avLst/>
+          </a:prstGeom>
+        </p:spPr>
+        <p:txBody>
+          <a:bodyPr vert="horz" lIns="91440" tIns="45720" rIns="91440" bIns="45720" rtlCol="0"/>
+          <a:lstStyle>
+            <a:lvl1pPr algn="r">
+              <a:defRPr sz="1200"/>
+            </a:lvl1pPr>
+          </a:lstStyle>
+          <a:p>
+            <a:fld id="{889AAA34-CE1E-48C9-A4CD-CFA775F628BC}" type="datetimeFigureOut">
+              <a:rPr lang="es-CL" smtClean="0"/>
+              <a:t>02-12-2018</a:t>
+            </a:fld>
+            <a:endParaRPr lang="es-CL"/>
+          </a:p>
+        </p:txBody>
+      </p:sp>
+      <p:sp>
+        <p:nvSpPr>
+          <p:cNvPr id="4" name="Marcador de pie de página 3">
+            <a:extLst>
+              <a:ext uri="{FF2B5EF4-FFF2-40B4-BE49-F238E27FC236}">
+                <a16:creationId xmlns:a16="http://schemas.microsoft.com/office/drawing/2014/main" id="{A9D656C3-F83C-4EBC-85BA-727EB2F5237C}"/>
+              </a:ext>
+            </a:extLst>
+          </p:cNvPr>
+          <p:cNvSpPr>
+            <a:spLocks noGrp="1"/>
+          </p:cNvSpPr>
+          <p:nvPr>
+            <p:ph type="ftr" sz="quarter" idx="2"/>
+          </p:nvPr>
+        </p:nvSpPr>
+        <p:spPr>
+          <a:xfrm>
+            <a:off x="0" y="8685213"/>
+            <a:ext cx="2971800" cy="458787"/>
+          </a:xfrm>
+          <a:prstGeom prst="rect">
+            <a:avLst/>
+          </a:prstGeom>
+        </p:spPr>
+        <p:txBody>
+          <a:bodyPr vert="horz" lIns="91440" tIns="45720" rIns="91440" bIns="45720" rtlCol="0" anchor="b"/>
+          <a:lstStyle>
+            <a:lvl1pPr algn="l">
+              <a:defRPr sz="1200"/>
+            </a:lvl1pPr>
+          </a:lstStyle>
+          <a:p>
+            <a:endParaRPr lang="es-CL"/>
+          </a:p>
+        </p:txBody>
+      </p:sp>
+      <p:sp>
+        <p:nvSpPr>
+          <p:cNvPr id="5" name="Marcador de número de diapositiva 4">
+            <a:extLst>
+              <a:ext uri="{FF2B5EF4-FFF2-40B4-BE49-F238E27FC236}">
+                <a16:creationId xmlns:a16="http://schemas.microsoft.com/office/drawing/2014/main" id="{60317450-4A4C-455F-839B-2CDA2D08F94E}"/>
+              </a:ext>
+            </a:extLst>
+          </p:cNvPr>
+          <p:cNvSpPr>
+            <a:spLocks noGrp="1"/>
+          </p:cNvSpPr>
+          <p:nvPr>
+            <p:ph type="sldNum" sz="quarter" idx="3"/>
+          </p:nvPr>
+        </p:nvSpPr>
+        <p:spPr>
+          <a:xfrm>
+            <a:off x="3884613" y="8685213"/>
+            <a:ext cx="2971800" cy="458787"/>
+          </a:xfrm>
+          <a:prstGeom prst="rect">
+            <a:avLst/>
+          </a:prstGeom>
+        </p:spPr>
+        <p:txBody>
+          <a:bodyPr vert="horz" lIns="91440" tIns="45720" rIns="91440" bIns="45720" rtlCol="0" anchor="b"/>
+          <a:lstStyle>
+            <a:lvl1pPr algn="r">
+              <a:defRPr sz="1200"/>
+            </a:lvl1pPr>
+          </a:lstStyle>
+          <a:p>
+            <a:fld id="{2E91DFA5-0E06-4AD5-9A19-C2D4404E4803}" type="slidenum">
+              <a:rPr lang="es-CL" smtClean="0"/>
+              <a:t>‹Nº›</a:t>
+            </a:fld>
+            <a:endParaRPr lang="es-CL"/>
+          </a:p>
+        </p:txBody>
+      </p:sp>
+    </p:spTree>
+    <p:extLst>
+      <p:ext uri="{BB962C8B-B14F-4D97-AF65-F5344CB8AC3E}">
+        <p14:creationId xmlns:p14="http://schemas.microsoft.com/office/powerpoint/2010/main" val="1809983617"/>
+      </p:ext>
+    </p:extLst>
+  </p:cSld>
+  <p:clrMap bg1="lt1" tx1="dk1" bg2="lt2" tx2="dk2" accent1="accent1" accent2="accent2" accent3="accent3" accent4="accent4" accent5="accent5" accent6="accent6" hlink="hlink" folHlink="folHlink"/>
+</p:handoutMaster>
 </file>
 
 <file path=ppt/slideLayouts/slideLayout1.xml><?xml version="1.0" encoding="utf-8"?>
@@ -838,7 +1030,7 @@
           <a:p>
             <a:fld id="{3BE2AC6D-F750-44BB-A0B8-07BFEA35E468}" type="datetimeFigureOut">
               <a:rPr lang="es-CL" smtClean="0"/>
-              <a:t>29-11-2018</a:t>
+              <a:t>02-12-2018</a:t>
             </a:fld>
             <a:endParaRPr lang="es-CL"/>
           </a:p>
@@ -1089,7 +1281,7 @@
           <a:p>
             <a:fld id="{3BE2AC6D-F750-44BB-A0B8-07BFEA35E468}" type="datetimeFigureOut">
               <a:rPr lang="es-CL" smtClean="0"/>
-              <a:t>29-11-2018</a:t>
+              <a:t>02-12-2018</a:t>
             </a:fld>
             <a:endParaRPr lang="es-CL"/>
           </a:p>
@@ -1403,7 +1595,7 @@
           <a:p>
             <a:fld id="{3BE2AC6D-F750-44BB-A0B8-07BFEA35E468}" type="datetimeFigureOut">
               <a:rPr lang="es-CL" smtClean="0"/>
-              <a:t>29-11-2018</a:t>
+              <a:t>02-12-2018</a:t>
             </a:fld>
             <a:endParaRPr lang="es-CL"/>
           </a:p>
@@ -1744,7 +1936,7 @@
           <a:p>
             <a:fld id="{3BE2AC6D-F750-44BB-A0B8-07BFEA35E468}" type="datetimeFigureOut">
               <a:rPr lang="es-CL" smtClean="0"/>
-              <a:t>29-11-2018</a:t>
+              <a:t>02-12-2018</a:t>
             </a:fld>
             <a:endParaRPr lang="es-CL"/>
           </a:p>
@@ -2058,7 +2250,7 @@
           <a:p>
             <a:fld id="{3BE2AC6D-F750-44BB-A0B8-07BFEA35E468}" type="datetimeFigureOut">
               <a:rPr lang="es-CL" smtClean="0"/>
-              <a:t>29-11-2018</a:t>
+              <a:t>02-12-2018</a:t>
             </a:fld>
             <a:endParaRPr lang="es-CL"/>
           </a:p>
@@ -2451,7 +2643,7 @@
           <a:p>
             <a:fld id="{3BE2AC6D-F750-44BB-A0B8-07BFEA35E468}" type="datetimeFigureOut">
               <a:rPr lang="es-CL" smtClean="0"/>
-              <a:t>29-11-2018</a:t>
+              <a:t>02-12-2018</a:t>
             </a:fld>
             <a:endParaRPr lang="es-CL"/>
           </a:p>
@@ -2621,7 +2813,7 @@
           <a:p>
             <a:fld id="{3BE2AC6D-F750-44BB-A0B8-07BFEA35E468}" type="datetimeFigureOut">
               <a:rPr lang="es-CL" smtClean="0"/>
-              <a:t>29-11-2018</a:t>
+              <a:t>02-12-2018</a:t>
             </a:fld>
             <a:endParaRPr lang="es-CL"/>
           </a:p>
@@ -2801,7 +2993,7 @@
           <a:p>
             <a:fld id="{3BE2AC6D-F750-44BB-A0B8-07BFEA35E468}" type="datetimeFigureOut">
               <a:rPr lang="es-CL" smtClean="0"/>
-              <a:t>29-11-2018</a:t>
+              <a:t>02-12-2018</a:t>
             </a:fld>
             <a:endParaRPr lang="es-CL"/>
           </a:p>
@@ -2863,7 +3055,7 @@
 </file>
 
 <file path=ppt/slideLayouts/slideLayout2.xml><?xml version="1.0" encoding="utf-8"?>
-<p:sldLayout xmlns:a="http://schemas.openxmlformats.org/drawingml/2006/main" xmlns:r="http://schemas.openxmlformats.org/officeDocument/2006/relationships" xmlns:p="http://schemas.openxmlformats.org/presentationml/2006/main" type="obj" preserve="1">
+<p:sldLayout xmlns:a="http://schemas.openxmlformats.org/drawingml/2006/main" xmlns:r="http://schemas.openxmlformats.org/officeDocument/2006/relationships" xmlns:p="http://schemas.openxmlformats.org/presentationml/2006/main" preserve="1" userDrawn="1">
   <p:cSld name="Título y objetos">
     <p:spTree>
       <p:nvGrpSpPr>
@@ -2889,7 +3081,12 @@
             <p:ph type="title"/>
           </p:nvPr>
         </p:nvSpPr>
-        <p:spPr/>
+        <p:spPr>
+          <a:xfrm>
+            <a:off x="495299" y="580104"/>
+            <a:ext cx="9159977" cy="672681"/>
+          </a:xfrm>
+        </p:spPr>
         <p:txBody>
           <a:bodyPr>
             <a:normAutofit/>
@@ -2901,8 +3098,8 @@
           </a:lstStyle>
           <a:p>
             <a:r>
-              <a:rPr lang="es-ES"/>
-              <a:t>Haga clic para modificar el estilo de título del patrón</a:t>
+              <a:rPr lang="es-ES" dirty="0"/>
+              <a:t>Haga clic para modificar el estilo de título</a:t>
             </a:r>
             <a:endParaRPr lang="en-US" dirty="0"/>
           </a:p>
@@ -2918,113 +3115,91 @@
             <p:ph idx="1"/>
           </p:nvPr>
         </p:nvSpPr>
-        <p:spPr/>
+        <p:spPr>
+          <a:xfrm>
+            <a:off x="495299" y="1402403"/>
+            <a:ext cx="9159977" cy="4638960"/>
+          </a:xfrm>
+        </p:spPr>
         <p:txBody>
           <a:bodyPr/>
           <a:lstStyle/>
           <a:p>
             <a:pPr lvl="0"/>
             <a:r>
-              <a:rPr lang="es-ES"/>
+              <a:rPr lang="es-ES" dirty="0"/>
               <a:t>Editar los estilos de texto del patrón</a:t>
             </a:r>
           </a:p>
           <a:p>
             <a:pPr lvl="1"/>
             <a:r>
-              <a:rPr lang="es-ES"/>
+              <a:rPr lang="es-ES" dirty="0"/>
               <a:t>Segundo nivel</a:t>
             </a:r>
           </a:p>
           <a:p>
             <a:pPr lvl="2"/>
             <a:r>
-              <a:rPr lang="es-ES"/>
+              <a:rPr lang="es-ES" dirty="0"/>
               <a:t>Tercer nivel</a:t>
             </a:r>
           </a:p>
           <a:p>
             <a:pPr lvl="3"/>
             <a:r>
-              <a:rPr lang="es-ES"/>
+              <a:rPr lang="es-ES" dirty="0"/>
               <a:t>Cuarto nivel</a:t>
             </a:r>
           </a:p>
           <a:p>
             <a:pPr lvl="4"/>
             <a:r>
-              <a:rPr lang="es-ES"/>
+              <a:rPr lang="es-ES" dirty="0"/>
               <a:t>Quinto nivel</a:t>
             </a:r>
             <a:endParaRPr lang="en-US" dirty="0"/>
           </a:p>
         </p:txBody>
       </p:sp>
-      <p:sp>
-        <p:nvSpPr>
-          <p:cNvPr id="4" name="Date Placeholder 3"/>
-          <p:cNvSpPr>
-            <a:spLocks noGrp="1"/>
-          </p:cNvSpPr>
-          <p:nvPr>
-            <p:ph type="dt" sz="half" idx="10"/>
-          </p:nvPr>
-        </p:nvSpPr>
-        <p:spPr/>
-        <p:txBody>
-          <a:bodyPr/>
-          <a:lstStyle/>
-          <a:p>
-            <a:fld id="{3BE2AC6D-F750-44BB-A0B8-07BFEA35E468}" type="datetimeFigureOut">
-              <a:rPr lang="es-CL" smtClean="0"/>
-              <a:t>29-11-2018</a:t>
-            </a:fld>
-            <a:endParaRPr lang="es-CL"/>
-          </a:p>
-        </p:txBody>
-      </p:sp>
-      <p:sp>
-        <p:nvSpPr>
-          <p:cNvPr id="5" name="Footer Placeholder 4"/>
-          <p:cNvSpPr>
-            <a:spLocks noGrp="1"/>
-          </p:cNvSpPr>
-          <p:nvPr>
-            <p:ph type="ftr" sz="quarter" idx="11"/>
-          </p:nvPr>
-        </p:nvSpPr>
-        <p:spPr/>
-        <p:txBody>
-          <a:bodyPr/>
-          <a:lstStyle/>
-          <a:p>
-            <a:endParaRPr lang="es-CL"/>
-          </a:p>
-        </p:txBody>
-      </p:sp>
-      <p:sp>
-        <p:nvSpPr>
-          <p:cNvPr id="6" name="Slide Number Placeholder 5"/>
-          <p:cNvSpPr>
-            <a:spLocks noGrp="1"/>
-          </p:cNvSpPr>
-          <p:nvPr>
-            <p:ph type="sldNum" sz="quarter" idx="12"/>
-          </p:nvPr>
-        </p:nvSpPr>
-        <p:spPr/>
-        <p:txBody>
-          <a:bodyPr/>
-          <a:lstStyle/>
-          <a:p>
-            <a:fld id="{F096F40B-75D8-4FE2-993F-058F3BD166B6}" type="slidenum">
-              <a:rPr lang="es-CL" smtClean="0"/>
-              <a:t>‹Nº›</a:t>
-            </a:fld>
-            <a:endParaRPr lang="es-CL"/>
-          </a:p>
-        </p:txBody>
-      </p:sp>
+      <p:cxnSp>
+        <p:nvCxnSpPr>
+          <p:cNvPr id="8" name="Conector recto 7">
+            <a:extLst>
+              <a:ext uri="{FF2B5EF4-FFF2-40B4-BE49-F238E27FC236}">
+                <a16:creationId xmlns:a16="http://schemas.microsoft.com/office/drawing/2014/main" id="{EFB01B32-AF99-4FDC-A418-A60F58E707F4}"/>
+              </a:ext>
+            </a:extLst>
+          </p:cNvPr>
+          <p:cNvCxnSpPr>
+            <a:cxnSpLocks/>
+          </p:cNvCxnSpPr>
+          <p:nvPr userDrawn="1"/>
+        </p:nvCxnSpPr>
+        <p:spPr>
+          <a:xfrm>
+            <a:off x="498643" y="1252791"/>
+            <a:ext cx="8950157" cy="0"/>
+          </a:xfrm>
+          <a:prstGeom prst="line">
+            <a:avLst/>
+          </a:prstGeom>
+        </p:spPr>
+        <p:style>
+          <a:lnRef idx="1">
+            <a:schemeClr val="accent1"/>
+          </a:lnRef>
+          <a:fillRef idx="0">
+            <a:schemeClr val="accent1"/>
+          </a:fillRef>
+          <a:effectRef idx="0">
+            <a:schemeClr val="accent1"/>
+          </a:effectRef>
+          <a:fontRef idx="minor">
+            <a:schemeClr val="tx1"/>
+          </a:fontRef>
+        </p:style>
+      </p:cxnSp>
     </p:spTree>
     <p:extLst>
       <p:ext uri="{BB962C8B-B14F-4D97-AF65-F5344CB8AC3E}">
@@ -3224,7 +3399,7 @@
           <a:p>
             <a:fld id="{3BE2AC6D-F750-44BB-A0B8-07BFEA35E468}" type="datetimeFigureOut">
               <a:rPr lang="es-CL" smtClean="0"/>
-              <a:t>29-11-2018</a:t>
+              <a:t>02-12-2018</a:t>
             </a:fld>
             <a:endParaRPr lang="es-CL"/>
           </a:p>
@@ -3456,7 +3631,7 @@
           <a:p>
             <a:fld id="{3BE2AC6D-F750-44BB-A0B8-07BFEA35E468}" type="datetimeFigureOut">
               <a:rPr lang="es-CL" smtClean="0"/>
-              <a:t>29-11-2018</a:t>
+              <a:t>02-12-2018</a:t>
             </a:fld>
             <a:endParaRPr lang="es-CL"/>
           </a:p>
@@ -3830,7 +4005,7 @@
           <a:p>
             <a:fld id="{3BE2AC6D-F750-44BB-A0B8-07BFEA35E468}" type="datetimeFigureOut">
               <a:rPr lang="es-CL" smtClean="0"/>
-              <a:t>29-11-2018</a:t>
+              <a:t>02-12-2018</a:t>
             </a:fld>
             <a:endParaRPr lang="es-CL"/>
           </a:p>
@@ -3953,7 +4128,7 @@
           <a:p>
             <a:fld id="{3BE2AC6D-F750-44BB-A0B8-07BFEA35E468}" type="datetimeFigureOut">
               <a:rPr lang="es-CL" smtClean="0"/>
-              <a:t>29-11-2018</a:t>
+              <a:t>02-12-2018</a:t>
             </a:fld>
             <a:endParaRPr lang="es-CL"/>
           </a:p>
@@ -4048,7 +4223,7 @@
           <a:p>
             <a:fld id="{3BE2AC6D-F750-44BB-A0B8-07BFEA35E468}" type="datetimeFigureOut">
               <a:rPr lang="es-CL" smtClean="0"/>
-              <a:t>29-11-2018</a:t>
+              <a:t>02-12-2018</a:t>
             </a:fld>
             <a:endParaRPr lang="es-CL"/>
           </a:p>
@@ -4303,7 +4478,7 @@
           <a:p>
             <a:fld id="{3BE2AC6D-F750-44BB-A0B8-07BFEA35E468}" type="datetimeFigureOut">
               <a:rPr lang="es-CL" smtClean="0"/>
-              <a:t>29-11-2018</a:t>
+              <a:t>02-12-2018</a:t>
             </a:fld>
             <a:endParaRPr lang="es-CL"/>
           </a:p>
@@ -4566,7 +4741,7 @@
           <a:p>
             <a:fld id="{3BE2AC6D-F750-44BB-A0B8-07BFEA35E468}" type="datetimeFigureOut">
               <a:rPr lang="es-CL" smtClean="0"/>
-              <a:t>29-11-2018</a:t>
+              <a:t>02-12-2018</a:t>
             </a:fld>
             <a:endParaRPr lang="es-CL"/>
           </a:p>
@@ -5309,7 +5484,7 @@
           <a:p>
             <a:fld id="{3BE2AC6D-F750-44BB-A0B8-07BFEA35E468}" type="datetimeFigureOut">
               <a:rPr lang="es-CL" smtClean="0"/>
-              <a:t>29-11-2018</a:t>
+              <a:t>02-12-2018</a:t>
             </a:fld>
             <a:endParaRPr lang="es-CL"/>
           </a:p>
@@ -5854,14 +6029,10 @@
             <a:spLocks noGrp="1"/>
           </p:cNvSpPr>
           <p:nvPr>
-            <p:ph type="title"/>
+            <p:ph type="ctrTitle"/>
           </p:nvPr>
         </p:nvSpPr>
         <p:spPr>
-          <a:xfrm>
-            <a:off x="2079502" y="2462434"/>
-            <a:ext cx="7751035" cy="1735832"/>
-          </a:xfrm>
           <a:ln w="3175">
             <a:noFill/>
           </a:ln>
@@ -6299,41 +6470,6 @@
       </p:grpSpPr>
       <p:sp>
         <p:nvSpPr>
-          <p:cNvPr id="2" name="Título 1">
-            <a:extLst>
-              <a:ext uri="{FF2B5EF4-FFF2-40B4-BE49-F238E27FC236}">
-                <a16:creationId xmlns:a16="http://schemas.microsoft.com/office/drawing/2014/main" id="{EC45AD01-B5A1-48A8-B2A6-275C8DCF926C}"/>
-              </a:ext>
-            </a:extLst>
-          </p:cNvPr>
-          <p:cNvSpPr>
-            <a:spLocks noGrp="1"/>
-          </p:cNvSpPr>
-          <p:nvPr>
-            <p:ph type="title"/>
-          </p:nvPr>
-        </p:nvSpPr>
-        <p:spPr>
-          <a:xfrm>
-            <a:off x="495300" y="641646"/>
-            <a:ext cx="6086475" cy="697907"/>
-          </a:xfrm>
-        </p:spPr>
-        <p:txBody>
-          <a:bodyPr>
-            <a:noAutofit/>
-          </a:bodyPr>
-          <a:lstStyle/>
-          <a:p>
-            <a:r>
-              <a:rPr lang="es-CL" dirty="0"/>
-              <a:t>Objetivo General</a:t>
-            </a:r>
-          </a:p>
-        </p:txBody>
-      </p:sp>
-      <p:sp>
-        <p:nvSpPr>
           <p:cNvPr id="3" name="Marcador de contenido 2">
             <a:extLst>
               <a:ext uri="{FF2B5EF4-FFF2-40B4-BE49-F238E27FC236}">
@@ -6350,8 +6486,8 @@
         </p:nvSpPr>
         <p:spPr>
           <a:xfrm>
-            <a:off x="495300" y="1628775"/>
-            <a:ext cx="8696326" cy="1003597"/>
+            <a:off x="495300" y="1473559"/>
+            <a:ext cx="8696326" cy="1158814"/>
           </a:xfrm>
         </p:spPr>
         <p:txBody>
@@ -6368,91 +6504,6 @@
           </a:p>
         </p:txBody>
       </p:sp>
-      <p:sp>
-        <p:nvSpPr>
-          <p:cNvPr id="4" name="Flecha: pentágono 3">
-            <a:extLst>
-              <a:ext uri="{FF2B5EF4-FFF2-40B4-BE49-F238E27FC236}">
-                <a16:creationId xmlns:a16="http://schemas.microsoft.com/office/drawing/2014/main" id="{C9009098-29DC-4FE1-A202-8AA63536C7F2}"/>
-              </a:ext>
-            </a:extLst>
-          </p:cNvPr>
-          <p:cNvSpPr/>
-          <p:nvPr/>
-        </p:nvSpPr>
-        <p:spPr>
-          <a:xfrm>
-            <a:off x="0" y="11393"/>
-            <a:ext cx="2801062" cy="493432"/>
-          </a:xfrm>
-          <a:prstGeom prst="homePlate">
-            <a:avLst/>
-          </a:prstGeom>
-        </p:spPr>
-        <p:style>
-          <a:lnRef idx="1">
-            <a:schemeClr val="accent1"/>
-          </a:lnRef>
-          <a:fillRef idx="3">
-            <a:schemeClr val="accent1"/>
-          </a:fillRef>
-          <a:effectRef idx="2">
-            <a:schemeClr val="accent1"/>
-          </a:effectRef>
-          <a:fontRef idx="minor">
-            <a:schemeClr val="lt1"/>
-          </a:fontRef>
-        </p:style>
-        <p:txBody>
-          <a:bodyPr rtlCol="0" anchor="ctr"/>
-          <a:lstStyle/>
-          <a:p>
-            <a:pPr algn="ctr"/>
-            <a:r>
-              <a:rPr lang="es-CL" dirty="0"/>
-              <a:t>Objetivos</a:t>
-            </a:r>
-          </a:p>
-        </p:txBody>
-      </p:sp>
-      <p:cxnSp>
-        <p:nvCxnSpPr>
-          <p:cNvPr id="6" name="Conector recto 5">
-            <a:extLst>
-              <a:ext uri="{FF2B5EF4-FFF2-40B4-BE49-F238E27FC236}">
-                <a16:creationId xmlns:a16="http://schemas.microsoft.com/office/drawing/2014/main" id="{BC86BE11-004F-4190-86AA-0A30E3CF34D4}"/>
-              </a:ext>
-            </a:extLst>
-          </p:cNvPr>
-          <p:cNvCxnSpPr>
-            <a:cxnSpLocks/>
-          </p:cNvCxnSpPr>
-          <p:nvPr/>
-        </p:nvCxnSpPr>
-        <p:spPr>
-          <a:xfrm>
-            <a:off x="495300" y="1339553"/>
-            <a:ext cx="8982075" cy="0"/>
-          </a:xfrm>
-          <a:prstGeom prst="line">
-            <a:avLst/>
-          </a:prstGeom>
-        </p:spPr>
-        <p:style>
-          <a:lnRef idx="1">
-            <a:schemeClr val="accent1"/>
-          </a:lnRef>
-          <a:fillRef idx="0">
-            <a:schemeClr val="accent1"/>
-          </a:fillRef>
-          <a:effectRef idx="0">
-            <a:schemeClr val="accent1"/>
-          </a:effectRef>
-          <a:fontRef idx="minor">
-            <a:schemeClr val="tx1"/>
-          </a:fontRef>
-        </p:style>
-      </p:cxnSp>
       <p:sp>
         <p:nvSpPr>
           <p:cNvPr id="7" name="Título 1">
@@ -6469,8 +6520,8 @@
         </p:nvSpPr>
         <p:spPr>
           <a:xfrm>
-            <a:off x="495300" y="2733676"/>
-            <a:ext cx="6086475" cy="695325"/>
+            <a:off x="495300" y="2853147"/>
+            <a:ext cx="6086475" cy="575854"/>
           </a:xfrm>
           <a:prstGeom prst="rect">
             <a:avLst/>
@@ -6554,7 +6605,7 @@
           </a:lstStyle>
           <a:p>
             <a:r>
-              <a:rPr lang="es-CL" dirty="0"/>
+              <a:rPr lang="es-CL" sz="2800" dirty="0"/>
               <a:t>Objetivos Específicos</a:t>
             </a:r>
           </a:p>
@@ -6615,7 +6666,7 @@
         <p:spPr>
           <a:xfrm>
             <a:off x="495300" y="3600453"/>
-            <a:ext cx="7620000" cy="2722195"/>
+            <a:ext cx="7686674" cy="2722195"/>
           </a:xfrm>
           <a:prstGeom prst="rect">
             <a:avLst/>
@@ -6871,6 +6922,81 @@
             <a:r>
               <a:rPr lang="es-CL" sz="2000" dirty="0"/>
               <a:t>Proponer un plan de implementación del manual de buenas prácticas.</a:t>
+            </a:r>
+          </a:p>
+        </p:txBody>
+      </p:sp>
+      <p:sp>
+        <p:nvSpPr>
+          <p:cNvPr id="9" name="Título 8">
+            <a:extLst>
+              <a:ext uri="{FF2B5EF4-FFF2-40B4-BE49-F238E27FC236}">
+                <a16:creationId xmlns:a16="http://schemas.microsoft.com/office/drawing/2014/main" id="{42031B5E-7635-47CB-9973-C3C802742803}"/>
+              </a:ext>
+            </a:extLst>
+          </p:cNvPr>
+          <p:cNvSpPr>
+            <a:spLocks noGrp="1"/>
+          </p:cNvSpPr>
+          <p:nvPr>
+            <p:ph type="title"/>
+          </p:nvPr>
+        </p:nvSpPr>
+        <p:spPr/>
+        <p:txBody>
+          <a:bodyPr/>
+          <a:lstStyle/>
+          <a:p>
+            <a:r>
+              <a:rPr lang="es-CL" dirty="0"/>
+              <a:t>Objetivo General</a:t>
+            </a:r>
+          </a:p>
+        </p:txBody>
+      </p:sp>
+      <p:sp>
+        <p:nvSpPr>
+          <p:cNvPr id="12" name="Flecha: pentágono 11">
+            <a:extLst>
+              <a:ext uri="{FF2B5EF4-FFF2-40B4-BE49-F238E27FC236}">
+                <a16:creationId xmlns:a16="http://schemas.microsoft.com/office/drawing/2014/main" id="{4215D47B-DB1D-4929-8142-2B581CB3CF66}"/>
+              </a:ext>
+            </a:extLst>
+          </p:cNvPr>
+          <p:cNvSpPr/>
+          <p:nvPr/>
+        </p:nvSpPr>
+        <p:spPr>
+          <a:xfrm>
+            <a:off x="0" y="11393"/>
+            <a:ext cx="2801062" cy="493432"/>
+          </a:xfrm>
+          <a:prstGeom prst="homePlate">
+            <a:avLst/>
+          </a:prstGeom>
+        </p:spPr>
+        <p:style>
+          <a:lnRef idx="1">
+            <a:schemeClr val="accent1"/>
+          </a:lnRef>
+          <a:fillRef idx="3">
+            <a:schemeClr val="accent1"/>
+          </a:fillRef>
+          <a:effectRef idx="2">
+            <a:schemeClr val="accent1"/>
+          </a:effectRef>
+          <a:fontRef idx="minor">
+            <a:schemeClr val="lt1"/>
+          </a:fontRef>
+        </p:style>
+        <p:txBody>
+          <a:bodyPr rtlCol="0" anchor="ctr"/>
+          <a:lstStyle/>
+          <a:p>
+            <a:pPr algn="ctr"/>
+            <a:r>
+              <a:rPr lang="es-CL" dirty="0"/>
+              <a:t>Objetivos</a:t>
             </a:r>
           </a:p>
         </p:txBody>
@@ -6999,10 +7125,10 @@
       </p:sp>
       <p:sp>
         <p:nvSpPr>
-          <p:cNvPr id="4" name="Flecha: pentágono 3">
+          <p:cNvPr id="7" name="Flecha: pentágono 6">
             <a:extLst>
               <a:ext uri="{FF2B5EF4-FFF2-40B4-BE49-F238E27FC236}">
-                <a16:creationId xmlns:a16="http://schemas.microsoft.com/office/drawing/2014/main" id="{C9009098-29DC-4FE1-A202-8AA63536C7F2}"/>
+                <a16:creationId xmlns:a16="http://schemas.microsoft.com/office/drawing/2014/main" id="{2421A3F3-D7E6-468F-8EE1-9D58DDF2460A}"/>
               </a:ext>
             </a:extLst>
           </p:cNvPr>
@@ -7044,44 +7170,6 @@
           </a:p>
         </p:txBody>
       </p:sp>
-      <p:cxnSp>
-        <p:nvCxnSpPr>
-          <p:cNvPr id="6" name="Conector recto 5">
-            <a:extLst>
-              <a:ext uri="{FF2B5EF4-FFF2-40B4-BE49-F238E27FC236}">
-                <a16:creationId xmlns:a16="http://schemas.microsoft.com/office/drawing/2014/main" id="{BC86BE11-004F-4190-86AA-0A30E3CF34D4}"/>
-              </a:ext>
-            </a:extLst>
-          </p:cNvPr>
-          <p:cNvCxnSpPr>
-            <a:cxnSpLocks/>
-          </p:cNvCxnSpPr>
-          <p:nvPr/>
-        </p:nvCxnSpPr>
-        <p:spPr>
-          <a:xfrm>
-            <a:off x="495300" y="1339553"/>
-            <a:ext cx="8972550" cy="0"/>
-          </a:xfrm>
-          <a:prstGeom prst="line">
-            <a:avLst/>
-          </a:prstGeom>
-        </p:spPr>
-        <p:style>
-          <a:lnRef idx="1">
-            <a:schemeClr val="accent1"/>
-          </a:lnRef>
-          <a:fillRef idx="0">
-            <a:schemeClr val="accent1"/>
-          </a:fillRef>
-          <a:effectRef idx="0">
-            <a:schemeClr val="accent1"/>
-          </a:effectRef>
-          <a:fontRef idx="minor">
-            <a:schemeClr val="tx1"/>
-          </a:fontRef>
-        </p:style>
-      </p:cxnSp>
     </p:spTree>
     <p:extLst>
       <p:ext uri="{BB962C8B-B14F-4D97-AF65-F5344CB8AC3E}">
@@ -7114,41 +7202,6 @@
       </p:grpSpPr>
       <p:sp>
         <p:nvSpPr>
-          <p:cNvPr id="2" name="Título 1">
-            <a:extLst>
-              <a:ext uri="{FF2B5EF4-FFF2-40B4-BE49-F238E27FC236}">
-                <a16:creationId xmlns:a16="http://schemas.microsoft.com/office/drawing/2014/main" id="{EC45AD01-B5A1-48A8-B2A6-275C8DCF926C}"/>
-              </a:ext>
-            </a:extLst>
-          </p:cNvPr>
-          <p:cNvSpPr>
-            <a:spLocks noGrp="1"/>
-          </p:cNvSpPr>
-          <p:nvPr>
-            <p:ph type="title"/>
-          </p:nvPr>
-        </p:nvSpPr>
-        <p:spPr>
-          <a:xfrm>
-            <a:off x="495300" y="641646"/>
-            <a:ext cx="8596668" cy="697907"/>
-          </a:xfrm>
-        </p:spPr>
-        <p:txBody>
-          <a:bodyPr>
-            <a:noAutofit/>
-          </a:bodyPr>
-          <a:lstStyle/>
-          <a:p>
-            <a:r>
-              <a:rPr lang="es-CL" dirty="0"/>
-              <a:t>Aspectos Estratégicos de ZOFRI S.A.</a:t>
-            </a:r>
-          </a:p>
-        </p:txBody>
-      </p:sp>
-      <p:sp>
-        <p:nvSpPr>
           <p:cNvPr id="3" name="Marcador de contenido 2">
             <a:extLst>
               <a:ext uri="{FF2B5EF4-FFF2-40B4-BE49-F238E27FC236}">
@@ -7283,44 +7336,6 @@
           </a:p>
         </p:txBody>
       </p:sp>
-      <p:cxnSp>
-        <p:nvCxnSpPr>
-          <p:cNvPr id="6" name="Conector recto 5">
-            <a:extLst>
-              <a:ext uri="{FF2B5EF4-FFF2-40B4-BE49-F238E27FC236}">
-                <a16:creationId xmlns:a16="http://schemas.microsoft.com/office/drawing/2014/main" id="{BC86BE11-004F-4190-86AA-0A30E3CF34D4}"/>
-              </a:ext>
-            </a:extLst>
-          </p:cNvPr>
-          <p:cNvCxnSpPr>
-            <a:cxnSpLocks/>
-          </p:cNvCxnSpPr>
-          <p:nvPr/>
-        </p:nvCxnSpPr>
-        <p:spPr>
-          <a:xfrm>
-            <a:off x="495300" y="1339553"/>
-            <a:ext cx="8991600" cy="0"/>
-          </a:xfrm>
-          <a:prstGeom prst="line">
-            <a:avLst/>
-          </a:prstGeom>
-        </p:spPr>
-        <p:style>
-          <a:lnRef idx="1">
-            <a:schemeClr val="accent1"/>
-          </a:lnRef>
-          <a:fillRef idx="0">
-            <a:schemeClr val="accent1"/>
-          </a:fillRef>
-          <a:effectRef idx="0">
-            <a:schemeClr val="accent1"/>
-          </a:effectRef>
-          <a:fontRef idx="minor">
-            <a:schemeClr val="tx1"/>
-          </a:fontRef>
-        </p:style>
-      </p:cxnSp>
       <p:sp>
         <p:nvSpPr>
           <p:cNvPr id="7" name="Marcador de contenido 2">
@@ -7594,6 +7609,34 @@
             <a:r>
               <a:rPr lang="es-CL" dirty="0"/>
               <a:t>Compromiso</a:t>
+            </a:r>
+          </a:p>
+        </p:txBody>
+      </p:sp>
+      <p:sp>
+        <p:nvSpPr>
+          <p:cNvPr id="8" name="Título 7">
+            <a:extLst>
+              <a:ext uri="{FF2B5EF4-FFF2-40B4-BE49-F238E27FC236}">
+                <a16:creationId xmlns:a16="http://schemas.microsoft.com/office/drawing/2014/main" id="{A1F7BBE7-AE55-470A-A695-EE06215F5EB4}"/>
+              </a:ext>
+            </a:extLst>
+          </p:cNvPr>
+          <p:cNvSpPr>
+            <a:spLocks noGrp="1"/>
+          </p:cNvSpPr>
+          <p:nvPr>
+            <p:ph type="title"/>
+          </p:nvPr>
+        </p:nvSpPr>
+        <p:spPr/>
+        <p:txBody>
+          <a:bodyPr/>
+          <a:lstStyle/>
+          <a:p>
+            <a:r>
+              <a:rPr lang="es-CL" dirty="0"/>
+              <a:t>Aspectos Estratégicos de ZOFRI S.A.</a:t>
             </a:r>
           </a:p>
         </p:txBody>
@@ -7630,41 +7673,6 @@
       </p:grpSpPr>
       <p:sp>
         <p:nvSpPr>
-          <p:cNvPr id="2" name="Título 1">
-            <a:extLst>
-              <a:ext uri="{FF2B5EF4-FFF2-40B4-BE49-F238E27FC236}">
-                <a16:creationId xmlns:a16="http://schemas.microsoft.com/office/drawing/2014/main" id="{EC45AD01-B5A1-48A8-B2A6-275C8DCF926C}"/>
-              </a:ext>
-            </a:extLst>
-          </p:cNvPr>
-          <p:cNvSpPr>
-            <a:spLocks noGrp="1"/>
-          </p:cNvSpPr>
-          <p:nvPr>
-            <p:ph type="title"/>
-          </p:nvPr>
-        </p:nvSpPr>
-        <p:spPr>
-          <a:xfrm>
-            <a:off x="495300" y="641646"/>
-            <a:ext cx="8596668" cy="697907"/>
-          </a:xfrm>
-        </p:spPr>
-        <p:txBody>
-          <a:bodyPr>
-            <a:noAutofit/>
-          </a:bodyPr>
-          <a:lstStyle/>
-          <a:p>
-            <a:r>
-              <a:rPr lang="es-CL" dirty="0"/>
-              <a:t>Estructura Organizacional de ZOFRI S.A.</a:t>
-            </a:r>
-          </a:p>
-        </p:txBody>
-      </p:sp>
-      <p:sp>
-        <p:nvSpPr>
           <p:cNvPr id="4" name="Flecha: pentágono 3">
             <a:extLst>
               <a:ext uri="{FF2B5EF4-FFF2-40B4-BE49-F238E27FC236}">
@@ -7710,44 +7718,6 @@
           </a:p>
         </p:txBody>
       </p:sp>
-      <p:cxnSp>
-        <p:nvCxnSpPr>
-          <p:cNvPr id="6" name="Conector recto 5">
-            <a:extLst>
-              <a:ext uri="{FF2B5EF4-FFF2-40B4-BE49-F238E27FC236}">
-                <a16:creationId xmlns:a16="http://schemas.microsoft.com/office/drawing/2014/main" id="{BC86BE11-004F-4190-86AA-0A30E3CF34D4}"/>
-              </a:ext>
-            </a:extLst>
-          </p:cNvPr>
-          <p:cNvCxnSpPr>
-            <a:cxnSpLocks/>
-          </p:cNvCxnSpPr>
-          <p:nvPr/>
-        </p:nvCxnSpPr>
-        <p:spPr>
-          <a:xfrm>
-            <a:off x="495300" y="1339553"/>
-            <a:ext cx="8991600" cy="0"/>
-          </a:xfrm>
-          <a:prstGeom prst="line">
-            <a:avLst/>
-          </a:prstGeom>
-        </p:spPr>
-        <p:style>
-          <a:lnRef idx="1">
-            <a:schemeClr val="accent1"/>
-          </a:lnRef>
-          <a:fillRef idx="0">
-            <a:schemeClr val="accent1"/>
-          </a:fillRef>
-          <a:effectRef idx="0">
-            <a:schemeClr val="accent1"/>
-          </a:effectRef>
-          <a:fontRef idx="minor">
-            <a:schemeClr val="tx1"/>
-          </a:fontRef>
-        </p:style>
-      </p:cxnSp>
       <p:pic>
         <p:nvPicPr>
           <p:cNvPr id="10" name="Imagen 9">
@@ -7843,6 +7813,34 @@
                 </a:solidFill>
               </a:rPr>
               <a:t>Dotación</a:t>
+            </a:r>
+          </a:p>
+        </p:txBody>
+      </p:sp>
+      <p:sp>
+        <p:nvSpPr>
+          <p:cNvPr id="5" name="Título 4">
+            <a:extLst>
+              <a:ext uri="{FF2B5EF4-FFF2-40B4-BE49-F238E27FC236}">
+                <a16:creationId xmlns:a16="http://schemas.microsoft.com/office/drawing/2014/main" id="{246EE814-BE17-4C97-9C98-4678D63EE06B}"/>
+              </a:ext>
+            </a:extLst>
+          </p:cNvPr>
+          <p:cNvSpPr>
+            <a:spLocks noGrp="1"/>
+          </p:cNvSpPr>
+          <p:nvPr>
+            <p:ph type="title"/>
+          </p:nvPr>
+        </p:nvSpPr>
+        <p:spPr/>
+        <p:txBody>
+          <a:bodyPr/>
+          <a:lstStyle/>
+          <a:p>
+            <a:r>
+              <a:rPr lang="es-CL" dirty="0"/>
+              <a:t>Estructura Organizacional de ZOFRI S.A.</a:t>
             </a:r>
           </a:p>
         </p:txBody>
@@ -8115,4 +8113,299 @@
     </a:ext>
   </a:extLst>
 </a:theme>
+</file>
+
+<file path=ppt/theme/theme2.xml><?xml version="1.0" encoding="utf-8"?>
+<a:theme xmlns:a="http://schemas.openxmlformats.org/drawingml/2006/main" name="Tema de Office">
+  <a:themeElements>
+    <a:clrScheme name="Office">
+      <a:dk1>
+        <a:sysClr val="windowText" lastClr="000000"/>
+      </a:dk1>
+      <a:lt1>
+        <a:sysClr val="window" lastClr="FFFFFF"/>
+      </a:lt1>
+      <a:dk2>
+        <a:srgbClr val="44546A"/>
+      </a:dk2>
+      <a:lt2>
+        <a:srgbClr val="E7E6E6"/>
+      </a:lt2>
+      <a:accent1>
+        <a:srgbClr val="4472C4"/>
+      </a:accent1>
+      <a:accent2>
+        <a:srgbClr val="ED7D31"/>
+      </a:accent2>
+      <a:accent3>
+        <a:srgbClr val="A5A5A5"/>
+      </a:accent3>
+      <a:accent4>
+        <a:srgbClr val="FFC000"/>
+      </a:accent4>
+      <a:accent5>
+        <a:srgbClr val="5B9BD5"/>
+      </a:accent5>
+      <a:accent6>
+        <a:srgbClr val="70AD47"/>
+      </a:accent6>
+      <a:hlink>
+        <a:srgbClr val="0563C1"/>
+      </a:hlink>
+      <a:folHlink>
+        <a:srgbClr val="954F72"/>
+      </a:folHlink>
+    </a:clrScheme>
+    <a:fontScheme name="Office">
+      <a:majorFont>
+        <a:latin typeface="Calibri Light" panose="020F0302020204030204"/>
+        <a:ea typeface=""/>
+        <a:cs typeface=""/>
+        <a:font script="Jpan" typeface="游ゴシック Light"/>
+        <a:font script="Hang" typeface="맑은 고딕"/>
+        <a:font script="Hans" typeface="等线 Light"/>
+        <a:font script="Hant" typeface="新細明體"/>
+        <a:font script="Arab" typeface="Times New Roman"/>
+        <a:font script="Hebr" typeface="Times New Roman"/>
+        <a:font script="Thai" typeface="Angsana New"/>
+        <a:font script="Ethi" typeface="Nyala"/>
+        <a:font script="Beng" typeface="Vrinda"/>
+        <a:font script="Gujr" typeface="Shruti"/>
+        <a:font script="Khmr" typeface="MoolBoran"/>
+        <a:font script="Knda" typeface="Tunga"/>
+        <a:font script="Guru" typeface="Raavi"/>
+        <a:font script="Cans" typeface="Euphemia"/>
+        <a:font script="Cher" typeface="Plantagenet Cherokee"/>
+        <a:font script="Yiii" typeface="Microsoft Yi Baiti"/>
+        <a:font script="Tibt" typeface="Microsoft Himalaya"/>
+        <a:font script="Thaa" typeface="MV Boli"/>
+        <a:font script="Deva" typeface="Mangal"/>
+        <a:font script="Telu" typeface="Gautami"/>
+        <a:font script="Taml" typeface="Latha"/>
+        <a:font script="Syrc" typeface="Estrangelo Edessa"/>
+        <a:font script="Orya" typeface="Kalinga"/>
+        <a:font script="Mlym" typeface="Kartika"/>
+        <a:font script="Laoo" typeface="DokChampa"/>
+        <a:font script="Sinh" typeface="Iskoola Pota"/>
+        <a:font script="Mong" typeface="Mongolian Baiti"/>
+        <a:font script="Viet" typeface="Times New Roman"/>
+        <a:font script="Uigh" typeface="Microsoft Uighur"/>
+        <a:font script="Geor" typeface="Sylfaen"/>
+        <a:font script="Armn" typeface="Arial"/>
+        <a:font script="Bugi" typeface="Leelawadee UI"/>
+        <a:font script="Bopo" typeface="Microsoft JhengHei"/>
+        <a:font script="Java" typeface="Javanese Text"/>
+        <a:font script="Lisu" typeface="Segoe UI"/>
+        <a:font script="Mymr" typeface="Myanmar Text"/>
+        <a:font script="Nkoo" typeface="Ebrima"/>
+        <a:font script="Olck" typeface="Nirmala UI"/>
+        <a:font script="Osma" typeface="Ebrima"/>
+        <a:font script="Phag" typeface="Phagspa"/>
+        <a:font script="Syrn" typeface="Estrangelo Edessa"/>
+        <a:font script="Syrj" typeface="Estrangelo Edessa"/>
+        <a:font script="Syre" typeface="Estrangelo Edessa"/>
+        <a:font script="Sora" typeface="Nirmala UI"/>
+        <a:font script="Tale" typeface="Microsoft Tai Le"/>
+        <a:font script="Talu" typeface="Microsoft New Tai Lue"/>
+        <a:font script="Tfng" typeface="Ebrima"/>
+      </a:majorFont>
+      <a:minorFont>
+        <a:latin typeface="Calibri" panose="020F0502020204030204"/>
+        <a:ea typeface=""/>
+        <a:cs typeface=""/>
+        <a:font script="Jpan" typeface="游ゴシック"/>
+        <a:font script="Hang" typeface="맑은 고딕"/>
+        <a:font script="Hans" typeface="等线"/>
+        <a:font script="Hant" typeface="新細明體"/>
+        <a:font script="Arab" typeface="Arial"/>
+        <a:font script="Hebr" typeface="Arial"/>
+        <a:font script="Thai" typeface="Cordia New"/>
+        <a:font script="Ethi" typeface="Nyala"/>
+        <a:font script="Beng" typeface="Vrinda"/>
+        <a:font script="Gujr" typeface="Shruti"/>
+        <a:font script="Khmr" typeface="DaunPenh"/>
+        <a:font script="Knda" typeface="Tunga"/>
+        <a:font script="Guru" typeface="Raavi"/>
+        <a:font script="Cans" typeface="Euphemia"/>
+        <a:font script="Cher" typeface="Plantagenet Cherokee"/>
+        <a:font script="Yiii" typeface="Microsoft Yi Baiti"/>
+        <a:font script="Tibt" typeface="Microsoft Himalaya"/>
+        <a:font script="Thaa" typeface="MV Boli"/>
+        <a:font script="Deva" typeface="Mangal"/>
+        <a:font script="Telu" typeface="Gautami"/>
+        <a:font script="Taml" typeface="Latha"/>
+        <a:font script="Syrc" typeface="Estrangelo Edessa"/>
+        <a:font script="Orya" typeface="Kalinga"/>
+        <a:font script="Mlym" typeface="Kartika"/>
+        <a:font script="Laoo" typeface="DokChampa"/>
+        <a:font script="Sinh" typeface="Iskoola Pota"/>
+        <a:font script="Mong" typeface="Mongolian Baiti"/>
+        <a:font script="Viet" typeface="Arial"/>
+        <a:font script="Uigh" typeface="Microsoft Uighur"/>
+        <a:font script="Geor" typeface="Sylfaen"/>
+        <a:font script="Armn" typeface="Arial"/>
+        <a:font script="Bugi" typeface="Leelawadee UI"/>
+        <a:font script="Bopo" typeface="Microsoft JhengHei"/>
+        <a:font script="Java" typeface="Javanese Text"/>
+        <a:font script="Lisu" typeface="Segoe UI"/>
+        <a:font script="Mymr" typeface="Myanmar Text"/>
+        <a:font script="Nkoo" typeface="Ebrima"/>
+        <a:font script="Olck" typeface="Nirmala UI"/>
+        <a:font script="Osma" typeface="Ebrima"/>
+        <a:font script="Phag" typeface="Phagspa"/>
+        <a:font script="Syrn" typeface="Estrangelo Edessa"/>
+        <a:font script="Syrj" typeface="Estrangelo Edessa"/>
+        <a:font script="Syre" typeface="Estrangelo Edessa"/>
+        <a:font script="Sora" typeface="Nirmala UI"/>
+        <a:font script="Tale" typeface="Microsoft Tai Le"/>
+        <a:font script="Talu" typeface="Microsoft New Tai Lue"/>
+        <a:font script="Tfng" typeface="Ebrima"/>
+      </a:minorFont>
+    </a:fontScheme>
+    <a:fmtScheme name="Office">
+      <a:fillStyleLst>
+        <a:solidFill>
+          <a:schemeClr val="phClr"/>
+        </a:solidFill>
+        <a:gradFill rotWithShape="1">
+          <a:gsLst>
+            <a:gs pos="0">
+              <a:schemeClr val="phClr">
+                <a:lumMod val="110000"/>
+                <a:satMod val="105000"/>
+                <a:tint val="67000"/>
+              </a:schemeClr>
+            </a:gs>
+            <a:gs pos="50000">
+              <a:schemeClr val="phClr">
+                <a:lumMod val="105000"/>
+                <a:satMod val="103000"/>
+                <a:tint val="73000"/>
+              </a:schemeClr>
+            </a:gs>
+            <a:gs pos="100000">
+              <a:schemeClr val="phClr">
+                <a:lumMod val="105000"/>
+                <a:satMod val="109000"/>
+                <a:tint val="81000"/>
+              </a:schemeClr>
+            </a:gs>
+          </a:gsLst>
+          <a:lin ang="5400000" scaled="0"/>
+        </a:gradFill>
+        <a:gradFill rotWithShape="1">
+          <a:gsLst>
+            <a:gs pos="0">
+              <a:schemeClr val="phClr">
+                <a:satMod val="103000"/>
+                <a:lumMod val="102000"/>
+                <a:tint val="94000"/>
+              </a:schemeClr>
+            </a:gs>
+            <a:gs pos="50000">
+              <a:schemeClr val="phClr">
+                <a:satMod val="110000"/>
+                <a:lumMod val="100000"/>
+                <a:shade val="100000"/>
+              </a:schemeClr>
+            </a:gs>
+            <a:gs pos="100000">
+              <a:schemeClr val="phClr">
+                <a:lumMod val="99000"/>
+                <a:satMod val="120000"/>
+                <a:shade val="78000"/>
+              </a:schemeClr>
+            </a:gs>
+          </a:gsLst>
+          <a:lin ang="5400000" scaled="0"/>
+        </a:gradFill>
+      </a:fillStyleLst>
+      <a:lnStyleLst>
+        <a:ln w="6350" cap="flat" cmpd="sng" algn="ctr">
+          <a:solidFill>
+            <a:schemeClr val="phClr"/>
+          </a:solidFill>
+          <a:prstDash val="solid"/>
+          <a:miter lim="800000"/>
+        </a:ln>
+        <a:ln w="12700" cap="flat" cmpd="sng" algn="ctr">
+          <a:solidFill>
+            <a:schemeClr val="phClr"/>
+          </a:solidFill>
+          <a:prstDash val="solid"/>
+          <a:miter lim="800000"/>
+        </a:ln>
+        <a:ln w="19050" cap="flat" cmpd="sng" algn="ctr">
+          <a:solidFill>
+            <a:schemeClr val="phClr"/>
+          </a:solidFill>
+          <a:prstDash val="solid"/>
+          <a:miter lim="800000"/>
+        </a:ln>
+      </a:lnStyleLst>
+      <a:effectStyleLst>
+        <a:effectStyle>
+          <a:effectLst/>
+        </a:effectStyle>
+        <a:effectStyle>
+          <a:effectLst/>
+        </a:effectStyle>
+        <a:effectStyle>
+          <a:effectLst>
+            <a:outerShdw blurRad="57150" dist="19050" dir="5400000" algn="ctr" rotWithShape="0">
+              <a:srgbClr val="000000">
+                <a:alpha val="63000"/>
+              </a:srgbClr>
+            </a:outerShdw>
+          </a:effectLst>
+        </a:effectStyle>
+      </a:effectStyleLst>
+      <a:bgFillStyleLst>
+        <a:solidFill>
+          <a:schemeClr val="phClr"/>
+        </a:solidFill>
+        <a:solidFill>
+          <a:schemeClr val="phClr">
+            <a:tint val="95000"/>
+            <a:satMod val="170000"/>
+          </a:schemeClr>
+        </a:solidFill>
+        <a:gradFill rotWithShape="1">
+          <a:gsLst>
+            <a:gs pos="0">
+              <a:schemeClr val="phClr">
+                <a:tint val="93000"/>
+                <a:satMod val="150000"/>
+                <a:shade val="98000"/>
+                <a:lumMod val="102000"/>
+              </a:schemeClr>
+            </a:gs>
+            <a:gs pos="50000">
+              <a:schemeClr val="phClr">
+                <a:tint val="98000"/>
+                <a:satMod val="130000"/>
+                <a:shade val="90000"/>
+                <a:lumMod val="103000"/>
+              </a:schemeClr>
+            </a:gs>
+            <a:gs pos="100000">
+              <a:schemeClr val="phClr">
+                <a:shade val="63000"/>
+                <a:satMod val="120000"/>
+              </a:schemeClr>
+            </a:gs>
+          </a:gsLst>
+          <a:lin ang="5400000" scaled="0"/>
+        </a:gradFill>
+      </a:bgFillStyleLst>
+    </a:fmtScheme>
+  </a:themeElements>
+  <a:objectDefaults/>
+  <a:extraClrSchemeLst/>
+  <a:extLst>
+    <a:ext uri="{05A4C25C-085E-4340-85A3-A5531E510DB2}">
+      <thm15:themeFamily xmlns:thm15="http://schemas.microsoft.com/office/thememl/2012/main" name="Office Theme" id="{62F939B6-93AF-4DB8-9C6B-D6C7DFDC589F}" vid="{4A3C46E8-61CC-4603-A589-7422A47A8E4A}"/>
+    </a:ext>
+  </a:extLst>
+</a:theme>
 </file>
</xml_diff>

<commit_message>
Se cambia la palabra Alumnos por Estudiantes
</commit_message>
<xml_diff>
--- a/2018/TT IQQ 2018 Camara y Garay.pptx
+++ b/2018/TT IQQ 2018 Camara y Garay.pptx
@@ -115,6 +115,9 @@
     <p:ext uri="{EFAFB233-063F-42B5-8137-9DF3F51BA10A}">
       <p15:sldGuideLst xmlns:p15="http://schemas.microsoft.com/office/powerpoint/2012/main"/>
     </p:ext>
+    <p:ext uri="{2D200454-40CA-4A62-9FC3-DE9A4176ACB9}">
+      <p15:notesGuideLst xmlns:p15="http://schemas.microsoft.com/office/powerpoint/2012/main"/>
+    </p:ext>
   </p:extLst>
 </p:presentation>
 </file>
@@ -213,7 +216,7 @@
           <a:p>
             <a:fld id="{889AAA34-CE1E-48C9-A4CD-CFA775F628BC}" type="datetimeFigureOut">
               <a:rPr lang="es-CL" smtClean="0"/>
-              <a:t>02-12-2018</a:t>
+              <a:t>03-12-2018</a:t>
             </a:fld>
             <a:endParaRPr lang="es-CL"/>
           </a:p>
@@ -1030,7 +1033,7 @@
           <a:p>
             <a:fld id="{3BE2AC6D-F750-44BB-A0B8-07BFEA35E468}" type="datetimeFigureOut">
               <a:rPr lang="es-CL" smtClean="0"/>
-              <a:t>02-12-2018</a:t>
+              <a:t>03-12-2018</a:t>
             </a:fld>
             <a:endParaRPr lang="es-CL"/>
           </a:p>
@@ -1281,7 +1284,7 @@
           <a:p>
             <a:fld id="{3BE2AC6D-F750-44BB-A0B8-07BFEA35E468}" type="datetimeFigureOut">
               <a:rPr lang="es-CL" smtClean="0"/>
-              <a:t>02-12-2018</a:t>
+              <a:t>03-12-2018</a:t>
             </a:fld>
             <a:endParaRPr lang="es-CL"/>
           </a:p>
@@ -1595,7 +1598,7 @@
           <a:p>
             <a:fld id="{3BE2AC6D-F750-44BB-A0B8-07BFEA35E468}" type="datetimeFigureOut">
               <a:rPr lang="es-CL" smtClean="0"/>
-              <a:t>02-12-2018</a:t>
+              <a:t>03-12-2018</a:t>
             </a:fld>
             <a:endParaRPr lang="es-CL"/>
           </a:p>
@@ -1936,7 +1939,7 @@
           <a:p>
             <a:fld id="{3BE2AC6D-F750-44BB-A0B8-07BFEA35E468}" type="datetimeFigureOut">
               <a:rPr lang="es-CL" smtClean="0"/>
-              <a:t>02-12-2018</a:t>
+              <a:t>03-12-2018</a:t>
             </a:fld>
             <a:endParaRPr lang="es-CL"/>
           </a:p>
@@ -2250,7 +2253,7 @@
           <a:p>
             <a:fld id="{3BE2AC6D-F750-44BB-A0B8-07BFEA35E468}" type="datetimeFigureOut">
               <a:rPr lang="es-CL" smtClean="0"/>
-              <a:t>02-12-2018</a:t>
+              <a:t>03-12-2018</a:t>
             </a:fld>
             <a:endParaRPr lang="es-CL"/>
           </a:p>
@@ -2643,7 +2646,7 @@
           <a:p>
             <a:fld id="{3BE2AC6D-F750-44BB-A0B8-07BFEA35E468}" type="datetimeFigureOut">
               <a:rPr lang="es-CL" smtClean="0"/>
-              <a:t>02-12-2018</a:t>
+              <a:t>03-12-2018</a:t>
             </a:fld>
             <a:endParaRPr lang="es-CL"/>
           </a:p>
@@ -2813,7 +2816,7 @@
           <a:p>
             <a:fld id="{3BE2AC6D-F750-44BB-A0B8-07BFEA35E468}" type="datetimeFigureOut">
               <a:rPr lang="es-CL" smtClean="0"/>
-              <a:t>02-12-2018</a:t>
+              <a:t>03-12-2018</a:t>
             </a:fld>
             <a:endParaRPr lang="es-CL"/>
           </a:p>
@@ -2993,7 +2996,7 @@
           <a:p>
             <a:fld id="{3BE2AC6D-F750-44BB-A0B8-07BFEA35E468}" type="datetimeFigureOut">
               <a:rPr lang="es-CL" smtClean="0"/>
-              <a:t>02-12-2018</a:t>
+              <a:t>03-12-2018</a:t>
             </a:fld>
             <a:endParaRPr lang="es-CL"/>
           </a:p>
@@ -3399,7 +3402,7 @@
           <a:p>
             <a:fld id="{3BE2AC6D-F750-44BB-A0B8-07BFEA35E468}" type="datetimeFigureOut">
               <a:rPr lang="es-CL" smtClean="0"/>
-              <a:t>02-12-2018</a:t>
+              <a:t>03-12-2018</a:t>
             </a:fld>
             <a:endParaRPr lang="es-CL"/>
           </a:p>
@@ -3631,7 +3634,7 @@
           <a:p>
             <a:fld id="{3BE2AC6D-F750-44BB-A0B8-07BFEA35E468}" type="datetimeFigureOut">
               <a:rPr lang="es-CL" smtClean="0"/>
-              <a:t>02-12-2018</a:t>
+              <a:t>03-12-2018</a:t>
             </a:fld>
             <a:endParaRPr lang="es-CL"/>
           </a:p>
@@ -4005,7 +4008,7 @@
           <a:p>
             <a:fld id="{3BE2AC6D-F750-44BB-A0B8-07BFEA35E468}" type="datetimeFigureOut">
               <a:rPr lang="es-CL" smtClean="0"/>
-              <a:t>02-12-2018</a:t>
+              <a:t>03-12-2018</a:t>
             </a:fld>
             <a:endParaRPr lang="es-CL"/>
           </a:p>
@@ -4128,7 +4131,7 @@
           <a:p>
             <a:fld id="{3BE2AC6D-F750-44BB-A0B8-07BFEA35E468}" type="datetimeFigureOut">
               <a:rPr lang="es-CL" smtClean="0"/>
-              <a:t>02-12-2018</a:t>
+              <a:t>03-12-2018</a:t>
             </a:fld>
             <a:endParaRPr lang="es-CL"/>
           </a:p>
@@ -4223,7 +4226,7 @@
           <a:p>
             <a:fld id="{3BE2AC6D-F750-44BB-A0B8-07BFEA35E468}" type="datetimeFigureOut">
               <a:rPr lang="es-CL" smtClean="0"/>
-              <a:t>02-12-2018</a:t>
+              <a:t>03-12-2018</a:t>
             </a:fld>
             <a:endParaRPr lang="es-CL"/>
           </a:p>
@@ -4478,7 +4481,7 @@
           <a:p>
             <a:fld id="{3BE2AC6D-F750-44BB-A0B8-07BFEA35E468}" type="datetimeFigureOut">
               <a:rPr lang="es-CL" smtClean="0"/>
-              <a:t>02-12-2018</a:t>
+              <a:t>03-12-2018</a:t>
             </a:fld>
             <a:endParaRPr lang="es-CL"/>
           </a:p>
@@ -4741,7 +4744,7 @@
           <a:p>
             <a:fld id="{3BE2AC6D-F750-44BB-A0B8-07BFEA35E468}" type="datetimeFigureOut">
               <a:rPr lang="es-CL" smtClean="0"/>
-              <a:t>02-12-2018</a:t>
+              <a:t>03-12-2018</a:t>
             </a:fld>
             <a:endParaRPr lang="es-CL"/>
           </a:p>
@@ -5484,7 +5487,7 @@
           <a:p>
             <a:fld id="{3BE2AC6D-F750-44BB-A0B8-07BFEA35E468}" type="datetimeFigureOut">
               <a:rPr lang="es-CL" smtClean="0"/>
-              <a:t>02-12-2018</a:t>
+              <a:t>03-12-2018</a:t>
             </a:fld>
             <a:endParaRPr lang="es-CL"/>
           </a:p>
@@ -6033,6 +6036,10 @@
           </p:nvPr>
         </p:nvSpPr>
         <p:spPr>
+          <a:xfrm>
+            <a:off x="2212530" y="2369425"/>
+            <a:ext cx="7766936" cy="1646302"/>
+          </a:xfrm>
           <a:ln w="3175">
             <a:noFill/>
           </a:ln>
@@ -6289,7 +6296,7 @@
         </p:nvSpPr>
         <p:spPr>
           <a:xfrm>
-            <a:off x="2079501" y="4604972"/>
+            <a:off x="1893877" y="4512963"/>
             <a:ext cx="3875518" cy="923330"/>
           </a:xfrm>
           <a:prstGeom prst="rect">
@@ -6334,7 +6341,7 @@
         </p:nvSpPr>
         <p:spPr>
           <a:xfrm>
-            <a:off x="6711716" y="4198265"/>
+            <a:off x="7019829" y="4031340"/>
             <a:ext cx="2846845" cy="2585323"/>
           </a:xfrm>
           <a:prstGeom prst="rect">
@@ -6349,7 +6356,7 @@
           <a:p>
             <a:r>
               <a:rPr lang="es-CL" b="1" dirty="0"/>
-              <a:t>Alumnos</a:t>
+              <a:t>Estudiantes</a:t>
             </a:r>
           </a:p>
           <a:p>
@@ -6410,7 +6417,7 @@
         </p:nvSpPr>
         <p:spPr>
           <a:xfrm>
-            <a:off x="2862925" y="5935008"/>
+            <a:off x="2862925" y="5933529"/>
             <a:ext cx="1937422" cy="646331"/>
           </a:xfrm>
           <a:prstGeom prst="rect">

</xml_diff>

<commit_message>
Avance en la presentación
</commit_message>
<xml_diff>
--- a/2018/TT IQQ 2018 Camara y Garay.pptx
+++ b/2018/TT IQQ 2018 Camara y Garay.pptx
@@ -5,7 +5,7 @@
     <p:sldMasterId id="2147483967" r:id="rId1"/>
   </p:sldMasterIdLst>
   <p:handoutMasterIdLst>
-    <p:handoutMasterId r:id="rId7"/>
+    <p:handoutMasterId r:id="rId12"/>
   </p:handoutMasterIdLst>
   <p:sldIdLst>
     <p:sldId id="258" r:id="rId2"/>
@@ -13,6 +13,11 @@
     <p:sldId id="260" r:id="rId4"/>
     <p:sldId id="261" r:id="rId5"/>
     <p:sldId id="263" r:id="rId6"/>
+    <p:sldId id="264" r:id="rId7"/>
+    <p:sldId id="265" r:id="rId8"/>
+    <p:sldId id="266" r:id="rId9"/>
+    <p:sldId id="267" r:id="rId10"/>
+    <p:sldId id="268" r:id="rId11"/>
   </p:sldIdLst>
   <p:sldSz cx="12192000" cy="6858000"/>
   <p:notesSz cx="6858000" cy="9144000"/>
@@ -216,7 +221,7 @@
           <a:p>
             <a:fld id="{889AAA34-CE1E-48C9-A4CD-CFA775F628BC}" type="datetimeFigureOut">
               <a:rPr lang="es-CL" smtClean="0"/>
-              <a:t>03-12-2018</a:t>
+              <a:t>06-12-2018</a:t>
             </a:fld>
             <a:endParaRPr lang="es-CL"/>
           </a:p>
@@ -1033,7 +1038,7 @@
           <a:p>
             <a:fld id="{3BE2AC6D-F750-44BB-A0B8-07BFEA35E468}" type="datetimeFigureOut">
               <a:rPr lang="es-CL" smtClean="0"/>
-              <a:t>03-12-2018</a:t>
+              <a:t>06-12-2018</a:t>
             </a:fld>
             <a:endParaRPr lang="es-CL"/>
           </a:p>
@@ -1284,7 +1289,7 @@
           <a:p>
             <a:fld id="{3BE2AC6D-F750-44BB-A0B8-07BFEA35E468}" type="datetimeFigureOut">
               <a:rPr lang="es-CL" smtClean="0"/>
-              <a:t>03-12-2018</a:t>
+              <a:t>06-12-2018</a:t>
             </a:fld>
             <a:endParaRPr lang="es-CL"/>
           </a:p>
@@ -1598,7 +1603,7 @@
           <a:p>
             <a:fld id="{3BE2AC6D-F750-44BB-A0B8-07BFEA35E468}" type="datetimeFigureOut">
               <a:rPr lang="es-CL" smtClean="0"/>
-              <a:t>03-12-2018</a:t>
+              <a:t>06-12-2018</a:t>
             </a:fld>
             <a:endParaRPr lang="es-CL"/>
           </a:p>
@@ -1939,7 +1944,7 @@
           <a:p>
             <a:fld id="{3BE2AC6D-F750-44BB-A0B8-07BFEA35E468}" type="datetimeFigureOut">
               <a:rPr lang="es-CL" smtClean="0"/>
-              <a:t>03-12-2018</a:t>
+              <a:t>06-12-2018</a:t>
             </a:fld>
             <a:endParaRPr lang="es-CL"/>
           </a:p>
@@ -2253,7 +2258,7 @@
           <a:p>
             <a:fld id="{3BE2AC6D-F750-44BB-A0B8-07BFEA35E468}" type="datetimeFigureOut">
               <a:rPr lang="es-CL" smtClean="0"/>
-              <a:t>03-12-2018</a:t>
+              <a:t>06-12-2018</a:t>
             </a:fld>
             <a:endParaRPr lang="es-CL"/>
           </a:p>
@@ -2646,7 +2651,7 @@
           <a:p>
             <a:fld id="{3BE2AC6D-F750-44BB-A0B8-07BFEA35E468}" type="datetimeFigureOut">
               <a:rPr lang="es-CL" smtClean="0"/>
-              <a:t>03-12-2018</a:t>
+              <a:t>06-12-2018</a:t>
             </a:fld>
             <a:endParaRPr lang="es-CL"/>
           </a:p>
@@ -2816,7 +2821,7 @@
           <a:p>
             <a:fld id="{3BE2AC6D-F750-44BB-A0B8-07BFEA35E468}" type="datetimeFigureOut">
               <a:rPr lang="es-CL" smtClean="0"/>
-              <a:t>03-12-2018</a:t>
+              <a:t>06-12-2018</a:t>
             </a:fld>
             <a:endParaRPr lang="es-CL"/>
           </a:p>
@@ -2996,7 +3001,7 @@
           <a:p>
             <a:fld id="{3BE2AC6D-F750-44BB-A0B8-07BFEA35E468}" type="datetimeFigureOut">
               <a:rPr lang="es-CL" smtClean="0"/>
-              <a:t>03-12-2018</a:t>
+              <a:t>06-12-2018</a:t>
             </a:fld>
             <a:endParaRPr lang="es-CL"/>
           </a:p>
@@ -3402,7 +3407,7 @@
           <a:p>
             <a:fld id="{3BE2AC6D-F750-44BB-A0B8-07BFEA35E468}" type="datetimeFigureOut">
               <a:rPr lang="es-CL" smtClean="0"/>
-              <a:t>03-12-2018</a:t>
+              <a:t>06-12-2018</a:t>
             </a:fld>
             <a:endParaRPr lang="es-CL"/>
           </a:p>
@@ -3634,7 +3639,7 @@
           <a:p>
             <a:fld id="{3BE2AC6D-F750-44BB-A0B8-07BFEA35E468}" type="datetimeFigureOut">
               <a:rPr lang="es-CL" smtClean="0"/>
-              <a:t>03-12-2018</a:t>
+              <a:t>06-12-2018</a:t>
             </a:fld>
             <a:endParaRPr lang="es-CL"/>
           </a:p>
@@ -4008,7 +4013,7 @@
           <a:p>
             <a:fld id="{3BE2AC6D-F750-44BB-A0B8-07BFEA35E468}" type="datetimeFigureOut">
               <a:rPr lang="es-CL" smtClean="0"/>
-              <a:t>03-12-2018</a:t>
+              <a:t>06-12-2018</a:t>
             </a:fld>
             <a:endParaRPr lang="es-CL"/>
           </a:p>
@@ -4131,7 +4136,7 @@
           <a:p>
             <a:fld id="{3BE2AC6D-F750-44BB-A0B8-07BFEA35E468}" type="datetimeFigureOut">
               <a:rPr lang="es-CL" smtClean="0"/>
-              <a:t>03-12-2018</a:t>
+              <a:t>06-12-2018</a:t>
             </a:fld>
             <a:endParaRPr lang="es-CL"/>
           </a:p>
@@ -4226,7 +4231,7 @@
           <a:p>
             <a:fld id="{3BE2AC6D-F750-44BB-A0B8-07BFEA35E468}" type="datetimeFigureOut">
               <a:rPr lang="es-CL" smtClean="0"/>
-              <a:t>03-12-2018</a:t>
+              <a:t>06-12-2018</a:t>
             </a:fld>
             <a:endParaRPr lang="es-CL"/>
           </a:p>
@@ -4481,7 +4486,7 @@
           <a:p>
             <a:fld id="{3BE2AC6D-F750-44BB-A0B8-07BFEA35E468}" type="datetimeFigureOut">
               <a:rPr lang="es-CL" smtClean="0"/>
-              <a:t>03-12-2018</a:t>
+              <a:t>06-12-2018</a:t>
             </a:fld>
             <a:endParaRPr lang="es-CL"/>
           </a:p>
@@ -4744,7 +4749,7 @@
           <a:p>
             <a:fld id="{3BE2AC6D-F750-44BB-A0B8-07BFEA35E468}" type="datetimeFigureOut">
               <a:rPr lang="es-CL" smtClean="0"/>
-              <a:t>03-12-2018</a:t>
+              <a:t>06-12-2018</a:t>
             </a:fld>
             <a:endParaRPr lang="es-CL"/>
           </a:p>
@@ -5487,7 +5492,7 @@
           <a:p>
             <a:fld id="{3BE2AC6D-F750-44BB-A0B8-07BFEA35E468}" type="datetimeFigureOut">
               <a:rPr lang="es-CL" smtClean="0"/>
-              <a:t>03-12-2018</a:t>
+              <a:t>06-12-2018</a:t>
             </a:fld>
             <a:endParaRPr lang="es-CL"/>
           </a:p>
@@ -6458,6 +6463,462 @@
 </p:sld>
 </file>
 
+<file path=ppt/slides/slide10.xml><?xml version="1.0" encoding="utf-8"?>
+<p:sld xmlns:a="http://schemas.openxmlformats.org/drawingml/2006/main" xmlns:r="http://schemas.openxmlformats.org/officeDocument/2006/relationships" xmlns:p="http://schemas.openxmlformats.org/presentationml/2006/main">
+  <p:cSld>
+    <p:spTree>
+      <p:nvGrpSpPr>
+        <p:cNvPr id="1" name=""/>
+        <p:cNvGrpSpPr/>
+        <p:nvPr/>
+      </p:nvGrpSpPr>
+      <p:grpSpPr>
+        <a:xfrm>
+          <a:off x="0" y="0"/>
+          <a:ext cx="0" cy="0"/>
+          <a:chOff x="0" y="0"/>
+          <a:chExt cx="0" cy="0"/>
+        </a:xfrm>
+      </p:grpSpPr>
+      <p:sp>
+        <p:nvSpPr>
+          <p:cNvPr id="32" name="Título 1">
+            <a:extLst>
+              <a:ext uri="{FF2B5EF4-FFF2-40B4-BE49-F238E27FC236}">
+                <a16:creationId xmlns:a16="http://schemas.microsoft.com/office/drawing/2014/main" id="{AB0C6F9A-6461-4EDA-9D4D-A6D75F43B879}"/>
+              </a:ext>
+            </a:extLst>
+          </p:cNvPr>
+          <p:cNvSpPr>
+            <a:spLocks noGrp="1"/>
+          </p:cNvSpPr>
+          <p:nvPr>
+            <p:ph type="ctrTitle"/>
+          </p:nvPr>
+        </p:nvSpPr>
+        <p:spPr>
+          <a:xfrm>
+            <a:off x="2212530" y="2369425"/>
+            <a:ext cx="7766936" cy="1646302"/>
+          </a:xfrm>
+          <a:ln w="3175">
+            <a:noFill/>
+          </a:ln>
+        </p:spPr>
+        <p:txBody>
+          <a:bodyPr vert="horz" lIns="91440" tIns="45720" rIns="91440" bIns="45720" rtlCol="0" anchor="ctr">
+            <a:normAutofit/>
+          </a:bodyPr>
+          <a:lstStyle/>
+          <a:p>
+            <a:pPr algn="ctr"/>
+            <a:r>
+              <a:rPr lang="es-CL" sz="2800" dirty="0">
+                <a:solidFill>
+                  <a:schemeClr val="tx1"/>
+                </a:solidFill>
+                <a:effectLst>
+                  <a:outerShdw blurRad="38100" dist="38100" dir="2700000" algn="tl">
+                    <a:srgbClr val="000000">
+                      <a:alpha val="43137"/>
+                    </a:srgbClr>
+                  </a:outerShdw>
+                </a:effectLst>
+                <a:latin typeface="+mn-lt"/>
+                <a:cs typeface="Arial" panose="020B0604020202020204" pitchFamily="34" charset="0"/>
+              </a:rPr>
+              <a:t>“Elaboración de un Manual de Buenas Prácticas para el Desarrollo de Proyectos Informáticos en </a:t>
+            </a:r>
+            <a:br>
+              <a:rPr lang="es-CL" sz="2800" dirty="0">
+                <a:solidFill>
+                  <a:schemeClr val="tx1"/>
+                </a:solidFill>
+                <a:effectLst>
+                  <a:outerShdw blurRad="38100" dist="38100" dir="2700000" algn="tl">
+                    <a:srgbClr val="000000">
+                      <a:alpha val="43137"/>
+                    </a:srgbClr>
+                  </a:outerShdw>
+                </a:effectLst>
+                <a:latin typeface="+mn-lt"/>
+                <a:cs typeface="Arial" panose="020B0604020202020204" pitchFamily="34" charset="0"/>
+              </a:rPr>
+            </a:br>
+            <a:r>
+              <a:rPr lang="es-CL" sz="2800" dirty="0">
+                <a:solidFill>
+                  <a:schemeClr val="tx1"/>
+                </a:solidFill>
+                <a:effectLst>
+                  <a:outerShdw blurRad="38100" dist="38100" dir="2700000" algn="tl">
+                    <a:srgbClr val="000000">
+                      <a:alpha val="43137"/>
+                    </a:srgbClr>
+                  </a:outerShdw>
+                </a:effectLst>
+                <a:latin typeface="+mn-lt"/>
+                <a:cs typeface="Arial" panose="020B0604020202020204" pitchFamily="34" charset="0"/>
+              </a:rPr>
+              <a:t>ZOFRI S.A.”</a:t>
+            </a:r>
+            <a:endParaRPr lang="en-US" sz="2800" dirty="0">
+              <a:solidFill>
+                <a:schemeClr val="tx1"/>
+              </a:solidFill>
+              <a:effectLst>
+                <a:outerShdw blurRad="38100" dist="38100" dir="2700000" algn="tl">
+                  <a:srgbClr val="000000">
+                    <a:alpha val="43137"/>
+                  </a:srgbClr>
+                </a:outerShdw>
+              </a:effectLst>
+              <a:latin typeface="+mn-lt"/>
+              <a:cs typeface="Arial" panose="020B0604020202020204" pitchFamily="34" charset="0"/>
+            </a:endParaRPr>
+          </a:p>
+        </p:txBody>
+      </p:sp>
+      <p:pic>
+        <p:nvPicPr>
+          <p:cNvPr id="34" name="Imagen 2">
+            <a:extLst>
+              <a:ext uri="{FF2B5EF4-FFF2-40B4-BE49-F238E27FC236}">
+                <a16:creationId xmlns:a16="http://schemas.microsoft.com/office/drawing/2014/main" id="{A7452294-7B27-4A84-852B-0005176BFC40}"/>
+              </a:ext>
+            </a:extLst>
+          </p:cNvPr>
+          <p:cNvPicPr>
+            <a:picLocks noChangeAspect="1" noChangeArrowheads="1"/>
+          </p:cNvPicPr>
+          <p:nvPr/>
+        </p:nvPicPr>
+        <p:blipFill>
+          <a:blip r:embed="rId2">
+            <a:extLst>
+              <a:ext uri="{28A0092B-C50C-407E-A947-70E740481C1C}">
+                <a14:useLocalDpi xmlns:a14="http://schemas.microsoft.com/office/drawing/2010/main" val="0"/>
+              </a:ext>
+            </a:extLst>
+          </a:blip>
+          <a:srcRect/>
+          <a:stretch>
+            <a:fillRect/>
+          </a:stretch>
+        </p:blipFill>
+        <p:spPr bwMode="auto">
+          <a:xfrm>
+            <a:off x="5065711" y="241337"/>
+            <a:ext cx="2060575" cy="1652587"/>
+          </a:xfrm>
+          <a:prstGeom prst="rect">
+            <a:avLst/>
+          </a:prstGeom>
+          <a:noFill/>
+          <a:extLst>
+            <a:ext uri="{909E8E84-426E-40DD-AFC4-6F175D3DCCD1}">
+              <a14:hiddenFill xmlns:a14="http://schemas.microsoft.com/office/drawing/2010/main">
+                <a:solidFill>
+                  <a:srgbClr val="FFFFFF"/>
+                </a:solidFill>
+              </a14:hiddenFill>
+            </a:ext>
+          </a:extLst>
+        </p:spPr>
+      </p:pic>
+      <p:sp>
+        <p:nvSpPr>
+          <p:cNvPr id="36" name="Título 1">
+            <a:extLst>
+              <a:ext uri="{FF2B5EF4-FFF2-40B4-BE49-F238E27FC236}">
+                <a16:creationId xmlns:a16="http://schemas.microsoft.com/office/drawing/2014/main" id="{1A67277A-3074-4F03-9173-00A6CB561B48}"/>
+              </a:ext>
+            </a:extLst>
+          </p:cNvPr>
+          <p:cNvSpPr txBox="1">
+            <a:spLocks/>
+          </p:cNvSpPr>
+          <p:nvPr/>
+        </p:nvSpPr>
+        <p:spPr>
+          <a:xfrm>
+            <a:off x="0" y="1986932"/>
+            <a:ext cx="12191999" cy="382493"/>
+          </a:xfrm>
+          <a:prstGeom prst="rect">
+            <a:avLst/>
+          </a:prstGeom>
+          <a:ln w="3175">
+            <a:noFill/>
+          </a:ln>
+        </p:spPr>
+        <p:txBody>
+          <a:bodyPr vert="horz" lIns="91440" tIns="45720" rIns="91440" bIns="45720" rtlCol="0" anchor="ctr">
+            <a:normAutofit/>
+          </a:bodyPr>
+          <a:lstStyle>
+            <a:lvl1pPr algn="l" defTabSz="457200" rtl="0" eaLnBrk="1" latinLnBrk="0" hangingPunct="1">
+              <a:spcBef>
+                <a:spcPct val="0"/>
+              </a:spcBef>
+              <a:buNone/>
+              <a:defRPr sz="3600" kern="1200">
+                <a:solidFill>
+                  <a:schemeClr val="accent1"/>
+                </a:solidFill>
+                <a:latin typeface="+mj-lt"/>
+                <a:ea typeface="+mj-ea"/>
+                <a:cs typeface="+mj-cs"/>
+              </a:defRPr>
+            </a:lvl1pPr>
+            <a:lvl2pPr eaLnBrk="1" hangingPunct="1">
+              <a:defRPr>
+                <a:solidFill>
+                  <a:schemeClr val="tx2"/>
+                </a:solidFill>
+              </a:defRPr>
+            </a:lvl2pPr>
+            <a:lvl3pPr eaLnBrk="1" hangingPunct="1">
+              <a:defRPr>
+                <a:solidFill>
+                  <a:schemeClr val="tx2"/>
+                </a:solidFill>
+              </a:defRPr>
+            </a:lvl3pPr>
+            <a:lvl4pPr eaLnBrk="1" hangingPunct="1">
+              <a:defRPr>
+                <a:solidFill>
+                  <a:schemeClr val="tx2"/>
+                </a:solidFill>
+              </a:defRPr>
+            </a:lvl4pPr>
+            <a:lvl5pPr eaLnBrk="1" hangingPunct="1">
+              <a:defRPr>
+                <a:solidFill>
+                  <a:schemeClr val="tx2"/>
+                </a:solidFill>
+              </a:defRPr>
+            </a:lvl5pPr>
+            <a:lvl6pPr eaLnBrk="1" hangingPunct="1">
+              <a:defRPr>
+                <a:solidFill>
+                  <a:schemeClr val="tx2"/>
+                </a:solidFill>
+              </a:defRPr>
+            </a:lvl6pPr>
+            <a:lvl7pPr eaLnBrk="1" hangingPunct="1">
+              <a:defRPr>
+                <a:solidFill>
+                  <a:schemeClr val="tx2"/>
+                </a:solidFill>
+              </a:defRPr>
+            </a:lvl7pPr>
+            <a:lvl8pPr eaLnBrk="1" hangingPunct="1">
+              <a:defRPr>
+                <a:solidFill>
+                  <a:schemeClr val="tx2"/>
+                </a:solidFill>
+              </a:defRPr>
+            </a:lvl8pPr>
+            <a:lvl9pPr eaLnBrk="1" hangingPunct="1">
+              <a:defRPr>
+                <a:solidFill>
+                  <a:schemeClr val="tx2"/>
+                </a:solidFill>
+              </a:defRPr>
+            </a:lvl9pPr>
+          </a:lstStyle>
+          <a:p>
+            <a:pPr algn="ctr"/>
+            <a:r>
+              <a:rPr lang="en-US" sz="1400" b="1" dirty="0">
+                <a:solidFill>
+                  <a:schemeClr val="tx1"/>
+                </a:solidFill>
+                <a:latin typeface="+mn-lt"/>
+                <a:cs typeface="Arial" panose="020B0604020202020204" pitchFamily="34" charset="0"/>
+              </a:rPr>
+              <a:t>FACULTAD DE INGENIERÍA Y ARQUITECTURA</a:t>
+            </a:r>
+          </a:p>
+        </p:txBody>
+      </p:sp>
+      <p:sp>
+        <p:nvSpPr>
+          <p:cNvPr id="38" name="Rectángulo 37">
+            <a:extLst>
+              <a:ext uri="{FF2B5EF4-FFF2-40B4-BE49-F238E27FC236}">
+                <a16:creationId xmlns:a16="http://schemas.microsoft.com/office/drawing/2014/main" id="{ECC0EF95-5142-4852-81EE-4EB13FED66ED}"/>
+              </a:ext>
+            </a:extLst>
+          </p:cNvPr>
+          <p:cNvSpPr/>
+          <p:nvPr/>
+        </p:nvSpPr>
+        <p:spPr>
+          <a:xfrm>
+            <a:off x="1893877" y="4512963"/>
+            <a:ext cx="3875518" cy="923330"/>
+          </a:xfrm>
+          <a:prstGeom prst="rect">
+            <a:avLst/>
+          </a:prstGeom>
+          <a:ln w="3175">
+            <a:noFill/>
+          </a:ln>
+        </p:spPr>
+        <p:txBody>
+          <a:bodyPr wrap="square">
+            <a:spAutoFit/>
+          </a:bodyPr>
+          <a:lstStyle/>
+          <a:p>
+            <a:pPr algn="ctr"/>
+            <a:r>
+              <a:rPr lang="es-CL" dirty="0"/>
+              <a:t>Memoria para optar al Título</a:t>
+            </a:r>
+          </a:p>
+          <a:p>
+            <a:pPr algn="ctr"/>
+            <a:r>
+              <a:rPr lang="es-CL" b="1" dirty="0"/>
+              <a:t>“Ingeniero Civil Industrial Mención Gestión”</a:t>
+            </a:r>
+          </a:p>
+        </p:txBody>
+      </p:sp>
+      <p:sp>
+        <p:nvSpPr>
+          <p:cNvPr id="40" name="Rectángulo 39">
+            <a:extLst>
+              <a:ext uri="{FF2B5EF4-FFF2-40B4-BE49-F238E27FC236}">
+                <a16:creationId xmlns:a16="http://schemas.microsoft.com/office/drawing/2014/main" id="{DF6CA437-2226-4077-9E6D-239A983EFB8A}"/>
+              </a:ext>
+            </a:extLst>
+          </p:cNvPr>
+          <p:cNvSpPr/>
+          <p:nvPr/>
+        </p:nvSpPr>
+        <p:spPr>
+          <a:xfrm>
+            <a:off x="7019829" y="4031340"/>
+            <a:ext cx="2846845" cy="2585323"/>
+          </a:xfrm>
+          <a:prstGeom prst="rect">
+            <a:avLst/>
+          </a:prstGeom>
+        </p:spPr>
+        <p:txBody>
+          <a:bodyPr wrap="square">
+            <a:spAutoFit/>
+          </a:bodyPr>
+          <a:lstStyle/>
+          <a:p>
+            <a:r>
+              <a:rPr lang="es-CL" b="1" dirty="0"/>
+              <a:t>Estudiantes</a:t>
+            </a:r>
+          </a:p>
+          <a:p>
+            <a:r>
+              <a:rPr lang="es-CL" dirty="0"/>
+              <a:t>Mauricio Cámara Molina</a:t>
+            </a:r>
+          </a:p>
+          <a:p>
+            <a:r>
+              <a:rPr lang="es-CL" dirty="0"/>
+              <a:t>Manuel Garay Riquelme</a:t>
+            </a:r>
+          </a:p>
+          <a:p>
+            <a:endParaRPr lang="es-CL" b="1" dirty="0"/>
+          </a:p>
+          <a:p>
+            <a:r>
+              <a:rPr lang="es-CL" b="1" dirty="0"/>
+              <a:t>Profesor Patrocinante</a:t>
+            </a:r>
+          </a:p>
+          <a:p>
+            <a:r>
+              <a:rPr lang="es-CL" dirty="0"/>
+              <a:t>Jaime Lam Moraga</a:t>
+            </a:r>
+          </a:p>
+          <a:p>
+            <a:endParaRPr lang="es-CL" b="1" dirty="0"/>
+          </a:p>
+          <a:p>
+            <a:r>
+              <a:rPr lang="es-CL" b="1" dirty="0"/>
+              <a:t>Profesor Colaborador</a:t>
+            </a:r>
+          </a:p>
+          <a:p>
+            <a:r>
+              <a:rPr lang="es-CL" dirty="0"/>
+              <a:t>Andrés Pulgar Seguel</a:t>
+            </a:r>
+          </a:p>
+        </p:txBody>
+      </p:sp>
+      <p:sp>
+        <p:nvSpPr>
+          <p:cNvPr id="43" name="Rectángulo 42">
+            <a:extLst>
+              <a:ext uri="{FF2B5EF4-FFF2-40B4-BE49-F238E27FC236}">
+                <a16:creationId xmlns:a16="http://schemas.microsoft.com/office/drawing/2014/main" id="{A759F881-73DF-4EB2-98C8-7A4E6D3DCC67}"/>
+              </a:ext>
+            </a:extLst>
+          </p:cNvPr>
+          <p:cNvSpPr/>
+          <p:nvPr/>
+        </p:nvSpPr>
+        <p:spPr>
+          <a:xfrm>
+            <a:off x="2862925" y="5933529"/>
+            <a:ext cx="1937422" cy="646331"/>
+          </a:xfrm>
+          <a:prstGeom prst="rect">
+            <a:avLst/>
+          </a:prstGeom>
+        </p:spPr>
+        <p:txBody>
+          <a:bodyPr wrap="square">
+            <a:spAutoFit/>
+          </a:bodyPr>
+          <a:lstStyle/>
+          <a:p>
+            <a:pPr algn="ctr"/>
+            <a:r>
+              <a:rPr lang="es-CL" dirty="0"/>
+              <a:t>Iquique – Chile</a:t>
+            </a:r>
+          </a:p>
+          <a:p>
+            <a:pPr algn="ctr"/>
+            <a:r>
+              <a:rPr lang="es-CL" dirty="0"/>
+              <a:t>Diciembre 2018</a:t>
+            </a:r>
+          </a:p>
+        </p:txBody>
+      </p:sp>
+    </p:spTree>
+    <p:extLst>
+      <p:ext uri="{BB962C8B-B14F-4D97-AF65-F5344CB8AC3E}">
+        <p14:creationId xmlns:p14="http://schemas.microsoft.com/office/powerpoint/2010/main" val="1170978291"/>
+      </p:ext>
+    </p:extLst>
+  </p:cSld>
+  <p:clrMapOvr>
+    <a:masterClrMapping/>
+  </p:clrMapOvr>
+</p:sld>
+</file>
+
 <file path=ppt/slides/slide2.xml><?xml version="1.0" encoding="utf-8"?>
 <p:sld xmlns:a="http://schemas.openxmlformats.org/drawingml/2006/main" xmlns:r="http://schemas.openxmlformats.org/officeDocument/2006/relationships" xmlns:p="http://schemas.openxmlformats.org/presentationml/2006/main">
   <p:cSld>
@@ -7856,6 +8317,580 @@
     <p:extLst>
       <p:ext uri="{BB962C8B-B14F-4D97-AF65-F5344CB8AC3E}">
         <p14:creationId xmlns:p14="http://schemas.microsoft.com/office/powerpoint/2010/main" val="1311091605"/>
+      </p:ext>
+    </p:extLst>
+  </p:cSld>
+  <p:clrMapOvr>
+    <a:masterClrMapping/>
+  </p:clrMapOvr>
+</p:sld>
+</file>
+
+<file path=ppt/slides/slide6.xml><?xml version="1.0" encoding="utf-8"?>
+<p:sld xmlns:a="http://schemas.openxmlformats.org/drawingml/2006/main" xmlns:r="http://schemas.openxmlformats.org/officeDocument/2006/relationships" xmlns:p="http://schemas.openxmlformats.org/presentationml/2006/main">
+  <p:cSld>
+    <p:spTree>
+      <p:nvGrpSpPr>
+        <p:cNvPr id="1" name=""/>
+        <p:cNvGrpSpPr/>
+        <p:nvPr/>
+      </p:nvGrpSpPr>
+      <p:grpSpPr>
+        <a:xfrm>
+          <a:off x="0" y="0"/>
+          <a:ext cx="0" cy="0"/>
+          <a:chOff x="0" y="0"/>
+          <a:chExt cx="0" cy="0"/>
+        </a:xfrm>
+      </p:grpSpPr>
+      <p:sp>
+        <p:nvSpPr>
+          <p:cNvPr id="2" name="Título 1">
+            <a:extLst>
+              <a:ext uri="{FF2B5EF4-FFF2-40B4-BE49-F238E27FC236}">
+                <a16:creationId xmlns:a16="http://schemas.microsoft.com/office/drawing/2014/main" id="{96D87ABC-3F9F-4AAA-98D0-27A2C9E307F2}"/>
+              </a:ext>
+            </a:extLst>
+          </p:cNvPr>
+          <p:cNvSpPr>
+            <a:spLocks noGrp="1"/>
+          </p:cNvSpPr>
+          <p:nvPr>
+            <p:ph type="title"/>
+          </p:nvPr>
+        </p:nvSpPr>
+        <p:spPr/>
+        <p:txBody>
+          <a:bodyPr/>
+          <a:lstStyle/>
+          <a:p>
+            <a:r>
+              <a:rPr lang="es-CL" dirty="0"/>
+              <a:t>Problemática</a:t>
+            </a:r>
+          </a:p>
+        </p:txBody>
+      </p:sp>
+      <p:sp>
+        <p:nvSpPr>
+          <p:cNvPr id="3" name="Marcador de contenido 2">
+            <a:extLst>
+              <a:ext uri="{FF2B5EF4-FFF2-40B4-BE49-F238E27FC236}">
+                <a16:creationId xmlns:a16="http://schemas.microsoft.com/office/drawing/2014/main" id="{A7CCCAB9-5C1B-4554-B40A-BA522687BAE9}"/>
+              </a:ext>
+            </a:extLst>
+          </p:cNvPr>
+          <p:cNvSpPr>
+            <a:spLocks noGrp="1"/>
+          </p:cNvSpPr>
+          <p:nvPr>
+            <p:ph idx="1"/>
+          </p:nvPr>
+        </p:nvSpPr>
+        <p:spPr/>
+        <p:txBody>
+          <a:bodyPr/>
+          <a:lstStyle/>
+          <a:p>
+            <a:r>
+              <a:rPr lang="es-CL" dirty="0"/>
+              <a:t>¿Por qué esta memoria?</a:t>
+            </a:r>
+          </a:p>
+          <a:p>
+            <a:r>
+              <a:rPr lang="es-CL" dirty="0"/>
+              <a:t>¿Cuál es la necesidad?</a:t>
+            </a:r>
+          </a:p>
+          <a:p>
+            <a:r>
+              <a:rPr lang="es-CL" dirty="0"/>
+              <a:t>¿Qué se analizará?</a:t>
+            </a:r>
+          </a:p>
+        </p:txBody>
+      </p:sp>
+      <p:sp>
+        <p:nvSpPr>
+          <p:cNvPr id="4" name="Flecha: pentágono 3">
+            <a:extLst>
+              <a:ext uri="{FF2B5EF4-FFF2-40B4-BE49-F238E27FC236}">
+                <a16:creationId xmlns:a16="http://schemas.microsoft.com/office/drawing/2014/main" id="{651A3DD8-D31E-41A9-B5DD-F9E83FA575AF}"/>
+              </a:ext>
+            </a:extLst>
+          </p:cNvPr>
+          <p:cNvSpPr/>
+          <p:nvPr/>
+        </p:nvSpPr>
+        <p:spPr>
+          <a:xfrm>
+            <a:off x="0" y="11393"/>
+            <a:ext cx="2801062" cy="493432"/>
+          </a:xfrm>
+          <a:prstGeom prst="homePlate">
+            <a:avLst/>
+          </a:prstGeom>
+        </p:spPr>
+        <p:style>
+          <a:lnRef idx="1">
+            <a:schemeClr val="accent1"/>
+          </a:lnRef>
+          <a:fillRef idx="3">
+            <a:schemeClr val="accent1"/>
+          </a:fillRef>
+          <a:effectRef idx="2">
+            <a:schemeClr val="accent1"/>
+          </a:effectRef>
+          <a:fontRef idx="minor">
+            <a:schemeClr val="lt1"/>
+          </a:fontRef>
+        </p:style>
+        <p:txBody>
+          <a:bodyPr rtlCol="0" anchor="ctr"/>
+          <a:lstStyle/>
+          <a:p>
+            <a:pPr algn="ctr"/>
+            <a:r>
+              <a:rPr lang="es-CL" dirty="0"/>
+              <a:t>Situación Bajo Estudio</a:t>
+            </a:r>
+          </a:p>
+        </p:txBody>
+      </p:sp>
+    </p:spTree>
+    <p:extLst>
+      <p:ext uri="{BB962C8B-B14F-4D97-AF65-F5344CB8AC3E}">
+        <p14:creationId xmlns:p14="http://schemas.microsoft.com/office/powerpoint/2010/main" val="2820023138"/>
+      </p:ext>
+    </p:extLst>
+  </p:cSld>
+  <p:clrMapOvr>
+    <a:masterClrMapping/>
+  </p:clrMapOvr>
+</p:sld>
+</file>
+
+<file path=ppt/slides/slide7.xml><?xml version="1.0" encoding="utf-8"?>
+<p:sld xmlns:a="http://schemas.openxmlformats.org/drawingml/2006/main" xmlns:r="http://schemas.openxmlformats.org/officeDocument/2006/relationships" xmlns:p="http://schemas.openxmlformats.org/presentationml/2006/main">
+  <p:cSld>
+    <p:spTree>
+      <p:nvGrpSpPr>
+        <p:cNvPr id="1" name=""/>
+        <p:cNvGrpSpPr/>
+        <p:nvPr/>
+      </p:nvGrpSpPr>
+      <p:grpSpPr>
+        <a:xfrm>
+          <a:off x="0" y="0"/>
+          <a:ext cx="0" cy="0"/>
+          <a:chOff x="0" y="0"/>
+          <a:chExt cx="0" cy="0"/>
+        </a:xfrm>
+      </p:grpSpPr>
+      <p:sp>
+        <p:nvSpPr>
+          <p:cNvPr id="2" name="Título 1">
+            <a:extLst>
+              <a:ext uri="{FF2B5EF4-FFF2-40B4-BE49-F238E27FC236}">
+                <a16:creationId xmlns:a16="http://schemas.microsoft.com/office/drawing/2014/main" id="{9285FC62-F834-4B80-A482-A83E68F82413}"/>
+              </a:ext>
+            </a:extLst>
+          </p:cNvPr>
+          <p:cNvSpPr>
+            <a:spLocks noGrp="1"/>
+          </p:cNvSpPr>
+          <p:nvPr>
+            <p:ph type="title"/>
+          </p:nvPr>
+        </p:nvSpPr>
+        <p:spPr/>
+        <p:txBody>
+          <a:bodyPr/>
+          <a:lstStyle/>
+          <a:p>
+            <a:endParaRPr lang="es-CL"/>
+          </a:p>
+        </p:txBody>
+      </p:sp>
+      <p:sp>
+        <p:nvSpPr>
+          <p:cNvPr id="3" name="Marcador de contenido 2">
+            <a:extLst>
+              <a:ext uri="{FF2B5EF4-FFF2-40B4-BE49-F238E27FC236}">
+                <a16:creationId xmlns:a16="http://schemas.microsoft.com/office/drawing/2014/main" id="{B9C19125-47FE-455B-984E-0BB3F8F116DB}"/>
+              </a:ext>
+            </a:extLst>
+          </p:cNvPr>
+          <p:cNvSpPr>
+            <a:spLocks noGrp="1"/>
+          </p:cNvSpPr>
+          <p:nvPr>
+            <p:ph idx="1"/>
+          </p:nvPr>
+        </p:nvSpPr>
+        <p:spPr/>
+        <p:txBody>
+          <a:bodyPr/>
+          <a:lstStyle/>
+          <a:p>
+            <a:endParaRPr lang="es-CL"/>
+          </a:p>
+        </p:txBody>
+      </p:sp>
+      <p:sp>
+        <p:nvSpPr>
+          <p:cNvPr id="4" name="Flecha: pentágono 3">
+            <a:extLst>
+              <a:ext uri="{FF2B5EF4-FFF2-40B4-BE49-F238E27FC236}">
+                <a16:creationId xmlns:a16="http://schemas.microsoft.com/office/drawing/2014/main" id="{345D5268-6816-4295-A1C8-156211BB6CAA}"/>
+              </a:ext>
+            </a:extLst>
+          </p:cNvPr>
+          <p:cNvSpPr/>
+          <p:nvPr/>
+        </p:nvSpPr>
+        <p:spPr>
+          <a:xfrm>
+            <a:off x="0" y="11393"/>
+            <a:ext cx="2801062" cy="493432"/>
+          </a:xfrm>
+          <a:prstGeom prst="homePlate">
+            <a:avLst/>
+          </a:prstGeom>
+        </p:spPr>
+        <p:style>
+          <a:lnRef idx="1">
+            <a:schemeClr val="accent1"/>
+          </a:lnRef>
+          <a:fillRef idx="3">
+            <a:schemeClr val="accent1"/>
+          </a:fillRef>
+          <a:effectRef idx="2">
+            <a:schemeClr val="accent1"/>
+          </a:effectRef>
+          <a:fontRef idx="minor">
+            <a:schemeClr val="lt1"/>
+          </a:fontRef>
+        </p:style>
+        <p:txBody>
+          <a:bodyPr rtlCol="0" anchor="ctr"/>
+          <a:lstStyle/>
+          <a:p>
+            <a:pPr algn="ctr"/>
+            <a:r>
+              <a:rPr lang="es-CL" dirty="0"/>
+              <a:t>Desarrollo</a:t>
+            </a:r>
+          </a:p>
+        </p:txBody>
+      </p:sp>
+    </p:spTree>
+    <p:extLst>
+      <p:ext uri="{BB962C8B-B14F-4D97-AF65-F5344CB8AC3E}">
+        <p14:creationId xmlns:p14="http://schemas.microsoft.com/office/powerpoint/2010/main" val="855222748"/>
+      </p:ext>
+    </p:extLst>
+  </p:cSld>
+  <p:clrMapOvr>
+    <a:masterClrMapping/>
+  </p:clrMapOvr>
+</p:sld>
+</file>
+
+<file path=ppt/slides/slide8.xml><?xml version="1.0" encoding="utf-8"?>
+<p:sld xmlns:a="http://schemas.openxmlformats.org/drawingml/2006/main" xmlns:r="http://schemas.openxmlformats.org/officeDocument/2006/relationships" xmlns:p="http://schemas.openxmlformats.org/presentationml/2006/main">
+  <p:cSld>
+    <p:spTree>
+      <p:nvGrpSpPr>
+        <p:cNvPr id="1" name=""/>
+        <p:cNvGrpSpPr/>
+        <p:nvPr/>
+      </p:nvGrpSpPr>
+      <p:grpSpPr>
+        <a:xfrm>
+          <a:off x="0" y="0"/>
+          <a:ext cx="0" cy="0"/>
+          <a:chOff x="0" y="0"/>
+          <a:chExt cx="0" cy="0"/>
+        </a:xfrm>
+      </p:grpSpPr>
+      <p:sp>
+        <p:nvSpPr>
+          <p:cNvPr id="2" name="Título 1">
+            <a:extLst>
+              <a:ext uri="{FF2B5EF4-FFF2-40B4-BE49-F238E27FC236}">
+                <a16:creationId xmlns:a16="http://schemas.microsoft.com/office/drawing/2014/main" id="{9CCF9805-D1CE-4FA9-8395-999F57BAFB90}"/>
+              </a:ext>
+            </a:extLst>
+          </p:cNvPr>
+          <p:cNvSpPr>
+            <a:spLocks noGrp="1"/>
+          </p:cNvSpPr>
+          <p:nvPr>
+            <p:ph type="title"/>
+          </p:nvPr>
+        </p:nvSpPr>
+        <p:spPr/>
+        <p:txBody>
+          <a:bodyPr/>
+          <a:lstStyle/>
+          <a:p>
+            <a:r>
+              <a:rPr lang="es-CL" dirty="0"/>
+              <a:t>Conclusiones</a:t>
+            </a:r>
+          </a:p>
+        </p:txBody>
+      </p:sp>
+      <p:sp>
+        <p:nvSpPr>
+          <p:cNvPr id="3" name="Marcador de contenido 2">
+            <a:extLst>
+              <a:ext uri="{FF2B5EF4-FFF2-40B4-BE49-F238E27FC236}">
+                <a16:creationId xmlns:a16="http://schemas.microsoft.com/office/drawing/2014/main" id="{96CDBD20-423B-44FB-9B9D-F84A66126AAC}"/>
+              </a:ext>
+            </a:extLst>
+          </p:cNvPr>
+          <p:cNvSpPr>
+            <a:spLocks noGrp="1"/>
+          </p:cNvSpPr>
+          <p:nvPr>
+            <p:ph idx="1"/>
+          </p:nvPr>
+        </p:nvSpPr>
+        <p:spPr/>
+        <p:txBody>
+          <a:bodyPr/>
+          <a:lstStyle/>
+          <a:p>
+            <a:r>
+              <a:rPr lang="es-CL" dirty="0"/>
+              <a:t>&lt;&lt;1&gt;&gt;</a:t>
+            </a:r>
+          </a:p>
+          <a:p>
+            <a:r>
+              <a:rPr lang="es-CL" dirty="0"/>
+              <a:t>&lt;&lt;2&gt;&gt;</a:t>
+            </a:r>
+          </a:p>
+          <a:p>
+            <a:r>
+              <a:rPr lang="es-CL" dirty="0"/>
+              <a:t>&lt;&lt;3&gt;&gt;</a:t>
+            </a:r>
+          </a:p>
+          <a:p>
+            <a:r>
+              <a:rPr lang="es-CL" dirty="0"/>
+              <a:t>&lt;&lt;4&gt;&gt;</a:t>
+            </a:r>
+          </a:p>
+        </p:txBody>
+      </p:sp>
+      <p:sp>
+        <p:nvSpPr>
+          <p:cNvPr id="4" name="Flecha: pentágono 3">
+            <a:extLst>
+              <a:ext uri="{FF2B5EF4-FFF2-40B4-BE49-F238E27FC236}">
+                <a16:creationId xmlns:a16="http://schemas.microsoft.com/office/drawing/2014/main" id="{D00E8A3A-5868-4159-A33C-4E613D5CA89B}"/>
+              </a:ext>
+            </a:extLst>
+          </p:cNvPr>
+          <p:cNvSpPr/>
+          <p:nvPr/>
+        </p:nvSpPr>
+        <p:spPr>
+          <a:xfrm>
+            <a:off x="0" y="11393"/>
+            <a:ext cx="2801062" cy="493432"/>
+          </a:xfrm>
+          <a:prstGeom prst="homePlate">
+            <a:avLst/>
+          </a:prstGeom>
+        </p:spPr>
+        <p:style>
+          <a:lnRef idx="1">
+            <a:schemeClr val="accent1"/>
+          </a:lnRef>
+          <a:fillRef idx="3">
+            <a:schemeClr val="accent1"/>
+          </a:fillRef>
+          <a:effectRef idx="2">
+            <a:schemeClr val="accent1"/>
+          </a:effectRef>
+          <a:fontRef idx="minor">
+            <a:schemeClr val="lt1"/>
+          </a:fontRef>
+        </p:style>
+        <p:txBody>
+          <a:bodyPr rtlCol="0" anchor="ctr"/>
+          <a:lstStyle/>
+          <a:p>
+            <a:pPr algn="ctr"/>
+            <a:r>
+              <a:rPr lang="es-CL" dirty="0"/>
+              <a:t>Conclusiones</a:t>
+            </a:r>
+          </a:p>
+        </p:txBody>
+      </p:sp>
+    </p:spTree>
+    <p:extLst>
+      <p:ext uri="{BB962C8B-B14F-4D97-AF65-F5344CB8AC3E}">
+        <p14:creationId xmlns:p14="http://schemas.microsoft.com/office/powerpoint/2010/main" val="2891704333"/>
+      </p:ext>
+    </p:extLst>
+  </p:cSld>
+  <p:clrMapOvr>
+    <a:masterClrMapping/>
+  </p:clrMapOvr>
+</p:sld>
+</file>
+
+<file path=ppt/slides/slide9.xml><?xml version="1.0" encoding="utf-8"?>
+<p:sld xmlns:a="http://schemas.openxmlformats.org/drawingml/2006/main" xmlns:r="http://schemas.openxmlformats.org/officeDocument/2006/relationships" xmlns:p="http://schemas.openxmlformats.org/presentationml/2006/main">
+  <p:cSld>
+    <p:spTree>
+      <p:nvGrpSpPr>
+        <p:cNvPr id="1" name=""/>
+        <p:cNvGrpSpPr/>
+        <p:nvPr/>
+      </p:nvGrpSpPr>
+      <p:grpSpPr>
+        <a:xfrm>
+          <a:off x="0" y="0"/>
+          <a:ext cx="0" cy="0"/>
+          <a:chOff x="0" y="0"/>
+          <a:chExt cx="0" cy="0"/>
+        </a:xfrm>
+      </p:grpSpPr>
+      <p:sp>
+        <p:nvSpPr>
+          <p:cNvPr id="2" name="Título 1">
+            <a:extLst>
+              <a:ext uri="{FF2B5EF4-FFF2-40B4-BE49-F238E27FC236}">
+                <a16:creationId xmlns:a16="http://schemas.microsoft.com/office/drawing/2014/main" id="{9CCF9805-D1CE-4FA9-8395-999F57BAFB90}"/>
+              </a:ext>
+            </a:extLst>
+          </p:cNvPr>
+          <p:cNvSpPr>
+            <a:spLocks noGrp="1"/>
+          </p:cNvSpPr>
+          <p:nvPr>
+            <p:ph type="title"/>
+          </p:nvPr>
+        </p:nvSpPr>
+        <p:spPr/>
+        <p:txBody>
+          <a:bodyPr/>
+          <a:lstStyle/>
+          <a:p>
+            <a:r>
+              <a:rPr lang="es-CL" dirty="0"/>
+              <a:t>Aportes</a:t>
+            </a:r>
+          </a:p>
+        </p:txBody>
+      </p:sp>
+      <p:sp>
+        <p:nvSpPr>
+          <p:cNvPr id="3" name="Marcador de contenido 2">
+            <a:extLst>
+              <a:ext uri="{FF2B5EF4-FFF2-40B4-BE49-F238E27FC236}">
+                <a16:creationId xmlns:a16="http://schemas.microsoft.com/office/drawing/2014/main" id="{96CDBD20-423B-44FB-9B9D-F84A66126AAC}"/>
+              </a:ext>
+            </a:extLst>
+          </p:cNvPr>
+          <p:cNvSpPr>
+            <a:spLocks noGrp="1"/>
+          </p:cNvSpPr>
+          <p:nvPr>
+            <p:ph idx="1"/>
+          </p:nvPr>
+        </p:nvSpPr>
+        <p:spPr/>
+        <p:txBody>
+          <a:bodyPr/>
+          <a:lstStyle/>
+          <a:p>
+            <a:r>
+              <a:rPr lang="es-CL" dirty="0"/>
+              <a:t>&lt;&lt;1&gt;&gt;</a:t>
+            </a:r>
+          </a:p>
+          <a:p>
+            <a:r>
+              <a:rPr lang="es-CL" dirty="0"/>
+              <a:t>&lt;&lt;2&gt;&gt;</a:t>
+            </a:r>
+          </a:p>
+          <a:p>
+            <a:r>
+              <a:rPr lang="es-CL" dirty="0"/>
+              <a:t>&lt;&lt;3&gt;&gt;</a:t>
+            </a:r>
+          </a:p>
+          <a:p>
+            <a:r>
+              <a:rPr lang="es-CL" dirty="0"/>
+              <a:t>&lt;&lt;4&gt;&gt;</a:t>
+            </a:r>
+          </a:p>
+        </p:txBody>
+      </p:sp>
+      <p:sp>
+        <p:nvSpPr>
+          <p:cNvPr id="4" name="Flecha: pentágono 3">
+            <a:extLst>
+              <a:ext uri="{FF2B5EF4-FFF2-40B4-BE49-F238E27FC236}">
+                <a16:creationId xmlns:a16="http://schemas.microsoft.com/office/drawing/2014/main" id="{D00E8A3A-5868-4159-A33C-4E613D5CA89B}"/>
+              </a:ext>
+            </a:extLst>
+          </p:cNvPr>
+          <p:cNvSpPr/>
+          <p:nvPr/>
+        </p:nvSpPr>
+        <p:spPr>
+          <a:xfrm>
+            <a:off x="0" y="11393"/>
+            <a:ext cx="2801062" cy="493432"/>
+          </a:xfrm>
+          <a:prstGeom prst="homePlate">
+            <a:avLst/>
+          </a:prstGeom>
+        </p:spPr>
+        <p:style>
+          <a:lnRef idx="1">
+            <a:schemeClr val="accent1"/>
+          </a:lnRef>
+          <a:fillRef idx="3">
+            <a:schemeClr val="accent1"/>
+          </a:fillRef>
+          <a:effectRef idx="2">
+            <a:schemeClr val="accent1"/>
+          </a:effectRef>
+          <a:fontRef idx="minor">
+            <a:schemeClr val="lt1"/>
+          </a:fontRef>
+        </p:style>
+        <p:txBody>
+          <a:bodyPr rtlCol="0" anchor="ctr"/>
+          <a:lstStyle/>
+          <a:p>
+            <a:pPr algn="ctr"/>
+            <a:r>
+              <a:rPr lang="es-CL" dirty="0"/>
+              <a:t>Conclusiones</a:t>
+            </a:r>
+          </a:p>
+        </p:txBody>
+      </p:sp>
+    </p:spTree>
+    <p:extLst>
+      <p:ext uri="{BB962C8B-B14F-4D97-AF65-F5344CB8AC3E}">
+        <p14:creationId xmlns:p14="http://schemas.microsoft.com/office/powerpoint/2010/main" val="392454465"/>
       </p:ext>
     </p:extLst>
   </p:cSld>

</xml_diff>

<commit_message>
Se aplican mejoras al TTsegún las observaciones recibidas
</commit_message>
<xml_diff>
--- a/2018/TT IQQ 2018 Camara y Garay.pptx
+++ b/2018/TT IQQ 2018 Camara y Garay.pptx
@@ -5,19 +5,21 @@
     <p:sldMasterId id="2147483967" r:id="rId1"/>
   </p:sldMasterIdLst>
   <p:handoutMasterIdLst>
-    <p:handoutMasterId r:id="rId12"/>
+    <p:handoutMasterId r:id="rId14"/>
   </p:handoutMasterIdLst>
   <p:sldIdLst>
     <p:sldId id="258" r:id="rId2"/>
     <p:sldId id="262" r:id="rId3"/>
     <p:sldId id="260" r:id="rId4"/>
-    <p:sldId id="261" r:id="rId5"/>
-    <p:sldId id="263" r:id="rId6"/>
-    <p:sldId id="264" r:id="rId7"/>
-    <p:sldId id="265" r:id="rId8"/>
-    <p:sldId id="266" r:id="rId9"/>
-    <p:sldId id="267" r:id="rId10"/>
-    <p:sldId id="268" r:id="rId11"/>
+    <p:sldId id="269" r:id="rId5"/>
+    <p:sldId id="270" r:id="rId6"/>
+    <p:sldId id="261" r:id="rId7"/>
+    <p:sldId id="263" r:id="rId8"/>
+    <p:sldId id="264" r:id="rId9"/>
+    <p:sldId id="265" r:id="rId10"/>
+    <p:sldId id="266" r:id="rId11"/>
+    <p:sldId id="267" r:id="rId12"/>
+    <p:sldId id="268" r:id="rId13"/>
   </p:sldIdLst>
   <p:sldSz cx="12192000" cy="6858000"/>
   <p:notesSz cx="6858000" cy="9144000"/>
@@ -6482,6 +6484,308 @@
       </p:grpSpPr>
       <p:sp>
         <p:nvSpPr>
+          <p:cNvPr id="2" name="Título 1">
+            <a:extLst>
+              <a:ext uri="{FF2B5EF4-FFF2-40B4-BE49-F238E27FC236}">
+                <a16:creationId xmlns:a16="http://schemas.microsoft.com/office/drawing/2014/main" id="{9CCF9805-D1CE-4FA9-8395-999F57BAFB90}"/>
+              </a:ext>
+            </a:extLst>
+          </p:cNvPr>
+          <p:cNvSpPr>
+            <a:spLocks noGrp="1"/>
+          </p:cNvSpPr>
+          <p:nvPr>
+            <p:ph type="title"/>
+          </p:nvPr>
+        </p:nvSpPr>
+        <p:spPr/>
+        <p:txBody>
+          <a:bodyPr/>
+          <a:lstStyle/>
+          <a:p>
+            <a:r>
+              <a:rPr lang="es-CL" dirty="0"/>
+              <a:t>Conclusiones</a:t>
+            </a:r>
+          </a:p>
+        </p:txBody>
+      </p:sp>
+      <p:sp>
+        <p:nvSpPr>
+          <p:cNvPr id="3" name="Marcador de contenido 2">
+            <a:extLst>
+              <a:ext uri="{FF2B5EF4-FFF2-40B4-BE49-F238E27FC236}">
+                <a16:creationId xmlns:a16="http://schemas.microsoft.com/office/drawing/2014/main" id="{96CDBD20-423B-44FB-9B9D-F84A66126AAC}"/>
+              </a:ext>
+            </a:extLst>
+          </p:cNvPr>
+          <p:cNvSpPr>
+            <a:spLocks noGrp="1"/>
+          </p:cNvSpPr>
+          <p:nvPr>
+            <p:ph idx="1"/>
+          </p:nvPr>
+        </p:nvSpPr>
+        <p:spPr/>
+        <p:txBody>
+          <a:bodyPr/>
+          <a:lstStyle/>
+          <a:p>
+            <a:r>
+              <a:rPr lang="es-CL" dirty="0"/>
+              <a:t>&lt;&lt;1&gt;&gt;</a:t>
+            </a:r>
+          </a:p>
+          <a:p>
+            <a:r>
+              <a:rPr lang="es-CL" dirty="0"/>
+              <a:t>&lt;&lt;2&gt;&gt;</a:t>
+            </a:r>
+          </a:p>
+          <a:p>
+            <a:r>
+              <a:rPr lang="es-CL" dirty="0"/>
+              <a:t>&lt;&lt;3&gt;&gt;</a:t>
+            </a:r>
+          </a:p>
+          <a:p>
+            <a:r>
+              <a:rPr lang="es-CL" dirty="0"/>
+              <a:t>&lt;&lt;4&gt;&gt;</a:t>
+            </a:r>
+          </a:p>
+        </p:txBody>
+      </p:sp>
+      <p:sp>
+        <p:nvSpPr>
+          <p:cNvPr id="4" name="Flecha: pentágono 3">
+            <a:extLst>
+              <a:ext uri="{FF2B5EF4-FFF2-40B4-BE49-F238E27FC236}">
+                <a16:creationId xmlns:a16="http://schemas.microsoft.com/office/drawing/2014/main" id="{D00E8A3A-5868-4159-A33C-4E613D5CA89B}"/>
+              </a:ext>
+            </a:extLst>
+          </p:cNvPr>
+          <p:cNvSpPr/>
+          <p:nvPr/>
+        </p:nvSpPr>
+        <p:spPr>
+          <a:xfrm>
+            <a:off x="0" y="11393"/>
+            <a:ext cx="2801062" cy="493432"/>
+          </a:xfrm>
+          <a:prstGeom prst="homePlate">
+            <a:avLst/>
+          </a:prstGeom>
+        </p:spPr>
+        <p:style>
+          <a:lnRef idx="1">
+            <a:schemeClr val="accent1"/>
+          </a:lnRef>
+          <a:fillRef idx="3">
+            <a:schemeClr val="accent1"/>
+          </a:fillRef>
+          <a:effectRef idx="2">
+            <a:schemeClr val="accent1"/>
+          </a:effectRef>
+          <a:fontRef idx="minor">
+            <a:schemeClr val="lt1"/>
+          </a:fontRef>
+        </p:style>
+        <p:txBody>
+          <a:bodyPr rtlCol="0" anchor="ctr"/>
+          <a:lstStyle/>
+          <a:p>
+            <a:pPr algn="ctr"/>
+            <a:r>
+              <a:rPr lang="es-CL" dirty="0"/>
+              <a:t>Conclusiones</a:t>
+            </a:r>
+          </a:p>
+        </p:txBody>
+      </p:sp>
+    </p:spTree>
+    <p:extLst>
+      <p:ext uri="{BB962C8B-B14F-4D97-AF65-F5344CB8AC3E}">
+        <p14:creationId xmlns:p14="http://schemas.microsoft.com/office/powerpoint/2010/main" val="2891704333"/>
+      </p:ext>
+    </p:extLst>
+  </p:cSld>
+  <p:clrMapOvr>
+    <a:masterClrMapping/>
+  </p:clrMapOvr>
+</p:sld>
+</file>
+
+<file path=ppt/slides/slide11.xml><?xml version="1.0" encoding="utf-8"?>
+<p:sld xmlns:a="http://schemas.openxmlformats.org/drawingml/2006/main" xmlns:r="http://schemas.openxmlformats.org/officeDocument/2006/relationships" xmlns:p="http://schemas.openxmlformats.org/presentationml/2006/main">
+  <p:cSld>
+    <p:spTree>
+      <p:nvGrpSpPr>
+        <p:cNvPr id="1" name=""/>
+        <p:cNvGrpSpPr/>
+        <p:nvPr/>
+      </p:nvGrpSpPr>
+      <p:grpSpPr>
+        <a:xfrm>
+          <a:off x="0" y="0"/>
+          <a:ext cx="0" cy="0"/>
+          <a:chOff x="0" y="0"/>
+          <a:chExt cx="0" cy="0"/>
+        </a:xfrm>
+      </p:grpSpPr>
+      <p:sp>
+        <p:nvSpPr>
+          <p:cNvPr id="2" name="Título 1">
+            <a:extLst>
+              <a:ext uri="{FF2B5EF4-FFF2-40B4-BE49-F238E27FC236}">
+                <a16:creationId xmlns:a16="http://schemas.microsoft.com/office/drawing/2014/main" id="{9CCF9805-D1CE-4FA9-8395-999F57BAFB90}"/>
+              </a:ext>
+            </a:extLst>
+          </p:cNvPr>
+          <p:cNvSpPr>
+            <a:spLocks noGrp="1"/>
+          </p:cNvSpPr>
+          <p:nvPr>
+            <p:ph type="title"/>
+          </p:nvPr>
+        </p:nvSpPr>
+        <p:spPr/>
+        <p:txBody>
+          <a:bodyPr/>
+          <a:lstStyle/>
+          <a:p>
+            <a:r>
+              <a:rPr lang="es-CL" dirty="0"/>
+              <a:t>Aportes</a:t>
+            </a:r>
+          </a:p>
+        </p:txBody>
+      </p:sp>
+      <p:sp>
+        <p:nvSpPr>
+          <p:cNvPr id="3" name="Marcador de contenido 2">
+            <a:extLst>
+              <a:ext uri="{FF2B5EF4-FFF2-40B4-BE49-F238E27FC236}">
+                <a16:creationId xmlns:a16="http://schemas.microsoft.com/office/drawing/2014/main" id="{96CDBD20-423B-44FB-9B9D-F84A66126AAC}"/>
+              </a:ext>
+            </a:extLst>
+          </p:cNvPr>
+          <p:cNvSpPr>
+            <a:spLocks noGrp="1"/>
+          </p:cNvSpPr>
+          <p:nvPr>
+            <p:ph idx="1"/>
+          </p:nvPr>
+        </p:nvSpPr>
+        <p:spPr/>
+        <p:txBody>
+          <a:bodyPr/>
+          <a:lstStyle/>
+          <a:p>
+            <a:r>
+              <a:rPr lang="es-CL" dirty="0"/>
+              <a:t>&lt;&lt;1&gt;&gt;</a:t>
+            </a:r>
+          </a:p>
+          <a:p>
+            <a:r>
+              <a:rPr lang="es-CL" dirty="0"/>
+              <a:t>&lt;&lt;2&gt;&gt;</a:t>
+            </a:r>
+          </a:p>
+          <a:p>
+            <a:r>
+              <a:rPr lang="es-CL" dirty="0"/>
+              <a:t>&lt;&lt;3&gt;&gt;</a:t>
+            </a:r>
+          </a:p>
+          <a:p>
+            <a:r>
+              <a:rPr lang="es-CL" dirty="0"/>
+              <a:t>&lt;&lt;4&gt;&gt;</a:t>
+            </a:r>
+          </a:p>
+        </p:txBody>
+      </p:sp>
+      <p:sp>
+        <p:nvSpPr>
+          <p:cNvPr id="4" name="Flecha: pentágono 3">
+            <a:extLst>
+              <a:ext uri="{FF2B5EF4-FFF2-40B4-BE49-F238E27FC236}">
+                <a16:creationId xmlns:a16="http://schemas.microsoft.com/office/drawing/2014/main" id="{D00E8A3A-5868-4159-A33C-4E613D5CA89B}"/>
+              </a:ext>
+            </a:extLst>
+          </p:cNvPr>
+          <p:cNvSpPr/>
+          <p:nvPr/>
+        </p:nvSpPr>
+        <p:spPr>
+          <a:xfrm>
+            <a:off x="0" y="11393"/>
+            <a:ext cx="2801062" cy="493432"/>
+          </a:xfrm>
+          <a:prstGeom prst="homePlate">
+            <a:avLst/>
+          </a:prstGeom>
+        </p:spPr>
+        <p:style>
+          <a:lnRef idx="1">
+            <a:schemeClr val="accent1"/>
+          </a:lnRef>
+          <a:fillRef idx="3">
+            <a:schemeClr val="accent1"/>
+          </a:fillRef>
+          <a:effectRef idx="2">
+            <a:schemeClr val="accent1"/>
+          </a:effectRef>
+          <a:fontRef idx="minor">
+            <a:schemeClr val="lt1"/>
+          </a:fontRef>
+        </p:style>
+        <p:txBody>
+          <a:bodyPr rtlCol="0" anchor="ctr"/>
+          <a:lstStyle/>
+          <a:p>
+            <a:pPr algn="ctr"/>
+            <a:r>
+              <a:rPr lang="es-CL" dirty="0"/>
+              <a:t>Conclusiones</a:t>
+            </a:r>
+          </a:p>
+        </p:txBody>
+      </p:sp>
+    </p:spTree>
+    <p:extLst>
+      <p:ext uri="{BB962C8B-B14F-4D97-AF65-F5344CB8AC3E}">
+        <p14:creationId xmlns:p14="http://schemas.microsoft.com/office/powerpoint/2010/main" val="392454465"/>
+      </p:ext>
+    </p:extLst>
+  </p:cSld>
+  <p:clrMapOvr>
+    <a:masterClrMapping/>
+  </p:clrMapOvr>
+</p:sld>
+</file>
+
+<file path=ppt/slides/slide12.xml><?xml version="1.0" encoding="utf-8"?>
+<p:sld xmlns:a="http://schemas.openxmlformats.org/drawingml/2006/main" xmlns:r="http://schemas.openxmlformats.org/officeDocument/2006/relationships" xmlns:p="http://schemas.openxmlformats.org/presentationml/2006/main">
+  <p:cSld>
+    <p:spTree>
+      <p:nvGrpSpPr>
+        <p:cNvPr id="1" name=""/>
+        <p:cNvGrpSpPr/>
+        <p:nvPr/>
+      </p:nvGrpSpPr>
+      <p:grpSpPr>
+        <a:xfrm>
+          <a:off x="0" y="0"/>
+          <a:ext cx="0" cy="0"/>
+          <a:chOff x="0" y="0"/>
+          <a:chExt cx="0" cy="0"/>
+        </a:xfrm>
+      </p:grpSpPr>
+      <p:sp>
+        <p:nvSpPr>
           <p:cNvPr id="32" name="Título 1">
             <a:extLst>
               <a:ext uri="{FF2B5EF4-FFF2-40B4-BE49-F238E27FC236}">
@@ -7529,7 +7833,7 @@
           <a:p>
             <a:r>
               <a:rPr lang="es-CL" dirty="0"/>
-              <a:t>Descripción de ZOFRI S.A.</a:t>
+              <a:t>Reseña de ZOFRI S.A.</a:t>
             </a:r>
           </a:p>
         </p:txBody>
@@ -7552,41 +7856,111 @@
         </p:nvSpPr>
         <p:spPr>
           <a:xfrm>
-            <a:off x="677334" y="1628775"/>
-            <a:ext cx="8596668" cy="4412587"/>
+            <a:off x="677333" y="1628775"/>
+            <a:ext cx="8754901" cy="4412587"/>
           </a:xfrm>
         </p:spPr>
         <p:txBody>
-          <a:bodyPr/>
-          <a:lstStyle/>
-          <a:p>
+          <a:bodyPr>
+            <a:normAutofit lnSpcReduction="10000"/>
+          </a:bodyPr>
+          <a:lstStyle/>
+          <a:p>
+            <a:pPr algn="just"/>
             <a:r>
               <a:rPr lang="es-CL" dirty="0">
                 <a:solidFill>
-                  <a:srgbClr val="FF0000"/>
+                  <a:schemeClr val="tx1"/>
                 </a:solidFill>
               </a:rPr>
-              <a:t>&lt;&lt; Reseña breve &gt;&gt;</a:t>
-            </a:r>
-          </a:p>
-          <a:p>
+              <a:t>En Agosto de 1973, se conforma la Junta de Vigilancia de la Zona Franca.</a:t>
+            </a:r>
+          </a:p>
+          <a:p>
+            <a:pPr algn="just"/>
             <a:r>
               <a:rPr lang="es-CL" dirty="0">
                 <a:solidFill>
-                  <a:srgbClr val="FF0000"/>
+                  <a:schemeClr val="tx1"/>
                 </a:solidFill>
               </a:rPr>
-              <a:t>&lt;&lt; Principal actividad &gt;&gt;</a:t>
-            </a:r>
-          </a:p>
-          <a:p>
+              <a:t>Con del Decreto Ley </a:t>
+            </a:r>
+            <a:r>
+              <a:rPr lang="es-CL" dirty="0" err="1">
+                <a:solidFill>
+                  <a:schemeClr val="tx1"/>
+                </a:solidFill>
+              </a:rPr>
+              <a:t>Nº</a:t>
+            </a:r>
             <a:r>
               <a:rPr lang="es-CL" dirty="0">
                 <a:solidFill>
-                  <a:srgbClr val="FF0000"/>
+                  <a:schemeClr val="tx1"/>
                 </a:solidFill>
               </a:rPr>
-              <a:t>&lt;&lt; Ubicación &gt;&gt;</a:t>
+              <a:t> 1.055, nace ZOFRI y comenzó sus actividades en Junio de 1975.</a:t>
+            </a:r>
+          </a:p>
+          <a:p>
+            <a:pPr algn="just"/>
+            <a:r>
+              <a:rPr lang="es-CL" dirty="0">
+                <a:solidFill>
+                  <a:schemeClr val="tx1"/>
+                </a:solidFill>
+              </a:rPr>
+              <a:t>En 1978 ZOFRI trasladó sus operaciones al barrio “El Colorado”, donde se mantiene hasta ahora.</a:t>
+            </a:r>
+          </a:p>
+          <a:p>
+            <a:pPr algn="just"/>
+            <a:r>
+              <a:rPr lang="es-CL" dirty="0">
+                <a:solidFill>
+                  <a:schemeClr val="tx1"/>
+                </a:solidFill>
+              </a:rPr>
+              <a:t>ZOFRI fue administrada por la Junta de Administración y Vigilancia, hasta noviembre del año 1989.</a:t>
+            </a:r>
+          </a:p>
+          <a:p>
+            <a:pPr algn="just"/>
+            <a:r>
+              <a:rPr lang="es-CL" dirty="0">
+                <a:solidFill>
+                  <a:schemeClr val="tx1"/>
+                </a:solidFill>
+              </a:rPr>
+              <a:t>A contar del 26 de febrero de 1990, la Ley </a:t>
+            </a:r>
+            <a:r>
+              <a:rPr lang="es-CL" dirty="0" err="1">
+                <a:solidFill>
+                  <a:schemeClr val="tx1"/>
+                </a:solidFill>
+              </a:rPr>
+              <a:t>N°</a:t>
+            </a:r>
+            <a:r>
+              <a:rPr lang="es-CL" dirty="0">
+                <a:solidFill>
+                  <a:schemeClr val="tx1"/>
+                </a:solidFill>
+              </a:rPr>
+              <a:t> 18.846 autorizó al Estado de Chile, a través de CORFO y el Fisco, a constituir la sociedad anónima “Zona Franca de Iquique S.A.”. Desde ese año, rige el contrato de concesión celebrado entre ZOFRI S.A. y el Estado de Chile, por un lapso de 40 años.</a:t>
+            </a:r>
+          </a:p>
+          <a:p>
+            <a:pPr algn="just"/>
+            <a:r>
+              <a:rPr lang="es-CL" dirty="0">
+                <a:solidFill>
+                  <a:schemeClr val="tx1"/>
+                </a:solidFill>
+              </a:rPr>
+              <a:t>Desde 1990, ZOFRI S.A. entrega el 15% de sus ingresos brutos a las 11 comunas de las regiones de Arica y Parinacota y de Tarapacá. Dichos montos están destinados a realizar inversiones de carácter social.</a:t>
             </a:r>
           </a:p>
         </p:txBody>
@@ -7670,6 +8044,41 @@
       </p:grpSpPr>
       <p:sp>
         <p:nvSpPr>
+          <p:cNvPr id="2" name="Título 1">
+            <a:extLst>
+              <a:ext uri="{FF2B5EF4-FFF2-40B4-BE49-F238E27FC236}">
+                <a16:creationId xmlns:a16="http://schemas.microsoft.com/office/drawing/2014/main" id="{EC45AD01-B5A1-48A8-B2A6-275C8DCF926C}"/>
+              </a:ext>
+            </a:extLst>
+          </p:cNvPr>
+          <p:cNvSpPr>
+            <a:spLocks noGrp="1"/>
+          </p:cNvSpPr>
+          <p:nvPr>
+            <p:ph type="title"/>
+          </p:nvPr>
+        </p:nvSpPr>
+        <p:spPr>
+          <a:xfrm>
+            <a:off x="495300" y="641646"/>
+            <a:ext cx="6086475" cy="697907"/>
+          </a:xfrm>
+        </p:spPr>
+        <p:txBody>
+          <a:bodyPr>
+            <a:noAutofit/>
+          </a:bodyPr>
+          <a:lstStyle/>
+          <a:p>
+            <a:r>
+              <a:rPr lang="es-CL" dirty="0"/>
+              <a:t>Actividad de ZOFRI S.A.</a:t>
+            </a:r>
+          </a:p>
+        </p:txBody>
+      </p:sp>
+      <p:sp>
+        <p:nvSpPr>
           <p:cNvPr id="3" name="Marcador de contenido 2">
             <a:extLst>
               <a:ext uri="{FF2B5EF4-FFF2-40B4-BE49-F238E27FC236}">
@@ -7686,8 +8095,8 @@
         </p:nvSpPr>
         <p:spPr>
           <a:xfrm>
-            <a:off x="495300" y="1476374"/>
-            <a:ext cx="8778702" cy="5162551"/>
+            <a:off x="677333" y="1628775"/>
+            <a:ext cx="8754901" cy="4412587"/>
           </a:xfrm>
         </p:spPr>
         <p:txBody>
@@ -7696,73 +8105,43 @@
           </a:bodyPr>
           <a:lstStyle/>
           <a:p>
-            <a:r>
-              <a:rPr lang="es-CL" dirty="0"/>
-              <a:t>Misión</a:t>
-            </a:r>
-          </a:p>
-          <a:p>
-            <a:pPr lvl="1" algn="just"/>
-            <a:r>
-              <a:rPr lang="es-CL" dirty="0"/>
-              <a:t>“Gestionar y liderar una plataforma de servicios para facilitar negocios en Sudamérica, aportando el conocimiento y la experiencia para entregarles a nuestros clientes: usuarios y visitantes, la mejor combinación de factores, procesos y soluciones, que satisfagan sus necesidades, teniendo como pilar fundamental el sentido de ética en los negocios y asumiendo un alto compromiso con la generación de valor para accionistas, clientes, colaboradores, comunidad y entorno”. </a:t>
-            </a:r>
-            <a:br>
-              <a:rPr lang="es-CL" dirty="0"/>
-            </a:br>
-            <a:r>
-              <a:rPr lang="es-CL" dirty="0"/>
-              <a:t>(ZOFRI S.A., 2017)</a:t>
-            </a:r>
-          </a:p>
-          <a:p>
-            <a:r>
-              <a:rPr lang="es-CL" dirty="0"/>
-              <a:t>Visión</a:t>
-            </a:r>
-          </a:p>
-          <a:p>
-            <a:pPr lvl="1" algn="just"/>
-            <a:r>
-              <a:rPr lang="es-CL" dirty="0"/>
-              <a:t>“Ser la más eficiente y sostenible plataforma de negocios de Sudamérica, con las mejores oportunidades y soluciones para sus clientes: usuarios y visitantes”.  (ZOFRI S.A., 2017)</a:t>
-            </a:r>
-          </a:p>
-          <a:p>
-            <a:r>
-              <a:rPr lang="es-CL" dirty="0"/>
-              <a:t>Valores</a:t>
-            </a:r>
-          </a:p>
-          <a:p>
-            <a:pPr lvl="1"/>
-            <a:r>
-              <a:rPr lang="es-CL" dirty="0"/>
-              <a:t>Confianza</a:t>
-            </a:r>
-          </a:p>
-          <a:p>
-            <a:pPr lvl="1"/>
-            <a:r>
-              <a:rPr lang="es-CL" dirty="0"/>
-              <a:t>Respeto</a:t>
-            </a:r>
-          </a:p>
-          <a:p>
-            <a:pPr lvl="1"/>
-            <a:r>
-              <a:rPr lang="es-CL" dirty="0"/>
-              <a:t>Creatividad</a:t>
-            </a:r>
-          </a:p>
-        </p:txBody>
-      </p:sp>
-      <p:sp>
-        <p:nvSpPr>
-          <p:cNvPr id="4" name="Flecha: pentágono 3">
+            <a:pPr algn="just"/>
+            <a:r>
+              <a:rPr lang="es-CL" dirty="0">
+                <a:solidFill>
+                  <a:schemeClr val="tx1"/>
+                </a:solidFill>
+              </a:rPr>
+              <a:t>La actividad principal de ZOFRI es la Administración y Explotación de la Zona Franca de Iquique. En la actualidad la Zona Franca de Iquique permite la operación a más de 2.000 empresas usuarias, distribuidas físicamente entre distintos sectores, incluidos el Parque Industrial Chacalluta (Arica) y el Parque Empresarial Alto Hospicio. También tiene oficinas en Santiago de Chile y durante el 2018 inauguró oficina comercial en Paraguay. </a:t>
+            </a:r>
+          </a:p>
+          <a:p>
+            <a:pPr algn="just"/>
+            <a:r>
+              <a:rPr lang="es-CL" dirty="0">
+                <a:solidFill>
+                  <a:schemeClr val="tx1"/>
+                </a:solidFill>
+              </a:rPr>
+              <a:t>Esta actividad se desarrolla dentro de sus 466 hectáreas en las ciudades de Iquique, Arica y Alto Hospicio.</a:t>
+            </a:r>
+          </a:p>
+          <a:p>
+            <a:pPr algn="just"/>
+            <a:endParaRPr lang="es-CL" dirty="0">
+              <a:solidFill>
+                <a:schemeClr val="tx1"/>
+              </a:solidFill>
+            </a:endParaRPr>
+          </a:p>
+        </p:txBody>
+      </p:sp>
+      <p:sp>
+        <p:nvSpPr>
+          <p:cNvPr id="7" name="Flecha: pentágono 6">
             <a:extLst>
               <a:ext uri="{FF2B5EF4-FFF2-40B4-BE49-F238E27FC236}">
-                <a16:creationId xmlns:a16="http://schemas.microsoft.com/office/drawing/2014/main" id="{C9009098-29DC-4FE1-A202-8AA63536C7F2}"/>
+                <a16:creationId xmlns:a16="http://schemas.microsoft.com/office/drawing/2014/main" id="{2421A3F3-D7E6-468F-8EE1-9D58DDF2460A}"/>
               </a:ext>
             </a:extLst>
           </p:cNvPr>
@@ -7804,315 +8183,10 @@
           </a:p>
         </p:txBody>
       </p:sp>
-      <p:sp>
-        <p:nvSpPr>
-          <p:cNvPr id="7" name="Marcador de contenido 2">
-            <a:extLst>
-              <a:ext uri="{FF2B5EF4-FFF2-40B4-BE49-F238E27FC236}">
-                <a16:creationId xmlns:a16="http://schemas.microsoft.com/office/drawing/2014/main" id="{26ADF021-C49E-4393-B843-B5C74C5AB6D0}"/>
-              </a:ext>
-            </a:extLst>
-          </p:cNvPr>
-          <p:cNvSpPr txBox="1">
-            <a:spLocks/>
-          </p:cNvSpPr>
-          <p:nvPr/>
-        </p:nvSpPr>
-        <p:spPr>
-          <a:xfrm>
-            <a:off x="2604693" y="5372102"/>
-            <a:ext cx="4559916" cy="1387181"/>
-          </a:xfrm>
-          <a:prstGeom prst="rect">
-            <a:avLst/>
-          </a:prstGeom>
-        </p:spPr>
-        <p:txBody>
-          <a:bodyPr vert="horz" lIns="91440" tIns="45720" rIns="91440" bIns="45720" rtlCol="0">
-            <a:normAutofit/>
-          </a:bodyPr>
-          <a:lstStyle>
-            <a:lvl1pPr marL="342900" indent="-342900" algn="l" defTabSz="457200" rtl="0" eaLnBrk="1" latinLnBrk="0" hangingPunct="1">
-              <a:spcBef>
-                <a:spcPts val="1000"/>
-              </a:spcBef>
-              <a:spcAft>
-                <a:spcPts val="0"/>
-              </a:spcAft>
-              <a:buClr>
-                <a:schemeClr val="accent1"/>
-              </a:buClr>
-              <a:buSzPct val="80000"/>
-              <a:buFont typeface="Wingdings 3" charset="2"/>
-              <a:buChar char=""/>
-              <a:defRPr sz="1800" kern="1200">
-                <a:solidFill>
-                  <a:schemeClr val="tx1">
-                    <a:lumMod val="75000"/>
-                    <a:lumOff val="25000"/>
-                  </a:schemeClr>
-                </a:solidFill>
-                <a:latin typeface="+mn-lt"/>
-                <a:ea typeface="+mn-ea"/>
-                <a:cs typeface="+mn-cs"/>
-              </a:defRPr>
-            </a:lvl1pPr>
-            <a:lvl2pPr marL="742950" indent="-285750" algn="l" defTabSz="457200" rtl="0" eaLnBrk="1" latinLnBrk="0" hangingPunct="1">
-              <a:spcBef>
-                <a:spcPts val="1000"/>
-              </a:spcBef>
-              <a:spcAft>
-                <a:spcPts val="0"/>
-              </a:spcAft>
-              <a:buClr>
-                <a:schemeClr val="accent1"/>
-              </a:buClr>
-              <a:buSzPct val="80000"/>
-              <a:buFont typeface="Wingdings 3" charset="2"/>
-              <a:buChar char=""/>
-              <a:defRPr sz="1600" kern="1200">
-                <a:solidFill>
-                  <a:schemeClr val="tx1">
-                    <a:lumMod val="75000"/>
-                    <a:lumOff val="25000"/>
-                  </a:schemeClr>
-                </a:solidFill>
-                <a:latin typeface="+mn-lt"/>
-                <a:ea typeface="+mn-ea"/>
-                <a:cs typeface="+mn-cs"/>
-              </a:defRPr>
-            </a:lvl2pPr>
-            <a:lvl3pPr marL="1143000" indent="-228600" algn="l" defTabSz="457200" rtl="0" eaLnBrk="1" latinLnBrk="0" hangingPunct="1">
-              <a:spcBef>
-                <a:spcPts val="1000"/>
-              </a:spcBef>
-              <a:spcAft>
-                <a:spcPts val="0"/>
-              </a:spcAft>
-              <a:buClr>
-                <a:schemeClr val="accent1"/>
-              </a:buClr>
-              <a:buSzPct val="80000"/>
-              <a:buFont typeface="Wingdings 3" charset="2"/>
-              <a:buChar char=""/>
-              <a:defRPr sz="1400" kern="1200">
-                <a:solidFill>
-                  <a:schemeClr val="tx1">
-                    <a:lumMod val="75000"/>
-                    <a:lumOff val="25000"/>
-                  </a:schemeClr>
-                </a:solidFill>
-                <a:latin typeface="+mn-lt"/>
-                <a:ea typeface="+mn-ea"/>
-                <a:cs typeface="+mn-cs"/>
-              </a:defRPr>
-            </a:lvl3pPr>
-            <a:lvl4pPr marL="1600200" indent="-228600" algn="l" defTabSz="457200" rtl="0" eaLnBrk="1" latinLnBrk="0" hangingPunct="1">
-              <a:spcBef>
-                <a:spcPts val="1000"/>
-              </a:spcBef>
-              <a:spcAft>
-                <a:spcPts val="0"/>
-              </a:spcAft>
-              <a:buClr>
-                <a:schemeClr val="accent1"/>
-              </a:buClr>
-              <a:buSzPct val="80000"/>
-              <a:buFont typeface="Wingdings 3" charset="2"/>
-              <a:buChar char=""/>
-              <a:defRPr sz="1200" kern="1200">
-                <a:solidFill>
-                  <a:schemeClr val="tx1">
-                    <a:lumMod val="75000"/>
-                    <a:lumOff val="25000"/>
-                  </a:schemeClr>
-                </a:solidFill>
-                <a:latin typeface="+mn-lt"/>
-                <a:ea typeface="+mn-ea"/>
-                <a:cs typeface="+mn-cs"/>
-              </a:defRPr>
-            </a:lvl4pPr>
-            <a:lvl5pPr marL="2057400" indent="-228600" algn="l" defTabSz="457200" rtl="0" eaLnBrk="1" latinLnBrk="0" hangingPunct="1">
-              <a:spcBef>
-                <a:spcPts val="1000"/>
-              </a:spcBef>
-              <a:spcAft>
-                <a:spcPts val="0"/>
-              </a:spcAft>
-              <a:buClr>
-                <a:schemeClr val="accent1"/>
-              </a:buClr>
-              <a:buSzPct val="80000"/>
-              <a:buFont typeface="Wingdings 3" charset="2"/>
-              <a:buChar char=""/>
-              <a:defRPr sz="1200" kern="1200">
-                <a:solidFill>
-                  <a:schemeClr val="tx1">
-                    <a:lumMod val="75000"/>
-                    <a:lumOff val="25000"/>
-                  </a:schemeClr>
-                </a:solidFill>
-                <a:latin typeface="+mn-lt"/>
-                <a:ea typeface="+mn-ea"/>
-                <a:cs typeface="+mn-cs"/>
-              </a:defRPr>
-            </a:lvl5pPr>
-            <a:lvl6pPr marL="2514600" indent="-228600" algn="l" defTabSz="457200" rtl="0" eaLnBrk="1" latinLnBrk="0" hangingPunct="1">
-              <a:spcBef>
-                <a:spcPts val="1000"/>
-              </a:spcBef>
-              <a:spcAft>
-                <a:spcPts val="0"/>
-              </a:spcAft>
-              <a:buClr>
-                <a:schemeClr val="accent1"/>
-              </a:buClr>
-              <a:buSzPct val="80000"/>
-              <a:buFont typeface="Wingdings 3" charset="2"/>
-              <a:buChar char=""/>
-              <a:defRPr sz="1200" kern="1200">
-                <a:solidFill>
-                  <a:schemeClr val="tx1">
-                    <a:lumMod val="75000"/>
-                    <a:lumOff val="25000"/>
-                  </a:schemeClr>
-                </a:solidFill>
-                <a:latin typeface="+mn-lt"/>
-                <a:ea typeface="+mn-ea"/>
-                <a:cs typeface="+mn-cs"/>
-              </a:defRPr>
-            </a:lvl6pPr>
-            <a:lvl7pPr marL="2971800" indent="-228600" algn="l" defTabSz="457200" rtl="0" eaLnBrk="1" latinLnBrk="0" hangingPunct="1">
-              <a:spcBef>
-                <a:spcPts val="1000"/>
-              </a:spcBef>
-              <a:spcAft>
-                <a:spcPts val="0"/>
-              </a:spcAft>
-              <a:buClr>
-                <a:schemeClr val="accent1"/>
-              </a:buClr>
-              <a:buSzPct val="80000"/>
-              <a:buFont typeface="Wingdings 3" charset="2"/>
-              <a:buChar char=""/>
-              <a:defRPr sz="1200" kern="1200">
-                <a:solidFill>
-                  <a:schemeClr val="tx1">
-                    <a:lumMod val="75000"/>
-                    <a:lumOff val="25000"/>
-                  </a:schemeClr>
-                </a:solidFill>
-                <a:latin typeface="+mn-lt"/>
-                <a:ea typeface="+mn-ea"/>
-                <a:cs typeface="+mn-cs"/>
-              </a:defRPr>
-            </a:lvl7pPr>
-            <a:lvl8pPr marL="3429000" indent="-228600" algn="l" defTabSz="457200" rtl="0" eaLnBrk="1" latinLnBrk="0" hangingPunct="1">
-              <a:spcBef>
-                <a:spcPts val="1000"/>
-              </a:spcBef>
-              <a:spcAft>
-                <a:spcPts val="0"/>
-              </a:spcAft>
-              <a:buClr>
-                <a:schemeClr val="accent1"/>
-              </a:buClr>
-              <a:buSzPct val="80000"/>
-              <a:buFont typeface="Wingdings 3" charset="2"/>
-              <a:buChar char=""/>
-              <a:defRPr sz="1200" kern="1200">
-                <a:solidFill>
-                  <a:schemeClr val="tx1">
-                    <a:lumMod val="75000"/>
-                    <a:lumOff val="25000"/>
-                  </a:schemeClr>
-                </a:solidFill>
-                <a:latin typeface="+mn-lt"/>
-                <a:ea typeface="+mn-ea"/>
-                <a:cs typeface="+mn-cs"/>
-              </a:defRPr>
-            </a:lvl8pPr>
-            <a:lvl9pPr marL="3886200" indent="-228600" algn="l" defTabSz="457200" rtl="0" eaLnBrk="1" latinLnBrk="0" hangingPunct="1">
-              <a:spcBef>
-                <a:spcPts val="1000"/>
-              </a:spcBef>
-              <a:spcAft>
-                <a:spcPts val="0"/>
-              </a:spcAft>
-              <a:buClr>
-                <a:schemeClr val="accent1"/>
-              </a:buClr>
-              <a:buSzPct val="80000"/>
-              <a:buFont typeface="Wingdings 3" charset="2"/>
-              <a:buChar char=""/>
-              <a:defRPr sz="1200" kern="1200">
-                <a:solidFill>
-                  <a:schemeClr val="tx1">
-                    <a:lumMod val="75000"/>
-                    <a:lumOff val="25000"/>
-                  </a:schemeClr>
-                </a:solidFill>
-                <a:latin typeface="+mn-lt"/>
-                <a:ea typeface="+mn-ea"/>
-                <a:cs typeface="+mn-cs"/>
-              </a:defRPr>
-            </a:lvl9pPr>
-          </a:lstStyle>
-          <a:p>
-            <a:pPr lvl="1"/>
-            <a:r>
-              <a:rPr lang="es-CL" dirty="0"/>
-              <a:t>Integridad</a:t>
-            </a:r>
-          </a:p>
-          <a:p>
-            <a:pPr lvl="1"/>
-            <a:r>
-              <a:rPr lang="es-CL" dirty="0"/>
-              <a:t>Vocación</a:t>
-            </a:r>
-          </a:p>
-          <a:p>
-            <a:pPr lvl="1"/>
-            <a:r>
-              <a:rPr lang="es-CL" dirty="0"/>
-              <a:t>Compromiso</a:t>
-            </a:r>
-          </a:p>
-        </p:txBody>
-      </p:sp>
-      <p:sp>
-        <p:nvSpPr>
-          <p:cNvPr id="8" name="Título 7">
-            <a:extLst>
-              <a:ext uri="{FF2B5EF4-FFF2-40B4-BE49-F238E27FC236}">
-                <a16:creationId xmlns:a16="http://schemas.microsoft.com/office/drawing/2014/main" id="{A1F7BBE7-AE55-470A-A695-EE06215F5EB4}"/>
-              </a:ext>
-            </a:extLst>
-          </p:cNvPr>
-          <p:cNvSpPr>
-            <a:spLocks noGrp="1"/>
-          </p:cNvSpPr>
-          <p:nvPr>
-            <p:ph type="title"/>
-          </p:nvPr>
-        </p:nvSpPr>
-        <p:spPr/>
-        <p:txBody>
-          <a:bodyPr/>
-          <a:lstStyle/>
-          <a:p>
-            <a:r>
-              <a:rPr lang="es-CL" dirty="0"/>
-              <a:t>Aspectos Estratégicos de ZOFRI S.A.</a:t>
-            </a:r>
-          </a:p>
-        </p:txBody>
-      </p:sp>
     </p:spTree>
     <p:extLst>
       <p:ext uri="{BB962C8B-B14F-4D97-AF65-F5344CB8AC3E}">
-        <p14:creationId xmlns:p14="http://schemas.microsoft.com/office/powerpoint/2010/main" val="125720994"/>
+        <p14:creationId xmlns:p14="http://schemas.microsoft.com/office/powerpoint/2010/main" val="1198930643"/>
       </p:ext>
     </p:extLst>
   </p:cSld>
@@ -8141,10 +8215,104 @@
       </p:grpSpPr>
       <p:sp>
         <p:nvSpPr>
-          <p:cNvPr id="4" name="Flecha: pentágono 3">
+          <p:cNvPr id="2" name="Título 1">
             <a:extLst>
               <a:ext uri="{FF2B5EF4-FFF2-40B4-BE49-F238E27FC236}">
-                <a16:creationId xmlns:a16="http://schemas.microsoft.com/office/drawing/2014/main" id="{C9009098-29DC-4FE1-A202-8AA63536C7F2}"/>
+                <a16:creationId xmlns:a16="http://schemas.microsoft.com/office/drawing/2014/main" id="{EC45AD01-B5A1-48A8-B2A6-275C8DCF926C}"/>
+              </a:ext>
+            </a:extLst>
+          </p:cNvPr>
+          <p:cNvSpPr>
+            <a:spLocks noGrp="1"/>
+          </p:cNvSpPr>
+          <p:nvPr>
+            <p:ph type="title"/>
+          </p:nvPr>
+        </p:nvSpPr>
+        <p:spPr>
+          <a:xfrm>
+            <a:off x="495300" y="641646"/>
+            <a:ext cx="6086475" cy="697907"/>
+          </a:xfrm>
+        </p:spPr>
+        <p:txBody>
+          <a:bodyPr>
+            <a:noAutofit/>
+          </a:bodyPr>
+          <a:lstStyle/>
+          <a:p>
+            <a:r>
+              <a:rPr lang="es-CL" dirty="0"/>
+              <a:t>Ubicación de ZOFRI S.A.</a:t>
+            </a:r>
+          </a:p>
+        </p:txBody>
+      </p:sp>
+      <p:sp>
+        <p:nvSpPr>
+          <p:cNvPr id="3" name="Marcador de contenido 2">
+            <a:extLst>
+              <a:ext uri="{FF2B5EF4-FFF2-40B4-BE49-F238E27FC236}">
+                <a16:creationId xmlns:a16="http://schemas.microsoft.com/office/drawing/2014/main" id="{376AE3DA-1551-4F75-AC60-1DC8F996A87F}"/>
+              </a:ext>
+            </a:extLst>
+          </p:cNvPr>
+          <p:cNvSpPr>
+            <a:spLocks noGrp="1"/>
+          </p:cNvSpPr>
+          <p:nvPr>
+            <p:ph idx="1"/>
+          </p:nvPr>
+        </p:nvSpPr>
+        <p:spPr>
+          <a:xfrm>
+            <a:off x="677333" y="1628775"/>
+            <a:ext cx="8754901" cy="4412587"/>
+          </a:xfrm>
+        </p:spPr>
+        <p:txBody>
+          <a:bodyPr>
+            <a:normAutofit/>
+          </a:bodyPr>
+          <a:lstStyle/>
+          <a:p>
+            <a:pPr algn="just"/>
+            <a:r>
+              <a:rPr lang="es-CL" dirty="0">
+                <a:solidFill>
+                  <a:schemeClr val="tx1"/>
+                </a:solidFill>
+              </a:rPr>
+              <a:t>El grueso de las instalaciones de ZOFRI S.A. y su personal se encuentran ubicados al norte de la cuidad de Iquique, en el sector denominado “El Colorado”.</a:t>
+            </a:r>
+          </a:p>
+          <a:p>
+            <a:pPr algn="just"/>
+            <a:r>
+              <a:rPr lang="es-CL" dirty="0">
+                <a:solidFill>
+                  <a:schemeClr val="tx1"/>
+                </a:solidFill>
+              </a:rPr>
+              <a:t>En este lugar encontramos el Centro de Negocios Mayoristas” (Recintos Amurallados I y II y Barrio Industrial de la Zona Franca), el Centro Logístico ZOFRI (CLZ) y el Mall ZOFRI.</a:t>
+            </a:r>
+          </a:p>
+          <a:p>
+            <a:pPr algn="just"/>
+            <a:endParaRPr lang="es-CL" dirty="0">
+              <a:solidFill>
+                <a:schemeClr val="tx1"/>
+              </a:solidFill>
+            </a:endParaRPr>
+          </a:p>
+        </p:txBody>
+      </p:sp>
+      <p:sp>
+        <p:nvSpPr>
+          <p:cNvPr id="7" name="Flecha: pentágono 6">
+            <a:extLst>
+              <a:ext uri="{FF2B5EF4-FFF2-40B4-BE49-F238E27FC236}">
+                <a16:creationId xmlns:a16="http://schemas.microsoft.com/office/drawing/2014/main" id="{2421A3F3-D7E6-468F-8EE1-9D58DDF2460A}"/>
               </a:ext>
             </a:extLst>
           </p:cNvPr>
@@ -8186,137 +8354,10 @@
           </a:p>
         </p:txBody>
       </p:sp>
-      <p:pic>
-        <p:nvPicPr>
-          <p:cNvPr id="10" name="Imagen 9">
-            <a:extLst>
-              <a:ext uri="{FF2B5EF4-FFF2-40B4-BE49-F238E27FC236}">
-                <a16:creationId xmlns:a16="http://schemas.microsoft.com/office/drawing/2014/main" id="{51DD884C-B3A7-4CDF-B487-66FE295A094C}"/>
-              </a:ext>
-            </a:extLst>
-          </p:cNvPr>
-          <p:cNvPicPr>
-            <a:picLocks noChangeAspect="1"/>
-          </p:cNvPicPr>
-          <p:nvPr/>
-        </p:nvPicPr>
-        <p:blipFill>
-          <a:blip r:embed="rId2"/>
-          <a:stretch>
-            <a:fillRect/>
-          </a:stretch>
-        </p:blipFill>
-        <p:spPr>
-          <a:xfrm>
-            <a:off x="655387" y="1476374"/>
-            <a:ext cx="5878763" cy="4994777"/>
-          </a:xfrm>
-          <a:prstGeom prst="rect">
-            <a:avLst/>
-          </a:prstGeom>
-        </p:spPr>
-      </p:pic>
-      <p:sp>
-        <p:nvSpPr>
-          <p:cNvPr id="11" name="Marcador de contenido 2">
-            <a:extLst>
-              <a:ext uri="{FF2B5EF4-FFF2-40B4-BE49-F238E27FC236}">
-                <a16:creationId xmlns:a16="http://schemas.microsoft.com/office/drawing/2014/main" id="{E3B272BE-7B43-42A7-8F36-F71E58A49179}"/>
-              </a:ext>
-            </a:extLst>
-          </p:cNvPr>
-          <p:cNvSpPr>
-            <a:spLocks noGrp="1"/>
-          </p:cNvSpPr>
-          <p:nvPr>
-            <p:ph idx="1"/>
-          </p:nvPr>
-        </p:nvSpPr>
-        <p:spPr>
-          <a:xfrm>
-            <a:off x="7691810" y="2285973"/>
-            <a:ext cx="2263602" cy="2600326"/>
-          </a:xfrm>
-        </p:spPr>
-        <p:txBody>
-          <a:bodyPr>
-            <a:normAutofit/>
-          </a:bodyPr>
-          <a:lstStyle/>
-          <a:p>
-            <a:r>
-              <a:rPr lang="es-CL" sz="2000" dirty="0">
-                <a:solidFill>
-                  <a:srgbClr val="FF0000"/>
-                </a:solidFill>
-              </a:rPr>
-              <a:t>Directores</a:t>
-            </a:r>
-          </a:p>
-          <a:p>
-            <a:r>
-              <a:rPr lang="es-CL" sz="2000" dirty="0">
-                <a:solidFill>
-                  <a:srgbClr val="FF0000"/>
-                </a:solidFill>
-              </a:rPr>
-              <a:t>Gerentes</a:t>
-            </a:r>
-          </a:p>
-          <a:p>
-            <a:r>
-              <a:rPr lang="es-CL" sz="2000" dirty="0">
-                <a:solidFill>
-                  <a:srgbClr val="FF0000"/>
-                </a:solidFill>
-              </a:rPr>
-              <a:t>Ejecutivos</a:t>
-            </a:r>
-          </a:p>
-          <a:p>
-            <a:r>
-              <a:rPr lang="es-CL" sz="2000" dirty="0">
-                <a:solidFill>
-                  <a:srgbClr val="FF0000"/>
-                </a:solidFill>
-              </a:rPr>
-              <a:t>Dotación</a:t>
-            </a:r>
-          </a:p>
-        </p:txBody>
-      </p:sp>
-      <p:sp>
-        <p:nvSpPr>
-          <p:cNvPr id="5" name="Título 4">
-            <a:extLst>
-              <a:ext uri="{FF2B5EF4-FFF2-40B4-BE49-F238E27FC236}">
-                <a16:creationId xmlns:a16="http://schemas.microsoft.com/office/drawing/2014/main" id="{246EE814-BE17-4C97-9C98-4678D63EE06B}"/>
-              </a:ext>
-            </a:extLst>
-          </p:cNvPr>
-          <p:cNvSpPr>
-            <a:spLocks noGrp="1"/>
-          </p:cNvSpPr>
-          <p:nvPr>
-            <p:ph type="title"/>
-          </p:nvPr>
-        </p:nvSpPr>
-        <p:spPr/>
-        <p:txBody>
-          <a:bodyPr/>
-          <a:lstStyle/>
-          <a:p>
-            <a:r>
-              <a:rPr lang="es-CL" dirty="0"/>
-              <a:t>Estructura Organizacional de ZOFRI S.A.</a:t>
-            </a:r>
-          </a:p>
-        </p:txBody>
-      </p:sp>
     </p:spTree>
     <p:extLst>
       <p:ext uri="{BB962C8B-B14F-4D97-AF65-F5344CB8AC3E}">
-        <p14:creationId xmlns:p14="http://schemas.microsoft.com/office/powerpoint/2010/main" val="1311091605"/>
+        <p14:creationId xmlns:p14="http://schemas.microsoft.com/office/powerpoint/2010/main" val="526465938"/>
       </p:ext>
     </p:extLst>
   </p:cSld>
@@ -8345,10 +8386,10 @@
       </p:grpSpPr>
       <p:sp>
         <p:nvSpPr>
-          <p:cNvPr id="2" name="Título 1">
+          <p:cNvPr id="3" name="Marcador de contenido 2">
             <a:extLst>
               <a:ext uri="{FF2B5EF4-FFF2-40B4-BE49-F238E27FC236}">
-                <a16:creationId xmlns:a16="http://schemas.microsoft.com/office/drawing/2014/main" id="{96D87ABC-3F9F-4AAA-98D0-27A2C9E307F2}"/>
+                <a16:creationId xmlns:a16="http://schemas.microsoft.com/office/drawing/2014/main" id="{376AE3DA-1551-4F75-AC60-1DC8F996A87F}"/>
               </a:ext>
             </a:extLst>
           </p:cNvPr>
@@ -8356,57 +8397,78 @@
             <a:spLocks noGrp="1"/>
           </p:cNvSpPr>
           <p:nvPr>
-            <p:ph type="title"/>
-          </p:nvPr>
-        </p:nvSpPr>
-        <p:spPr/>
-        <p:txBody>
-          <a:bodyPr/>
+            <p:ph idx="1"/>
+          </p:nvPr>
+        </p:nvSpPr>
+        <p:spPr>
+          <a:xfrm>
+            <a:off x="495300" y="1476374"/>
+            <a:ext cx="8778702" cy="5162551"/>
+          </a:xfrm>
+        </p:spPr>
+        <p:txBody>
+          <a:bodyPr>
+            <a:normAutofit/>
+          </a:bodyPr>
           <a:lstStyle/>
           <a:p>
             <a:r>
               <a:rPr lang="es-CL" dirty="0"/>
-              <a:t>Problemática</a:t>
-            </a:r>
-          </a:p>
-        </p:txBody>
-      </p:sp>
-      <p:sp>
-        <p:nvSpPr>
-          <p:cNvPr id="3" name="Marcador de contenido 2">
-            <a:extLst>
-              <a:ext uri="{FF2B5EF4-FFF2-40B4-BE49-F238E27FC236}">
-                <a16:creationId xmlns:a16="http://schemas.microsoft.com/office/drawing/2014/main" id="{A7CCCAB9-5C1B-4554-B40A-BA522687BAE9}"/>
-              </a:ext>
-            </a:extLst>
-          </p:cNvPr>
-          <p:cNvSpPr>
-            <a:spLocks noGrp="1"/>
-          </p:cNvSpPr>
-          <p:nvPr>
-            <p:ph idx="1"/>
-          </p:nvPr>
-        </p:nvSpPr>
-        <p:spPr/>
-        <p:txBody>
-          <a:bodyPr/>
-          <a:lstStyle/>
-          <a:p>
+              <a:t>Misión</a:t>
+            </a:r>
+          </a:p>
+          <a:p>
+            <a:pPr lvl="1" algn="just"/>
             <a:r>
               <a:rPr lang="es-CL" dirty="0"/>
-              <a:t>¿Por qué esta memoria?</a:t>
-            </a:r>
-          </a:p>
-          <a:p>
-            <a:r>
+              <a:t>“Gestionar y liderar una plataforma de servicios para facilitar negocios en Sudamérica, aportando el conocimiento y la experiencia para entregarles a nuestros clientes: usuarios y visitantes, la mejor combinación de factores, procesos y soluciones, que satisfagan sus necesidades, teniendo como pilar fundamental el sentido de ética en los negocios y asumiendo un alto compromiso con la generación de valor para accionistas, clientes, colaboradores, comunidad y entorno”. </a:t>
+            </a:r>
+            <a:br>
               <a:rPr lang="es-CL" dirty="0"/>
-              <a:t>¿Cuál es la necesidad?</a:t>
-            </a:r>
-          </a:p>
-          <a:p>
+            </a:br>
             <a:r>
               <a:rPr lang="es-CL" dirty="0"/>
-              <a:t>¿Qué se analizará?</a:t>
+              <a:t>(ZOFRI S.A., 2017)</a:t>
+            </a:r>
+          </a:p>
+          <a:p>
+            <a:r>
+              <a:rPr lang="es-CL" dirty="0"/>
+              <a:t>Visión</a:t>
+            </a:r>
+          </a:p>
+          <a:p>
+            <a:pPr lvl="1" algn="just"/>
+            <a:r>
+              <a:rPr lang="es-CL" dirty="0"/>
+              <a:t>“Ser la más eficiente y sostenible plataforma de negocios de Sudamérica, con las mejores oportunidades y soluciones para sus clientes: usuarios y visitantes”.  (ZOFRI S.A., 2017)</a:t>
+            </a:r>
+          </a:p>
+          <a:p>
+            <a:r>
+              <a:rPr lang="es-CL" dirty="0"/>
+              <a:t>Valores</a:t>
+            </a:r>
+          </a:p>
+          <a:p>
+            <a:pPr lvl="1"/>
+            <a:r>
+              <a:rPr lang="es-CL" dirty="0"/>
+              <a:t>Confianza</a:t>
+            </a:r>
+          </a:p>
+          <a:p>
+            <a:pPr lvl="1"/>
+            <a:r>
+              <a:rPr lang="es-CL" dirty="0"/>
+              <a:t>Respeto</a:t>
+            </a:r>
+          </a:p>
+          <a:p>
+            <a:pPr lvl="1"/>
+            <a:r>
+              <a:rPr lang="es-CL" dirty="0"/>
+              <a:t>Creatividad</a:t>
             </a:r>
           </a:p>
         </p:txBody>
@@ -8416,7 +8478,7 @@
           <p:cNvPr id="4" name="Flecha: pentágono 3">
             <a:extLst>
               <a:ext uri="{FF2B5EF4-FFF2-40B4-BE49-F238E27FC236}">
-                <a16:creationId xmlns:a16="http://schemas.microsoft.com/office/drawing/2014/main" id="{651A3DD8-D31E-41A9-B5DD-F9E83FA575AF}"/>
+                <a16:creationId xmlns:a16="http://schemas.microsoft.com/office/drawing/2014/main" id="{C9009098-29DC-4FE1-A202-8AA63536C7F2}"/>
               </a:ext>
             </a:extLst>
           </p:cNvPr>
@@ -8458,10 +8520,315 @@
           </a:p>
         </p:txBody>
       </p:sp>
+      <p:sp>
+        <p:nvSpPr>
+          <p:cNvPr id="7" name="Marcador de contenido 2">
+            <a:extLst>
+              <a:ext uri="{FF2B5EF4-FFF2-40B4-BE49-F238E27FC236}">
+                <a16:creationId xmlns:a16="http://schemas.microsoft.com/office/drawing/2014/main" id="{26ADF021-C49E-4393-B843-B5C74C5AB6D0}"/>
+              </a:ext>
+            </a:extLst>
+          </p:cNvPr>
+          <p:cNvSpPr txBox="1">
+            <a:spLocks/>
+          </p:cNvSpPr>
+          <p:nvPr/>
+        </p:nvSpPr>
+        <p:spPr>
+          <a:xfrm>
+            <a:off x="2604693" y="5372102"/>
+            <a:ext cx="4559916" cy="1387181"/>
+          </a:xfrm>
+          <a:prstGeom prst="rect">
+            <a:avLst/>
+          </a:prstGeom>
+        </p:spPr>
+        <p:txBody>
+          <a:bodyPr vert="horz" lIns="91440" tIns="45720" rIns="91440" bIns="45720" rtlCol="0">
+            <a:normAutofit/>
+          </a:bodyPr>
+          <a:lstStyle>
+            <a:lvl1pPr marL="342900" indent="-342900" algn="l" defTabSz="457200" rtl="0" eaLnBrk="1" latinLnBrk="0" hangingPunct="1">
+              <a:spcBef>
+                <a:spcPts val="1000"/>
+              </a:spcBef>
+              <a:spcAft>
+                <a:spcPts val="0"/>
+              </a:spcAft>
+              <a:buClr>
+                <a:schemeClr val="accent1"/>
+              </a:buClr>
+              <a:buSzPct val="80000"/>
+              <a:buFont typeface="Wingdings 3" charset="2"/>
+              <a:buChar char=""/>
+              <a:defRPr sz="1800" kern="1200">
+                <a:solidFill>
+                  <a:schemeClr val="tx1">
+                    <a:lumMod val="75000"/>
+                    <a:lumOff val="25000"/>
+                  </a:schemeClr>
+                </a:solidFill>
+                <a:latin typeface="+mn-lt"/>
+                <a:ea typeface="+mn-ea"/>
+                <a:cs typeface="+mn-cs"/>
+              </a:defRPr>
+            </a:lvl1pPr>
+            <a:lvl2pPr marL="742950" indent="-285750" algn="l" defTabSz="457200" rtl="0" eaLnBrk="1" latinLnBrk="0" hangingPunct="1">
+              <a:spcBef>
+                <a:spcPts val="1000"/>
+              </a:spcBef>
+              <a:spcAft>
+                <a:spcPts val="0"/>
+              </a:spcAft>
+              <a:buClr>
+                <a:schemeClr val="accent1"/>
+              </a:buClr>
+              <a:buSzPct val="80000"/>
+              <a:buFont typeface="Wingdings 3" charset="2"/>
+              <a:buChar char=""/>
+              <a:defRPr sz="1600" kern="1200">
+                <a:solidFill>
+                  <a:schemeClr val="tx1">
+                    <a:lumMod val="75000"/>
+                    <a:lumOff val="25000"/>
+                  </a:schemeClr>
+                </a:solidFill>
+                <a:latin typeface="+mn-lt"/>
+                <a:ea typeface="+mn-ea"/>
+                <a:cs typeface="+mn-cs"/>
+              </a:defRPr>
+            </a:lvl2pPr>
+            <a:lvl3pPr marL="1143000" indent="-228600" algn="l" defTabSz="457200" rtl="0" eaLnBrk="1" latinLnBrk="0" hangingPunct="1">
+              <a:spcBef>
+                <a:spcPts val="1000"/>
+              </a:spcBef>
+              <a:spcAft>
+                <a:spcPts val="0"/>
+              </a:spcAft>
+              <a:buClr>
+                <a:schemeClr val="accent1"/>
+              </a:buClr>
+              <a:buSzPct val="80000"/>
+              <a:buFont typeface="Wingdings 3" charset="2"/>
+              <a:buChar char=""/>
+              <a:defRPr sz="1400" kern="1200">
+                <a:solidFill>
+                  <a:schemeClr val="tx1">
+                    <a:lumMod val="75000"/>
+                    <a:lumOff val="25000"/>
+                  </a:schemeClr>
+                </a:solidFill>
+                <a:latin typeface="+mn-lt"/>
+                <a:ea typeface="+mn-ea"/>
+                <a:cs typeface="+mn-cs"/>
+              </a:defRPr>
+            </a:lvl3pPr>
+            <a:lvl4pPr marL="1600200" indent="-228600" algn="l" defTabSz="457200" rtl="0" eaLnBrk="1" latinLnBrk="0" hangingPunct="1">
+              <a:spcBef>
+                <a:spcPts val="1000"/>
+              </a:spcBef>
+              <a:spcAft>
+                <a:spcPts val="0"/>
+              </a:spcAft>
+              <a:buClr>
+                <a:schemeClr val="accent1"/>
+              </a:buClr>
+              <a:buSzPct val="80000"/>
+              <a:buFont typeface="Wingdings 3" charset="2"/>
+              <a:buChar char=""/>
+              <a:defRPr sz="1200" kern="1200">
+                <a:solidFill>
+                  <a:schemeClr val="tx1">
+                    <a:lumMod val="75000"/>
+                    <a:lumOff val="25000"/>
+                  </a:schemeClr>
+                </a:solidFill>
+                <a:latin typeface="+mn-lt"/>
+                <a:ea typeface="+mn-ea"/>
+                <a:cs typeface="+mn-cs"/>
+              </a:defRPr>
+            </a:lvl4pPr>
+            <a:lvl5pPr marL="2057400" indent="-228600" algn="l" defTabSz="457200" rtl="0" eaLnBrk="1" latinLnBrk="0" hangingPunct="1">
+              <a:spcBef>
+                <a:spcPts val="1000"/>
+              </a:spcBef>
+              <a:spcAft>
+                <a:spcPts val="0"/>
+              </a:spcAft>
+              <a:buClr>
+                <a:schemeClr val="accent1"/>
+              </a:buClr>
+              <a:buSzPct val="80000"/>
+              <a:buFont typeface="Wingdings 3" charset="2"/>
+              <a:buChar char=""/>
+              <a:defRPr sz="1200" kern="1200">
+                <a:solidFill>
+                  <a:schemeClr val="tx1">
+                    <a:lumMod val="75000"/>
+                    <a:lumOff val="25000"/>
+                  </a:schemeClr>
+                </a:solidFill>
+                <a:latin typeface="+mn-lt"/>
+                <a:ea typeface="+mn-ea"/>
+                <a:cs typeface="+mn-cs"/>
+              </a:defRPr>
+            </a:lvl5pPr>
+            <a:lvl6pPr marL="2514600" indent="-228600" algn="l" defTabSz="457200" rtl="0" eaLnBrk="1" latinLnBrk="0" hangingPunct="1">
+              <a:spcBef>
+                <a:spcPts val="1000"/>
+              </a:spcBef>
+              <a:spcAft>
+                <a:spcPts val="0"/>
+              </a:spcAft>
+              <a:buClr>
+                <a:schemeClr val="accent1"/>
+              </a:buClr>
+              <a:buSzPct val="80000"/>
+              <a:buFont typeface="Wingdings 3" charset="2"/>
+              <a:buChar char=""/>
+              <a:defRPr sz="1200" kern="1200">
+                <a:solidFill>
+                  <a:schemeClr val="tx1">
+                    <a:lumMod val="75000"/>
+                    <a:lumOff val="25000"/>
+                  </a:schemeClr>
+                </a:solidFill>
+                <a:latin typeface="+mn-lt"/>
+                <a:ea typeface="+mn-ea"/>
+                <a:cs typeface="+mn-cs"/>
+              </a:defRPr>
+            </a:lvl6pPr>
+            <a:lvl7pPr marL="2971800" indent="-228600" algn="l" defTabSz="457200" rtl="0" eaLnBrk="1" latinLnBrk="0" hangingPunct="1">
+              <a:spcBef>
+                <a:spcPts val="1000"/>
+              </a:spcBef>
+              <a:spcAft>
+                <a:spcPts val="0"/>
+              </a:spcAft>
+              <a:buClr>
+                <a:schemeClr val="accent1"/>
+              </a:buClr>
+              <a:buSzPct val="80000"/>
+              <a:buFont typeface="Wingdings 3" charset="2"/>
+              <a:buChar char=""/>
+              <a:defRPr sz="1200" kern="1200">
+                <a:solidFill>
+                  <a:schemeClr val="tx1">
+                    <a:lumMod val="75000"/>
+                    <a:lumOff val="25000"/>
+                  </a:schemeClr>
+                </a:solidFill>
+                <a:latin typeface="+mn-lt"/>
+                <a:ea typeface="+mn-ea"/>
+                <a:cs typeface="+mn-cs"/>
+              </a:defRPr>
+            </a:lvl7pPr>
+            <a:lvl8pPr marL="3429000" indent="-228600" algn="l" defTabSz="457200" rtl="0" eaLnBrk="1" latinLnBrk="0" hangingPunct="1">
+              <a:spcBef>
+                <a:spcPts val="1000"/>
+              </a:spcBef>
+              <a:spcAft>
+                <a:spcPts val="0"/>
+              </a:spcAft>
+              <a:buClr>
+                <a:schemeClr val="accent1"/>
+              </a:buClr>
+              <a:buSzPct val="80000"/>
+              <a:buFont typeface="Wingdings 3" charset="2"/>
+              <a:buChar char=""/>
+              <a:defRPr sz="1200" kern="1200">
+                <a:solidFill>
+                  <a:schemeClr val="tx1">
+                    <a:lumMod val="75000"/>
+                    <a:lumOff val="25000"/>
+                  </a:schemeClr>
+                </a:solidFill>
+                <a:latin typeface="+mn-lt"/>
+                <a:ea typeface="+mn-ea"/>
+                <a:cs typeface="+mn-cs"/>
+              </a:defRPr>
+            </a:lvl8pPr>
+            <a:lvl9pPr marL="3886200" indent="-228600" algn="l" defTabSz="457200" rtl="0" eaLnBrk="1" latinLnBrk="0" hangingPunct="1">
+              <a:spcBef>
+                <a:spcPts val="1000"/>
+              </a:spcBef>
+              <a:spcAft>
+                <a:spcPts val="0"/>
+              </a:spcAft>
+              <a:buClr>
+                <a:schemeClr val="accent1"/>
+              </a:buClr>
+              <a:buSzPct val="80000"/>
+              <a:buFont typeface="Wingdings 3" charset="2"/>
+              <a:buChar char=""/>
+              <a:defRPr sz="1200" kern="1200">
+                <a:solidFill>
+                  <a:schemeClr val="tx1">
+                    <a:lumMod val="75000"/>
+                    <a:lumOff val="25000"/>
+                  </a:schemeClr>
+                </a:solidFill>
+                <a:latin typeface="+mn-lt"/>
+                <a:ea typeface="+mn-ea"/>
+                <a:cs typeface="+mn-cs"/>
+              </a:defRPr>
+            </a:lvl9pPr>
+          </a:lstStyle>
+          <a:p>
+            <a:pPr lvl="1"/>
+            <a:r>
+              <a:rPr lang="es-CL" dirty="0"/>
+              <a:t>Integridad</a:t>
+            </a:r>
+          </a:p>
+          <a:p>
+            <a:pPr lvl="1"/>
+            <a:r>
+              <a:rPr lang="es-CL" dirty="0"/>
+              <a:t>Vocación</a:t>
+            </a:r>
+          </a:p>
+          <a:p>
+            <a:pPr lvl="1"/>
+            <a:r>
+              <a:rPr lang="es-CL" dirty="0"/>
+              <a:t>Compromiso</a:t>
+            </a:r>
+          </a:p>
+        </p:txBody>
+      </p:sp>
+      <p:sp>
+        <p:nvSpPr>
+          <p:cNvPr id="8" name="Título 7">
+            <a:extLst>
+              <a:ext uri="{FF2B5EF4-FFF2-40B4-BE49-F238E27FC236}">
+                <a16:creationId xmlns:a16="http://schemas.microsoft.com/office/drawing/2014/main" id="{A1F7BBE7-AE55-470A-A695-EE06215F5EB4}"/>
+              </a:ext>
+            </a:extLst>
+          </p:cNvPr>
+          <p:cNvSpPr>
+            <a:spLocks noGrp="1"/>
+          </p:cNvSpPr>
+          <p:nvPr>
+            <p:ph type="title"/>
+          </p:nvPr>
+        </p:nvSpPr>
+        <p:spPr/>
+        <p:txBody>
+          <a:bodyPr/>
+          <a:lstStyle/>
+          <a:p>
+            <a:r>
+              <a:rPr lang="es-CL" dirty="0"/>
+              <a:t>Aspectos Estratégicos de ZOFRI S.A.</a:t>
+            </a:r>
+          </a:p>
+        </p:txBody>
+      </p:sp>
     </p:spTree>
     <p:extLst>
       <p:ext uri="{BB962C8B-B14F-4D97-AF65-F5344CB8AC3E}">
-        <p14:creationId xmlns:p14="http://schemas.microsoft.com/office/powerpoint/2010/main" val="2820023138"/>
+        <p14:creationId xmlns:p14="http://schemas.microsoft.com/office/powerpoint/2010/main" val="125720994"/>
       </p:ext>
     </p:extLst>
   </p:cSld>
@@ -8490,60 +8857,10 @@
       </p:grpSpPr>
       <p:sp>
         <p:nvSpPr>
-          <p:cNvPr id="2" name="Título 1">
-            <a:extLst>
-              <a:ext uri="{FF2B5EF4-FFF2-40B4-BE49-F238E27FC236}">
-                <a16:creationId xmlns:a16="http://schemas.microsoft.com/office/drawing/2014/main" id="{9285FC62-F834-4B80-A482-A83E68F82413}"/>
-              </a:ext>
-            </a:extLst>
-          </p:cNvPr>
-          <p:cNvSpPr>
-            <a:spLocks noGrp="1"/>
-          </p:cNvSpPr>
-          <p:nvPr>
-            <p:ph type="title"/>
-          </p:nvPr>
-        </p:nvSpPr>
-        <p:spPr/>
-        <p:txBody>
-          <a:bodyPr/>
-          <a:lstStyle/>
-          <a:p>
-            <a:endParaRPr lang="es-CL"/>
-          </a:p>
-        </p:txBody>
-      </p:sp>
-      <p:sp>
-        <p:nvSpPr>
-          <p:cNvPr id="3" name="Marcador de contenido 2">
-            <a:extLst>
-              <a:ext uri="{FF2B5EF4-FFF2-40B4-BE49-F238E27FC236}">
-                <a16:creationId xmlns:a16="http://schemas.microsoft.com/office/drawing/2014/main" id="{B9C19125-47FE-455B-984E-0BB3F8F116DB}"/>
-              </a:ext>
-            </a:extLst>
-          </p:cNvPr>
-          <p:cNvSpPr>
-            <a:spLocks noGrp="1"/>
-          </p:cNvSpPr>
-          <p:nvPr>
-            <p:ph idx="1"/>
-          </p:nvPr>
-        </p:nvSpPr>
-        <p:spPr/>
-        <p:txBody>
-          <a:bodyPr/>
-          <a:lstStyle/>
-          <a:p>
-            <a:endParaRPr lang="es-CL"/>
-          </a:p>
-        </p:txBody>
-      </p:sp>
-      <p:sp>
-        <p:nvSpPr>
           <p:cNvPr id="4" name="Flecha: pentágono 3">
             <a:extLst>
               <a:ext uri="{FF2B5EF4-FFF2-40B4-BE49-F238E27FC236}">
-                <a16:creationId xmlns:a16="http://schemas.microsoft.com/office/drawing/2014/main" id="{345D5268-6816-4295-A1C8-156211BB6CAA}"/>
+                <a16:creationId xmlns:a16="http://schemas.microsoft.com/office/drawing/2014/main" id="{C9009098-29DC-4FE1-A202-8AA63536C7F2}"/>
               </a:ext>
             </a:extLst>
           </p:cNvPr>
@@ -8580,15 +8897,964 @@
             <a:pPr algn="ctr"/>
             <a:r>
               <a:rPr lang="es-CL" dirty="0"/>
-              <a:t>Desarrollo</a:t>
-            </a:r>
-          </a:p>
-        </p:txBody>
-      </p:sp>
+              <a:t>Situación Bajo Estudio</a:t>
+            </a:r>
+          </a:p>
+        </p:txBody>
+      </p:sp>
+      <p:sp>
+        <p:nvSpPr>
+          <p:cNvPr id="5" name="Título 4">
+            <a:extLst>
+              <a:ext uri="{FF2B5EF4-FFF2-40B4-BE49-F238E27FC236}">
+                <a16:creationId xmlns:a16="http://schemas.microsoft.com/office/drawing/2014/main" id="{246EE814-BE17-4C97-9C98-4678D63EE06B}"/>
+              </a:ext>
+            </a:extLst>
+          </p:cNvPr>
+          <p:cNvSpPr>
+            <a:spLocks noGrp="1"/>
+          </p:cNvSpPr>
+          <p:nvPr>
+            <p:ph type="title"/>
+          </p:nvPr>
+        </p:nvSpPr>
+        <p:spPr/>
+        <p:txBody>
+          <a:bodyPr/>
+          <a:lstStyle/>
+          <a:p>
+            <a:r>
+              <a:rPr lang="es-CL" dirty="0"/>
+              <a:t>Estructura Organizacional de ZOFRI S.A.</a:t>
+            </a:r>
+          </a:p>
+        </p:txBody>
+      </p:sp>
+      <p:sp>
+        <p:nvSpPr>
+          <p:cNvPr id="8" name="Marcador de contenido 2">
+            <a:extLst>
+              <a:ext uri="{FF2B5EF4-FFF2-40B4-BE49-F238E27FC236}">
+                <a16:creationId xmlns:a16="http://schemas.microsoft.com/office/drawing/2014/main" id="{5799C2AA-93E8-4EC4-B384-A75BF9634DB7}"/>
+              </a:ext>
+            </a:extLst>
+          </p:cNvPr>
+          <p:cNvSpPr>
+            <a:spLocks noGrp="1"/>
+          </p:cNvSpPr>
+          <p:nvPr>
+            <p:ph idx="1"/>
+          </p:nvPr>
+        </p:nvSpPr>
+        <p:spPr>
+          <a:xfrm>
+            <a:off x="7691810" y="2285973"/>
+            <a:ext cx="2263602" cy="2600326"/>
+          </a:xfrm>
+        </p:spPr>
+        <p:txBody>
+          <a:bodyPr>
+            <a:normAutofit/>
+          </a:bodyPr>
+          <a:lstStyle/>
+          <a:p>
+            <a:r>
+              <a:rPr lang="es-CL" sz="2000" dirty="0">
+                <a:solidFill>
+                  <a:schemeClr val="tx1"/>
+                </a:solidFill>
+              </a:rPr>
+              <a:t>Directores:   7</a:t>
+            </a:r>
+          </a:p>
+          <a:p>
+            <a:r>
+              <a:rPr lang="es-CL" sz="2000" dirty="0">
+                <a:solidFill>
+                  <a:schemeClr val="tx1"/>
+                </a:solidFill>
+              </a:rPr>
+              <a:t>Gerentes:     6</a:t>
+            </a:r>
+          </a:p>
+          <a:p>
+            <a:r>
+              <a:rPr lang="es-CL" sz="2000" dirty="0">
+                <a:solidFill>
+                  <a:schemeClr val="tx1"/>
+                </a:solidFill>
+              </a:rPr>
+              <a:t>Ejecutivos:  12</a:t>
+            </a:r>
+          </a:p>
+          <a:p>
+            <a:r>
+              <a:rPr lang="es-CL" sz="2000" dirty="0">
+                <a:solidFill>
+                  <a:schemeClr val="tx1"/>
+                </a:solidFill>
+              </a:rPr>
+              <a:t>Dotación:   295</a:t>
+            </a:r>
+          </a:p>
+        </p:txBody>
+      </p:sp>
+      <p:sp>
+        <p:nvSpPr>
+          <p:cNvPr id="9" name="Rectángulo: esquinas redondeadas 8">
+            <a:extLst>
+              <a:ext uri="{FF2B5EF4-FFF2-40B4-BE49-F238E27FC236}">
+                <a16:creationId xmlns:a16="http://schemas.microsoft.com/office/drawing/2014/main" id="{32D85B81-0D13-4B2B-B6BB-BF5135B318CE}"/>
+              </a:ext>
+            </a:extLst>
+          </p:cNvPr>
+          <p:cNvSpPr/>
+          <p:nvPr/>
+        </p:nvSpPr>
+        <p:spPr>
+          <a:xfrm>
+            <a:off x="3142112" y="1525676"/>
+            <a:ext cx="2013357" cy="511726"/>
+          </a:xfrm>
+          <a:prstGeom prst="roundRect">
+            <a:avLst/>
+          </a:prstGeom>
+          <a:solidFill>
+            <a:srgbClr val="FFC000"/>
+          </a:solidFill>
+        </p:spPr>
+        <p:style>
+          <a:lnRef idx="2">
+            <a:schemeClr val="accent1">
+              <a:shade val="50000"/>
+            </a:schemeClr>
+          </a:lnRef>
+          <a:fillRef idx="1">
+            <a:schemeClr val="accent1"/>
+          </a:fillRef>
+          <a:effectRef idx="0">
+            <a:schemeClr val="accent1"/>
+          </a:effectRef>
+          <a:fontRef idx="minor">
+            <a:schemeClr val="lt1"/>
+          </a:fontRef>
+        </p:style>
+        <p:txBody>
+          <a:bodyPr rtlCol="0" anchor="ctr"/>
+          <a:lstStyle/>
+          <a:p>
+            <a:pPr algn="ctr"/>
+            <a:r>
+              <a:rPr lang="es-CL" sz="1600" dirty="0"/>
+              <a:t>Directorio</a:t>
+            </a:r>
+          </a:p>
+        </p:txBody>
+      </p:sp>
+      <p:sp>
+        <p:nvSpPr>
+          <p:cNvPr id="12" name="Rectángulo: esquinas redondeadas 11">
+            <a:extLst>
+              <a:ext uri="{FF2B5EF4-FFF2-40B4-BE49-F238E27FC236}">
+                <a16:creationId xmlns:a16="http://schemas.microsoft.com/office/drawing/2014/main" id="{B22CD232-2B6A-4C04-8B37-3EB888ACCB26}"/>
+              </a:ext>
+            </a:extLst>
+          </p:cNvPr>
+          <p:cNvSpPr/>
+          <p:nvPr/>
+        </p:nvSpPr>
+        <p:spPr>
+          <a:xfrm>
+            <a:off x="3145216" y="2405864"/>
+            <a:ext cx="2013357" cy="511726"/>
+          </a:xfrm>
+          <a:prstGeom prst="roundRect">
+            <a:avLst/>
+          </a:prstGeom>
+          <a:solidFill>
+            <a:srgbClr val="FFC000"/>
+          </a:solidFill>
+        </p:spPr>
+        <p:style>
+          <a:lnRef idx="2">
+            <a:schemeClr val="accent1">
+              <a:shade val="50000"/>
+            </a:schemeClr>
+          </a:lnRef>
+          <a:fillRef idx="1">
+            <a:schemeClr val="accent1"/>
+          </a:fillRef>
+          <a:effectRef idx="0">
+            <a:schemeClr val="accent1"/>
+          </a:effectRef>
+          <a:fontRef idx="minor">
+            <a:schemeClr val="lt1"/>
+          </a:fontRef>
+        </p:style>
+        <p:txBody>
+          <a:bodyPr rtlCol="0" anchor="ctr"/>
+          <a:lstStyle/>
+          <a:p>
+            <a:pPr algn="ctr"/>
+            <a:r>
+              <a:rPr lang="es-CL" sz="1600" dirty="0"/>
+              <a:t>Gerencia General</a:t>
+            </a:r>
+          </a:p>
+        </p:txBody>
+      </p:sp>
+      <p:sp>
+        <p:nvSpPr>
+          <p:cNvPr id="13" name="Rectángulo: esquinas redondeadas 12">
+            <a:extLst>
+              <a:ext uri="{FF2B5EF4-FFF2-40B4-BE49-F238E27FC236}">
+                <a16:creationId xmlns:a16="http://schemas.microsoft.com/office/drawing/2014/main" id="{BEDE7F05-F1DA-48E8-9C0F-B56E6DA9B8D2}"/>
+              </a:ext>
+            </a:extLst>
+          </p:cNvPr>
+          <p:cNvSpPr/>
+          <p:nvPr/>
+        </p:nvSpPr>
+        <p:spPr>
+          <a:xfrm>
+            <a:off x="1287628" y="3320265"/>
+            <a:ext cx="2359383" cy="511726"/>
+          </a:xfrm>
+          <a:prstGeom prst="roundRect">
+            <a:avLst/>
+          </a:prstGeom>
+          <a:solidFill>
+            <a:srgbClr val="FFC000"/>
+          </a:solidFill>
+        </p:spPr>
+        <p:style>
+          <a:lnRef idx="2">
+            <a:schemeClr val="accent1">
+              <a:shade val="50000"/>
+            </a:schemeClr>
+          </a:lnRef>
+          <a:fillRef idx="1">
+            <a:schemeClr val="accent1"/>
+          </a:fillRef>
+          <a:effectRef idx="0">
+            <a:schemeClr val="accent1"/>
+          </a:effectRef>
+          <a:fontRef idx="minor">
+            <a:schemeClr val="lt1"/>
+          </a:fontRef>
+        </p:style>
+        <p:txBody>
+          <a:bodyPr rtlCol="0" anchor="ctr"/>
+          <a:lstStyle/>
+          <a:p>
+            <a:pPr algn="ctr"/>
+            <a:r>
+              <a:rPr lang="es-CL" sz="1600" dirty="0"/>
+              <a:t>Gerencia de Asuntos Legales</a:t>
+            </a:r>
+          </a:p>
+        </p:txBody>
+      </p:sp>
+      <p:sp>
+        <p:nvSpPr>
+          <p:cNvPr id="14" name="Rectángulo: esquinas redondeadas 13">
+            <a:extLst>
+              <a:ext uri="{FF2B5EF4-FFF2-40B4-BE49-F238E27FC236}">
+                <a16:creationId xmlns:a16="http://schemas.microsoft.com/office/drawing/2014/main" id="{DEB9088A-0CF8-4BE7-9345-AAAC3C4C2EF2}"/>
+              </a:ext>
+            </a:extLst>
+          </p:cNvPr>
+          <p:cNvSpPr/>
+          <p:nvPr/>
+        </p:nvSpPr>
+        <p:spPr>
+          <a:xfrm>
+            <a:off x="4687877" y="3332700"/>
+            <a:ext cx="2555719" cy="511726"/>
+          </a:xfrm>
+          <a:prstGeom prst="roundRect">
+            <a:avLst/>
+          </a:prstGeom>
+          <a:solidFill>
+            <a:srgbClr val="FFC000"/>
+          </a:solidFill>
+        </p:spPr>
+        <p:style>
+          <a:lnRef idx="2">
+            <a:schemeClr val="accent1">
+              <a:shade val="50000"/>
+            </a:schemeClr>
+          </a:lnRef>
+          <a:fillRef idx="1">
+            <a:schemeClr val="accent1"/>
+          </a:fillRef>
+          <a:effectRef idx="0">
+            <a:schemeClr val="accent1"/>
+          </a:effectRef>
+          <a:fontRef idx="minor">
+            <a:schemeClr val="lt1"/>
+          </a:fontRef>
+        </p:style>
+        <p:txBody>
+          <a:bodyPr rtlCol="0" anchor="ctr"/>
+          <a:lstStyle/>
+          <a:p>
+            <a:pPr algn="ctr"/>
+            <a:r>
+              <a:rPr lang="es-CL" sz="1600" dirty="0"/>
+              <a:t>Gerencia de Planificación y Desarrollo</a:t>
+            </a:r>
+          </a:p>
+        </p:txBody>
+      </p:sp>
+      <p:sp>
+        <p:nvSpPr>
+          <p:cNvPr id="15" name="Rectángulo: esquinas redondeadas 14">
+            <a:extLst>
+              <a:ext uri="{FF2B5EF4-FFF2-40B4-BE49-F238E27FC236}">
+                <a16:creationId xmlns:a16="http://schemas.microsoft.com/office/drawing/2014/main" id="{231BC841-CE91-40E7-B6D2-D83B049F36C7}"/>
+              </a:ext>
+            </a:extLst>
+          </p:cNvPr>
+          <p:cNvSpPr/>
+          <p:nvPr/>
+        </p:nvSpPr>
+        <p:spPr>
+          <a:xfrm>
+            <a:off x="1281406" y="3985847"/>
+            <a:ext cx="2359383" cy="511726"/>
+          </a:xfrm>
+          <a:prstGeom prst="roundRect">
+            <a:avLst/>
+          </a:prstGeom>
+          <a:solidFill>
+            <a:srgbClr val="FFC000"/>
+          </a:solidFill>
+        </p:spPr>
+        <p:style>
+          <a:lnRef idx="2">
+            <a:schemeClr val="accent1">
+              <a:shade val="50000"/>
+            </a:schemeClr>
+          </a:lnRef>
+          <a:fillRef idx="1">
+            <a:schemeClr val="accent1"/>
+          </a:fillRef>
+          <a:effectRef idx="0">
+            <a:schemeClr val="accent1"/>
+          </a:effectRef>
+          <a:fontRef idx="minor">
+            <a:schemeClr val="lt1"/>
+          </a:fontRef>
+        </p:style>
+        <p:txBody>
+          <a:bodyPr rtlCol="0" anchor="ctr"/>
+          <a:lstStyle/>
+          <a:p>
+            <a:pPr algn="ctr"/>
+            <a:r>
+              <a:rPr lang="es-CL" sz="1600" dirty="0"/>
+              <a:t>Subgerencia de Auditoría</a:t>
+            </a:r>
+          </a:p>
+        </p:txBody>
+      </p:sp>
+      <p:sp>
+        <p:nvSpPr>
+          <p:cNvPr id="16" name="Rectángulo: esquinas redondeadas 15">
+            <a:extLst>
+              <a:ext uri="{FF2B5EF4-FFF2-40B4-BE49-F238E27FC236}">
+                <a16:creationId xmlns:a16="http://schemas.microsoft.com/office/drawing/2014/main" id="{C25B0479-8FEC-4536-9AD9-8D4057E67C8D}"/>
+              </a:ext>
+            </a:extLst>
+          </p:cNvPr>
+          <p:cNvSpPr/>
+          <p:nvPr/>
+        </p:nvSpPr>
+        <p:spPr>
+          <a:xfrm>
+            <a:off x="4681655" y="3998282"/>
+            <a:ext cx="2555719" cy="511726"/>
+          </a:xfrm>
+          <a:prstGeom prst="roundRect">
+            <a:avLst/>
+          </a:prstGeom>
+          <a:solidFill>
+            <a:srgbClr val="FFC000"/>
+          </a:solidFill>
+        </p:spPr>
+        <p:style>
+          <a:lnRef idx="2">
+            <a:schemeClr val="accent1">
+              <a:shade val="50000"/>
+            </a:schemeClr>
+          </a:lnRef>
+          <a:fillRef idx="1">
+            <a:schemeClr val="accent1"/>
+          </a:fillRef>
+          <a:effectRef idx="0">
+            <a:schemeClr val="accent1"/>
+          </a:effectRef>
+          <a:fontRef idx="minor">
+            <a:schemeClr val="lt1"/>
+          </a:fontRef>
+        </p:style>
+        <p:txBody>
+          <a:bodyPr rtlCol="0" anchor="ctr"/>
+          <a:lstStyle/>
+          <a:p>
+            <a:pPr algn="ctr"/>
+            <a:r>
+              <a:rPr lang="es-CL" sz="1600" dirty="0"/>
+              <a:t>Subgerencia de Asuntos Corporativos y </a:t>
+            </a:r>
+            <a:r>
+              <a:rPr lang="es-CL" sz="1600" dirty="0" err="1"/>
+              <a:t>Comunic</a:t>
+            </a:r>
+            <a:r>
+              <a:rPr lang="es-CL" sz="1600" dirty="0"/>
+              <a:t>.</a:t>
+            </a:r>
+          </a:p>
+        </p:txBody>
+      </p:sp>
+      <p:sp>
+        <p:nvSpPr>
+          <p:cNvPr id="17" name="Rectángulo: esquinas redondeadas 16">
+            <a:extLst>
+              <a:ext uri="{FF2B5EF4-FFF2-40B4-BE49-F238E27FC236}">
+                <a16:creationId xmlns:a16="http://schemas.microsoft.com/office/drawing/2014/main" id="{3D97973B-AC26-487A-BD25-A52D1175958B}"/>
+              </a:ext>
+            </a:extLst>
+          </p:cNvPr>
+          <p:cNvSpPr/>
+          <p:nvPr/>
+        </p:nvSpPr>
+        <p:spPr>
+          <a:xfrm>
+            <a:off x="1281406" y="4648329"/>
+            <a:ext cx="2368716" cy="511726"/>
+          </a:xfrm>
+          <a:prstGeom prst="roundRect">
+            <a:avLst/>
+          </a:prstGeom>
+          <a:solidFill>
+            <a:srgbClr val="FFC000"/>
+          </a:solidFill>
+        </p:spPr>
+        <p:style>
+          <a:lnRef idx="2">
+            <a:schemeClr val="accent1">
+              <a:shade val="50000"/>
+            </a:schemeClr>
+          </a:lnRef>
+          <a:fillRef idx="1">
+            <a:schemeClr val="accent1"/>
+          </a:fillRef>
+          <a:effectRef idx="0">
+            <a:schemeClr val="accent1"/>
+          </a:effectRef>
+          <a:fontRef idx="minor">
+            <a:schemeClr val="lt1"/>
+          </a:fontRef>
+        </p:style>
+        <p:txBody>
+          <a:bodyPr rtlCol="0" anchor="ctr"/>
+          <a:lstStyle/>
+          <a:p>
+            <a:pPr algn="ctr"/>
+            <a:r>
+              <a:rPr lang="es-CL" sz="1600" dirty="0"/>
+              <a:t>Subgerencia de Seguridad</a:t>
+            </a:r>
+          </a:p>
+        </p:txBody>
+      </p:sp>
+      <p:sp>
+        <p:nvSpPr>
+          <p:cNvPr id="18" name="Rectángulo: esquinas redondeadas 17">
+            <a:extLst>
+              <a:ext uri="{FF2B5EF4-FFF2-40B4-BE49-F238E27FC236}">
+                <a16:creationId xmlns:a16="http://schemas.microsoft.com/office/drawing/2014/main" id="{DEF0DE10-0912-4F51-8D3E-52A94ED61B88}"/>
+              </a:ext>
+            </a:extLst>
+          </p:cNvPr>
+          <p:cNvSpPr/>
+          <p:nvPr/>
+        </p:nvSpPr>
+        <p:spPr>
+          <a:xfrm>
+            <a:off x="4681656" y="4660764"/>
+            <a:ext cx="2555718" cy="511726"/>
+          </a:xfrm>
+          <a:prstGeom prst="roundRect">
+            <a:avLst/>
+          </a:prstGeom>
+          <a:solidFill>
+            <a:srgbClr val="FFC000"/>
+          </a:solidFill>
+        </p:spPr>
+        <p:style>
+          <a:lnRef idx="2">
+            <a:schemeClr val="accent1">
+              <a:shade val="50000"/>
+            </a:schemeClr>
+          </a:lnRef>
+          <a:fillRef idx="1">
+            <a:schemeClr val="accent1"/>
+          </a:fillRef>
+          <a:effectRef idx="0">
+            <a:schemeClr val="accent1"/>
+          </a:effectRef>
+          <a:fontRef idx="minor">
+            <a:schemeClr val="lt1"/>
+          </a:fontRef>
+        </p:style>
+        <p:txBody>
+          <a:bodyPr rtlCol="0" anchor="ctr"/>
+          <a:lstStyle/>
+          <a:p>
+            <a:pPr algn="ctr"/>
+            <a:r>
+              <a:rPr lang="es-CL" sz="1600" dirty="0"/>
+              <a:t>Subgerencia de Personas</a:t>
+            </a:r>
+          </a:p>
+        </p:txBody>
+      </p:sp>
+      <p:sp>
+        <p:nvSpPr>
+          <p:cNvPr id="19" name="Rectángulo: esquinas redondeadas 18">
+            <a:extLst>
+              <a:ext uri="{FF2B5EF4-FFF2-40B4-BE49-F238E27FC236}">
+                <a16:creationId xmlns:a16="http://schemas.microsoft.com/office/drawing/2014/main" id="{AB3D07A1-4E4A-4112-8E4C-1C5BFCB1969A}"/>
+              </a:ext>
+            </a:extLst>
+          </p:cNvPr>
+          <p:cNvSpPr/>
+          <p:nvPr/>
+        </p:nvSpPr>
+        <p:spPr>
+          <a:xfrm>
+            <a:off x="269876" y="5805334"/>
+            <a:ext cx="2409852" cy="511726"/>
+          </a:xfrm>
+          <a:prstGeom prst="roundRect">
+            <a:avLst/>
+          </a:prstGeom>
+          <a:solidFill>
+            <a:srgbClr val="FFC000"/>
+          </a:solidFill>
+        </p:spPr>
+        <p:style>
+          <a:lnRef idx="2">
+            <a:schemeClr val="accent1">
+              <a:shade val="50000"/>
+            </a:schemeClr>
+          </a:lnRef>
+          <a:fillRef idx="1">
+            <a:schemeClr val="accent1"/>
+          </a:fillRef>
+          <a:effectRef idx="0">
+            <a:schemeClr val="accent1"/>
+          </a:effectRef>
+          <a:fontRef idx="minor">
+            <a:schemeClr val="lt1"/>
+          </a:fontRef>
+        </p:style>
+        <p:txBody>
+          <a:bodyPr rtlCol="0" anchor="ctr"/>
+          <a:lstStyle/>
+          <a:p>
+            <a:pPr algn="ctr"/>
+            <a:r>
+              <a:rPr lang="es-CL" sz="1600" dirty="0"/>
+              <a:t>Gerencia Comercial</a:t>
+            </a:r>
+          </a:p>
+        </p:txBody>
+      </p:sp>
+      <p:sp>
+        <p:nvSpPr>
+          <p:cNvPr id="20" name="Rectángulo: esquinas redondeadas 19">
+            <a:extLst>
+              <a:ext uri="{FF2B5EF4-FFF2-40B4-BE49-F238E27FC236}">
+                <a16:creationId xmlns:a16="http://schemas.microsoft.com/office/drawing/2014/main" id="{3FC5228D-92A1-4485-BFBE-A1438CE85D54}"/>
+              </a:ext>
+            </a:extLst>
+          </p:cNvPr>
+          <p:cNvSpPr/>
+          <p:nvPr/>
+        </p:nvSpPr>
+        <p:spPr>
+          <a:xfrm>
+            <a:off x="2952399" y="5817769"/>
+            <a:ext cx="2409852" cy="511726"/>
+          </a:xfrm>
+          <a:prstGeom prst="roundRect">
+            <a:avLst/>
+          </a:prstGeom>
+          <a:solidFill>
+            <a:srgbClr val="FFC000"/>
+          </a:solidFill>
+        </p:spPr>
+        <p:style>
+          <a:lnRef idx="2">
+            <a:schemeClr val="accent1">
+              <a:shade val="50000"/>
+            </a:schemeClr>
+          </a:lnRef>
+          <a:fillRef idx="1">
+            <a:schemeClr val="accent1"/>
+          </a:fillRef>
+          <a:effectRef idx="0">
+            <a:schemeClr val="accent1"/>
+          </a:effectRef>
+          <a:fontRef idx="minor">
+            <a:schemeClr val="lt1"/>
+          </a:fontRef>
+        </p:style>
+        <p:txBody>
+          <a:bodyPr rtlCol="0" anchor="ctr"/>
+          <a:lstStyle/>
+          <a:p>
+            <a:pPr algn="ctr"/>
+            <a:r>
+              <a:rPr lang="es-CL" sz="1600" dirty="0"/>
+              <a:t>Gerencia de Operaciones</a:t>
+            </a:r>
+          </a:p>
+        </p:txBody>
+      </p:sp>
+      <p:sp>
+        <p:nvSpPr>
+          <p:cNvPr id="21" name="Rectángulo: esquinas redondeadas 20">
+            <a:extLst>
+              <a:ext uri="{FF2B5EF4-FFF2-40B4-BE49-F238E27FC236}">
+                <a16:creationId xmlns:a16="http://schemas.microsoft.com/office/drawing/2014/main" id="{14C275E1-805A-4520-98F5-5424870C0D7D}"/>
+              </a:ext>
+            </a:extLst>
+          </p:cNvPr>
+          <p:cNvSpPr/>
+          <p:nvPr/>
+        </p:nvSpPr>
+        <p:spPr>
+          <a:xfrm>
+            <a:off x="5645826" y="5802215"/>
+            <a:ext cx="2409853" cy="511726"/>
+          </a:xfrm>
+          <a:prstGeom prst="roundRect">
+            <a:avLst/>
+          </a:prstGeom>
+          <a:solidFill>
+            <a:srgbClr val="FFC000"/>
+          </a:solidFill>
+        </p:spPr>
+        <p:style>
+          <a:lnRef idx="2">
+            <a:schemeClr val="accent1">
+              <a:shade val="50000"/>
+            </a:schemeClr>
+          </a:lnRef>
+          <a:fillRef idx="1">
+            <a:schemeClr val="accent1"/>
+          </a:fillRef>
+          <a:effectRef idx="0">
+            <a:schemeClr val="accent1"/>
+          </a:effectRef>
+          <a:fontRef idx="minor">
+            <a:schemeClr val="lt1"/>
+          </a:fontRef>
+        </p:style>
+        <p:txBody>
+          <a:bodyPr rtlCol="0" anchor="ctr"/>
+          <a:lstStyle/>
+          <a:p>
+            <a:pPr algn="ctr"/>
+            <a:r>
+              <a:rPr lang="es-CL" sz="1600" dirty="0"/>
+              <a:t>Gerencia de </a:t>
+            </a:r>
+            <a:r>
+              <a:rPr lang="es-CL" sz="1600" dirty="0" err="1"/>
+              <a:t>Adm</a:t>
+            </a:r>
+            <a:r>
+              <a:rPr lang="es-CL" sz="1600" dirty="0"/>
+              <a:t>. y Finanzas</a:t>
+            </a:r>
+          </a:p>
+        </p:txBody>
+      </p:sp>
+      <p:cxnSp>
+        <p:nvCxnSpPr>
+          <p:cNvPr id="22" name="Conector: angular 21">
+            <a:extLst>
+              <a:ext uri="{FF2B5EF4-FFF2-40B4-BE49-F238E27FC236}">
+                <a16:creationId xmlns:a16="http://schemas.microsoft.com/office/drawing/2014/main" id="{CA13F069-A041-4C8B-9232-721E65E6F920}"/>
+              </a:ext>
+            </a:extLst>
+          </p:cNvPr>
+          <p:cNvCxnSpPr>
+            <a:cxnSpLocks/>
+            <a:stCxn id="19" idx="0"/>
+            <a:endCxn id="21" idx="0"/>
+          </p:cNvCxnSpPr>
+          <p:nvPr/>
+        </p:nvCxnSpPr>
+        <p:spPr>
+          <a:xfrm rot="5400000" flipH="1" flipV="1">
+            <a:off x="4161218" y="3115800"/>
+            <a:ext cx="3119" cy="5375951"/>
+          </a:xfrm>
+          <a:prstGeom prst="bentConnector3">
+            <a:avLst>
+              <a:gd name="adj1" fmla="val 7429272"/>
+            </a:avLst>
+          </a:prstGeom>
+          <a:ln>
+            <a:headEnd type="triangle"/>
+            <a:tailEnd type="triangle"/>
+          </a:ln>
+        </p:spPr>
+        <p:style>
+          <a:lnRef idx="1">
+            <a:schemeClr val="accent1"/>
+          </a:lnRef>
+          <a:fillRef idx="0">
+            <a:schemeClr val="accent1"/>
+          </a:fillRef>
+          <a:effectRef idx="0">
+            <a:schemeClr val="accent1"/>
+          </a:effectRef>
+          <a:fontRef idx="minor">
+            <a:schemeClr val="tx1"/>
+          </a:fontRef>
+        </p:style>
+      </p:cxnSp>
+      <p:cxnSp>
+        <p:nvCxnSpPr>
+          <p:cNvPr id="23" name="Conector recto de flecha 22">
+            <a:extLst>
+              <a:ext uri="{FF2B5EF4-FFF2-40B4-BE49-F238E27FC236}">
+                <a16:creationId xmlns:a16="http://schemas.microsoft.com/office/drawing/2014/main" id="{56F7E485-5784-4BA5-89D8-5D0039107732}"/>
+              </a:ext>
+            </a:extLst>
+          </p:cNvPr>
+          <p:cNvCxnSpPr>
+            <a:cxnSpLocks/>
+            <a:stCxn id="12" idx="2"/>
+            <a:endCxn id="20" idx="0"/>
+          </p:cNvCxnSpPr>
+          <p:nvPr/>
+        </p:nvCxnSpPr>
+        <p:spPr>
+          <a:xfrm>
+            <a:off x="4151895" y="2917590"/>
+            <a:ext cx="5430" cy="2900179"/>
+          </a:xfrm>
+          <a:prstGeom prst="straightConnector1">
+            <a:avLst/>
+          </a:prstGeom>
+          <a:ln>
+            <a:headEnd type="triangle"/>
+            <a:tailEnd type="triangle"/>
+          </a:ln>
+        </p:spPr>
+        <p:style>
+          <a:lnRef idx="1">
+            <a:schemeClr val="accent1"/>
+          </a:lnRef>
+          <a:fillRef idx="0">
+            <a:schemeClr val="accent1"/>
+          </a:fillRef>
+          <a:effectRef idx="0">
+            <a:schemeClr val="accent1"/>
+          </a:effectRef>
+          <a:fontRef idx="minor">
+            <a:schemeClr val="tx1"/>
+          </a:fontRef>
+        </p:style>
+      </p:cxnSp>
+      <p:cxnSp>
+        <p:nvCxnSpPr>
+          <p:cNvPr id="24" name="Conector recto de flecha 23">
+            <a:extLst>
+              <a:ext uri="{FF2B5EF4-FFF2-40B4-BE49-F238E27FC236}">
+                <a16:creationId xmlns:a16="http://schemas.microsoft.com/office/drawing/2014/main" id="{A7BF7716-9F03-4FA3-B9C8-BF4184C3ECB4}"/>
+              </a:ext>
+            </a:extLst>
+          </p:cNvPr>
+          <p:cNvCxnSpPr>
+            <a:stCxn id="9" idx="2"/>
+            <a:endCxn id="12" idx="0"/>
+          </p:cNvCxnSpPr>
+          <p:nvPr/>
+        </p:nvCxnSpPr>
+        <p:spPr>
+          <a:xfrm>
+            <a:off x="4148791" y="2037402"/>
+            <a:ext cx="3104" cy="368462"/>
+          </a:xfrm>
+          <a:prstGeom prst="straightConnector1">
+            <a:avLst/>
+          </a:prstGeom>
+          <a:ln>
+            <a:tailEnd type="triangle"/>
+          </a:ln>
+        </p:spPr>
+        <p:style>
+          <a:lnRef idx="1">
+            <a:schemeClr val="accent1"/>
+          </a:lnRef>
+          <a:fillRef idx="0">
+            <a:schemeClr val="accent1"/>
+          </a:fillRef>
+          <a:effectRef idx="0">
+            <a:schemeClr val="accent1"/>
+          </a:effectRef>
+          <a:fontRef idx="minor">
+            <a:schemeClr val="tx1"/>
+          </a:fontRef>
+        </p:style>
+      </p:cxnSp>
+      <p:cxnSp>
+        <p:nvCxnSpPr>
+          <p:cNvPr id="25" name="Conector recto de flecha 24">
+            <a:extLst>
+              <a:ext uri="{FF2B5EF4-FFF2-40B4-BE49-F238E27FC236}">
+                <a16:creationId xmlns:a16="http://schemas.microsoft.com/office/drawing/2014/main" id="{04C410AB-7814-4E79-8A42-7C7B65167C6B}"/>
+              </a:ext>
+            </a:extLst>
+          </p:cNvPr>
+          <p:cNvCxnSpPr>
+            <a:cxnSpLocks/>
+            <a:stCxn id="13" idx="3"/>
+            <a:endCxn id="14" idx="1"/>
+          </p:cNvCxnSpPr>
+          <p:nvPr/>
+        </p:nvCxnSpPr>
+        <p:spPr>
+          <a:xfrm>
+            <a:off x="3647011" y="3576128"/>
+            <a:ext cx="1040866" cy="12435"/>
+          </a:xfrm>
+          <a:prstGeom prst="straightConnector1">
+            <a:avLst/>
+          </a:prstGeom>
+          <a:ln>
+            <a:headEnd type="triangle"/>
+            <a:tailEnd type="triangle"/>
+          </a:ln>
+        </p:spPr>
+        <p:style>
+          <a:lnRef idx="1">
+            <a:schemeClr val="accent1"/>
+          </a:lnRef>
+          <a:fillRef idx="0">
+            <a:schemeClr val="accent1"/>
+          </a:fillRef>
+          <a:effectRef idx="0">
+            <a:schemeClr val="accent1"/>
+          </a:effectRef>
+          <a:fontRef idx="minor">
+            <a:schemeClr val="tx1"/>
+          </a:fontRef>
+        </p:style>
+      </p:cxnSp>
+      <p:cxnSp>
+        <p:nvCxnSpPr>
+          <p:cNvPr id="26" name="Conector recto de flecha 25">
+            <a:extLst>
+              <a:ext uri="{FF2B5EF4-FFF2-40B4-BE49-F238E27FC236}">
+                <a16:creationId xmlns:a16="http://schemas.microsoft.com/office/drawing/2014/main" id="{ECD3C97F-3059-4C70-89D7-E34AC3E6ACED}"/>
+              </a:ext>
+            </a:extLst>
+          </p:cNvPr>
+          <p:cNvCxnSpPr>
+            <a:cxnSpLocks/>
+            <a:stCxn id="15" idx="3"/>
+            <a:endCxn id="16" idx="1"/>
+          </p:cNvCxnSpPr>
+          <p:nvPr/>
+        </p:nvCxnSpPr>
+        <p:spPr>
+          <a:xfrm>
+            <a:off x="3640789" y="4241710"/>
+            <a:ext cx="1040866" cy="12435"/>
+          </a:xfrm>
+          <a:prstGeom prst="straightConnector1">
+            <a:avLst/>
+          </a:prstGeom>
+          <a:ln>
+            <a:headEnd type="triangle"/>
+            <a:tailEnd type="triangle"/>
+          </a:ln>
+        </p:spPr>
+        <p:style>
+          <a:lnRef idx="1">
+            <a:schemeClr val="accent1"/>
+          </a:lnRef>
+          <a:fillRef idx="0">
+            <a:schemeClr val="accent1"/>
+          </a:fillRef>
+          <a:effectRef idx="0">
+            <a:schemeClr val="accent1"/>
+          </a:effectRef>
+          <a:fontRef idx="minor">
+            <a:schemeClr val="tx1"/>
+          </a:fontRef>
+        </p:style>
+      </p:cxnSp>
+      <p:cxnSp>
+        <p:nvCxnSpPr>
+          <p:cNvPr id="27" name="Conector recto de flecha 26">
+            <a:extLst>
+              <a:ext uri="{FF2B5EF4-FFF2-40B4-BE49-F238E27FC236}">
+                <a16:creationId xmlns:a16="http://schemas.microsoft.com/office/drawing/2014/main" id="{4BA6AFE9-F818-414E-8372-C4CFB0061BE8}"/>
+              </a:ext>
+            </a:extLst>
+          </p:cNvPr>
+          <p:cNvCxnSpPr>
+            <a:cxnSpLocks/>
+            <a:stCxn id="17" idx="3"/>
+            <a:endCxn id="18" idx="1"/>
+          </p:cNvCxnSpPr>
+          <p:nvPr/>
+        </p:nvCxnSpPr>
+        <p:spPr>
+          <a:xfrm>
+            <a:off x="3650122" y="4904192"/>
+            <a:ext cx="1031534" cy="12435"/>
+          </a:xfrm>
+          <a:prstGeom prst="straightConnector1">
+            <a:avLst/>
+          </a:prstGeom>
+          <a:ln>
+            <a:headEnd type="triangle"/>
+            <a:tailEnd type="triangle"/>
+          </a:ln>
+        </p:spPr>
+        <p:style>
+          <a:lnRef idx="1">
+            <a:schemeClr val="accent1"/>
+          </a:lnRef>
+          <a:fillRef idx="0">
+            <a:schemeClr val="accent1"/>
+          </a:fillRef>
+          <a:effectRef idx="0">
+            <a:schemeClr val="accent1"/>
+          </a:effectRef>
+          <a:fontRef idx="minor">
+            <a:schemeClr val="tx1"/>
+          </a:fontRef>
+        </p:style>
+      </p:cxnSp>
     </p:spTree>
     <p:extLst>
       <p:ext uri="{BB962C8B-B14F-4D97-AF65-F5344CB8AC3E}">
-        <p14:creationId xmlns:p14="http://schemas.microsoft.com/office/powerpoint/2010/main" val="855222748"/>
+        <p14:creationId xmlns:p14="http://schemas.microsoft.com/office/powerpoint/2010/main" val="1311091605"/>
       </p:ext>
     </p:extLst>
   </p:cSld>
@@ -8620,7 +9886,7 @@
           <p:cNvPr id="2" name="Título 1">
             <a:extLst>
               <a:ext uri="{FF2B5EF4-FFF2-40B4-BE49-F238E27FC236}">
-                <a16:creationId xmlns:a16="http://schemas.microsoft.com/office/drawing/2014/main" id="{9CCF9805-D1CE-4FA9-8395-999F57BAFB90}"/>
+                <a16:creationId xmlns:a16="http://schemas.microsoft.com/office/drawing/2014/main" id="{96D87ABC-3F9F-4AAA-98D0-27A2C9E307F2}"/>
               </a:ext>
             </a:extLst>
           </p:cNvPr>
@@ -8638,7 +9904,7 @@
           <a:p>
             <a:r>
               <a:rPr lang="es-CL" dirty="0"/>
-              <a:t>Conclusiones</a:t>
+              <a:t>Problemática</a:t>
             </a:r>
           </a:p>
         </p:txBody>
@@ -8648,7 +9914,7 @@
           <p:cNvPr id="3" name="Marcador de contenido 2">
             <a:extLst>
               <a:ext uri="{FF2B5EF4-FFF2-40B4-BE49-F238E27FC236}">
-                <a16:creationId xmlns:a16="http://schemas.microsoft.com/office/drawing/2014/main" id="{96CDBD20-423B-44FB-9B9D-F84A66126AAC}"/>
+                <a16:creationId xmlns:a16="http://schemas.microsoft.com/office/drawing/2014/main" id="{A7CCCAB9-5C1B-4554-B40A-BA522687BAE9}"/>
               </a:ext>
             </a:extLst>
           </p:cNvPr>
@@ -8666,25 +9932,19 @@
           <a:p>
             <a:r>
               <a:rPr lang="es-CL" dirty="0"/>
-              <a:t>&lt;&lt;1&gt;&gt;</a:t>
+              <a:t>¿Por qué esta memoria?</a:t>
             </a:r>
           </a:p>
           <a:p>
             <a:r>
               <a:rPr lang="es-CL" dirty="0"/>
-              <a:t>&lt;&lt;2&gt;&gt;</a:t>
+              <a:t>¿Cuál es la necesidad?</a:t>
             </a:r>
           </a:p>
           <a:p>
             <a:r>
               <a:rPr lang="es-CL" dirty="0"/>
-              <a:t>&lt;&lt;3&gt;&gt;</a:t>
-            </a:r>
-          </a:p>
-          <a:p>
-            <a:r>
-              <a:rPr lang="es-CL" dirty="0"/>
-              <a:t>&lt;&lt;4&gt;&gt;</a:t>
+              <a:t>¿Qué se analizará?</a:t>
             </a:r>
           </a:p>
         </p:txBody>
@@ -8694,7 +9954,7 @@
           <p:cNvPr id="4" name="Flecha: pentágono 3">
             <a:extLst>
               <a:ext uri="{FF2B5EF4-FFF2-40B4-BE49-F238E27FC236}">
-                <a16:creationId xmlns:a16="http://schemas.microsoft.com/office/drawing/2014/main" id="{D00E8A3A-5868-4159-A33C-4E613D5CA89B}"/>
+                <a16:creationId xmlns:a16="http://schemas.microsoft.com/office/drawing/2014/main" id="{651A3DD8-D31E-41A9-B5DD-F9E83FA575AF}"/>
               </a:ext>
             </a:extLst>
           </p:cNvPr>
@@ -8731,7 +9991,7 @@
             <a:pPr algn="ctr"/>
             <a:r>
               <a:rPr lang="es-CL" dirty="0"/>
-              <a:t>Conclusiones</a:t>
+              <a:t>Situación Bajo Estudio</a:t>
             </a:r>
           </a:p>
         </p:txBody>
@@ -8739,7 +9999,7 @@
     </p:spTree>
     <p:extLst>
       <p:ext uri="{BB962C8B-B14F-4D97-AF65-F5344CB8AC3E}">
-        <p14:creationId xmlns:p14="http://schemas.microsoft.com/office/powerpoint/2010/main" val="2891704333"/>
+        <p14:creationId xmlns:p14="http://schemas.microsoft.com/office/powerpoint/2010/main" val="2820023138"/>
       </p:ext>
     </p:extLst>
   </p:cSld>
@@ -8771,7 +10031,7 @@
           <p:cNvPr id="2" name="Título 1">
             <a:extLst>
               <a:ext uri="{FF2B5EF4-FFF2-40B4-BE49-F238E27FC236}">
-                <a16:creationId xmlns:a16="http://schemas.microsoft.com/office/drawing/2014/main" id="{9CCF9805-D1CE-4FA9-8395-999F57BAFB90}"/>
+                <a16:creationId xmlns:a16="http://schemas.microsoft.com/office/drawing/2014/main" id="{9285FC62-F834-4B80-A482-A83E68F82413}"/>
               </a:ext>
             </a:extLst>
           </p:cNvPr>
@@ -8787,10 +10047,7 @@
           <a:bodyPr/>
           <a:lstStyle/>
           <a:p>
-            <a:r>
-              <a:rPr lang="es-CL" dirty="0"/>
-              <a:t>Aportes</a:t>
-            </a:r>
+            <a:endParaRPr lang="es-CL"/>
           </a:p>
         </p:txBody>
       </p:sp>
@@ -8799,7 +10056,7 @@
           <p:cNvPr id="3" name="Marcador de contenido 2">
             <a:extLst>
               <a:ext uri="{FF2B5EF4-FFF2-40B4-BE49-F238E27FC236}">
-                <a16:creationId xmlns:a16="http://schemas.microsoft.com/office/drawing/2014/main" id="{96CDBD20-423B-44FB-9B9D-F84A66126AAC}"/>
+                <a16:creationId xmlns:a16="http://schemas.microsoft.com/office/drawing/2014/main" id="{B9C19125-47FE-455B-984E-0BB3F8F116DB}"/>
               </a:ext>
             </a:extLst>
           </p:cNvPr>
@@ -8815,28 +10072,7 @@
           <a:bodyPr/>
           <a:lstStyle/>
           <a:p>
-            <a:r>
-              <a:rPr lang="es-CL" dirty="0"/>
-              <a:t>&lt;&lt;1&gt;&gt;</a:t>
-            </a:r>
-          </a:p>
-          <a:p>
-            <a:r>
-              <a:rPr lang="es-CL" dirty="0"/>
-              <a:t>&lt;&lt;2&gt;&gt;</a:t>
-            </a:r>
-          </a:p>
-          <a:p>
-            <a:r>
-              <a:rPr lang="es-CL" dirty="0"/>
-              <a:t>&lt;&lt;3&gt;&gt;</a:t>
-            </a:r>
-          </a:p>
-          <a:p>
-            <a:r>
-              <a:rPr lang="es-CL" dirty="0"/>
-              <a:t>&lt;&lt;4&gt;&gt;</a:t>
-            </a:r>
+            <a:endParaRPr lang="es-CL"/>
           </a:p>
         </p:txBody>
       </p:sp>
@@ -8845,7 +10081,7 @@
           <p:cNvPr id="4" name="Flecha: pentágono 3">
             <a:extLst>
               <a:ext uri="{FF2B5EF4-FFF2-40B4-BE49-F238E27FC236}">
-                <a16:creationId xmlns:a16="http://schemas.microsoft.com/office/drawing/2014/main" id="{D00E8A3A-5868-4159-A33C-4E613D5CA89B}"/>
+                <a16:creationId xmlns:a16="http://schemas.microsoft.com/office/drawing/2014/main" id="{345D5268-6816-4295-A1C8-156211BB6CAA}"/>
               </a:ext>
             </a:extLst>
           </p:cNvPr>
@@ -8882,7 +10118,7 @@
             <a:pPr algn="ctr"/>
             <a:r>
               <a:rPr lang="es-CL" dirty="0"/>
-              <a:t>Conclusiones</a:t>
+              <a:t>Desarrollo</a:t>
             </a:r>
           </a:p>
         </p:txBody>
@@ -8890,7 +10126,7 @@
     </p:spTree>
     <p:extLst>
       <p:ext uri="{BB962C8B-B14F-4D97-AF65-F5344CB8AC3E}">
-        <p14:creationId xmlns:p14="http://schemas.microsoft.com/office/powerpoint/2010/main" val="392454465"/>
+        <p14:creationId xmlns:p14="http://schemas.microsoft.com/office/powerpoint/2010/main" val="855222748"/>
       </p:ext>
     </p:extLst>
   </p:cSld>

</xml_diff>

<commit_message>
Se cambia el formato de la portada
</commit_message>
<xml_diff>
--- a/2018/TT IQQ 2018 Camara y Garay.pptx
+++ b/2018/TT IQQ 2018 Camara y Garay.pptx
@@ -19,7 +19,7 @@
     <p:sldId id="265" r:id="rId10"/>
     <p:sldId id="266" r:id="rId11"/>
     <p:sldId id="267" r:id="rId12"/>
-    <p:sldId id="268" r:id="rId13"/>
+    <p:sldId id="271" r:id="rId13"/>
   </p:sldIdLst>
   <p:sldSz cx="12192000" cy="6858000"/>
   <p:notesSz cx="6858000" cy="9144000"/>
@@ -223,7 +223,7 @@
           <a:p>
             <a:fld id="{889AAA34-CE1E-48C9-A4CD-CFA775F628BC}" type="datetimeFigureOut">
               <a:rPr lang="es-CL" smtClean="0"/>
-              <a:t>06-12-2018</a:t>
+              <a:t>08-12-2018</a:t>
             </a:fld>
             <a:endParaRPr lang="es-CL"/>
           </a:p>
@@ -1040,7 +1040,7 @@
           <a:p>
             <a:fld id="{3BE2AC6D-F750-44BB-A0B8-07BFEA35E468}" type="datetimeFigureOut">
               <a:rPr lang="es-CL" smtClean="0"/>
-              <a:t>06-12-2018</a:t>
+              <a:t>08-12-2018</a:t>
             </a:fld>
             <a:endParaRPr lang="es-CL"/>
           </a:p>
@@ -1291,7 +1291,7 @@
           <a:p>
             <a:fld id="{3BE2AC6D-F750-44BB-A0B8-07BFEA35E468}" type="datetimeFigureOut">
               <a:rPr lang="es-CL" smtClean="0"/>
-              <a:t>06-12-2018</a:t>
+              <a:t>08-12-2018</a:t>
             </a:fld>
             <a:endParaRPr lang="es-CL"/>
           </a:p>
@@ -1605,7 +1605,7 @@
           <a:p>
             <a:fld id="{3BE2AC6D-F750-44BB-A0B8-07BFEA35E468}" type="datetimeFigureOut">
               <a:rPr lang="es-CL" smtClean="0"/>
-              <a:t>06-12-2018</a:t>
+              <a:t>08-12-2018</a:t>
             </a:fld>
             <a:endParaRPr lang="es-CL"/>
           </a:p>
@@ -1946,7 +1946,7 @@
           <a:p>
             <a:fld id="{3BE2AC6D-F750-44BB-A0B8-07BFEA35E468}" type="datetimeFigureOut">
               <a:rPr lang="es-CL" smtClean="0"/>
-              <a:t>06-12-2018</a:t>
+              <a:t>08-12-2018</a:t>
             </a:fld>
             <a:endParaRPr lang="es-CL"/>
           </a:p>
@@ -2260,7 +2260,7 @@
           <a:p>
             <a:fld id="{3BE2AC6D-F750-44BB-A0B8-07BFEA35E468}" type="datetimeFigureOut">
               <a:rPr lang="es-CL" smtClean="0"/>
-              <a:t>06-12-2018</a:t>
+              <a:t>08-12-2018</a:t>
             </a:fld>
             <a:endParaRPr lang="es-CL"/>
           </a:p>
@@ -2653,7 +2653,7 @@
           <a:p>
             <a:fld id="{3BE2AC6D-F750-44BB-A0B8-07BFEA35E468}" type="datetimeFigureOut">
               <a:rPr lang="es-CL" smtClean="0"/>
-              <a:t>06-12-2018</a:t>
+              <a:t>08-12-2018</a:t>
             </a:fld>
             <a:endParaRPr lang="es-CL"/>
           </a:p>
@@ -2823,7 +2823,7 @@
           <a:p>
             <a:fld id="{3BE2AC6D-F750-44BB-A0B8-07BFEA35E468}" type="datetimeFigureOut">
               <a:rPr lang="es-CL" smtClean="0"/>
-              <a:t>06-12-2018</a:t>
+              <a:t>08-12-2018</a:t>
             </a:fld>
             <a:endParaRPr lang="es-CL"/>
           </a:p>
@@ -3003,7 +3003,7 @@
           <a:p>
             <a:fld id="{3BE2AC6D-F750-44BB-A0B8-07BFEA35E468}" type="datetimeFigureOut">
               <a:rPr lang="es-CL" smtClean="0"/>
-              <a:t>06-12-2018</a:t>
+              <a:t>08-12-2018</a:t>
             </a:fld>
             <a:endParaRPr lang="es-CL"/>
           </a:p>
@@ -3409,7 +3409,7 @@
           <a:p>
             <a:fld id="{3BE2AC6D-F750-44BB-A0B8-07BFEA35E468}" type="datetimeFigureOut">
               <a:rPr lang="es-CL" smtClean="0"/>
-              <a:t>06-12-2018</a:t>
+              <a:t>08-12-2018</a:t>
             </a:fld>
             <a:endParaRPr lang="es-CL"/>
           </a:p>
@@ -3641,7 +3641,7 @@
           <a:p>
             <a:fld id="{3BE2AC6D-F750-44BB-A0B8-07BFEA35E468}" type="datetimeFigureOut">
               <a:rPr lang="es-CL" smtClean="0"/>
-              <a:t>06-12-2018</a:t>
+              <a:t>08-12-2018</a:t>
             </a:fld>
             <a:endParaRPr lang="es-CL"/>
           </a:p>
@@ -4015,7 +4015,7 @@
           <a:p>
             <a:fld id="{3BE2AC6D-F750-44BB-A0B8-07BFEA35E468}" type="datetimeFigureOut">
               <a:rPr lang="es-CL" smtClean="0"/>
-              <a:t>06-12-2018</a:t>
+              <a:t>08-12-2018</a:t>
             </a:fld>
             <a:endParaRPr lang="es-CL"/>
           </a:p>
@@ -4138,7 +4138,7 @@
           <a:p>
             <a:fld id="{3BE2AC6D-F750-44BB-A0B8-07BFEA35E468}" type="datetimeFigureOut">
               <a:rPr lang="es-CL" smtClean="0"/>
-              <a:t>06-12-2018</a:t>
+              <a:t>08-12-2018</a:t>
             </a:fld>
             <a:endParaRPr lang="es-CL"/>
           </a:p>
@@ -4233,7 +4233,7 @@
           <a:p>
             <a:fld id="{3BE2AC6D-F750-44BB-A0B8-07BFEA35E468}" type="datetimeFigureOut">
               <a:rPr lang="es-CL" smtClean="0"/>
-              <a:t>06-12-2018</a:t>
+              <a:t>08-12-2018</a:t>
             </a:fld>
             <a:endParaRPr lang="es-CL"/>
           </a:p>
@@ -4488,7 +4488,7 @@
           <a:p>
             <a:fld id="{3BE2AC6D-F750-44BB-A0B8-07BFEA35E468}" type="datetimeFigureOut">
               <a:rPr lang="es-CL" smtClean="0"/>
-              <a:t>06-12-2018</a:t>
+              <a:t>08-12-2018</a:t>
             </a:fld>
             <a:endParaRPr lang="es-CL"/>
           </a:p>
@@ -4751,7 +4751,7 @@
           <a:p>
             <a:fld id="{3BE2AC6D-F750-44BB-A0B8-07BFEA35E468}" type="datetimeFigureOut">
               <a:rPr lang="es-CL" smtClean="0"/>
-              <a:t>06-12-2018</a:t>
+              <a:t>08-12-2018</a:t>
             </a:fld>
             <a:endParaRPr lang="es-CL"/>
           </a:p>
@@ -5494,7 +5494,7 @@
           <a:p>
             <a:fld id="{3BE2AC6D-F750-44BB-A0B8-07BFEA35E468}" type="datetimeFigureOut">
               <a:rPr lang="es-CL" smtClean="0"/>
-              <a:t>06-12-2018</a:t>
+              <a:t>08-12-2018</a:t>
             </a:fld>
             <a:endParaRPr lang="es-CL"/>
           </a:p>
@@ -6002,7 +6002,7 @@
 </file>
 
 <file path=ppt/slides/slide1.xml><?xml version="1.0" encoding="utf-8"?>
-<p:sld xmlns:a="http://schemas.openxmlformats.org/drawingml/2006/main" xmlns:r="http://schemas.openxmlformats.org/officeDocument/2006/relationships" xmlns:p="http://schemas.openxmlformats.org/presentationml/2006/main">
+<p:sld xmlns:a="http://schemas.openxmlformats.org/drawingml/2006/main" xmlns:r="http://schemas.openxmlformats.org/officeDocument/2006/relationships" xmlns:p="http://schemas.openxmlformats.org/presentationml/2006/main" showMasterSp="0">
   <p:cSld>
     <p:bg>
       <p:bgPr>
@@ -6044,8 +6044,8 @@
         </p:nvSpPr>
         <p:spPr>
           <a:xfrm>
-            <a:off x="2212530" y="2369425"/>
-            <a:ext cx="7766936" cy="1646302"/>
+            <a:off x="2212529" y="3027900"/>
+            <a:ext cx="7766936" cy="1318403"/>
           </a:xfrm>
           <a:ln w="3175">
             <a:noFill/>
@@ -6059,7 +6059,7 @@
           <a:p>
             <a:pPr algn="ctr"/>
             <a:r>
-              <a:rPr lang="es-CL" sz="2800" dirty="0">
+              <a:rPr lang="es-CL" sz="2400" dirty="0">
                 <a:solidFill>
                   <a:schemeClr val="tx1"/>
                 </a:solidFill>
@@ -6076,7 +6076,7 @@
               <a:t>“Elaboración de un Manual de Buenas Prácticas para el Desarrollo de Proyectos Informáticos en </a:t>
             </a:r>
             <a:br>
-              <a:rPr lang="es-CL" sz="2800" dirty="0">
+              <a:rPr lang="es-CL" sz="2400" dirty="0">
                 <a:solidFill>
                   <a:schemeClr val="tx1"/>
                 </a:solidFill>
@@ -6092,7 +6092,7 @@
               </a:rPr>
             </a:br>
             <a:r>
-              <a:rPr lang="es-CL" sz="2800" dirty="0">
+              <a:rPr lang="es-CL" sz="2400" dirty="0">
                 <a:solidFill>
                   <a:schemeClr val="tx1"/>
                 </a:solidFill>
@@ -6108,7 +6108,7 @@
               </a:rPr>
               <a:t>ZOFRI S.A.”</a:t>
             </a:r>
-            <a:endParaRPr lang="en-US" sz="2800" dirty="0">
+            <a:endParaRPr lang="en-US" sz="2400" dirty="0">
               <a:solidFill>
                 <a:schemeClr val="tx1"/>
               </a:solidFill>
@@ -6154,8 +6154,8 @@
         </p:blipFill>
         <p:spPr bwMode="auto">
           <a:xfrm>
-            <a:off x="5065711" y="241337"/>
-            <a:ext cx="2060575" cy="1652587"/>
+            <a:off x="4696347" y="294876"/>
+            <a:ext cx="2799301" cy="2245048"/>
           </a:xfrm>
           <a:prstGeom prst="rect">
             <a:avLst/>
@@ -6188,7 +6188,7 @@
         </p:nvSpPr>
         <p:spPr>
           <a:xfrm>
-            <a:off x="0" y="1986932"/>
+            <a:off x="1" y="2580453"/>
             <a:ext cx="12191999" cy="382493"/>
           </a:xfrm>
           <a:prstGeom prst="rect">
@@ -6303,8 +6303,8 @@
         </p:nvSpPr>
         <p:spPr>
           <a:xfrm>
-            <a:off x="1893877" y="4512963"/>
-            <a:ext cx="3875518" cy="923330"/>
+            <a:off x="2" y="4438461"/>
+            <a:ext cx="12191998" cy="646331"/>
           </a:xfrm>
           <a:prstGeom prst="rect">
             <a:avLst/>
@@ -6348,8 +6348,8 @@
         </p:nvSpPr>
         <p:spPr>
           <a:xfrm>
-            <a:off x="7019829" y="4031340"/>
-            <a:ext cx="2846845" cy="2585323"/>
+            <a:off x="108155" y="5736884"/>
+            <a:ext cx="2846845" cy="923330"/>
           </a:xfrm>
           <a:prstGeom prst="rect">
             <a:avLst/>
@@ -6376,36 +6376,6 @@
             <a:r>
               <a:rPr lang="es-CL" dirty="0"/>
               <a:t>Manuel Garay Riquelme</a:t>
-            </a:r>
-          </a:p>
-          <a:p>
-            <a:endParaRPr lang="es-CL" b="1" dirty="0"/>
-          </a:p>
-          <a:p>
-            <a:r>
-              <a:rPr lang="es-CL" b="1" dirty="0"/>
-              <a:t>Profesor Patrocinante</a:t>
-            </a:r>
-          </a:p>
-          <a:p>
-            <a:r>
-              <a:rPr lang="es-CL" dirty="0"/>
-              <a:t>Jaime Lam Moraga</a:t>
-            </a:r>
-          </a:p>
-          <a:p>
-            <a:endParaRPr lang="es-CL" b="1" dirty="0"/>
-          </a:p>
-          <a:p>
-            <a:r>
-              <a:rPr lang="es-CL" b="1" dirty="0"/>
-              <a:t>Profesor Colaborador</a:t>
-            </a:r>
-          </a:p>
-          <a:p>
-            <a:r>
-              <a:rPr lang="es-CL" dirty="0"/>
-              <a:t>Andrés Pulgar Seguel</a:t>
             </a:r>
           </a:p>
         </p:txBody>
@@ -6424,8 +6394,8 @@
         </p:nvSpPr>
         <p:spPr>
           <a:xfrm>
-            <a:off x="2862925" y="5933529"/>
-            <a:ext cx="1937422" cy="646331"/>
+            <a:off x="0" y="6006614"/>
+            <a:ext cx="12192000" cy="646331"/>
           </a:xfrm>
           <a:prstGeom prst="rect">
             <a:avLst/>
@@ -6449,6 +6419,113 @@
               <a:rPr lang="es-CL" dirty="0"/>
               <a:t>Diciembre 2018</a:t>
             </a:r>
+          </a:p>
+        </p:txBody>
+      </p:sp>
+      <p:sp>
+        <p:nvSpPr>
+          <p:cNvPr id="9" name="Rectángulo 8">
+            <a:extLst>
+              <a:ext uri="{FF2B5EF4-FFF2-40B4-BE49-F238E27FC236}">
+                <a16:creationId xmlns:a16="http://schemas.microsoft.com/office/drawing/2014/main" id="{32BAA55A-12D6-47F7-AC22-066E1D9C8C95}"/>
+              </a:ext>
+            </a:extLst>
+          </p:cNvPr>
+          <p:cNvSpPr/>
+          <p:nvPr/>
+        </p:nvSpPr>
+        <p:spPr>
+          <a:xfrm>
+            <a:off x="9345155" y="5175617"/>
+            <a:ext cx="2846845" cy="1477328"/>
+          </a:xfrm>
+          <a:prstGeom prst="rect">
+            <a:avLst/>
+          </a:prstGeom>
+        </p:spPr>
+        <p:txBody>
+          <a:bodyPr wrap="square">
+            <a:spAutoFit/>
+          </a:bodyPr>
+          <a:lstStyle/>
+          <a:p>
+            <a:r>
+              <a:rPr lang="es-CL" b="1" dirty="0"/>
+              <a:t>Profesor Patrocinante</a:t>
+            </a:r>
+          </a:p>
+          <a:p>
+            <a:r>
+              <a:rPr lang="es-CL" dirty="0"/>
+              <a:t>Jaime Lam Moraga</a:t>
+            </a:r>
+          </a:p>
+          <a:p>
+            <a:endParaRPr lang="es-CL" b="1" dirty="0"/>
+          </a:p>
+          <a:p>
+            <a:r>
+              <a:rPr lang="es-CL" b="1" dirty="0"/>
+              <a:t>Profesor Colaborador</a:t>
+            </a:r>
+          </a:p>
+          <a:p>
+            <a:r>
+              <a:rPr lang="es-CL" dirty="0"/>
+              <a:t>Andrés Pulgar Seguel</a:t>
+            </a:r>
+          </a:p>
+        </p:txBody>
+      </p:sp>
+      <p:sp>
+        <p:nvSpPr>
+          <p:cNvPr id="3" name="Rectángulo 2">
+            <a:extLst>
+              <a:ext uri="{FF2B5EF4-FFF2-40B4-BE49-F238E27FC236}">
+                <a16:creationId xmlns:a16="http://schemas.microsoft.com/office/drawing/2014/main" id="{ABBC3194-4F6D-463E-9391-E08CDE04143C}"/>
+              </a:ext>
+            </a:extLst>
+          </p:cNvPr>
+          <p:cNvSpPr/>
+          <p:nvPr/>
+        </p:nvSpPr>
+        <p:spPr>
+          <a:xfrm>
+            <a:off x="108155" y="108155"/>
+            <a:ext cx="11975690" cy="6636774"/>
+          </a:xfrm>
+          <a:prstGeom prst="rect">
+            <a:avLst/>
+          </a:prstGeom>
+          <a:noFill/>
+          <a:ln w="12700">
+            <a:solidFill>
+              <a:schemeClr val="accent1"/>
+            </a:solidFill>
+          </a:ln>
+        </p:spPr>
+        <p:style>
+          <a:lnRef idx="2">
+            <a:schemeClr val="accent1">
+              <a:shade val="50000"/>
+            </a:schemeClr>
+          </a:lnRef>
+          <a:fillRef idx="1">
+            <a:schemeClr val="accent1"/>
+          </a:fillRef>
+          <a:effectRef idx="0">
+            <a:schemeClr val="accent1"/>
+          </a:effectRef>
+          <a:fontRef idx="minor">
+            <a:schemeClr val="lt1"/>
+          </a:fontRef>
+        </p:style>
+        <p:txBody>
+          <a:bodyPr rtlCol="0" anchor="ctr"/>
+          <a:lstStyle/>
+          <a:p>
+            <a:pPr algn="ctr"/>
+            <a:endParaRPr lang="es-CL"/>
           </a:p>
         </p:txBody>
       </p:sp>
@@ -6512,52 +6589,6 @@
       </p:sp>
       <p:sp>
         <p:nvSpPr>
-          <p:cNvPr id="3" name="Marcador de contenido 2">
-            <a:extLst>
-              <a:ext uri="{FF2B5EF4-FFF2-40B4-BE49-F238E27FC236}">
-                <a16:creationId xmlns:a16="http://schemas.microsoft.com/office/drawing/2014/main" id="{96CDBD20-423B-44FB-9B9D-F84A66126AAC}"/>
-              </a:ext>
-            </a:extLst>
-          </p:cNvPr>
-          <p:cNvSpPr>
-            <a:spLocks noGrp="1"/>
-          </p:cNvSpPr>
-          <p:nvPr>
-            <p:ph idx="1"/>
-          </p:nvPr>
-        </p:nvSpPr>
-        <p:spPr/>
-        <p:txBody>
-          <a:bodyPr/>
-          <a:lstStyle/>
-          <a:p>
-            <a:r>
-              <a:rPr lang="es-CL" dirty="0"/>
-              <a:t>&lt;&lt;1&gt;&gt;</a:t>
-            </a:r>
-          </a:p>
-          <a:p>
-            <a:r>
-              <a:rPr lang="es-CL" dirty="0"/>
-              <a:t>&lt;&lt;2&gt;&gt;</a:t>
-            </a:r>
-          </a:p>
-          <a:p>
-            <a:r>
-              <a:rPr lang="es-CL" dirty="0"/>
-              <a:t>&lt;&lt;3&gt;&gt;</a:t>
-            </a:r>
-          </a:p>
-          <a:p>
-            <a:r>
-              <a:rPr lang="es-CL" dirty="0"/>
-              <a:t>&lt;&lt;4&gt;&gt;</a:t>
-            </a:r>
-          </a:p>
-        </p:txBody>
-      </p:sp>
-      <p:sp>
-        <p:nvSpPr>
           <p:cNvPr id="4" name="Flecha: pentágono 3">
             <a:extLst>
               <a:ext uri="{FF2B5EF4-FFF2-40B4-BE49-F238E27FC236}">
@@ -6768,7 +6799,7 @@
 </file>
 
 <file path=ppt/slides/slide12.xml><?xml version="1.0" encoding="utf-8"?>
-<p:sld xmlns:a="http://schemas.openxmlformats.org/drawingml/2006/main" xmlns:r="http://schemas.openxmlformats.org/officeDocument/2006/relationships" xmlns:p="http://schemas.openxmlformats.org/presentationml/2006/main">
+<p:sld xmlns:a="http://schemas.openxmlformats.org/drawingml/2006/main" xmlns:r="http://schemas.openxmlformats.org/officeDocument/2006/relationships" xmlns:p="http://schemas.openxmlformats.org/presentationml/2006/main" showMasterSp="0">
   <p:cSld>
     <p:spTree>
       <p:nvGrpSpPr>
@@ -6802,8 +6833,8 @@
         </p:nvSpPr>
         <p:spPr>
           <a:xfrm>
-            <a:off x="2212530" y="2369425"/>
-            <a:ext cx="7766936" cy="1646302"/>
+            <a:off x="2212529" y="3027900"/>
+            <a:ext cx="7766936" cy="1318403"/>
           </a:xfrm>
           <a:ln w="3175">
             <a:noFill/>
@@ -6817,7 +6848,7 @@
           <a:p>
             <a:pPr algn="ctr"/>
             <a:r>
-              <a:rPr lang="es-CL" sz="2800" dirty="0">
+              <a:rPr lang="es-CL" sz="2400" dirty="0">
                 <a:solidFill>
                   <a:schemeClr val="tx1"/>
                 </a:solidFill>
@@ -6834,7 +6865,7 @@
               <a:t>“Elaboración de un Manual de Buenas Prácticas para el Desarrollo de Proyectos Informáticos en </a:t>
             </a:r>
             <a:br>
-              <a:rPr lang="es-CL" sz="2800" dirty="0">
+              <a:rPr lang="es-CL" sz="2400" dirty="0">
                 <a:solidFill>
                   <a:schemeClr val="tx1"/>
                 </a:solidFill>
@@ -6850,7 +6881,7 @@
               </a:rPr>
             </a:br>
             <a:r>
-              <a:rPr lang="es-CL" sz="2800" dirty="0">
+              <a:rPr lang="es-CL" sz="2400" dirty="0">
                 <a:solidFill>
                   <a:schemeClr val="tx1"/>
                 </a:solidFill>
@@ -6866,7 +6897,7 @@
               </a:rPr>
               <a:t>ZOFRI S.A.”</a:t>
             </a:r>
-            <a:endParaRPr lang="en-US" sz="2800" dirty="0">
+            <a:endParaRPr lang="en-US" sz="2400" dirty="0">
               <a:solidFill>
                 <a:schemeClr val="tx1"/>
               </a:solidFill>
@@ -6912,8 +6943,8 @@
         </p:blipFill>
         <p:spPr bwMode="auto">
           <a:xfrm>
-            <a:off x="5065711" y="241337"/>
-            <a:ext cx="2060575" cy="1652587"/>
+            <a:off x="4696347" y="294876"/>
+            <a:ext cx="2799301" cy="2245048"/>
           </a:xfrm>
           <a:prstGeom prst="rect">
             <a:avLst/>
@@ -6946,7 +6977,7 @@
         </p:nvSpPr>
         <p:spPr>
           <a:xfrm>
-            <a:off x="0" y="1986932"/>
+            <a:off x="1" y="2580453"/>
             <a:ext cx="12191999" cy="382493"/>
           </a:xfrm>
           <a:prstGeom prst="rect">
@@ -7061,8 +7092,8 @@
         </p:nvSpPr>
         <p:spPr>
           <a:xfrm>
-            <a:off x="1893877" y="4512963"/>
-            <a:ext cx="3875518" cy="923330"/>
+            <a:off x="2" y="4438461"/>
+            <a:ext cx="12191998" cy="646331"/>
           </a:xfrm>
           <a:prstGeom prst="rect">
             <a:avLst/>
@@ -7106,8 +7137,8 @@
         </p:nvSpPr>
         <p:spPr>
           <a:xfrm>
-            <a:off x="7019829" y="4031340"/>
-            <a:ext cx="2846845" cy="2585323"/>
+            <a:off x="108155" y="5736884"/>
+            <a:ext cx="2846845" cy="923330"/>
           </a:xfrm>
           <a:prstGeom prst="rect">
             <a:avLst/>
@@ -7134,36 +7165,6 @@
             <a:r>
               <a:rPr lang="es-CL" dirty="0"/>
               <a:t>Manuel Garay Riquelme</a:t>
-            </a:r>
-          </a:p>
-          <a:p>
-            <a:endParaRPr lang="es-CL" b="1" dirty="0"/>
-          </a:p>
-          <a:p>
-            <a:r>
-              <a:rPr lang="es-CL" b="1" dirty="0"/>
-              <a:t>Profesor Patrocinante</a:t>
-            </a:r>
-          </a:p>
-          <a:p>
-            <a:r>
-              <a:rPr lang="es-CL" dirty="0"/>
-              <a:t>Jaime Lam Moraga</a:t>
-            </a:r>
-          </a:p>
-          <a:p>
-            <a:endParaRPr lang="es-CL" b="1" dirty="0"/>
-          </a:p>
-          <a:p>
-            <a:r>
-              <a:rPr lang="es-CL" b="1" dirty="0"/>
-              <a:t>Profesor Colaborador</a:t>
-            </a:r>
-          </a:p>
-          <a:p>
-            <a:r>
-              <a:rPr lang="es-CL" dirty="0"/>
-              <a:t>Andrés Pulgar Seguel</a:t>
             </a:r>
           </a:p>
         </p:txBody>
@@ -7182,8 +7183,8 @@
         </p:nvSpPr>
         <p:spPr>
           <a:xfrm>
-            <a:off x="2862925" y="5933529"/>
-            <a:ext cx="1937422" cy="646331"/>
+            <a:off x="0" y="6006614"/>
+            <a:ext cx="12192000" cy="646331"/>
           </a:xfrm>
           <a:prstGeom prst="rect">
             <a:avLst/>
@@ -7210,10 +7211,117 @@
           </a:p>
         </p:txBody>
       </p:sp>
+      <p:sp>
+        <p:nvSpPr>
+          <p:cNvPr id="9" name="Rectángulo 8">
+            <a:extLst>
+              <a:ext uri="{FF2B5EF4-FFF2-40B4-BE49-F238E27FC236}">
+                <a16:creationId xmlns:a16="http://schemas.microsoft.com/office/drawing/2014/main" id="{32BAA55A-12D6-47F7-AC22-066E1D9C8C95}"/>
+              </a:ext>
+            </a:extLst>
+          </p:cNvPr>
+          <p:cNvSpPr/>
+          <p:nvPr/>
+        </p:nvSpPr>
+        <p:spPr>
+          <a:xfrm>
+            <a:off x="9345155" y="5175617"/>
+            <a:ext cx="2846845" cy="1477328"/>
+          </a:xfrm>
+          <a:prstGeom prst="rect">
+            <a:avLst/>
+          </a:prstGeom>
+        </p:spPr>
+        <p:txBody>
+          <a:bodyPr wrap="square">
+            <a:spAutoFit/>
+          </a:bodyPr>
+          <a:lstStyle/>
+          <a:p>
+            <a:r>
+              <a:rPr lang="es-CL" b="1" dirty="0"/>
+              <a:t>Profesor Patrocinante</a:t>
+            </a:r>
+          </a:p>
+          <a:p>
+            <a:r>
+              <a:rPr lang="es-CL" dirty="0"/>
+              <a:t>Jaime Lam Moraga</a:t>
+            </a:r>
+          </a:p>
+          <a:p>
+            <a:endParaRPr lang="es-CL" b="1" dirty="0"/>
+          </a:p>
+          <a:p>
+            <a:r>
+              <a:rPr lang="es-CL" b="1" dirty="0"/>
+              <a:t>Profesor Colaborador</a:t>
+            </a:r>
+          </a:p>
+          <a:p>
+            <a:r>
+              <a:rPr lang="es-CL" dirty="0"/>
+              <a:t>Andrés Pulgar Seguel</a:t>
+            </a:r>
+          </a:p>
+        </p:txBody>
+      </p:sp>
+      <p:sp>
+        <p:nvSpPr>
+          <p:cNvPr id="3" name="Rectángulo 2">
+            <a:extLst>
+              <a:ext uri="{FF2B5EF4-FFF2-40B4-BE49-F238E27FC236}">
+                <a16:creationId xmlns:a16="http://schemas.microsoft.com/office/drawing/2014/main" id="{ABBC3194-4F6D-463E-9391-E08CDE04143C}"/>
+              </a:ext>
+            </a:extLst>
+          </p:cNvPr>
+          <p:cNvSpPr/>
+          <p:nvPr/>
+        </p:nvSpPr>
+        <p:spPr>
+          <a:xfrm>
+            <a:off x="108155" y="108155"/>
+            <a:ext cx="11975690" cy="6636774"/>
+          </a:xfrm>
+          <a:prstGeom prst="rect">
+            <a:avLst/>
+          </a:prstGeom>
+          <a:noFill/>
+          <a:ln w="12700">
+            <a:solidFill>
+              <a:schemeClr val="accent1"/>
+            </a:solidFill>
+          </a:ln>
+        </p:spPr>
+        <p:style>
+          <a:lnRef idx="2">
+            <a:schemeClr val="accent1">
+              <a:shade val="50000"/>
+            </a:schemeClr>
+          </a:lnRef>
+          <a:fillRef idx="1">
+            <a:schemeClr val="accent1"/>
+          </a:fillRef>
+          <a:effectRef idx="0">
+            <a:schemeClr val="accent1"/>
+          </a:effectRef>
+          <a:fontRef idx="minor">
+            <a:schemeClr val="lt1"/>
+          </a:fontRef>
+        </p:style>
+        <p:txBody>
+          <a:bodyPr rtlCol="0" anchor="ctr"/>
+          <a:lstStyle/>
+          <a:p>
+            <a:pPr algn="ctr"/>
+            <a:endParaRPr lang="es-CL"/>
+          </a:p>
+        </p:txBody>
+      </p:sp>
     </p:spTree>
     <p:extLst>
       <p:ext uri="{BB962C8B-B14F-4D97-AF65-F5344CB8AC3E}">
-        <p14:creationId xmlns:p14="http://schemas.microsoft.com/office/powerpoint/2010/main" val="1170978291"/>
+        <p14:creationId xmlns:p14="http://schemas.microsoft.com/office/powerpoint/2010/main" val="305287576"/>
       </p:ext>
     </p:extLst>
   </p:cSld>

</xml_diff>

<commit_message>
Se agregan láminas respecto a las conclusiones
</commit_message>
<xml_diff>
--- a/2018/TT IQQ 2018 Camara y Garay.pptx
+++ b/2018/TT IQQ 2018 Camara y Garay.pptx
@@ -5,7 +5,7 @@
     <p:sldMasterId id="2147483967" r:id="rId1"/>
   </p:sldMasterIdLst>
   <p:handoutMasterIdLst>
-    <p:handoutMasterId r:id="rId14"/>
+    <p:handoutMasterId r:id="rId17"/>
   </p:handoutMasterIdLst>
   <p:sldIdLst>
     <p:sldId id="258" r:id="rId2"/>
@@ -18,8 +18,11 @@
     <p:sldId id="264" r:id="rId9"/>
     <p:sldId id="265" r:id="rId10"/>
     <p:sldId id="266" r:id="rId11"/>
-    <p:sldId id="267" r:id="rId12"/>
-    <p:sldId id="271" r:id="rId13"/>
+    <p:sldId id="272" r:id="rId12"/>
+    <p:sldId id="273" r:id="rId13"/>
+    <p:sldId id="274" r:id="rId14"/>
+    <p:sldId id="267" r:id="rId15"/>
+    <p:sldId id="271" r:id="rId16"/>
   </p:sldIdLst>
   <p:sldSz cx="12192000" cy="6858000"/>
   <p:notesSz cx="6858000" cy="9144000"/>
@@ -223,7 +226,7 @@
           <a:p>
             <a:fld id="{889AAA34-CE1E-48C9-A4CD-CFA775F628BC}" type="datetimeFigureOut">
               <a:rPr lang="es-CL" smtClean="0"/>
-              <a:t>08-12-2018</a:t>
+              <a:t>09-12-2018</a:t>
             </a:fld>
             <a:endParaRPr lang="es-CL"/>
           </a:p>
@@ -1040,7 +1043,7 @@
           <a:p>
             <a:fld id="{3BE2AC6D-F750-44BB-A0B8-07BFEA35E468}" type="datetimeFigureOut">
               <a:rPr lang="es-CL" smtClean="0"/>
-              <a:t>08-12-2018</a:t>
+              <a:t>09-12-2018</a:t>
             </a:fld>
             <a:endParaRPr lang="es-CL"/>
           </a:p>
@@ -1291,7 +1294,7 @@
           <a:p>
             <a:fld id="{3BE2AC6D-F750-44BB-A0B8-07BFEA35E468}" type="datetimeFigureOut">
               <a:rPr lang="es-CL" smtClean="0"/>
-              <a:t>08-12-2018</a:t>
+              <a:t>09-12-2018</a:t>
             </a:fld>
             <a:endParaRPr lang="es-CL"/>
           </a:p>
@@ -1605,7 +1608,7 @@
           <a:p>
             <a:fld id="{3BE2AC6D-F750-44BB-A0B8-07BFEA35E468}" type="datetimeFigureOut">
               <a:rPr lang="es-CL" smtClean="0"/>
-              <a:t>08-12-2018</a:t>
+              <a:t>09-12-2018</a:t>
             </a:fld>
             <a:endParaRPr lang="es-CL"/>
           </a:p>
@@ -1946,7 +1949,7 @@
           <a:p>
             <a:fld id="{3BE2AC6D-F750-44BB-A0B8-07BFEA35E468}" type="datetimeFigureOut">
               <a:rPr lang="es-CL" smtClean="0"/>
-              <a:t>08-12-2018</a:t>
+              <a:t>09-12-2018</a:t>
             </a:fld>
             <a:endParaRPr lang="es-CL"/>
           </a:p>
@@ -2260,7 +2263,7 @@
           <a:p>
             <a:fld id="{3BE2AC6D-F750-44BB-A0B8-07BFEA35E468}" type="datetimeFigureOut">
               <a:rPr lang="es-CL" smtClean="0"/>
-              <a:t>08-12-2018</a:t>
+              <a:t>09-12-2018</a:t>
             </a:fld>
             <a:endParaRPr lang="es-CL"/>
           </a:p>
@@ -2653,7 +2656,7 @@
           <a:p>
             <a:fld id="{3BE2AC6D-F750-44BB-A0B8-07BFEA35E468}" type="datetimeFigureOut">
               <a:rPr lang="es-CL" smtClean="0"/>
-              <a:t>08-12-2018</a:t>
+              <a:t>09-12-2018</a:t>
             </a:fld>
             <a:endParaRPr lang="es-CL"/>
           </a:p>
@@ -2823,7 +2826,7 @@
           <a:p>
             <a:fld id="{3BE2AC6D-F750-44BB-A0B8-07BFEA35E468}" type="datetimeFigureOut">
               <a:rPr lang="es-CL" smtClean="0"/>
-              <a:t>08-12-2018</a:t>
+              <a:t>09-12-2018</a:t>
             </a:fld>
             <a:endParaRPr lang="es-CL"/>
           </a:p>
@@ -3003,7 +3006,7 @@
           <a:p>
             <a:fld id="{3BE2AC6D-F750-44BB-A0B8-07BFEA35E468}" type="datetimeFigureOut">
               <a:rPr lang="es-CL" smtClean="0"/>
-              <a:t>08-12-2018</a:t>
+              <a:t>09-12-2018</a:t>
             </a:fld>
             <a:endParaRPr lang="es-CL"/>
           </a:p>
@@ -3409,7 +3412,7 @@
           <a:p>
             <a:fld id="{3BE2AC6D-F750-44BB-A0B8-07BFEA35E468}" type="datetimeFigureOut">
               <a:rPr lang="es-CL" smtClean="0"/>
-              <a:t>08-12-2018</a:t>
+              <a:t>09-12-2018</a:t>
             </a:fld>
             <a:endParaRPr lang="es-CL"/>
           </a:p>
@@ -3641,7 +3644,7 @@
           <a:p>
             <a:fld id="{3BE2AC6D-F750-44BB-A0B8-07BFEA35E468}" type="datetimeFigureOut">
               <a:rPr lang="es-CL" smtClean="0"/>
-              <a:t>08-12-2018</a:t>
+              <a:t>09-12-2018</a:t>
             </a:fld>
             <a:endParaRPr lang="es-CL"/>
           </a:p>
@@ -4015,7 +4018,7 @@
           <a:p>
             <a:fld id="{3BE2AC6D-F750-44BB-A0B8-07BFEA35E468}" type="datetimeFigureOut">
               <a:rPr lang="es-CL" smtClean="0"/>
-              <a:t>08-12-2018</a:t>
+              <a:t>09-12-2018</a:t>
             </a:fld>
             <a:endParaRPr lang="es-CL"/>
           </a:p>
@@ -4138,7 +4141,7 @@
           <a:p>
             <a:fld id="{3BE2AC6D-F750-44BB-A0B8-07BFEA35E468}" type="datetimeFigureOut">
               <a:rPr lang="es-CL" smtClean="0"/>
-              <a:t>08-12-2018</a:t>
+              <a:t>09-12-2018</a:t>
             </a:fld>
             <a:endParaRPr lang="es-CL"/>
           </a:p>
@@ -4233,7 +4236,7 @@
           <a:p>
             <a:fld id="{3BE2AC6D-F750-44BB-A0B8-07BFEA35E468}" type="datetimeFigureOut">
               <a:rPr lang="es-CL" smtClean="0"/>
-              <a:t>08-12-2018</a:t>
+              <a:t>09-12-2018</a:t>
             </a:fld>
             <a:endParaRPr lang="es-CL"/>
           </a:p>
@@ -4488,7 +4491,7 @@
           <a:p>
             <a:fld id="{3BE2AC6D-F750-44BB-A0B8-07BFEA35E468}" type="datetimeFigureOut">
               <a:rPr lang="es-CL" smtClean="0"/>
-              <a:t>08-12-2018</a:t>
+              <a:t>09-12-2018</a:t>
             </a:fld>
             <a:endParaRPr lang="es-CL"/>
           </a:p>
@@ -4751,7 +4754,7 @@
           <a:p>
             <a:fld id="{3BE2AC6D-F750-44BB-A0B8-07BFEA35E468}" type="datetimeFigureOut">
               <a:rPr lang="es-CL" smtClean="0"/>
-              <a:t>08-12-2018</a:t>
+              <a:t>09-12-2018</a:t>
             </a:fld>
             <a:endParaRPr lang="es-CL"/>
           </a:p>
@@ -5494,7 +5497,7 @@
           <a:p>
             <a:fld id="{3BE2AC6D-F750-44BB-A0B8-07BFEA35E468}" type="datetimeFigureOut">
               <a:rPr lang="es-CL" smtClean="0"/>
-              <a:t>08-12-2018</a:t>
+              <a:t>09-12-2018</a:t>
             </a:fld>
             <a:endParaRPr lang="es-CL"/>
           </a:p>
@@ -6582,7 +6585,7 @@
           <a:p>
             <a:r>
               <a:rPr lang="es-CL" dirty="0"/>
-              <a:t>Conclusiones</a:t>
+              <a:t>Con relación a Objetivos Específicos (1/3)</a:t>
             </a:r>
           </a:p>
         </p:txBody>
@@ -6634,6 +6637,312 @@
           </a:p>
         </p:txBody>
       </p:sp>
+      <p:sp>
+        <p:nvSpPr>
+          <p:cNvPr id="5" name="Rectángulo: esquinas redondeadas 4">
+            <a:extLst>
+              <a:ext uri="{FF2B5EF4-FFF2-40B4-BE49-F238E27FC236}">
+                <a16:creationId xmlns:a16="http://schemas.microsoft.com/office/drawing/2014/main" id="{AF984D5F-A2D1-40F7-8C89-C6586B12503B}"/>
+              </a:ext>
+            </a:extLst>
+          </p:cNvPr>
+          <p:cNvSpPr/>
+          <p:nvPr/>
+        </p:nvSpPr>
+        <p:spPr>
+          <a:xfrm>
+            <a:off x="495300" y="1583768"/>
+            <a:ext cx="2794552" cy="4618249"/>
+          </a:xfrm>
+          <a:prstGeom prst="roundRect">
+            <a:avLst/>
+          </a:prstGeom>
+          <a:solidFill>
+            <a:schemeClr val="bg1"/>
+          </a:solidFill>
+          <a:effectLst>
+            <a:outerShdw blurRad="254000" dist="38100" algn="l" rotWithShape="0">
+              <a:prstClr val="black">
+                <a:alpha val="40000"/>
+              </a:prstClr>
+            </a:outerShdw>
+          </a:effectLst>
+        </p:spPr>
+        <p:style>
+          <a:lnRef idx="2">
+            <a:schemeClr val="accent1"/>
+          </a:lnRef>
+          <a:fillRef idx="1">
+            <a:schemeClr val="lt1"/>
+          </a:fillRef>
+          <a:effectRef idx="0">
+            <a:schemeClr val="accent1"/>
+          </a:effectRef>
+          <a:fontRef idx="minor">
+            <a:schemeClr val="dk1"/>
+          </a:fontRef>
+        </p:style>
+        <p:txBody>
+          <a:bodyPr rot="0" spcFirstLastPara="0" vertOverflow="overflow" horzOverflow="overflow" vert="horz" wrap="square" lIns="91440" tIns="45720" rIns="91440" bIns="45720" numCol="1" spcCol="0" rtlCol="0" fromWordArt="0" anchor="ctr" anchorCtr="0" forceAA="0" compatLnSpc="1">
+            <a:prstTxWarp prst="textNoShape">
+              <a:avLst/>
+            </a:prstTxWarp>
+            <a:noAutofit/>
+          </a:bodyPr>
+          <a:lstStyle/>
+          <a:p>
+            <a:pPr algn="ctr"/>
+            <a:r>
+              <a:rPr lang="es-CL" sz="2400" dirty="0">
+                <a:ln w="0"/>
+                <a:solidFill>
+                  <a:schemeClr val="tx1"/>
+                </a:solidFill>
+                <a:effectLst>
+                  <a:outerShdw blurRad="50800" dist="38100" algn="l" rotWithShape="0">
+                    <a:prstClr val="black">
+                      <a:alpha val="40000"/>
+                    </a:prstClr>
+                  </a:outerShdw>
+                </a:effectLst>
+              </a:rPr>
+              <a:t>Identificar los factores críticos que influyen en las buenas prácticas del área bajo estudio</a:t>
+            </a:r>
+          </a:p>
+        </p:txBody>
+      </p:sp>
+      <p:sp>
+        <p:nvSpPr>
+          <p:cNvPr id="6" name="Rectángulo: esquinas redondeadas 5">
+            <a:extLst>
+              <a:ext uri="{FF2B5EF4-FFF2-40B4-BE49-F238E27FC236}">
+                <a16:creationId xmlns:a16="http://schemas.microsoft.com/office/drawing/2014/main" id="{991D95A8-A708-40E3-BA44-524899660B04}"/>
+              </a:ext>
+            </a:extLst>
+          </p:cNvPr>
+          <p:cNvSpPr/>
+          <p:nvPr/>
+        </p:nvSpPr>
+        <p:spPr>
+          <a:xfrm>
+            <a:off x="4263887" y="1859071"/>
+            <a:ext cx="5158409" cy="1586815"/>
+          </a:xfrm>
+          <a:prstGeom prst="roundRect">
+            <a:avLst/>
+          </a:prstGeom>
+          <a:effectLst>
+            <a:outerShdw blurRad="254000" dist="38100" algn="l" rotWithShape="0">
+              <a:prstClr val="black">
+                <a:alpha val="40000"/>
+              </a:prstClr>
+            </a:outerShdw>
+          </a:effectLst>
+        </p:spPr>
+        <p:style>
+          <a:lnRef idx="2">
+            <a:schemeClr val="accent5"/>
+          </a:lnRef>
+          <a:fillRef idx="1">
+            <a:schemeClr val="lt1"/>
+          </a:fillRef>
+          <a:effectRef idx="0">
+            <a:schemeClr val="accent5"/>
+          </a:effectRef>
+          <a:fontRef idx="minor">
+            <a:schemeClr val="dk1"/>
+          </a:fontRef>
+        </p:style>
+        <p:txBody>
+          <a:bodyPr rot="0" spcFirstLastPara="0" vertOverflow="overflow" horzOverflow="overflow" vert="horz" wrap="square" lIns="91440" tIns="45720" rIns="91440" bIns="45720" numCol="1" spcCol="0" rtlCol="0" fromWordArt="0" anchor="ctr" anchorCtr="0" forceAA="0" compatLnSpc="1">
+            <a:prstTxWarp prst="textNoShape">
+              <a:avLst/>
+            </a:prstTxWarp>
+            <a:noAutofit/>
+          </a:bodyPr>
+          <a:lstStyle/>
+          <a:p>
+            <a:pPr algn="ctr"/>
+            <a:r>
+              <a:rPr lang="es-CL" sz="2400" dirty="0">
+                <a:ln w="0"/>
+                <a:solidFill>
+                  <a:schemeClr val="tx1"/>
+                </a:solidFill>
+                <a:effectLst>
+                  <a:outerShdw blurRad="50800" dist="38100" algn="l" rotWithShape="0">
+                    <a:prstClr val="black">
+                      <a:alpha val="40000"/>
+                    </a:prstClr>
+                  </a:outerShdw>
+                </a:effectLst>
+              </a:rPr>
+              <a:t>Estudio de modelos y estándares fue relevante la focalización de los antecedentes históricos</a:t>
+            </a:r>
+          </a:p>
+        </p:txBody>
+      </p:sp>
+      <p:sp>
+        <p:nvSpPr>
+          <p:cNvPr id="7" name="Rectángulo: esquinas redondeadas 6">
+            <a:extLst>
+              <a:ext uri="{FF2B5EF4-FFF2-40B4-BE49-F238E27FC236}">
+                <a16:creationId xmlns:a16="http://schemas.microsoft.com/office/drawing/2014/main" id="{B22E714E-A66D-4395-9AB0-D3D4101D751B}"/>
+              </a:ext>
+            </a:extLst>
+          </p:cNvPr>
+          <p:cNvSpPr/>
+          <p:nvPr/>
+        </p:nvSpPr>
+        <p:spPr>
+          <a:xfrm>
+            <a:off x="4263886" y="4355767"/>
+            <a:ext cx="5158410" cy="1586814"/>
+          </a:xfrm>
+          <a:prstGeom prst="roundRect">
+            <a:avLst/>
+          </a:prstGeom>
+          <a:effectLst>
+            <a:outerShdw blurRad="254000" dist="38100" algn="l" rotWithShape="0">
+              <a:prstClr val="black">
+                <a:alpha val="40000"/>
+              </a:prstClr>
+            </a:outerShdw>
+          </a:effectLst>
+        </p:spPr>
+        <p:style>
+          <a:lnRef idx="2">
+            <a:schemeClr val="accent5"/>
+          </a:lnRef>
+          <a:fillRef idx="1">
+            <a:schemeClr val="lt1"/>
+          </a:fillRef>
+          <a:effectRef idx="0">
+            <a:schemeClr val="accent5"/>
+          </a:effectRef>
+          <a:fontRef idx="minor">
+            <a:schemeClr val="dk1"/>
+          </a:fontRef>
+        </p:style>
+        <p:txBody>
+          <a:bodyPr rot="0" spcFirstLastPara="0" vertOverflow="overflow" horzOverflow="overflow" vert="horz" wrap="square" lIns="91440" tIns="45720" rIns="91440" bIns="45720" numCol="1" spcCol="0" rtlCol="0" fromWordArt="0" anchor="ctr" anchorCtr="0" forceAA="0" compatLnSpc="1">
+            <a:prstTxWarp prst="textNoShape">
+              <a:avLst/>
+            </a:prstTxWarp>
+            <a:noAutofit/>
+          </a:bodyPr>
+          <a:lstStyle/>
+          <a:p>
+            <a:pPr algn="ctr"/>
+            <a:r>
+              <a:rPr lang="es-CL" sz="2400" dirty="0">
+                <a:ln w="0"/>
+                <a:solidFill>
+                  <a:schemeClr val="tx1"/>
+                </a:solidFill>
+                <a:effectLst>
+                  <a:outerShdw blurRad="50800" dist="38100" algn="l" rotWithShape="0">
+                    <a:prstClr val="black">
+                      <a:alpha val="40000"/>
+                    </a:prstClr>
+                  </a:outerShdw>
+                </a:effectLst>
+              </a:rPr>
+              <a:t>Factores identificados y completamente validados por la organización</a:t>
+            </a:r>
+          </a:p>
+        </p:txBody>
+      </p:sp>
+      <p:sp>
+        <p:nvSpPr>
+          <p:cNvPr id="8" name="Flecha: a la derecha 7">
+            <a:extLst>
+              <a:ext uri="{FF2B5EF4-FFF2-40B4-BE49-F238E27FC236}">
+                <a16:creationId xmlns:a16="http://schemas.microsoft.com/office/drawing/2014/main" id="{6BC2FF41-4305-489F-A368-174837FFA75F}"/>
+              </a:ext>
+            </a:extLst>
+          </p:cNvPr>
+          <p:cNvSpPr/>
+          <p:nvPr/>
+        </p:nvSpPr>
+        <p:spPr>
+          <a:xfrm>
+            <a:off x="3473726" y="2279861"/>
+            <a:ext cx="606286" cy="745234"/>
+          </a:xfrm>
+          <a:prstGeom prst="rightArrow">
+            <a:avLst/>
+          </a:prstGeom>
+          <a:effectLst/>
+        </p:spPr>
+        <p:style>
+          <a:lnRef idx="2">
+            <a:schemeClr val="accent1"/>
+          </a:lnRef>
+          <a:fillRef idx="1">
+            <a:schemeClr val="lt1"/>
+          </a:fillRef>
+          <a:effectRef idx="0">
+            <a:schemeClr val="accent1"/>
+          </a:effectRef>
+          <a:fontRef idx="minor">
+            <a:schemeClr val="dk1"/>
+          </a:fontRef>
+        </p:style>
+        <p:txBody>
+          <a:bodyPr rtlCol="0" anchor="ctr"/>
+          <a:lstStyle/>
+          <a:p>
+            <a:pPr algn="ctr"/>
+            <a:endParaRPr lang="es-CL"/>
+          </a:p>
+        </p:txBody>
+      </p:sp>
+      <p:sp>
+        <p:nvSpPr>
+          <p:cNvPr id="9" name="Flecha: a la derecha 8">
+            <a:extLst>
+              <a:ext uri="{FF2B5EF4-FFF2-40B4-BE49-F238E27FC236}">
+                <a16:creationId xmlns:a16="http://schemas.microsoft.com/office/drawing/2014/main" id="{F56BED41-0F92-46C3-AD7C-726AC7B2ECB2}"/>
+              </a:ext>
+            </a:extLst>
+          </p:cNvPr>
+          <p:cNvSpPr/>
+          <p:nvPr/>
+        </p:nvSpPr>
+        <p:spPr>
+          <a:xfrm rot="5400000">
+            <a:off x="6539948" y="3554779"/>
+            <a:ext cx="606286" cy="745234"/>
+          </a:xfrm>
+          <a:prstGeom prst="rightArrow">
+            <a:avLst/>
+          </a:prstGeom>
+          <a:effectLst/>
+        </p:spPr>
+        <p:style>
+          <a:lnRef idx="2">
+            <a:schemeClr val="accent1"/>
+          </a:lnRef>
+          <a:fillRef idx="1">
+            <a:schemeClr val="lt1"/>
+          </a:fillRef>
+          <a:effectRef idx="0">
+            <a:schemeClr val="accent1"/>
+          </a:effectRef>
+          <a:fontRef idx="minor">
+            <a:schemeClr val="dk1"/>
+          </a:fontRef>
+        </p:style>
+        <p:txBody>
+          <a:bodyPr rtlCol="0" anchor="ctr"/>
+          <a:lstStyle/>
+          <a:p>
+            <a:pPr algn="ctr"/>
+            <a:endParaRPr lang="es-CL"/>
+          </a:p>
+        </p:txBody>
+      </p:sp>
     </p:spTree>
     <p:extLst>
       <p:ext uri="{BB962C8B-B14F-4D97-AF65-F5344CB8AC3E}">
@@ -6644,12 +6953,200 @@
   <p:clrMapOvr>
     <a:masterClrMapping/>
   </p:clrMapOvr>
+  <p:timing>
+    <p:tnLst>
+      <p:par>
+        <p:cTn id="1" dur="indefinite" restart="never" nodeType="tmRoot">
+          <p:childTnLst>
+            <p:seq concurrent="1" nextAc="seek">
+              <p:cTn id="2" dur="indefinite" nodeType="mainSeq">
+                <p:childTnLst>
+                  <p:par>
+                    <p:cTn id="3" fill="hold">
+                      <p:stCondLst>
+                        <p:cond delay="indefinite"/>
+                      </p:stCondLst>
+                      <p:childTnLst>
+                        <p:par>
+                          <p:cTn id="4" fill="hold">
+                            <p:stCondLst>
+                              <p:cond delay="0"/>
+                            </p:stCondLst>
+                            <p:childTnLst>
+                              <p:par>
+                                <p:cTn id="5" presetID="1" presetClass="entr" presetSubtype="0" fill="hold" grpId="0" nodeType="clickEffect">
+                                  <p:stCondLst>
+                                    <p:cond delay="0"/>
+                                  </p:stCondLst>
+                                  <p:childTnLst>
+                                    <p:set>
+                                      <p:cBhvr>
+                                        <p:cTn id="6" dur="1" fill="hold">
+                                          <p:stCondLst>
+                                            <p:cond delay="0"/>
+                                          </p:stCondLst>
+                                        </p:cTn>
+                                        <p:tgtEl>
+                                          <p:spTgt spid="8"/>
+                                        </p:tgtEl>
+                                        <p:attrNameLst>
+                                          <p:attrName>style.visibility</p:attrName>
+                                        </p:attrNameLst>
+                                      </p:cBhvr>
+                                      <p:to>
+                                        <p:strVal val="visible"/>
+                                      </p:to>
+                                    </p:set>
+                                  </p:childTnLst>
+                                </p:cTn>
+                              </p:par>
+                              <p:par>
+                                <p:cTn id="7" presetID="1" presetClass="entr" presetSubtype="0" fill="hold" grpId="0" nodeType="withEffect">
+                                  <p:stCondLst>
+                                    <p:cond delay="0"/>
+                                  </p:stCondLst>
+                                  <p:childTnLst>
+                                    <p:set>
+                                      <p:cBhvr>
+                                        <p:cTn id="8" dur="1" fill="hold">
+                                          <p:stCondLst>
+                                            <p:cond delay="0"/>
+                                          </p:stCondLst>
+                                        </p:cTn>
+                                        <p:tgtEl>
+                                          <p:spTgt spid="6"/>
+                                        </p:tgtEl>
+                                        <p:attrNameLst>
+                                          <p:attrName>style.visibility</p:attrName>
+                                        </p:attrNameLst>
+                                      </p:cBhvr>
+                                      <p:to>
+                                        <p:strVal val="visible"/>
+                                      </p:to>
+                                    </p:set>
+                                  </p:childTnLst>
+                                </p:cTn>
+                              </p:par>
+                            </p:childTnLst>
+                          </p:cTn>
+                        </p:par>
+                      </p:childTnLst>
+                    </p:cTn>
+                  </p:par>
+                  <p:par>
+                    <p:cTn id="9" fill="hold">
+                      <p:stCondLst>
+                        <p:cond delay="indefinite"/>
+                      </p:stCondLst>
+                      <p:childTnLst>
+                        <p:par>
+                          <p:cTn id="10" fill="hold">
+                            <p:stCondLst>
+                              <p:cond delay="0"/>
+                            </p:stCondLst>
+                            <p:childTnLst>
+                              <p:par>
+                                <p:cTn id="11" presetID="1" presetClass="entr" presetSubtype="0" fill="hold" grpId="0" nodeType="clickEffect">
+                                  <p:stCondLst>
+                                    <p:cond delay="0"/>
+                                  </p:stCondLst>
+                                  <p:childTnLst>
+                                    <p:set>
+                                      <p:cBhvr>
+                                        <p:cTn id="12" dur="1" fill="hold">
+                                          <p:stCondLst>
+                                            <p:cond delay="0"/>
+                                          </p:stCondLst>
+                                        </p:cTn>
+                                        <p:tgtEl>
+                                          <p:spTgt spid="9"/>
+                                        </p:tgtEl>
+                                        <p:attrNameLst>
+                                          <p:attrName>style.visibility</p:attrName>
+                                        </p:attrNameLst>
+                                      </p:cBhvr>
+                                      <p:to>
+                                        <p:strVal val="visible"/>
+                                      </p:to>
+                                    </p:set>
+                                  </p:childTnLst>
+                                </p:cTn>
+                              </p:par>
+                              <p:par>
+                                <p:cTn id="13" presetID="1" presetClass="entr" presetSubtype="0" fill="hold" grpId="0" nodeType="withEffect">
+                                  <p:stCondLst>
+                                    <p:cond delay="0"/>
+                                  </p:stCondLst>
+                                  <p:childTnLst>
+                                    <p:set>
+                                      <p:cBhvr>
+                                        <p:cTn id="14" dur="1" fill="hold">
+                                          <p:stCondLst>
+                                            <p:cond delay="0"/>
+                                          </p:stCondLst>
+                                        </p:cTn>
+                                        <p:tgtEl>
+                                          <p:spTgt spid="7"/>
+                                        </p:tgtEl>
+                                        <p:attrNameLst>
+                                          <p:attrName>style.visibility</p:attrName>
+                                        </p:attrNameLst>
+                                      </p:cBhvr>
+                                      <p:to>
+                                        <p:strVal val="visible"/>
+                                      </p:to>
+                                    </p:set>
+                                  </p:childTnLst>
+                                </p:cTn>
+                              </p:par>
+                            </p:childTnLst>
+                          </p:cTn>
+                        </p:par>
+                      </p:childTnLst>
+                    </p:cTn>
+                  </p:par>
+                </p:childTnLst>
+              </p:cTn>
+              <p:prevCondLst>
+                <p:cond evt="onPrev" delay="0">
+                  <p:tgtEl>
+                    <p:sldTgt/>
+                  </p:tgtEl>
+                </p:cond>
+              </p:prevCondLst>
+              <p:nextCondLst>
+                <p:cond evt="onNext" delay="0">
+                  <p:tgtEl>
+                    <p:sldTgt/>
+                  </p:tgtEl>
+                </p:cond>
+              </p:nextCondLst>
+            </p:seq>
+          </p:childTnLst>
+        </p:cTn>
+      </p:par>
+    </p:tnLst>
+    <p:bldLst>
+      <p:bldP spid="6" grpId="0" animBg="1"/>
+      <p:bldP spid="7" grpId="0" animBg="1"/>
+      <p:bldP spid="8" grpId="0" animBg="1"/>
+      <p:bldP spid="9" grpId="0" animBg="1"/>
+    </p:bldLst>
+  </p:timing>
 </p:sld>
 </file>
 
 <file path=ppt/slides/slide11.xml><?xml version="1.0" encoding="utf-8"?>
 <p:sld xmlns:a="http://schemas.openxmlformats.org/drawingml/2006/main" xmlns:r="http://schemas.openxmlformats.org/officeDocument/2006/relationships" xmlns:p="http://schemas.openxmlformats.org/presentationml/2006/main">
   <p:cSld>
+    <p:bg>
+      <p:bgPr>
+        <a:solidFill>
+          <a:schemeClr val="bg1"/>
+        </a:solidFill>
+        <a:effectLst/>
+      </p:bgPr>
+    </p:bg>
     <p:spTree>
       <p:nvGrpSpPr>
         <p:cNvPr id="1" name=""/>
@@ -6687,53 +7184,7 @@
           <a:p>
             <a:r>
               <a:rPr lang="es-CL" dirty="0"/>
-              <a:t>Aportes</a:t>
-            </a:r>
-          </a:p>
-        </p:txBody>
-      </p:sp>
-      <p:sp>
-        <p:nvSpPr>
-          <p:cNvPr id="3" name="Marcador de contenido 2">
-            <a:extLst>
-              <a:ext uri="{FF2B5EF4-FFF2-40B4-BE49-F238E27FC236}">
-                <a16:creationId xmlns:a16="http://schemas.microsoft.com/office/drawing/2014/main" id="{96CDBD20-423B-44FB-9B9D-F84A66126AAC}"/>
-              </a:ext>
-            </a:extLst>
-          </p:cNvPr>
-          <p:cNvSpPr>
-            <a:spLocks noGrp="1"/>
-          </p:cNvSpPr>
-          <p:nvPr>
-            <p:ph idx="1"/>
-          </p:nvPr>
-        </p:nvSpPr>
-        <p:spPr/>
-        <p:txBody>
-          <a:bodyPr/>
-          <a:lstStyle/>
-          <a:p>
-            <a:r>
-              <a:rPr lang="es-CL" dirty="0"/>
-              <a:t>&lt;&lt;1&gt;&gt;</a:t>
-            </a:r>
-          </a:p>
-          <a:p>
-            <a:r>
-              <a:rPr lang="es-CL" dirty="0"/>
-              <a:t>&lt;&lt;2&gt;&gt;</a:t>
-            </a:r>
-          </a:p>
-          <a:p>
-            <a:r>
-              <a:rPr lang="es-CL" dirty="0"/>
-              <a:t>&lt;&lt;3&gt;&gt;</a:t>
-            </a:r>
-          </a:p>
-          <a:p>
-            <a:r>
-              <a:rPr lang="es-CL" dirty="0"/>
-              <a:t>&lt;&lt;4&gt;&gt;</a:t>
+              <a:t>Con relación a Objetivos Específicos (2/3)</a:t>
             </a:r>
           </a:p>
         </p:txBody>
@@ -6785,6 +7236,1855 @@
           </a:p>
         </p:txBody>
       </p:sp>
+      <p:sp>
+        <p:nvSpPr>
+          <p:cNvPr id="5" name="Rectángulo: esquinas redondeadas 4">
+            <a:extLst>
+              <a:ext uri="{FF2B5EF4-FFF2-40B4-BE49-F238E27FC236}">
+                <a16:creationId xmlns:a16="http://schemas.microsoft.com/office/drawing/2014/main" id="{AF984D5F-A2D1-40F7-8C89-C6586B12503B}"/>
+              </a:ext>
+            </a:extLst>
+          </p:cNvPr>
+          <p:cNvSpPr/>
+          <p:nvPr/>
+        </p:nvSpPr>
+        <p:spPr>
+          <a:xfrm>
+            <a:off x="495300" y="1583768"/>
+            <a:ext cx="2794552" cy="4618249"/>
+          </a:xfrm>
+          <a:prstGeom prst="roundRect">
+            <a:avLst/>
+          </a:prstGeom>
+          <a:solidFill>
+            <a:schemeClr val="bg1"/>
+          </a:solidFill>
+          <a:effectLst>
+            <a:outerShdw blurRad="254000" dist="38100" algn="l" rotWithShape="0">
+              <a:prstClr val="black">
+                <a:alpha val="40000"/>
+              </a:prstClr>
+            </a:outerShdw>
+          </a:effectLst>
+        </p:spPr>
+        <p:style>
+          <a:lnRef idx="2">
+            <a:schemeClr val="accent1"/>
+          </a:lnRef>
+          <a:fillRef idx="1">
+            <a:schemeClr val="lt1"/>
+          </a:fillRef>
+          <a:effectRef idx="0">
+            <a:schemeClr val="accent1"/>
+          </a:effectRef>
+          <a:fontRef idx="minor">
+            <a:schemeClr val="dk1"/>
+          </a:fontRef>
+        </p:style>
+        <p:txBody>
+          <a:bodyPr rot="0" spcFirstLastPara="0" vertOverflow="overflow" horzOverflow="overflow" vert="horz" wrap="square" lIns="91440" tIns="45720" rIns="91440" bIns="45720" numCol="1" spcCol="0" rtlCol="0" fromWordArt="0" anchor="ctr" anchorCtr="0" forceAA="0" compatLnSpc="1">
+            <a:prstTxWarp prst="textNoShape">
+              <a:avLst/>
+            </a:prstTxWarp>
+            <a:noAutofit/>
+          </a:bodyPr>
+          <a:lstStyle/>
+          <a:p>
+            <a:pPr algn="ctr"/>
+            <a:r>
+              <a:rPr lang="es-CL" sz="2400" dirty="0">
+                <a:ln w="0"/>
+                <a:solidFill>
+                  <a:schemeClr val="tx1"/>
+                </a:solidFill>
+                <a:effectLst>
+                  <a:outerShdw blurRad="50800" dist="38100" algn="l" rotWithShape="0">
+                    <a:prstClr val="black">
+                      <a:alpha val="40000"/>
+                    </a:prstClr>
+                  </a:outerShdw>
+                </a:effectLst>
+              </a:rPr>
+              <a:t>Desarrollar los elementos centrales</a:t>
+            </a:r>
+          </a:p>
+          <a:p>
+            <a:pPr algn="ctr"/>
+            <a:r>
+              <a:rPr lang="es-CL" sz="2400" dirty="0">
+                <a:ln w="0"/>
+                <a:solidFill>
+                  <a:schemeClr val="tx1"/>
+                </a:solidFill>
+                <a:effectLst>
+                  <a:outerShdw blurRad="50800" dist="38100" algn="l" rotWithShape="0">
+                    <a:prstClr val="black">
+                      <a:alpha val="40000"/>
+                    </a:prstClr>
+                  </a:outerShdw>
+                </a:effectLst>
+              </a:rPr>
+              <a:t>del manual de buenas prácticas</a:t>
+            </a:r>
+          </a:p>
+        </p:txBody>
+      </p:sp>
+      <p:sp>
+        <p:nvSpPr>
+          <p:cNvPr id="6" name="Rectángulo: esquinas redondeadas 5">
+            <a:extLst>
+              <a:ext uri="{FF2B5EF4-FFF2-40B4-BE49-F238E27FC236}">
+                <a16:creationId xmlns:a16="http://schemas.microsoft.com/office/drawing/2014/main" id="{991D95A8-A708-40E3-BA44-524899660B04}"/>
+              </a:ext>
+            </a:extLst>
+          </p:cNvPr>
+          <p:cNvSpPr/>
+          <p:nvPr/>
+        </p:nvSpPr>
+        <p:spPr>
+          <a:xfrm>
+            <a:off x="4263887" y="1859071"/>
+            <a:ext cx="5158409" cy="1586815"/>
+          </a:xfrm>
+          <a:prstGeom prst="roundRect">
+            <a:avLst/>
+          </a:prstGeom>
+          <a:effectLst>
+            <a:outerShdw blurRad="254000" dist="38100" algn="l" rotWithShape="0">
+              <a:prstClr val="black">
+                <a:alpha val="40000"/>
+              </a:prstClr>
+            </a:outerShdw>
+          </a:effectLst>
+        </p:spPr>
+        <p:style>
+          <a:lnRef idx="2">
+            <a:schemeClr val="accent5"/>
+          </a:lnRef>
+          <a:fillRef idx="1">
+            <a:schemeClr val="lt1"/>
+          </a:fillRef>
+          <a:effectRef idx="0">
+            <a:schemeClr val="accent5"/>
+          </a:effectRef>
+          <a:fontRef idx="minor">
+            <a:schemeClr val="dk1"/>
+          </a:fontRef>
+        </p:style>
+        <p:txBody>
+          <a:bodyPr rot="0" spcFirstLastPara="0" vertOverflow="overflow" horzOverflow="overflow" vert="horz" wrap="square" lIns="91440" tIns="45720" rIns="91440" bIns="45720" numCol="1" spcCol="0" rtlCol="0" fromWordArt="0" anchor="ctr" anchorCtr="0" forceAA="0" compatLnSpc="1">
+            <a:prstTxWarp prst="textNoShape">
+              <a:avLst/>
+            </a:prstTxWarp>
+            <a:noAutofit/>
+          </a:bodyPr>
+          <a:lstStyle/>
+          <a:p>
+            <a:pPr algn="ctr"/>
+            <a:r>
+              <a:rPr lang="es-CL" sz="2400" dirty="0">
+                <a:ln w="0"/>
+                <a:solidFill>
+                  <a:schemeClr val="tx1"/>
+                </a:solidFill>
+                <a:effectLst>
+                  <a:outerShdw blurRad="50800" dist="38100" algn="l" rotWithShape="0">
+                    <a:prstClr val="black">
+                      <a:alpha val="40000"/>
+                    </a:prstClr>
+                  </a:outerShdw>
+                </a:effectLst>
+              </a:rPr>
+              <a:t>Creación de Documentos sin precedentes en la organización</a:t>
+            </a:r>
+          </a:p>
+        </p:txBody>
+      </p:sp>
+      <p:sp>
+        <p:nvSpPr>
+          <p:cNvPr id="7" name="Rectángulo: esquinas redondeadas 6">
+            <a:extLst>
+              <a:ext uri="{FF2B5EF4-FFF2-40B4-BE49-F238E27FC236}">
+                <a16:creationId xmlns:a16="http://schemas.microsoft.com/office/drawing/2014/main" id="{B22E714E-A66D-4395-9AB0-D3D4101D751B}"/>
+              </a:ext>
+            </a:extLst>
+          </p:cNvPr>
+          <p:cNvSpPr/>
+          <p:nvPr/>
+        </p:nvSpPr>
+        <p:spPr>
+          <a:xfrm>
+            <a:off x="4263886" y="4355767"/>
+            <a:ext cx="5158410" cy="1586814"/>
+          </a:xfrm>
+          <a:prstGeom prst="roundRect">
+            <a:avLst/>
+          </a:prstGeom>
+          <a:effectLst>
+            <a:outerShdw blurRad="254000" dist="38100" algn="l" rotWithShape="0">
+              <a:prstClr val="black">
+                <a:alpha val="40000"/>
+              </a:prstClr>
+            </a:outerShdw>
+          </a:effectLst>
+        </p:spPr>
+        <p:style>
+          <a:lnRef idx="2">
+            <a:schemeClr val="accent5"/>
+          </a:lnRef>
+          <a:fillRef idx="1">
+            <a:schemeClr val="lt1"/>
+          </a:fillRef>
+          <a:effectRef idx="0">
+            <a:schemeClr val="accent5"/>
+          </a:effectRef>
+          <a:fontRef idx="minor">
+            <a:schemeClr val="dk1"/>
+          </a:fontRef>
+        </p:style>
+        <p:txBody>
+          <a:bodyPr rot="0" spcFirstLastPara="0" vertOverflow="overflow" horzOverflow="overflow" vert="horz" wrap="square" lIns="91440" tIns="45720" rIns="91440" bIns="45720" numCol="1" spcCol="0" rtlCol="0" fromWordArt="0" anchor="ctr" anchorCtr="0" forceAA="0" compatLnSpc="1">
+            <a:prstTxWarp prst="textNoShape">
+              <a:avLst/>
+            </a:prstTxWarp>
+            <a:noAutofit/>
+          </a:bodyPr>
+          <a:lstStyle/>
+          <a:p>
+            <a:pPr algn="ctr"/>
+            <a:r>
+              <a:rPr lang="es-CL" sz="2400" dirty="0">
+                <a:ln w="0"/>
+                <a:solidFill>
+                  <a:schemeClr val="tx1"/>
+                </a:solidFill>
+                <a:effectLst>
+                  <a:outerShdw blurRad="50800" dist="38100" algn="l" rotWithShape="0">
+                    <a:prstClr val="black">
+                      <a:alpha val="40000"/>
+                    </a:prstClr>
+                  </a:outerShdw>
+                </a:effectLst>
+              </a:rPr>
+              <a:t>Generación de oportunidad para construir otros manuales, que cubran todo tipo de proyectos</a:t>
+            </a:r>
+          </a:p>
+        </p:txBody>
+      </p:sp>
+      <p:sp>
+        <p:nvSpPr>
+          <p:cNvPr id="8" name="Flecha: a la derecha 7">
+            <a:extLst>
+              <a:ext uri="{FF2B5EF4-FFF2-40B4-BE49-F238E27FC236}">
+                <a16:creationId xmlns:a16="http://schemas.microsoft.com/office/drawing/2014/main" id="{6BC2FF41-4305-489F-A368-174837FFA75F}"/>
+              </a:ext>
+            </a:extLst>
+          </p:cNvPr>
+          <p:cNvSpPr/>
+          <p:nvPr/>
+        </p:nvSpPr>
+        <p:spPr>
+          <a:xfrm>
+            <a:off x="3473726" y="2279861"/>
+            <a:ext cx="606286" cy="745234"/>
+          </a:xfrm>
+          <a:prstGeom prst="rightArrow">
+            <a:avLst/>
+          </a:prstGeom>
+          <a:effectLst/>
+        </p:spPr>
+        <p:style>
+          <a:lnRef idx="2">
+            <a:schemeClr val="accent1"/>
+          </a:lnRef>
+          <a:fillRef idx="1">
+            <a:schemeClr val="lt1"/>
+          </a:fillRef>
+          <a:effectRef idx="0">
+            <a:schemeClr val="accent1"/>
+          </a:effectRef>
+          <a:fontRef idx="minor">
+            <a:schemeClr val="dk1"/>
+          </a:fontRef>
+        </p:style>
+        <p:txBody>
+          <a:bodyPr rtlCol="0" anchor="ctr"/>
+          <a:lstStyle/>
+          <a:p>
+            <a:pPr algn="ctr"/>
+            <a:endParaRPr lang="es-CL"/>
+          </a:p>
+        </p:txBody>
+      </p:sp>
+      <p:sp>
+        <p:nvSpPr>
+          <p:cNvPr id="9" name="Flecha: a la derecha 8">
+            <a:extLst>
+              <a:ext uri="{FF2B5EF4-FFF2-40B4-BE49-F238E27FC236}">
+                <a16:creationId xmlns:a16="http://schemas.microsoft.com/office/drawing/2014/main" id="{F56BED41-0F92-46C3-AD7C-726AC7B2ECB2}"/>
+              </a:ext>
+            </a:extLst>
+          </p:cNvPr>
+          <p:cNvSpPr/>
+          <p:nvPr/>
+        </p:nvSpPr>
+        <p:spPr>
+          <a:xfrm rot="5400000">
+            <a:off x="6539948" y="3554779"/>
+            <a:ext cx="606286" cy="745234"/>
+          </a:xfrm>
+          <a:prstGeom prst="rightArrow">
+            <a:avLst/>
+          </a:prstGeom>
+          <a:effectLst/>
+        </p:spPr>
+        <p:style>
+          <a:lnRef idx="2">
+            <a:schemeClr val="accent1"/>
+          </a:lnRef>
+          <a:fillRef idx="1">
+            <a:schemeClr val="lt1"/>
+          </a:fillRef>
+          <a:effectRef idx="0">
+            <a:schemeClr val="accent1"/>
+          </a:effectRef>
+          <a:fontRef idx="minor">
+            <a:schemeClr val="dk1"/>
+          </a:fontRef>
+        </p:style>
+        <p:txBody>
+          <a:bodyPr rtlCol="0" anchor="ctr"/>
+          <a:lstStyle/>
+          <a:p>
+            <a:pPr algn="ctr"/>
+            <a:endParaRPr lang="es-CL"/>
+          </a:p>
+        </p:txBody>
+      </p:sp>
+    </p:spTree>
+    <p:extLst>
+      <p:ext uri="{BB962C8B-B14F-4D97-AF65-F5344CB8AC3E}">
+        <p14:creationId xmlns:p14="http://schemas.microsoft.com/office/powerpoint/2010/main" val="1335304436"/>
+      </p:ext>
+    </p:extLst>
+  </p:cSld>
+  <p:clrMapOvr>
+    <a:masterClrMapping/>
+  </p:clrMapOvr>
+  <p:timing>
+    <p:tnLst>
+      <p:par>
+        <p:cTn id="1" dur="indefinite" restart="never" nodeType="tmRoot">
+          <p:childTnLst>
+            <p:seq concurrent="1" nextAc="seek">
+              <p:cTn id="2" dur="indefinite" nodeType="mainSeq">
+                <p:childTnLst>
+                  <p:par>
+                    <p:cTn id="3" fill="hold">
+                      <p:stCondLst>
+                        <p:cond delay="indefinite"/>
+                      </p:stCondLst>
+                      <p:childTnLst>
+                        <p:par>
+                          <p:cTn id="4" fill="hold">
+                            <p:stCondLst>
+                              <p:cond delay="0"/>
+                            </p:stCondLst>
+                            <p:childTnLst>
+                              <p:par>
+                                <p:cTn id="5" presetID="1" presetClass="entr" presetSubtype="0" fill="hold" grpId="0" nodeType="clickEffect">
+                                  <p:stCondLst>
+                                    <p:cond delay="0"/>
+                                  </p:stCondLst>
+                                  <p:childTnLst>
+                                    <p:set>
+                                      <p:cBhvr>
+                                        <p:cTn id="6" dur="1" fill="hold">
+                                          <p:stCondLst>
+                                            <p:cond delay="0"/>
+                                          </p:stCondLst>
+                                        </p:cTn>
+                                        <p:tgtEl>
+                                          <p:spTgt spid="8"/>
+                                        </p:tgtEl>
+                                        <p:attrNameLst>
+                                          <p:attrName>style.visibility</p:attrName>
+                                        </p:attrNameLst>
+                                      </p:cBhvr>
+                                      <p:to>
+                                        <p:strVal val="visible"/>
+                                      </p:to>
+                                    </p:set>
+                                  </p:childTnLst>
+                                </p:cTn>
+                              </p:par>
+                              <p:par>
+                                <p:cTn id="7" presetID="1" presetClass="entr" presetSubtype="0" fill="hold" grpId="0" nodeType="withEffect">
+                                  <p:stCondLst>
+                                    <p:cond delay="0"/>
+                                  </p:stCondLst>
+                                  <p:childTnLst>
+                                    <p:set>
+                                      <p:cBhvr>
+                                        <p:cTn id="8" dur="1" fill="hold">
+                                          <p:stCondLst>
+                                            <p:cond delay="0"/>
+                                          </p:stCondLst>
+                                        </p:cTn>
+                                        <p:tgtEl>
+                                          <p:spTgt spid="6"/>
+                                        </p:tgtEl>
+                                        <p:attrNameLst>
+                                          <p:attrName>style.visibility</p:attrName>
+                                        </p:attrNameLst>
+                                      </p:cBhvr>
+                                      <p:to>
+                                        <p:strVal val="visible"/>
+                                      </p:to>
+                                    </p:set>
+                                  </p:childTnLst>
+                                </p:cTn>
+                              </p:par>
+                            </p:childTnLst>
+                          </p:cTn>
+                        </p:par>
+                      </p:childTnLst>
+                    </p:cTn>
+                  </p:par>
+                  <p:par>
+                    <p:cTn id="9" fill="hold">
+                      <p:stCondLst>
+                        <p:cond delay="indefinite"/>
+                      </p:stCondLst>
+                      <p:childTnLst>
+                        <p:par>
+                          <p:cTn id="10" fill="hold">
+                            <p:stCondLst>
+                              <p:cond delay="0"/>
+                            </p:stCondLst>
+                            <p:childTnLst>
+                              <p:par>
+                                <p:cTn id="11" presetID="1" presetClass="entr" presetSubtype="0" fill="hold" grpId="0" nodeType="clickEffect">
+                                  <p:stCondLst>
+                                    <p:cond delay="0"/>
+                                  </p:stCondLst>
+                                  <p:childTnLst>
+                                    <p:set>
+                                      <p:cBhvr>
+                                        <p:cTn id="12" dur="1" fill="hold">
+                                          <p:stCondLst>
+                                            <p:cond delay="0"/>
+                                          </p:stCondLst>
+                                        </p:cTn>
+                                        <p:tgtEl>
+                                          <p:spTgt spid="9"/>
+                                        </p:tgtEl>
+                                        <p:attrNameLst>
+                                          <p:attrName>style.visibility</p:attrName>
+                                        </p:attrNameLst>
+                                      </p:cBhvr>
+                                      <p:to>
+                                        <p:strVal val="visible"/>
+                                      </p:to>
+                                    </p:set>
+                                  </p:childTnLst>
+                                </p:cTn>
+                              </p:par>
+                              <p:par>
+                                <p:cTn id="13" presetID="1" presetClass="entr" presetSubtype="0" fill="hold" grpId="0" nodeType="withEffect">
+                                  <p:stCondLst>
+                                    <p:cond delay="0"/>
+                                  </p:stCondLst>
+                                  <p:childTnLst>
+                                    <p:set>
+                                      <p:cBhvr>
+                                        <p:cTn id="14" dur="1" fill="hold">
+                                          <p:stCondLst>
+                                            <p:cond delay="0"/>
+                                          </p:stCondLst>
+                                        </p:cTn>
+                                        <p:tgtEl>
+                                          <p:spTgt spid="7"/>
+                                        </p:tgtEl>
+                                        <p:attrNameLst>
+                                          <p:attrName>style.visibility</p:attrName>
+                                        </p:attrNameLst>
+                                      </p:cBhvr>
+                                      <p:to>
+                                        <p:strVal val="visible"/>
+                                      </p:to>
+                                    </p:set>
+                                  </p:childTnLst>
+                                </p:cTn>
+                              </p:par>
+                            </p:childTnLst>
+                          </p:cTn>
+                        </p:par>
+                      </p:childTnLst>
+                    </p:cTn>
+                  </p:par>
+                </p:childTnLst>
+              </p:cTn>
+              <p:prevCondLst>
+                <p:cond evt="onPrev" delay="0">
+                  <p:tgtEl>
+                    <p:sldTgt/>
+                  </p:tgtEl>
+                </p:cond>
+              </p:prevCondLst>
+              <p:nextCondLst>
+                <p:cond evt="onNext" delay="0">
+                  <p:tgtEl>
+                    <p:sldTgt/>
+                  </p:tgtEl>
+                </p:cond>
+              </p:nextCondLst>
+            </p:seq>
+          </p:childTnLst>
+        </p:cTn>
+      </p:par>
+    </p:tnLst>
+    <p:bldLst>
+      <p:bldP spid="6" grpId="0" animBg="1"/>
+      <p:bldP spid="7" grpId="0" animBg="1"/>
+      <p:bldP spid="8" grpId="0" animBg="1"/>
+      <p:bldP spid="9" grpId="0" animBg="1"/>
+    </p:bldLst>
+  </p:timing>
+</p:sld>
+</file>
+
+<file path=ppt/slides/slide12.xml><?xml version="1.0" encoding="utf-8"?>
+<p:sld xmlns:a="http://schemas.openxmlformats.org/drawingml/2006/main" xmlns:r="http://schemas.openxmlformats.org/officeDocument/2006/relationships" xmlns:p="http://schemas.openxmlformats.org/presentationml/2006/main">
+  <p:cSld>
+    <p:spTree>
+      <p:nvGrpSpPr>
+        <p:cNvPr id="1" name=""/>
+        <p:cNvGrpSpPr/>
+        <p:nvPr/>
+      </p:nvGrpSpPr>
+      <p:grpSpPr>
+        <a:xfrm>
+          <a:off x="0" y="0"/>
+          <a:ext cx="0" cy="0"/>
+          <a:chOff x="0" y="0"/>
+          <a:chExt cx="0" cy="0"/>
+        </a:xfrm>
+      </p:grpSpPr>
+      <p:sp>
+        <p:nvSpPr>
+          <p:cNvPr id="2" name="Título 1">
+            <a:extLst>
+              <a:ext uri="{FF2B5EF4-FFF2-40B4-BE49-F238E27FC236}">
+                <a16:creationId xmlns:a16="http://schemas.microsoft.com/office/drawing/2014/main" id="{9CCF9805-D1CE-4FA9-8395-999F57BAFB90}"/>
+              </a:ext>
+            </a:extLst>
+          </p:cNvPr>
+          <p:cNvSpPr>
+            <a:spLocks noGrp="1"/>
+          </p:cNvSpPr>
+          <p:nvPr>
+            <p:ph type="title"/>
+          </p:nvPr>
+        </p:nvSpPr>
+        <p:spPr/>
+        <p:txBody>
+          <a:bodyPr/>
+          <a:lstStyle/>
+          <a:p>
+            <a:r>
+              <a:rPr lang="es-CL" dirty="0"/>
+              <a:t>Con relación a Objetivos Específicos (3/3)</a:t>
+            </a:r>
+          </a:p>
+        </p:txBody>
+      </p:sp>
+      <p:sp>
+        <p:nvSpPr>
+          <p:cNvPr id="4" name="Flecha: pentágono 3">
+            <a:extLst>
+              <a:ext uri="{FF2B5EF4-FFF2-40B4-BE49-F238E27FC236}">
+                <a16:creationId xmlns:a16="http://schemas.microsoft.com/office/drawing/2014/main" id="{D00E8A3A-5868-4159-A33C-4E613D5CA89B}"/>
+              </a:ext>
+            </a:extLst>
+          </p:cNvPr>
+          <p:cNvSpPr/>
+          <p:nvPr/>
+        </p:nvSpPr>
+        <p:spPr>
+          <a:xfrm>
+            <a:off x="0" y="11393"/>
+            <a:ext cx="2801062" cy="493432"/>
+          </a:xfrm>
+          <a:prstGeom prst="homePlate">
+            <a:avLst/>
+          </a:prstGeom>
+        </p:spPr>
+        <p:style>
+          <a:lnRef idx="1">
+            <a:schemeClr val="accent1"/>
+          </a:lnRef>
+          <a:fillRef idx="3">
+            <a:schemeClr val="accent1"/>
+          </a:fillRef>
+          <a:effectRef idx="2">
+            <a:schemeClr val="accent1"/>
+          </a:effectRef>
+          <a:fontRef idx="minor">
+            <a:schemeClr val="lt1"/>
+          </a:fontRef>
+        </p:style>
+        <p:txBody>
+          <a:bodyPr rtlCol="0" anchor="ctr"/>
+          <a:lstStyle/>
+          <a:p>
+            <a:pPr algn="ctr"/>
+            <a:r>
+              <a:rPr lang="es-CL" dirty="0"/>
+              <a:t>Conclusiones</a:t>
+            </a:r>
+          </a:p>
+        </p:txBody>
+      </p:sp>
+      <p:sp>
+        <p:nvSpPr>
+          <p:cNvPr id="5" name="Rectángulo: esquinas redondeadas 4">
+            <a:extLst>
+              <a:ext uri="{FF2B5EF4-FFF2-40B4-BE49-F238E27FC236}">
+                <a16:creationId xmlns:a16="http://schemas.microsoft.com/office/drawing/2014/main" id="{AF984D5F-A2D1-40F7-8C89-C6586B12503B}"/>
+              </a:ext>
+            </a:extLst>
+          </p:cNvPr>
+          <p:cNvSpPr/>
+          <p:nvPr/>
+        </p:nvSpPr>
+        <p:spPr>
+          <a:xfrm>
+            <a:off x="495300" y="1583768"/>
+            <a:ext cx="2794552" cy="4618249"/>
+          </a:xfrm>
+          <a:prstGeom prst="roundRect">
+            <a:avLst/>
+          </a:prstGeom>
+          <a:effectLst>
+            <a:outerShdw blurRad="254000" dist="38100" algn="l" rotWithShape="0">
+              <a:prstClr val="black">
+                <a:alpha val="40000"/>
+              </a:prstClr>
+            </a:outerShdw>
+          </a:effectLst>
+        </p:spPr>
+        <p:style>
+          <a:lnRef idx="2">
+            <a:schemeClr val="accent1"/>
+          </a:lnRef>
+          <a:fillRef idx="1">
+            <a:schemeClr val="lt1"/>
+          </a:fillRef>
+          <a:effectRef idx="0">
+            <a:schemeClr val="accent1"/>
+          </a:effectRef>
+          <a:fontRef idx="minor">
+            <a:schemeClr val="dk1"/>
+          </a:fontRef>
+        </p:style>
+        <p:txBody>
+          <a:bodyPr rot="0" spcFirstLastPara="0" vertOverflow="overflow" horzOverflow="overflow" vert="horz" wrap="square" lIns="91440" tIns="45720" rIns="91440" bIns="45720" numCol="1" spcCol="0" rtlCol="0" fromWordArt="0" anchor="ctr" anchorCtr="0" forceAA="0" compatLnSpc="1">
+            <a:prstTxWarp prst="textNoShape">
+              <a:avLst/>
+            </a:prstTxWarp>
+            <a:noAutofit/>
+          </a:bodyPr>
+          <a:lstStyle/>
+          <a:p>
+            <a:pPr algn="ctr"/>
+            <a:r>
+              <a:rPr lang="es-CL" sz="2400" dirty="0">
+                <a:ln w="0"/>
+                <a:solidFill>
+                  <a:schemeClr val="tx1"/>
+                </a:solidFill>
+                <a:effectLst>
+                  <a:outerShdw blurRad="50800" dist="38100" algn="l" rotWithShape="0">
+                    <a:prstClr val="black">
+                      <a:alpha val="40000"/>
+                    </a:prstClr>
+                  </a:outerShdw>
+                </a:effectLst>
+              </a:rPr>
+              <a:t>Proponer un </a:t>
+            </a:r>
+          </a:p>
+          <a:p>
+            <a:pPr algn="ctr"/>
+            <a:r>
+              <a:rPr lang="es-CL" sz="2400" dirty="0">
+                <a:ln w="0"/>
+                <a:solidFill>
+                  <a:schemeClr val="tx1"/>
+                </a:solidFill>
+                <a:effectLst>
+                  <a:outerShdw blurRad="50800" dist="38100" algn="l" rotWithShape="0">
+                    <a:prstClr val="black">
+                      <a:alpha val="40000"/>
+                    </a:prstClr>
+                  </a:outerShdw>
+                </a:effectLst>
+              </a:rPr>
+              <a:t>plan de implementación del manual </a:t>
+            </a:r>
+          </a:p>
+          <a:p>
+            <a:pPr algn="ctr"/>
+            <a:r>
+              <a:rPr lang="es-CL" sz="2400" dirty="0">
+                <a:ln w="0"/>
+                <a:solidFill>
+                  <a:schemeClr val="tx1"/>
+                </a:solidFill>
+                <a:effectLst>
+                  <a:outerShdw blurRad="50800" dist="38100" algn="l" rotWithShape="0">
+                    <a:prstClr val="black">
+                      <a:alpha val="40000"/>
+                    </a:prstClr>
+                  </a:outerShdw>
+                </a:effectLst>
+              </a:rPr>
+              <a:t>de buenas prácticas</a:t>
+            </a:r>
+          </a:p>
+        </p:txBody>
+      </p:sp>
+      <p:sp>
+        <p:nvSpPr>
+          <p:cNvPr id="6" name="Rectángulo: esquinas redondeadas 5">
+            <a:extLst>
+              <a:ext uri="{FF2B5EF4-FFF2-40B4-BE49-F238E27FC236}">
+                <a16:creationId xmlns:a16="http://schemas.microsoft.com/office/drawing/2014/main" id="{991D95A8-A708-40E3-BA44-524899660B04}"/>
+              </a:ext>
+            </a:extLst>
+          </p:cNvPr>
+          <p:cNvSpPr/>
+          <p:nvPr/>
+        </p:nvSpPr>
+        <p:spPr>
+          <a:xfrm>
+            <a:off x="4263887" y="1859071"/>
+            <a:ext cx="5158409" cy="1586815"/>
+          </a:xfrm>
+          <a:prstGeom prst="roundRect">
+            <a:avLst/>
+          </a:prstGeom>
+          <a:effectLst>
+            <a:outerShdw blurRad="254000" dist="38100" algn="l" rotWithShape="0">
+              <a:prstClr val="black">
+                <a:alpha val="40000"/>
+              </a:prstClr>
+            </a:outerShdw>
+          </a:effectLst>
+        </p:spPr>
+        <p:style>
+          <a:lnRef idx="2">
+            <a:schemeClr val="accent5"/>
+          </a:lnRef>
+          <a:fillRef idx="1">
+            <a:schemeClr val="lt1"/>
+          </a:fillRef>
+          <a:effectRef idx="0">
+            <a:schemeClr val="accent5"/>
+          </a:effectRef>
+          <a:fontRef idx="minor">
+            <a:schemeClr val="dk1"/>
+          </a:fontRef>
+        </p:style>
+        <p:txBody>
+          <a:bodyPr rot="0" spcFirstLastPara="0" vertOverflow="overflow" horzOverflow="overflow" vert="horz" wrap="square" lIns="91440" tIns="45720" rIns="91440" bIns="45720" numCol="1" spcCol="0" rtlCol="0" fromWordArt="0" anchor="ctr" anchorCtr="0" forceAA="0" compatLnSpc="1">
+            <a:prstTxWarp prst="textNoShape">
+              <a:avLst/>
+            </a:prstTxWarp>
+            <a:noAutofit/>
+          </a:bodyPr>
+          <a:lstStyle/>
+          <a:p>
+            <a:pPr algn="ctr"/>
+            <a:r>
+              <a:rPr lang="es-CL" sz="2400" dirty="0">
+                <a:ln w="0"/>
+                <a:solidFill>
+                  <a:schemeClr val="tx1"/>
+                </a:solidFill>
+                <a:effectLst>
+                  <a:outerShdw blurRad="50800" dist="38100" algn="l" rotWithShape="0">
+                    <a:prstClr val="black">
+                      <a:alpha val="40000"/>
+                    </a:prstClr>
+                  </a:outerShdw>
+                </a:effectLst>
+              </a:rPr>
+              <a:t>Permite acelerar el proceso de aprendizaje sobre la gestión de los factores críticos</a:t>
+            </a:r>
+          </a:p>
+        </p:txBody>
+      </p:sp>
+      <p:sp>
+        <p:nvSpPr>
+          <p:cNvPr id="7" name="Rectángulo: esquinas redondeadas 6">
+            <a:extLst>
+              <a:ext uri="{FF2B5EF4-FFF2-40B4-BE49-F238E27FC236}">
+                <a16:creationId xmlns:a16="http://schemas.microsoft.com/office/drawing/2014/main" id="{B22E714E-A66D-4395-9AB0-D3D4101D751B}"/>
+              </a:ext>
+            </a:extLst>
+          </p:cNvPr>
+          <p:cNvSpPr/>
+          <p:nvPr/>
+        </p:nvSpPr>
+        <p:spPr>
+          <a:xfrm>
+            <a:off x="4263886" y="4355767"/>
+            <a:ext cx="5158410" cy="1586814"/>
+          </a:xfrm>
+          <a:prstGeom prst="roundRect">
+            <a:avLst/>
+          </a:prstGeom>
+          <a:effectLst>
+            <a:outerShdw blurRad="254000" dist="38100" algn="l" rotWithShape="0">
+              <a:prstClr val="black">
+                <a:alpha val="40000"/>
+              </a:prstClr>
+            </a:outerShdw>
+          </a:effectLst>
+        </p:spPr>
+        <p:style>
+          <a:lnRef idx="2">
+            <a:schemeClr val="accent5"/>
+          </a:lnRef>
+          <a:fillRef idx="1">
+            <a:schemeClr val="lt1"/>
+          </a:fillRef>
+          <a:effectRef idx="0">
+            <a:schemeClr val="accent5"/>
+          </a:effectRef>
+          <a:fontRef idx="minor">
+            <a:schemeClr val="dk1"/>
+          </a:fontRef>
+        </p:style>
+        <p:txBody>
+          <a:bodyPr rot="0" spcFirstLastPara="0" vertOverflow="overflow" horzOverflow="overflow" vert="horz" wrap="square" lIns="91440" tIns="45720" rIns="91440" bIns="45720" numCol="1" spcCol="0" rtlCol="0" fromWordArt="0" anchor="ctr" anchorCtr="0" forceAA="0" compatLnSpc="1">
+            <a:prstTxWarp prst="textNoShape">
+              <a:avLst/>
+            </a:prstTxWarp>
+            <a:noAutofit/>
+          </a:bodyPr>
+          <a:lstStyle/>
+          <a:p>
+            <a:pPr algn="ctr"/>
+            <a:r>
+              <a:rPr lang="es-CL" sz="2400" dirty="0">
+                <a:ln w="0"/>
+                <a:solidFill>
+                  <a:schemeClr val="tx1"/>
+                </a:solidFill>
+                <a:effectLst>
+                  <a:outerShdw blurRad="50800" dist="38100" algn="l" rotWithShape="0">
+                    <a:prstClr val="black">
+                      <a:alpha val="40000"/>
+                    </a:prstClr>
+                  </a:outerShdw>
+                </a:effectLst>
+              </a:rPr>
+              <a:t>El enfoque en los factores críticos, sostendrá en el tiempo a las buenas prácticas</a:t>
+            </a:r>
+          </a:p>
+        </p:txBody>
+      </p:sp>
+      <p:sp>
+        <p:nvSpPr>
+          <p:cNvPr id="8" name="Flecha: a la derecha 7">
+            <a:extLst>
+              <a:ext uri="{FF2B5EF4-FFF2-40B4-BE49-F238E27FC236}">
+                <a16:creationId xmlns:a16="http://schemas.microsoft.com/office/drawing/2014/main" id="{6BC2FF41-4305-489F-A368-174837FFA75F}"/>
+              </a:ext>
+            </a:extLst>
+          </p:cNvPr>
+          <p:cNvSpPr/>
+          <p:nvPr/>
+        </p:nvSpPr>
+        <p:spPr>
+          <a:xfrm>
+            <a:off x="3473726" y="2279861"/>
+            <a:ext cx="606286" cy="745234"/>
+          </a:xfrm>
+          <a:prstGeom prst="rightArrow">
+            <a:avLst/>
+          </a:prstGeom>
+          <a:effectLst/>
+        </p:spPr>
+        <p:style>
+          <a:lnRef idx="2">
+            <a:schemeClr val="accent1"/>
+          </a:lnRef>
+          <a:fillRef idx="1">
+            <a:schemeClr val="lt1"/>
+          </a:fillRef>
+          <a:effectRef idx="0">
+            <a:schemeClr val="accent1"/>
+          </a:effectRef>
+          <a:fontRef idx="minor">
+            <a:schemeClr val="dk1"/>
+          </a:fontRef>
+        </p:style>
+        <p:txBody>
+          <a:bodyPr rtlCol="0" anchor="ctr"/>
+          <a:lstStyle/>
+          <a:p>
+            <a:pPr algn="ctr"/>
+            <a:endParaRPr lang="es-CL"/>
+          </a:p>
+        </p:txBody>
+      </p:sp>
+      <p:sp>
+        <p:nvSpPr>
+          <p:cNvPr id="9" name="Flecha: a la derecha 8">
+            <a:extLst>
+              <a:ext uri="{FF2B5EF4-FFF2-40B4-BE49-F238E27FC236}">
+                <a16:creationId xmlns:a16="http://schemas.microsoft.com/office/drawing/2014/main" id="{F56BED41-0F92-46C3-AD7C-726AC7B2ECB2}"/>
+              </a:ext>
+            </a:extLst>
+          </p:cNvPr>
+          <p:cNvSpPr/>
+          <p:nvPr/>
+        </p:nvSpPr>
+        <p:spPr>
+          <a:xfrm rot="5400000">
+            <a:off x="6539948" y="3554779"/>
+            <a:ext cx="606286" cy="745234"/>
+          </a:xfrm>
+          <a:prstGeom prst="rightArrow">
+            <a:avLst/>
+          </a:prstGeom>
+          <a:effectLst/>
+        </p:spPr>
+        <p:style>
+          <a:lnRef idx="2">
+            <a:schemeClr val="accent1"/>
+          </a:lnRef>
+          <a:fillRef idx="1">
+            <a:schemeClr val="lt1"/>
+          </a:fillRef>
+          <a:effectRef idx="0">
+            <a:schemeClr val="accent1"/>
+          </a:effectRef>
+          <a:fontRef idx="minor">
+            <a:schemeClr val="dk1"/>
+          </a:fontRef>
+        </p:style>
+        <p:txBody>
+          <a:bodyPr rtlCol="0" anchor="ctr"/>
+          <a:lstStyle/>
+          <a:p>
+            <a:pPr algn="ctr"/>
+            <a:endParaRPr lang="es-CL"/>
+          </a:p>
+        </p:txBody>
+      </p:sp>
+    </p:spTree>
+    <p:extLst>
+      <p:ext uri="{BB962C8B-B14F-4D97-AF65-F5344CB8AC3E}">
+        <p14:creationId xmlns:p14="http://schemas.microsoft.com/office/powerpoint/2010/main" val="2744671481"/>
+      </p:ext>
+    </p:extLst>
+  </p:cSld>
+  <p:clrMapOvr>
+    <a:masterClrMapping/>
+  </p:clrMapOvr>
+  <p:timing>
+    <p:tnLst>
+      <p:par>
+        <p:cTn id="1" dur="indefinite" restart="never" nodeType="tmRoot">
+          <p:childTnLst>
+            <p:seq concurrent="1" nextAc="seek">
+              <p:cTn id="2" dur="indefinite" nodeType="mainSeq">
+                <p:childTnLst>
+                  <p:par>
+                    <p:cTn id="3" fill="hold">
+                      <p:stCondLst>
+                        <p:cond delay="indefinite"/>
+                      </p:stCondLst>
+                      <p:childTnLst>
+                        <p:par>
+                          <p:cTn id="4" fill="hold">
+                            <p:stCondLst>
+                              <p:cond delay="0"/>
+                            </p:stCondLst>
+                            <p:childTnLst>
+                              <p:par>
+                                <p:cTn id="5" presetID="1" presetClass="entr" presetSubtype="0" fill="hold" grpId="0" nodeType="clickEffect">
+                                  <p:stCondLst>
+                                    <p:cond delay="0"/>
+                                  </p:stCondLst>
+                                  <p:childTnLst>
+                                    <p:set>
+                                      <p:cBhvr>
+                                        <p:cTn id="6" dur="1" fill="hold">
+                                          <p:stCondLst>
+                                            <p:cond delay="0"/>
+                                          </p:stCondLst>
+                                        </p:cTn>
+                                        <p:tgtEl>
+                                          <p:spTgt spid="8"/>
+                                        </p:tgtEl>
+                                        <p:attrNameLst>
+                                          <p:attrName>style.visibility</p:attrName>
+                                        </p:attrNameLst>
+                                      </p:cBhvr>
+                                      <p:to>
+                                        <p:strVal val="visible"/>
+                                      </p:to>
+                                    </p:set>
+                                  </p:childTnLst>
+                                </p:cTn>
+                              </p:par>
+                              <p:par>
+                                <p:cTn id="7" presetID="1" presetClass="entr" presetSubtype="0" fill="hold" grpId="0" nodeType="withEffect">
+                                  <p:stCondLst>
+                                    <p:cond delay="0"/>
+                                  </p:stCondLst>
+                                  <p:childTnLst>
+                                    <p:set>
+                                      <p:cBhvr>
+                                        <p:cTn id="8" dur="1" fill="hold">
+                                          <p:stCondLst>
+                                            <p:cond delay="0"/>
+                                          </p:stCondLst>
+                                        </p:cTn>
+                                        <p:tgtEl>
+                                          <p:spTgt spid="6"/>
+                                        </p:tgtEl>
+                                        <p:attrNameLst>
+                                          <p:attrName>style.visibility</p:attrName>
+                                        </p:attrNameLst>
+                                      </p:cBhvr>
+                                      <p:to>
+                                        <p:strVal val="visible"/>
+                                      </p:to>
+                                    </p:set>
+                                  </p:childTnLst>
+                                </p:cTn>
+                              </p:par>
+                            </p:childTnLst>
+                          </p:cTn>
+                        </p:par>
+                      </p:childTnLst>
+                    </p:cTn>
+                  </p:par>
+                  <p:par>
+                    <p:cTn id="9" fill="hold">
+                      <p:stCondLst>
+                        <p:cond delay="indefinite"/>
+                      </p:stCondLst>
+                      <p:childTnLst>
+                        <p:par>
+                          <p:cTn id="10" fill="hold">
+                            <p:stCondLst>
+                              <p:cond delay="0"/>
+                            </p:stCondLst>
+                            <p:childTnLst>
+                              <p:par>
+                                <p:cTn id="11" presetID="1" presetClass="entr" presetSubtype="0" fill="hold" grpId="0" nodeType="clickEffect">
+                                  <p:stCondLst>
+                                    <p:cond delay="0"/>
+                                  </p:stCondLst>
+                                  <p:childTnLst>
+                                    <p:set>
+                                      <p:cBhvr>
+                                        <p:cTn id="12" dur="1" fill="hold">
+                                          <p:stCondLst>
+                                            <p:cond delay="0"/>
+                                          </p:stCondLst>
+                                        </p:cTn>
+                                        <p:tgtEl>
+                                          <p:spTgt spid="9"/>
+                                        </p:tgtEl>
+                                        <p:attrNameLst>
+                                          <p:attrName>style.visibility</p:attrName>
+                                        </p:attrNameLst>
+                                      </p:cBhvr>
+                                      <p:to>
+                                        <p:strVal val="visible"/>
+                                      </p:to>
+                                    </p:set>
+                                  </p:childTnLst>
+                                </p:cTn>
+                              </p:par>
+                              <p:par>
+                                <p:cTn id="13" presetID="1" presetClass="entr" presetSubtype="0" fill="hold" grpId="0" nodeType="withEffect">
+                                  <p:stCondLst>
+                                    <p:cond delay="0"/>
+                                  </p:stCondLst>
+                                  <p:childTnLst>
+                                    <p:set>
+                                      <p:cBhvr>
+                                        <p:cTn id="14" dur="1" fill="hold">
+                                          <p:stCondLst>
+                                            <p:cond delay="0"/>
+                                          </p:stCondLst>
+                                        </p:cTn>
+                                        <p:tgtEl>
+                                          <p:spTgt spid="7"/>
+                                        </p:tgtEl>
+                                        <p:attrNameLst>
+                                          <p:attrName>style.visibility</p:attrName>
+                                        </p:attrNameLst>
+                                      </p:cBhvr>
+                                      <p:to>
+                                        <p:strVal val="visible"/>
+                                      </p:to>
+                                    </p:set>
+                                  </p:childTnLst>
+                                </p:cTn>
+                              </p:par>
+                            </p:childTnLst>
+                          </p:cTn>
+                        </p:par>
+                      </p:childTnLst>
+                    </p:cTn>
+                  </p:par>
+                </p:childTnLst>
+              </p:cTn>
+              <p:prevCondLst>
+                <p:cond evt="onPrev" delay="0">
+                  <p:tgtEl>
+                    <p:sldTgt/>
+                  </p:tgtEl>
+                </p:cond>
+              </p:prevCondLst>
+              <p:nextCondLst>
+                <p:cond evt="onNext" delay="0">
+                  <p:tgtEl>
+                    <p:sldTgt/>
+                  </p:tgtEl>
+                </p:cond>
+              </p:nextCondLst>
+            </p:seq>
+          </p:childTnLst>
+        </p:cTn>
+      </p:par>
+    </p:tnLst>
+    <p:bldLst>
+      <p:bldP spid="6" grpId="0" animBg="1"/>
+      <p:bldP spid="7" grpId="0" animBg="1"/>
+      <p:bldP spid="8" grpId="0" animBg="1"/>
+      <p:bldP spid="9" grpId="0" animBg="1"/>
+    </p:bldLst>
+  </p:timing>
+</p:sld>
+</file>
+
+<file path=ppt/slides/slide13.xml><?xml version="1.0" encoding="utf-8"?>
+<p:sld xmlns:a="http://schemas.openxmlformats.org/drawingml/2006/main" xmlns:r="http://schemas.openxmlformats.org/officeDocument/2006/relationships" xmlns:p="http://schemas.openxmlformats.org/presentationml/2006/main">
+  <p:cSld>
+    <p:spTree>
+      <p:nvGrpSpPr>
+        <p:cNvPr id="1" name=""/>
+        <p:cNvGrpSpPr/>
+        <p:nvPr/>
+      </p:nvGrpSpPr>
+      <p:grpSpPr>
+        <a:xfrm>
+          <a:off x="0" y="0"/>
+          <a:ext cx="0" cy="0"/>
+          <a:chOff x="0" y="0"/>
+          <a:chExt cx="0" cy="0"/>
+        </a:xfrm>
+      </p:grpSpPr>
+      <p:sp>
+        <p:nvSpPr>
+          <p:cNvPr id="2" name="Título 1">
+            <a:extLst>
+              <a:ext uri="{FF2B5EF4-FFF2-40B4-BE49-F238E27FC236}">
+                <a16:creationId xmlns:a16="http://schemas.microsoft.com/office/drawing/2014/main" id="{9CCF9805-D1CE-4FA9-8395-999F57BAFB90}"/>
+              </a:ext>
+            </a:extLst>
+          </p:cNvPr>
+          <p:cNvSpPr>
+            <a:spLocks noGrp="1"/>
+          </p:cNvSpPr>
+          <p:nvPr>
+            <p:ph type="title"/>
+          </p:nvPr>
+        </p:nvSpPr>
+        <p:spPr/>
+        <p:txBody>
+          <a:bodyPr/>
+          <a:lstStyle/>
+          <a:p>
+            <a:r>
+              <a:rPr lang="es-CL" dirty="0"/>
+              <a:t>Conclusión General</a:t>
+            </a:r>
+          </a:p>
+        </p:txBody>
+      </p:sp>
+      <p:sp>
+        <p:nvSpPr>
+          <p:cNvPr id="4" name="Flecha: pentágono 3">
+            <a:extLst>
+              <a:ext uri="{FF2B5EF4-FFF2-40B4-BE49-F238E27FC236}">
+                <a16:creationId xmlns:a16="http://schemas.microsoft.com/office/drawing/2014/main" id="{D00E8A3A-5868-4159-A33C-4E613D5CA89B}"/>
+              </a:ext>
+            </a:extLst>
+          </p:cNvPr>
+          <p:cNvSpPr/>
+          <p:nvPr/>
+        </p:nvSpPr>
+        <p:spPr>
+          <a:xfrm>
+            <a:off x="0" y="11393"/>
+            <a:ext cx="2801062" cy="493432"/>
+          </a:xfrm>
+          <a:prstGeom prst="homePlate">
+            <a:avLst/>
+          </a:prstGeom>
+        </p:spPr>
+        <p:style>
+          <a:lnRef idx="1">
+            <a:schemeClr val="accent1"/>
+          </a:lnRef>
+          <a:fillRef idx="3">
+            <a:schemeClr val="accent1"/>
+          </a:fillRef>
+          <a:effectRef idx="2">
+            <a:schemeClr val="accent1"/>
+          </a:effectRef>
+          <a:fontRef idx="minor">
+            <a:schemeClr val="lt1"/>
+          </a:fontRef>
+        </p:style>
+        <p:txBody>
+          <a:bodyPr rtlCol="0" anchor="ctr"/>
+          <a:lstStyle/>
+          <a:p>
+            <a:pPr algn="ctr"/>
+            <a:r>
+              <a:rPr lang="es-CL" dirty="0"/>
+              <a:t>Conclusiones</a:t>
+            </a:r>
+          </a:p>
+        </p:txBody>
+      </p:sp>
+      <p:sp>
+        <p:nvSpPr>
+          <p:cNvPr id="5" name="Rectángulo: esquinas redondeadas 4">
+            <a:extLst>
+              <a:ext uri="{FF2B5EF4-FFF2-40B4-BE49-F238E27FC236}">
+                <a16:creationId xmlns:a16="http://schemas.microsoft.com/office/drawing/2014/main" id="{AF984D5F-A2D1-40F7-8C89-C6586B12503B}"/>
+              </a:ext>
+            </a:extLst>
+          </p:cNvPr>
+          <p:cNvSpPr/>
+          <p:nvPr/>
+        </p:nvSpPr>
+        <p:spPr>
+          <a:xfrm>
+            <a:off x="1022901" y="1630037"/>
+            <a:ext cx="6213614" cy="1441817"/>
+          </a:xfrm>
+          <a:prstGeom prst="roundRect">
+            <a:avLst/>
+          </a:prstGeom>
+          <a:effectLst>
+            <a:outerShdw blurRad="254000" dist="38100" algn="l" rotWithShape="0">
+              <a:prstClr val="black">
+                <a:alpha val="40000"/>
+              </a:prstClr>
+            </a:outerShdw>
+          </a:effectLst>
+        </p:spPr>
+        <p:style>
+          <a:lnRef idx="2">
+            <a:schemeClr val="accent1"/>
+          </a:lnRef>
+          <a:fillRef idx="1">
+            <a:schemeClr val="lt1"/>
+          </a:fillRef>
+          <a:effectRef idx="0">
+            <a:schemeClr val="accent1"/>
+          </a:effectRef>
+          <a:fontRef idx="minor">
+            <a:schemeClr val="dk1"/>
+          </a:fontRef>
+        </p:style>
+        <p:txBody>
+          <a:bodyPr rot="0" spcFirstLastPara="0" vertOverflow="overflow" horzOverflow="overflow" vert="horz" wrap="square" lIns="91440" tIns="45720" rIns="91440" bIns="45720" numCol="1" spcCol="0" rtlCol="0" fromWordArt="0" anchor="ctr" anchorCtr="0" forceAA="0" compatLnSpc="1">
+            <a:prstTxWarp prst="textNoShape">
+              <a:avLst/>
+            </a:prstTxWarp>
+            <a:noAutofit/>
+          </a:bodyPr>
+          <a:lstStyle/>
+          <a:p>
+            <a:pPr algn="ctr"/>
+            <a:r>
+              <a:rPr lang="es-CL" sz="2400" dirty="0">
+                <a:ln w="0"/>
+                <a:solidFill>
+                  <a:schemeClr val="tx1"/>
+                </a:solidFill>
+                <a:effectLst>
+                  <a:outerShdw blurRad="50800" dist="38100" algn="l" rotWithShape="0">
+                    <a:prstClr val="black">
+                      <a:alpha val="40000"/>
+                    </a:prstClr>
+                  </a:outerShdw>
+                </a:effectLst>
+              </a:rPr>
+              <a:t>Elaborar un manual de buenas prácticas para el desarrollo de proyectos informáticos en ZOFRI S.A.</a:t>
+            </a:r>
+          </a:p>
+        </p:txBody>
+      </p:sp>
+      <p:sp>
+        <p:nvSpPr>
+          <p:cNvPr id="6" name="Rectángulo: esquinas redondeadas 5">
+            <a:extLst>
+              <a:ext uri="{FF2B5EF4-FFF2-40B4-BE49-F238E27FC236}">
+                <a16:creationId xmlns:a16="http://schemas.microsoft.com/office/drawing/2014/main" id="{991D95A8-A708-40E3-BA44-524899660B04}"/>
+              </a:ext>
+            </a:extLst>
+          </p:cNvPr>
+          <p:cNvSpPr/>
+          <p:nvPr/>
+        </p:nvSpPr>
+        <p:spPr>
+          <a:xfrm>
+            <a:off x="1550503" y="4500440"/>
+            <a:ext cx="5158409" cy="1278702"/>
+          </a:xfrm>
+          <a:prstGeom prst="roundRect">
+            <a:avLst/>
+          </a:prstGeom>
+          <a:effectLst>
+            <a:outerShdw blurRad="254000" dist="38100" algn="l" rotWithShape="0">
+              <a:prstClr val="black">
+                <a:alpha val="40000"/>
+              </a:prstClr>
+            </a:outerShdw>
+          </a:effectLst>
+        </p:spPr>
+        <p:style>
+          <a:lnRef idx="2">
+            <a:schemeClr val="accent5"/>
+          </a:lnRef>
+          <a:fillRef idx="1">
+            <a:schemeClr val="lt1"/>
+          </a:fillRef>
+          <a:effectRef idx="0">
+            <a:schemeClr val="accent5"/>
+          </a:effectRef>
+          <a:fontRef idx="minor">
+            <a:schemeClr val="dk1"/>
+          </a:fontRef>
+        </p:style>
+        <p:txBody>
+          <a:bodyPr rot="0" spcFirstLastPara="0" vertOverflow="overflow" horzOverflow="overflow" vert="horz" wrap="square" lIns="91440" tIns="45720" rIns="91440" bIns="45720" numCol="1" spcCol="0" rtlCol="0" fromWordArt="0" anchor="ctr" anchorCtr="0" forceAA="0" compatLnSpc="1">
+            <a:prstTxWarp prst="textNoShape">
+              <a:avLst/>
+            </a:prstTxWarp>
+            <a:noAutofit/>
+          </a:bodyPr>
+          <a:lstStyle/>
+          <a:p>
+            <a:pPr algn="ctr"/>
+            <a:r>
+              <a:rPr lang="es-CL" sz="2400" dirty="0">
+                <a:ln w="0"/>
+                <a:solidFill>
+                  <a:schemeClr val="tx1"/>
+                </a:solidFill>
+                <a:effectLst>
+                  <a:outerShdw blurRad="50800" dist="38100" algn="l" rotWithShape="0">
+                    <a:prstClr val="black">
+                      <a:alpha val="40000"/>
+                    </a:prstClr>
+                  </a:outerShdw>
+                </a:effectLst>
+              </a:rPr>
+              <a:t>Recibido, Revisado y Validado </a:t>
+            </a:r>
+            <a:r>
+              <a:rPr lang="es-CL" sz="2400" dirty="0" err="1">
+                <a:ln w="0"/>
+                <a:solidFill>
+                  <a:schemeClr val="tx1"/>
+                </a:solidFill>
+                <a:effectLst>
+                  <a:outerShdw blurRad="50800" dist="38100" algn="l" rotWithShape="0">
+                    <a:prstClr val="black">
+                      <a:alpha val="40000"/>
+                    </a:prstClr>
+                  </a:outerShdw>
+                </a:effectLst>
+              </a:rPr>
+              <a:t>integramente</a:t>
+            </a:r>
+            <a:endParaRPr lang="es-CL" sz="2400" dirty="0">
+              <a:ln w="0"/>
+              <a:solidFill>
+                <a:schemeClr val="tx1"/>
+              </a:solidFill>
+              <a:effectLst>
+                <a:outerShdw blurRad="50800" dist="38100" algn="l" rotWithShape="0">
+                  <a:prstClr val="black">
+                    <a:alpha val="40000"/>
+                  </a:prstClr>
+                </a:outerShdw>
+              </a:effectLst>
+            </a:endParaRPr>
+          </a:p>
+        </p:txBody>
+      </p:sp>
+      <p:sp>
+        <p:nvSpPr>
+          <p:cNvPr id="8" name="Flecha: a la derecha 7">
+            <a:extLst>
+              <a:ext uri="{FF2B5EF4-FFF2-40B4-BE49-F238E27FC236}">
+                <a16:creationId xmlns:a16="http://schemas.microsoft.com/office/drawing/2014/main" id="{6BC2FF41-4305-489F-A368-174837FFA75F}"/>
+              </a:ext>
+            </a:extLst>
+          </p:cNvPr>
+          <p:cNvSpPr/>
+          <p:nvPr/>
+        </p:nvSpPr>
+        <p:spPr>
+          <a:xfrm rot="5400000">
+            <a:off x="3826565" y="3413530"/>
+            <a:ext cx="606286" cy="745234"/>
+          </a:xfrm>
+          <a:prstGeom prst="rightArrow">
+            <a:avLst/>
+          </a:prstGeom>
+          <a:effectLst/>
+        </p:spPr>
+        <p:style>
+          <a:lnRef idx="2">
+            <a:schemeClr val="accent1"/>
+          </a:lnRef>
+          <a:fillRef idx="1">
+            <a:schemeClr val="lt1"/>
+          </a:fillRef>
+          <a:effectRef idx="0">
+            <a:schemeClr val="accent1"/>
+          </a:effectRef>
+          <a:fontRef idx="minor">
+            <a:schemeClr val="dk1"/>
+          </a:fontRef>
+        </p:style>
+        <p:txBody>
+          <a:bodyPr rtlCol="0" anchor="ctr"/>
+          <a:lstStyle/>
+          <a:p>
+            <a:pPr algn="ctr"/>
+            <a:endParaRPr lang="es-CL"/>
+          </a:p>
+        </p:txBody>
+      </p:sp>
+      <p:pic>
+        <p:nvPicPr>
+          <p:cNvPr id="14" name="Imagen 13">
+            <a:extLst>
+              <a:ext uri="{FF2B5EF4-FFF2-40B4-BE49-F238E27FC236}">
+                <a16:creationId xmlns:a16="http://schemas.microsoft.com/office/drawing/2014/main" id="{78C165D4-3F4E-4BB8-9BFA-8EDC3438E036}"/>
+              </a:ext>
+            </a:extLst>
+          </p:cNvPr>
+          <p:cNvPicPr>
+            <a:picLocks noChangeAspect="1"/>
+          </p:cNvPicPr>
+          <p:nvPr/>
+        </p:nvPicPr>
+        <p:blipFill>
+          <a:blip r:embed="rId2">
+            <a:extLst>
+              <a:ext uri="{28A0092B-C50C-407E-A947-70E740481C1C}">
+                <a14:useLocalDpi xmlns:a14="http://schemas.microsoft.com/office/drawing/2010/main" val="0"/>
+              </a:ext>
+            </a:extLst>
+          </a:blip>
+          <a:stretch>
+            <a:fillRect/>
+          </a:stretch>
+        </p:blipFill>
+        <p:spPr>
+          <a:xfrm>
+            <a:off x="7881731" y="1386860"/>
+            <a:ext cx="3954118" cy="5337065"/>
+          </a:xfrm>
+          <a:prstGeom prst="rect">
+            <a:avLst/>
+          </a:prstGeom>
+          <a:ln>
+            <a:solidFill>
+              <a:schemeClr val="accent1"/>
+            </a:solidFill>
+          </a:ln>
+        </p:spPr>
+      </p:pic>
+    </p:spTree>
+    <p:extLst>
+      <p:ext uri="{BB962C8B-B14F-4D97-AF65-F5344CB8AC3E}">
+        <p14:creationId xmlns:p14="http://schemas.microsoft.com/office/powerpoint/2010/main" val="1017915229"/>
+      </p:ext>
+    </p:extLst>
+  </p:cSld>
+  <p:clrMapOvr>
+    <a:masterClrMapping/>
+  </p:clrMapOvr>
+  <p:timing>
+    <p:tnLst>
+      <p:par>
+        <p:cTn id="1" dur="indefinite" restart="never" nodeType="tmRoot">
+          <p:childTnLst>
+            <p:seq concurrent="1" nextAc="seek">
+              <p:cTn id="2" dur="indefinite" nodeType="mainSeq">
+                <p:childTnLst>
+                  <p:par>
+                    <p:cTn id="3" fill="hold">
+                      <p:stCondLst>
+                        <p:cond delay="indefinite"/>
+                      </p:stCondLst>
+                      <p:childTnLst>
+                        <p:par>
+                          <p:cTn id="4" fill="hold">
+                            <p:stCondLst>
+                              <p:cond delay="0"/>
+                            </p:stCondLst>
+                            <p:childTnLst>
+                              <p:par>
+                                <p:cTn id="5" presetID="1" presetClass="entr" presetSubtype="0" fill="hold" grpId="0" nodeType="clickEffect">
+                                  <p:stCondLst>
+                                    <p:cond delay="0"/>
+                                  </p:stCondLst>
+                                  <p:childTnLst>
+                                    <p:set>
+                                      <p:cBhvr>
+                                        <p:cTn id="6" dur="1" fill="hold">
+                                          <p:stCondLst>
+                                            <p:cond delay="0"/>
+                                          </p:stCondLst>
+                                        </p:cTn>
+                                        <p:tgtEl>
+                                          <p:spTgt spid="8"/>
+                                        </p:tgtEl>
+                                        <p:attrNameLst>
+                                          <p:attrName>style.visibility</p:attrName>
+                                        </p:attrNameLst>
+                                      </p:cBhvr>
+                                      <p:to>
+                                        <p:strVal val="visible"/>
+                                      </p:to>
+                                    </p:set>
+                                  </p:childTnLst>
+                                </p:cTn>
+                              </p:par>
+                              <p:par>
+                                <p:cTn id="7" presetID="1" presetClass="entr" presetSubtype="0" fill="hold" grpId="0" nodeType="withEffect">
+                                  <p:stCondLst>
+                                    <p:cond delay="0"/>
+                                  </p:stCondLst>
+                                  <p:childTnLst>
+                                    <p:set>
+                                      <p:cBhvr>
+                                        <p:cTn id="8" dur="1" fill="hold">
+                                          <p:stCondLst>
+                                            <p:cond delay="0"/>
+                                          </p:stCondLst>
+                                        </p:cTn>
+                                        <p:tgtEl>
+                                          <p:spTgt spid="6"/>
+                                        </p:tgtEl>
+                                        <p:attrNameLst>
+                                          <p:attrName>style.visibility</p:attrName>
+                                        </p:attrNameLst>
+                                      </p:cBhvr>
+                                      <p:to>
+                                        <p:strVal val="visible"/>
+                                      </p:to>
+                                    </p:set>
+                                  </p:childTnLst>
+                                </p:cTn>
+                              </p:par>
+                            </p:childTnLst>
+                          </p:cTn>
+                        </p:par>
+                      </p:childTnLst>
+                    </p:cTn>
+                  </p:par>
+                  <p:par>
+                    <p:cTn id="9" fill="hold">
+                      <p:stCondLst>
+                        <p:cond delay="indefinite"/>
+                      </p:stCondLst>
+                      <p:childTnLst>
+                        <p:par>
+                          <p:cTn id="10" fill="hold">
+                            <p:stCondLst>
+                              <p:cond delay="0"/>
+                            </p:stCondLst>
+                            <p:childTnLst>
+                              <p:par>
+                                <p:cTn id="11" presetID="53" presetClass="entr" presetSubtype="16" fill="hold" nodeType="clickEffect">
+                                  <p:stCondLst>
+                                    <p:cond delay="0"/>
+                                  </p:stCondLst>
+                                  <p:childTnLst>
+                                    <p:set>
+                                      <p:cBhvr>
+                                        <p:cTn id="12" dur="1" fill="hold">
+                                          <p:stCondLst>
+                                            <p:cond delay="0"/>
+                                          </p:stCondLst>
+                                        </p:cTn>
+                                        <p:tgtEl>
+                                          <p:spTgt spid="14"/>
+                                        </p:tgtEl>
+                                        <p:attrNameLst>
+                                          <p:attrName>style.visibility</p:attrName>
+                                        </p:attrNameLst>
+                                      </p:cBhvr>
+                                      <p:to>
+                                        <p:strVal val="visible"/>
+                                      </p:to>
+                                    </p:set>
+                                    <p:anim calcmode="lin" valueType="num">
+                                      <p:cBhvr>
+                                        <p:cTn id="13" dur="500" fill="hold"/>
+                                        <p:tgtEl>
+                                          <p:spTgt spid="14"/>
+                                        </p:tgtEl>
+                                        <p:attrNameLst>
+                                          <p:attrName>ppt_w</p:attrName>
+                                        </p:attrNameLst>
+                                      </p:cBhvr>
+                                      <p:tavLst>
+                                        <p:tav tm="0">
+                                          <p:val>
+                                            <p:fltVal val="0"/>
+                                          </p:val>
+                                        </p:tav>
+                                        <p:tav tm="100000">
+                                          <p:val>
+                                            <p:strVal val="#ppt_w"/>
+                                          </p:val>
+                                        </p:tav>
+                                      </p:tavLst>
+                                    </p:anim>
+                                    <p:anim calcmode="lin" valueType="num">
+                                      <p:cBhvr>
+                                        <p:cTn id="14" dur="500" fill="hold"/>
+                                        <p:tgtEl>
+                                          <p:spTgt spid="14"/>
+                                        </p:tgtEl>
+                                        <p:attrNameLst>
+                                          <p:attrName>ppt_h</p:attrName>
+                                        </p:attrNameLst>
+                                      </p:cBhvr>
+                                      <p:tavLst>
+                                        <p:tav tm="0">
+                                          <p:val>
+                                            <p:fltVal val="0"/>
+                                          </p:val>
+                                        </p:tav>
+                                        <p:tav tm="100000">
+                                          <p:val>
+                                            <p:strVal val="#ppt_h"/>
+                                          </p:val>
+                                        </p:tav>
+                                      </p:tavLst>
+                                    </p:anim>
+                                    <p:animEffect transition="in" filter="fade">
+                                      <p:cBhvr>
+                                        <p:cTn id="15" dur="500"/>
+                                        <p:tgtEl>
+                                          <p:spTgt spid="14"/>
+                                        </p:tgtEl>
+                                      </p:cBhvr>
+                                    </p:animEffect>
+                                  </p:childTnLst>
+                                </p:cTn>
+                              </p:par>
+                            </p:childTnLst>
+                          </p:cTn>
+                        </p:par>
+                      </p:childTnLst>
+                    </p:cTn>
+                  </p:par>
+                </p:childTnLst>
+              </p:cTn>
+              <p:prevCondLst>
+                <p:cond evt="onPrev" delay="0">
+                  <p:tgtEl>
+                    <p:sldTgt/>
+                  </p:tgtEl>
+                </p:cond>
+              </p:prevCondLst>
+              <p:nextCondLst>
+                <p:cond evt="onNext" delay="0">
+                  <p:tgtEl>
+                    <p:sldTgt/>
+                  </p:tgtEl>
+                </p:cond>
+              </p:nextCondLst>
+            </p:seq>
+          </p:childTnLst>
+        </p:cTn>
+      </p:par>
+    </p:tnLst>
+    <p:bldLst>
+      <p:bldP spid="6" grpId="0" animBg="1"/>
+      <p:bldP spid="8" grpId="0" animBg="1"/>
+    </p:bldLst>
+  </p:timing>
+</p:sld>
+</file>
+
+<file path=ppt/slides/slide14.xml><?xml version="1.0" encoding="utf-8"?>
+<p:sld xmlns:a="http://schemas.openxmlformats.org/drawingml/2006/main" xmlns:r="http://schemas.openxmlformats.org/officeDocument/2006/relationships" xmlns:p="http://schemas.openxmlformats.org/presentationml/2006/main">
+  <p:cSld>
+    <p:spTree>
+      <p:nvGrpSpPr>
+        <p:cNvPr id="1" name=""/>
+        <p:cNvGrpSpPr/>
+        <p:nvPr/>
+      </p:nvGrpSpPr>
+      <p:grpSpPr>
+        <a:xfrm>
+          <a:off x="0" y="0"/>
+          <a:ext cx="0" cy="0"/>
+          <a:chOff x="0" y="0"/>
+          <a:chExt cx="0" cy="0"/>
+        </a:xfrm>
+      </p:grpSpPr>
+      <p:sp>
+        <p:nvSpPr>
+          <p:cNvPr id="2" name="Título 1">
+            <a:extLst>
+              <a:ext uri="{FF2B5EF4-FFF2-40B4-BE49-F238E27FC236}">
+                <a16:creationId xmlns:a16="http://schemas.microsoft.com/office/drawing/2014/main" id="{9CCF9805-D1CE-4FA9-8395-999F57BAFB90}"/>
+              </a:ext>
+            </a:extLst>
+          </p:cNvPr>
+          <p:cNvSpPr>
+            <a:spLocks noGrp="1"/>
+          </p:cNvSpPr>
+          <p:nvPr>
+            <p:ph type="title"/>
+          </p:nvPr>
+        </p:nvSpPr>
+        <p:spPr/>
+        <p:txBody>
+          <a:bodyPr/>
+          <a:lstStyle/>
+          <a:p>
+            <a:r>
+              <a:rPr lang="es-CL" dirty="0"/>
+              <a:t>Aportes</a:t>
+            </a:r>
+          </a:p>
+        </p:txBody>
+      </p:sp>
+      <p:sp>
+        <p:nvSpPr>
+          <p:cNvPr id="3" name="Marcador de contenido 2">
+            <a:extLst>
+              <a:ext uri="{FF2B5EF4-FFF2-40B4-BE49-F238E27FC236}">
+                <a16:creationId xmlns:a16="http://schemas.microsoft.com/office/drawing/2014/main" id="{96CDBD20-423B-44FB-9B9D-F84A66126AAC}"/>
+              </a:ext>
+            </a:extLst>
+          </p:cNvPr>
+          <p:cNvSpPr>
+            <a:spLocks noGrp="1"/>
+          </p:cNvSpPr>
+          <p:nvPr>
+            <p:ph idx="1"/>
+          </p:nvPr>
+        </p:nvSpPr>
+        <p:spPr/>
+        <p:txBody>
+          <a:bodyPr/>
+          <a:lstStyle/>
+          <a:p>
+            <a:r>
+              <a:rPr lang="es-CL" dirty="0"/>
+              <a:t>&lt;&lt;1&gt;&gt;</a:t>
+            </a:r>
+          </a:p>
+          <a:p>
+            <a:r>
+              <a:rPr lang="es-CL" dirty="0"/>
+              <a:t>&lt;&lt;2&gt;&gt;</a:t>
+            </a:r>
+          </a:p>
+          <a:p>
+            <a:r>
+              <a:rPr lang="es-CL" dirty="0"/>
+              <a:t>&lt;&lt;3&gt;&gt;</a:t>
+            </a:r>
+          </a:p>
+          <a:p>
+            <a:r>
+              <a:rPr lang="es-CL" dirty="0"/>
+              <a:t>&lt;&lt;4&gt;&gt;</a:t>
+            </a:r>
+          </a:p>
+        </p:txBody>
+      </p:sp>
+      <p:sp>
+        <p:nvSpPr>
+          <p:cNvPr id="4" name="Flecha: pentágono 3">
+            <a:extLst>
+              <a:ext uri="{FF2B5EF4-FFF2-40B4-BE49-F238E27FC236}">
+                <a16:creationId xmlns:a16="http://schemas.microsoft.com/office/drawing/2014/main" id="{D00E8A3A-5868-4159-A33C-4E613D5CA89B}"/>
+              </a:ext>
+            </a:extLst>
+          </p:cNvPr>
+          <p:cNvSpPr/>
+          <p:nvPr/>
+        </p:nvSpPr>
+        <p:spPr>
+          <a:xfrm>
+            <a:off x="0" y="11393"/>
+            <a:ext cx="2801062" cy="493432"/>
+          </a:xfrm>
+          <a:prstGeom prst="homePlate">
+            <a:avLst/>
+          </a:prstGeom>
+        </p:spPr>
+        <p:style>
+          <a:lnRef idx="1">
+            <a:schemeClr val="accent1"/>
+          </a:lnRef>
+          <a:fillRef idx="3">
+            <a:schemeClr val="accent1"/>
+          </a:fillRef>
+          <a:effectRef idx="2">
+            <a:schemeClr val="accent1"/>
+          </a:effectRef>
+          <a:fontRef idx="minor">
+            <a:schemeClr val="lt1"/>
+          </a:fontRef>
+        </p:style>
+        <p:txBody>
+          <a:bodyPr rtlCol="0" anchor="ctr"/>
+          <a:lstStyle/>
+          <a:p>
+            <a:pPr algn="ctr"/>
+            <a:r>
+              <a:rPr lang="es-CL" dirty="0"/>
+              <a:t>Conclusiones</a:t>
+            </a:r>
+          </a:p>
+        </p:txBody>
+      </p:sp>
     </p:spTree>
     <p:extLst>
       <p:ext uri="{BB962C8B-B14F-4D97-AF65-F5344CB8AC3E}">
@@ -6798,7 +9098,7 @@
 </p:sld>
 </file>
 
-<file path=ppt/slides/slide12.xml><?xml version="1.0" encoding="utf-8"?>
+<file path=ppt/slides/slide15.xml><?xml version="1.0" encoding="utf-8"?>
 <p:sld xmlns:a="http://schemas.openxmlformats.org/drawingml/2006/main" xmlns:r="http://schemas.openxmlformats.org/officeDocument/2006/relationships" xmlns:p="http://schemas.openxmlformats.org/presentationml/2006/main" showMasterSp="0">
   <p:cSld>
     <p:spTree>

</xml_diff>

<commit_message>
Mejoras en redacción de puntos en la metodología
</commit_message>
<xml_diff>
--- a/2018/TT IQQ 2018 Camara y Garay.pptx
+++ b/2018/TT IQQ 2018 Camara y Garay.pptx
@@ -26228,7 +26228,7 @@
         </p:nvSpPr>
         <p:spPr>
           <a:xfrm>
-            <a:off x="2761422" y="2875629"/>
+            <a:off x="2374480" y="2862056"/>
             <a:ext cx="1147014" cy="316165"/>
           </a:xfrm>
           <a:prstGeom prst="flowChartMerge">
@@ -26285,7 +26285,7 @@
         </p:nvSpPr>
         <p:spPr>
           <a:xfrm>
-            <a:off x="2761421" y="4804889"/>
+            <a:off x="2374480" y="4819451"/>
             <a:ext cx="1147014" cy="316165"/>
           </a:xfrm>
           <a:prstGeom prst="flowChartMerge">
@@ -26423,7 +26423,7 @@
                   <a:schemeClr val="tx1"/>
                 </a:solidFill>
               </a:rPr>
-              <a:t>Factores para ZOFRI S.A.</a:t>
+              <a:t>Factores Críticos para ZOFRI S.A.</a:t>
             </a:r>
           </a:p>
         </p:txBody>
@@ -26495,7 +26495,7 @@
                   <a:schemeClr val="tx1"/>
                 </a:solidFill>
               </a:rPr>
-              <a:t>Diseño Estructura</a:t>
+              <a:t>Diseño de la Estructura</a:t>
             </a:r>
           </a:p>
           <a:p>
@@ -26509,7 +26509,7 @@
                   <a:schemeClr val="tx1"/>
                 </a:solidFill>
               </a:rPr>
-              <a:t>Construcción de Contenidos</a:t>
+              <a:t>Construcción de los Contenidos</a:t>
             </a:r>
           </a:p>
           <a:p>
@@ -26595,7 +26595,7 @@
                   <a:schemeClr val="tx1"/>
                 </a:solidFill>
               </a:rPr>
-              <a:t>Identificación de Actividades</a:t>
+              <a:t>Definición de las actividades</a:t>
             </a:r>
           </a:p>
           <a:p>

</xml_diff>

<commit_message>
Ajustes en tamaños de letras
</commit_message>
<xml_diff>
--- a/2018/TT IQQ 2018 Camara y Garay.pptx
+++ b/2018/TT IQQ 2018 Camara y Garay.pptx
@@ -1057,6 +1057,14 @@
         <a:bodyPr/>
         <a:lstStyle/>
         <a:p>
+          <a:pPr>
+            <a:lnSpc>
+              <a:spcPct val="100000"/>
+            </a:lnSpc>
+            <a:spcAft>
+              <a:spcPts val="0"/>
+            </a:spcAft>
+          </a:pPr>
           <a:r>
             <a:rPr lang="es-CL" sz="2400" dirty="0">
               <a:effectLst>
@@ -1071,6 +1079,14 @@
           </a:r>
         </a:p>
         <a:p>
+          <a:pPr>
+            <a:lnSpc>
+              <a:spcPct val="100000"/>
+            </a:lnSpc>
+            <a:spcAft>
+              <a:spcPts val="0"/>
+            </a:spcAft>
+          </a:pPr>
           <a:r>
             <a:rPr lang="es-CL" sz="2400" dirty="0">
               <a:effectLst>
@@ -1617,13 +1633,13 @@
         <a:p>
           <a:pPr marL="0" lvl="0" indent="0" algn="ctr" defTabSz="1066800">
             <a:lnSpc>
-              <a:spcPct val="90000"/>
+              <a:spcPct val="100000"/>
             </a:lnSpc>
             <a:spcBef>
               <a:spcPct val="0"/>
             </a:spcBef>
             <a:spcAft>
-              <a:spcPct val="35000"/>
+              <a:spcPts val="0"/>
             </a:spcAft>
             <a:buNone/>
           </a:pPr>
@@ -1643,13 +1659,13 @@
         <a:p>
           <a:pPr marL="0" lvl="0" indent="0" algn="ctr" defTabSz="1066800">
             <a:lnSpc>
-              <a:spcPct val="90000"/>
+              <a:spcPct val="100000"/>
             </a:lnSpc>
             <a:spcBef>
               <a:spcPct val="0"/>
             </a:spcBef>
             <a:spcAft>
-              <a:spcPct val="35000"/>
+              <a:spcPts val="0"/>
             </a:spcAft>
             <a:buNone/>
           </a:pPr>
@@ -5924,7 +5940,7 @@
         <p:spPr>
           <a:xfrm>
             <a:off x="498643" y="1252791"/>
-            <a:ext cx="8950157" cy="0"/>
+            <a:ext cx="9009151" cy="0"/>
           </a:xfrm>
           <a:prstGeom prst="line">
             <a:avLst/>
@@ -9378,7 +9394,15 @@
           <a:p>
             <a:pPr algn="ctr"/>
             <a:r>
-              <a:rPr lang="es-CL" dirty="0"/>
+              <a:rPr lang="es-CL" dirty="0">
+                <a:effectLst>
+                  <a:outerShdw blurRad="38100" dist="38100" dir="2700000" algn="tl">
+                    <a:srgbClr val="000000">
+                      <a:alpha val="43137"/>
+                    </a:srgbClr>
+                  </a:outerShdw>
+                </a:effectLst>
+              </a:rPr>
               <a:t>Desarrollo</a:t>
             </a:r>
           </a:p>
@@ -9398,8 +9422,8 @@
         </p:nvSpPr>
         <p:spPr>
           <a:xfrm>
-            <a:off x="495299" y="1417347"/>
-            <a:ext cx="4905376" cy="1293721"/>
+            <a:off x="495298" y="1417347"/>
+            <a:ext cx="5219701" cy="1293721"/>
           </a:xfrm>
           <a:prstGeom prst="rect">
             <a:avLst/>
@@ -9433,7 +9457,7 @@
           <a:p>
             <a:pPr algn="ctr"/>
             <a:r>
-              <a:rPr lang="es-CL" sz="2000" dirty="0">
+              <a:rPr lang="es-CL" sz="2800" dirty="0">
                 <a:effectLst>
                   <a:outerShdw blurRad="50800" dist="38100" algn="l" rotWithShape="0">
                     <a:prstClr val="black">
@@ -9442,7 +9466,22 @@
                   </a:outerShdw>
                 </a:effectLst>
               </a:rPr>
-              <a:t>Identificación de los Factores Críticos</a:t>
+              <a:t>Identificación de los </a:t>
+            </a:r>
+          </a:p>
+          <a:p>
+            <a:pPr algn="ctr"/>
+            <a:r>
+              <a:rPr lang="es-CL" sz="2800" dirty="0">
+                <a:effectLst>
+                  <a:outerShdw blurRad="50800" dist="38100" algn="l" rotWithShape="0">
+                    <a:prstClr val="black">
+                      <a:alpha val="40000"/>
+                    </a:prstClr>
+                  </a:outerShdw>
+                </a:effectLst>
+              </a:rPr>
+              <a:t>Factores Críticos</a:t>
             </a:r>
           </a:p>
         </p:txBody>
@@ -9461,8 +9500,8 @@
         </p:nvSpPr>
         <p:spPr>
           <a:xfrm>
-            <a:off x="495299" y="3322926"/>
-            <a:ext cx="4905376" cy="1302287"/>
+            <a:off x="495298" y="3322926"/>
+            <a:ext cx="5219701" cy="1302287"/>
           </a:xfrm>
           <a:prstGeom prst="rect">
             <a:avLst/>
@@ -9496,7 +9535,7 @@
           <a:p>
             <a:pPr algn="ctr"/>
             <a:r>
-              <a:rPr lang="es-CL" sz="2000" dirty="0">
+              <a:rPr lang="es-CL" sz="2800" dirty="0">
                 <a:effectLst>
                   <a:outerShdw blurRad="50800" dist="38100" algn="l" rotWithShape="0">
                     <a:prstClr val="black">
@@ -9511,7 +9550,7 @@
           <a:p>
             <a:pPr algn="ctr"/>
             <a:r>
-              <a:rPr lang="es-CL" sz="2000" dirty="0">
+              <a:rPr lang="es-CL" sz="2800" dirty="0">
                 <a:effectLst>
                   <a:outerShdw blurRad="50800" dist="38100" algn="l" rotWithShape="0">
                     <a:prstClr val="black">
@@ -9539,8 +9578,8 @@
         </p:nvSpPr>
         <p:spPr>
           <a:xfrm>
-            <a:off x="495299" y="5265759"/>
-            <a:ext cx="4905376" cy="1302287"/>
+            <a:off x="495298" y="5265759"/>
+            <a:ext cx="5219701" cy="1302287"/>
           </a:xfrm>
           <a:prstGeom prst="rect">
             <a:avLst/>
@@ -9574,7 +9613,7 @@
           <a:p>
             <a:pPr algn="ctr"/>
             <a:r>
-              <a:rPr lang="es-CL" sz="2000" dirty="0">
+              <a:rPr lang="es-CL" sz="2800" dirty="0">
                 <a:effectLst>
                   <a:outerShdw blurRad="50800" dist="38100" algn="l" rotWithShape="0">
                     <a:prstClr val="black">
@@ -9589,7 +9628,7 @@
           <a:p>
             <a:pPr algn="ctr"/>
             <a:r>
-              <a:rPr lang="es-CL" sz="2000" dirty="0">
+              <a:rPr lang="es-CL" sz="2800" dirty="0">
                 <a:effectLst>
                   <a:outerShdw blurRad="50800" dist="38100" algn="l" rotWithShape="0">
                     <a:prstClr val="black">
@@ -9617,7 +9656,7 @@
         </p:nvSpPr>
         <p:spPr>
           <a:xfrm>
-            <a:off x="2374480" y="2862056"/>
+            <a:off x="2573263" y="2844571"/>
             <a:ext cx="1147014" cy="316165"/>
           </a:xfrm>
           <a:prstGeom prst="flowChartMerge">
@@ -9674,7 +9713,7 @@
         </p:nvSpPr>
         <p:spPr>
           <a:xfrm>
-            <a:off x="2374480" y="4819451"/>
+            <a:off x="2573263" y="4787403"/>
             <a:ext cx="1147014" cy="316165"/>
           </a:xfrm>
           <a:prstGeom prst="flowChartMerge">
@@ -9731,8 +9770,8 @@
         </p:nvSpPr>
         <p:spPr>
           <a:xfrm>
-            <a:off x="5762625" y="1530807"/>
-            <a:ext cx="3714749" cy="1066800"/>
+            <a:off x="6096002" y="1403293"/>
+            <a:ext cx="4752975" cy="1302287"/>
           </a:xfrm>
           <a:prstGeom prst="roundRect">
             <a:avLst/>
@@ -9779,7 +9818,7 @@
               <a:buChar char="•"/>
             </a:pPr>
             <a:r>
-              <a:rPr lang="es-CL" sz="1600" dirty="0">
+              <a:rPr lang="es-CL" sz="2000" dirty="0">
                 <a:solidFill>
                   <a:schemeClr val="tx1"/>
                 </a:solidFill>
@@ -9793,7 +9832,7 @@
               <a:buChar char="•"/>
             </a:pPr>
             <a:r>
-              <a:rPr lang="es-CL" sz="1600" dirty="0">
+              <a:rPr lang="es-CL" sz="2000" dirty="0">
                 <a:solidFill>
                   <a:schemeClr val="tx1"/>
                 </a:solidFill>
@@ -9807,7 +9846,7 @@
               <a:buChar char="•"/>
             </a:pPr>
             <a:r>
-              <a:rPr lang="es-CL" sz="1600" dirty="0">
+              <a:rPr lang="es-CL" sz="2000" dirty="0">
                 <a:solidFill>
                   <a:schemeClr val="tx1"/>
                 </a:solidFill>
@@ -9831,8 +9870,8 @@
         </p:nvSpPr>
         <p:spPr>
           <a:xfrm>
-            <a:off x="5762624" y="3440669"/>
-            <a:ext cx="3714749" cy="1066800"/>
+            <a:off x="6096001" y="3313155"/>
+            <a:ext cx="4752975" cy="1302287"/>
           </a:xfrm>
           <a:prstGeom prst="roundRect">
             <a:avLst/>
@@ -9879,7 +9918,7 @@
               <a:buChar char="•"/>
             </a:pPr>
             <a:r>
-              <a:rPr lang="es-CL" sz="1600" dirty="0">
+              <a:rPr lang="es-CL" sz="2000" dirty="0">
                 <a:solidFill>
                   <a:schemeClr val="tx1"/>
                 </a:solidFill>
@@ -9893,7 +9932,7 @@
               <a:buChar char="•"/>
             </a:pPr>
             <a:r>
-              <a:rPr lang="es-CL" sz="1600" dirty="0">
+              <a:rPr lang="es-CL" sz="2000" dirty="0">
                 <a:solidFill>
                   <a:schemeClr val="tx1"/>
                 </a:solidFill>
@@ -9907,7 +9946,7 @@
               <a:buChar char="•"/>
             </a:pPr>
             <a:r>
-              <a:rPr lang="es-CL" sz="1600" dirty="0">
+              <a:rPr lang="es-CL" sz="2000" dirty="0">
                 <a:solidFill>
                   <a:schemeClr val="tx1"/>
                 </a:solidFill>
@@ -9931,8 +9970,8 @@
         </p:nvSpPr>
         <p:spPr>
           <a:xfrm>
-            <a:off x="5762623" y="5383502"/>
-            <a:ext cx="3714749" cy="1066800"/>
+            <a:off x="6096000" y="5255988"/>
+            <a:ext cx="4752975" cy="1302287"/>
           </a:xfrm>
           <a:prstGeom prst="roundRect">
             <a:avLst/>
@@ -9979,7 +10018,7 @@
               <a:buChar char="•"/>
             </a:pPr>
             <a:r>
-              <a:rPr lang="es-CL" sz="1600" dirty="0">
+              <a:rPr lang="es-CL" sz="2000" dirty="0">
                 <a:solidFill>
                   <a:schemeClr val="tx1"/>
                 </a:solidFill>
@@ -9993,7 +10032,7 @@
               <a:buChar char="•"/>
             </a:pPr>
             <a:r>
-              <a:rPr lang="es-CL" sz="1600" dirty="0">
+              <a:rPr lang="es-CL" sz="2000" dirty="0">
                 <a:solidFill>
                   <a:schemeClr val="tx1"/>
                 </a:solidFill>
@@ -10363,8 +10402,8 @@
         </p:nvSpPr>
         <p:spPr>
           <a:xfrm>
-            <a:off x="495298" y="4563057"/>
-            <a:ext cx="4258805" cy="557093"/>
+            <a:off x="486056" y="4577961"/>
+            <a:ext cx="4462672" cy="557093"/>
           </a:xfrm>
           <a:prstGeom prst="roundRect">
             <a:avLst/>
@@ -10411,7 +10450,7 @@
           <a:p>
             <a:pPr algn="ctr"/>
             <a:r>
-              <a:rPr lang="es-CL" sz="2000" dirty="0">
+              <a:rPr lang="es-CL" sz="2400" dirty="0">
                 <a:ln w="0"/>
                 <a:solidFill>
                   <a:schemeClr val="tx1"/>
@@ -10443,8 +10482,8 @@
         </p:nvSpPr>
         <p:spPr>
           <a:xfrm>
-            <a:off x="495299" y="5311017"/>
-            <a:ext cx="4258805" cy="557093"/>
+            <a:off x="486057" y="5325921"/>
+            <a:ext cx="4462672" cy="557093"/>
           </a:xfrm>
           <a:prstGeom prst="roundRect">
             <a:avLst/>
@@ -10491,7 +10530,7 @@
           <a:p>
             <a:pPr algn="ctr"/>
             <a:r>
-              <a:rPr lang="es-CL" sz="2000" dirty="0">
+              <a:rPr lang="es-CL" sz="2400" dirty="0">
                 <a:ln w="0"/>
                 <a:solidFill>
                   <a:schemeClr val="tx1"/>
@@ -10523,8 +10562,8 @@
         </p:nvSpPr>
         <p:spPr>
           <a:xfrm>
-            <a:off x="495300" y="6058977"/>
-            <a:ext cx="4258805" cy="557093"/>
+            <a:off x="486058" y="6073881"/>
+            <a:ext cx="4462672" cy="557093"/>
           </a:xfrm>
           <a:prstGeom prst="roundRect">
             <a:avLst/>
@@ -10571,7 +10610,7 @@
           <a:p>
             <a:pPr algn="ctr"/>
             <a:r>
-              <a:rPr lang="es-CL" sz="2000" dirty="0">
+              <a:rPr lang="es-CL" sz="2400" dirty="0">
                 <a:ln w="0"/>
                 <a:solidFill>
                   <a:schemeClr val="tx1"/>
@@ -10603,8 +10642,8 @@
         </p:nvSpPr>
         <p:spPr>
           <a:xfrm>
-            <a:off x="5213189" y="4563056"/>
-            <a:ext cx="4258805" cy="557093"/>
+            <a:off x="5108715" y="4581441"/>
+            <a:ext cx="4462672" cy="557093"/>
           </a:xfrm>
           <a:prstGeom prst="roundRect">
             <a:avLst/>
@@ -10651,7 +10690,7 @@
           <a:p>
             <a:pPr algn="ctr"/>
             <a:r>
-              <a:rPr lang="es-CL" sz="2000" dirty="0">
+              <a:rPr lang="es-CL" sz="2400" dirty="0">
                 <a:ln w="0"/>
                 <a:solidFill>
                   <a:schemeClr val="tx1"/>
@@ -10683,8 +10722,8 @@
         </p:nvSpPr>
         <p:spPr>
           <a:xfrm>
-            <a:off x="5215802" y="5311017"/>
-            <a:ext cx="4258805" cy="557093"/>
+            <a:off x="5108715" y="5316473"/>
+            <a:ext cx="4462672" cy="557093"/>
           </a:xfrm>
           <a:prstGeom prst="roundRect">
             <a:avLst/>
@@ -10731,7 +10770,7 @@
           <a:p>
             <a:pPr algn="ctr"/>
             <a:r>
-              <a:rPr lang="es-CL" sz="2000" dirty="0">
+              <a:rPr lang="es-CL" sz="2400" dirty="0">
                 <a:ln w="0"/>
                 <a:solidFill>
                   <a:schemeClr val="tx1"/>
@@ -10763,8 +10802,8 @@
         </p:nvSpPr>
         <p:spPr>
           <a:xfrm>
-            <a:off x="5213189" y="6058977"/>
-            <a:ext cx="4258805" cy="557093"/>
+            <a:off x="5108715" y="6073881"/>
+            <a:ext cx="4462672" cy="557093"/>
           </a:xfrm>
           <a:prstGeom prst="roundRect">
             <a:avLst/>
@@ -10811,7 +10850,7 @@
           <a:p>
             <a:pPr algn="ctr"/>
             <a:r>
-              <a:rPr lang="es-CL" sz="2000" dirty="0">
+              <a:rPr lang="es-CL" sz="2400" dirty="0">
                 <a:ln w="0"/>
                 <a:solidFill>
                   <a:schemeClr val="tx1"/>
@@ -10843,8 +10882,8 @@
         </p:nvSpPr>
         <p:spPr>
           <a:xfrm>
-            <a:off x="495298" y="1555955"/>
-            <a:ext cx="3937554" cy="1286636"/>
+            <a:off x="495299" y="1555955"/>
+            <a:ext cx="4046187" cy="1286636"/>
           </a:xfrm>
           <a:prstGeom prst="rect">
             <a:avLst/>
@@ -10906,8 +10945,8 @@
         </p:nvSpPr>
         <p:spPr>
           <a:xfrm>
-            <a:off x="5534437" y="1555955"/>
-            <a:ext cx="3937554" cy="1286636"/>
+            <a:off x="5491772" y="1555955"/>
+            <a:ext cx="4046187" cy="1286636"/>
           </a:xfrm>
           <a:prstGeom prst="rect">
             <a:avLst/>
@@ -10984,8 +11023,8 @@
         </p:nvSpPr>
         <p:spPr>
           <a:xfrm>
-            <a:off x="495298" y="3617516"/>
-            <a:ext cx="8976696" cy="754671"/>
+            <a:off x="486057" y="3617516"/>
+            <a:ext cx="9051902" cy="754671"/>
           </a:xfrm>
           <a:prstGeom prst="roundRect">
             <a:avLst/>
@@ -11019,7 +11058,7 @@
           <a:p>
             <a:pPr algn="ctr"/>
             <a:r>
-              <a:rPr lang="es-CL" sz="2400" dirty="0">
+              <a:rPr lang="es-CL" sz="2800" dirty="0">
                 <a:effectLst>
                   <a:outerShdw blurRad="50800" dist="38100" algn="l" rotWithShape="0">
                     <a:prstClr val="black">
@@ -11047,7 +11086,7 @@
         </p:nvSpPr>
         <p:spPr>
           <a:xfrm>
-            <a:off x="3014869" y="3033458"/>
+            <a:off x="3043231" y="3020530"/>
             <a:ext cx="3937553" cy="378284"/>
           </a:xfrm>
           <a:prstGeom prst="flowChartMerge">
@@ -11617,7 +11656,15 @@
           <a:p>
             <a:pPr algn="ctr"/>
             <a:r>
-              <a:rPr lang="es-CL" dirty="0"/>
+              <a:rPr lang="es-CL" dirty="0">
+                <a:effectLst>
+                  <a:outerShdw blurRad="38100" dist="38100" dir="2700000" algn="tl">
+                    <a:srgbClr val="000000">
+                      <a:alpha val="43137"/>
+                    </a:srgbClr>
+                  </a:outerShdw>
+                </a:effectLst>
+              </a:rPr>
               <a:t>Desarrollo</a:t>
             </a:r>
           </a:p>
@@ -11651,8 +11698,8 @@
         </p:blipFill>
         <p:spPr>
           <a:xfrm>
-            <a:off x="6897756" y="1417349"/>
-            <a:ext cx="5073307" cy="5196888"/>
+            <a:off x="6963722" y="1362766"/>
+            <a:ext cx="5073307" cy="5345696"/>
           </a:xfrm>
           <a:prstGeom prst="rect">
             <a:avLst/>
@@ -11685,8 +11732,8 @@
         </p:nvSpPr>
         <p:spPr>
           <a:xfrm>
-            <a:off x="495299" y="1417348"/>
-            <a:ext cx="5915440" cy="672681"/>
+            <a:off x="495298" y="1362766"/>
+            <a:ext cx="6173859" cy="736435"/>
           </a:xfrm>
           <a:prstGeom prst="rect">
             <a:avLst/>
@@ -11720,7 +11767,7 @@
           <a:p>
             <a:pPr algn="ctr"/>
             <a:r>
-              <a:rPr lang="es-CL" sz="2000" dirty="0">
+              <a:rPr lang="es-CL" sz="2400" dirty="0">
                 <a:effectLst>
                   <a:outerShdw blurRad="50800" dist="38100" algn="l" rotWithShape="0">
                     <a:prstClr val="black">
@@ -11748,8 +11795,8 @@
         </p:nvSpPr>
         <p:spPr>
           <a:xfrm>
-            <a:off x="495299" y="2262486"/>
-            <a:ext cx="5915440" cy="672680"/>
+            <a:off x="495299" y="2290934"/>
+            <a:ext cx="6173858" cy="736435"/>
           </a:xfrm>
           <a:prstGeom prst="rect">
             <a:avLst/>
@@ -11783,7 +11830,7 @@
           <a:p>
             <a:pPr algn="ctr"/>
             <a:r>
-              <a:rPr lang="es-CL" sz="2000" dirty="0">
+              <a:rPr lang="es-CL" sz="2400" dirty="0">
                 <a:effectLst>
                   <a:outerShdw blurRad="50800" dist="38100" algn="l" rotWithShape="0">
                     <a:prstClr val="black">
@@ -11811,8 +11858,8 @@
         </p:nvSpPr>
         <p:spPr>
           <a:xfrm>
-            <a:off x="495299" y="5941555"/>
-            <a:ext cx="5915440" cy="672681"/>
+            <a:off x="495299" y="5967961"/>
+            <a:ext cx="6173858" cy="740501"/>
           </a:xfrm>
           <a:prstGeom prst="rect">
             <a:avLst/>
@@ -11846,7 +11893,7 @@
           <a:p>
             <a:pPr algn="ctr"/>
             <a:r>
-              <a:rPr lang="es-CL" sz="2000" dirty="0">
+              <a:rPr lang="es-CL" sz="2400" dirty="0">
                 <a:effectLst>
                   <a:outerShdw blurRad="50800" dist="38100" algn="l" rotWithShape="0">
                     <a:prstClr val="black">
@@ -11875,13 +11922,13 @@
           <p:nvPr>
             <p:extLst>
               <p:ext uri="{D42A27DB-BD31-4B8C-83A1-F6EECF244321}">
-                <p14:modId xmlns:p14="http://schemas.microsoft.com/office/powerpoint/2010/main" val="2586048167"/>
+                <p14:modId xmlns:p14="http://schemas.microsoft.com/office/powerpoint/2010/main" val="4087835923"/>
               </p:ext>
             </p:extLst>
           </p:nvPr>
         </p:nvGraphicFramePr>
         <p:xfrm>
-          <a:off x="495299" y="3103676"/>
+          <a:off x="495299" y="3199725"/>
           <a:ext cx="4285423" cy="2595880"/>
         </p:xfrm>
         <a:graphic>
@@ -12162,7 +12209,7 @@
         </p:nvSpPr>
         <p:spPr>
           <a:xfrm>
-            <a:off x="4969565" y="3834887"/>
+            <a:off x="5227983" y="3890415"/>
             <a:ext cx="1441174" cy="1104860"/>
           </a:xfrm>
           <a:prstGeom prst="roundRect">
@@ -12326,33 +12373,15 @@
                                   </p:childTnLst>
                                 </p:cTn>
                               </p:par>
-                            </p:childTnLst>
-                          </p:cTn>
-                        </p:par>
-                      </p:childTnLst>
-                    </p:cTn>
-                  </p:par>
-                  <p:par>
-                    <p:cTn id="11" fill="hold">
-                      <p:stCondLst>
-                        <p:cond delay="indefinite"/>
-                      </p:stCondLst>
-                      <p:childTnLst>
-                        <p:par>
-                          <p:cTn id="12" fill="hold">
-                            <p:stCondLst>
-                              <p:cond delay="0"/>
-                            </p:stCondLst>
-                            <p:childTnLst>
                               <p:par>
-                                <p:cTn id="13" presetID="1" presetClass="entr" presetSubtype="0" fill="hold" grpId="0" nodeType="clickEffect">
+                                <p:cTn id="11" presetID="1" presetClass="entr" presetSubtype="0" fill="hold" grpId="0" nodeType="withEffect">
                                   <p:stCondLst>
                                     <p:cond delay="0"/>
                                   </p:stCondLst>
                                   <p:childTnLst>
                                     <p:set>
                                       <p:cBhvr>
-                                        <p:cTn id="14" dur="1" fill="hold">
+                                        <p:cTn id="12" dur="1" fill="hold">
                                           <p:stCondLst>
                                             <p:cond delay="0"/>
                                           </p:stCondLst>
@@ -12378,26 +12407,26 @@
                     </p:cTn>
                   </p:par>
                   <p:par>
-                    <p:cTn id="15" fill="hold">
+                    <p:cTn id="13" fill="hold">
                       <p:stCondLst>
                         <p:cond delay="indefinite"/>
                       </p:stCondLst>
                       <p:childTnLst>
                         <p:par>
-                          <p:cTn id="16" fill="hold">
+                          <p:cTn id="14" fill="hold">
                             <p:stCondLst>
                               <p:cond delay="0"/>
                             </p:stCondLst>
                             <p:childTnLst>
                               <p:par>
-                                <p:cTn id="17" presetID="1" presetClass="entr" presetSubtype="0" fill="hold" grpId="0" nodeType="clickEffect">
+                                <p:cTn id="15" presetID="1" presetClass="entr" presetSubtype="0" fill="hold" grpId="0" nodeType="clickEffect">
                                   <p:stCondLst>
                                     <p:cond delay="0"/>
                                   </p:stCondLst>
                                   <p:childTnLst>
                                     <p:set>
                                       <p:cBhvr>
-                                        <p:cTn id="18" dur="1" fill="hold">
+                                        <p:cTn id="16" dur="1" fill="hold">
                                           <p:stCondLst>
                                             <p:cond delay="0"/>
                                           </p:stCondLst>
@@ -12423,26 +12452,26 @@
                     </p:cTn>
                   </p:par>
                   <p:par>
-                    <p:cTn id="19" fill="hold">
+                    <p:cTn id="17" fill="hold">
                       <p:stCondLst>
                         <p:cond delay="indefinite"/>
                       </p:stCondLst>
                       <p:childTnLst>
                         <p:par>
-                          <p:cTn id="20" fill="hold">
+                          <p:cTn id="18" fill="hold">
                             <p:stCondLst>
                               <p:cond delay="0"/>
                             </p:stCondLst>
                             <p:childTnLst>
                               <p:par>
-                                <p:cTn id="21" presetID="10" presetClass="entr" presetSubtype="0" fill="hold" nodeType="clickEffect">
+                                <p:cTn id="19" presetID="10" presetClass="entr" presetSubtype="0" fill="hold" nodeType="clickEffect">
                                   <p:stCondLst>
                                     <p:cond delay="0"/>
                                   </p:stCondLst>
                                   <p:childTnLst>
                                     <p:set>
                                       <p:cBhvr>
-                                        <p:cTn id="22" dur="1" fill="hold">
+                                        <p:cTn id="20" dur="1" fill="hold">
                                           <p:stCondLst>
                                             <p:cond delay="0"/>
                                           </p:stCondLst>
@@ -12460,7 +12489,7 @@
                                     </p:set>
                                     <p:animEffect transition="in" filter="fade">
                                       <p:cBhvr>
-                                        <p:cTn id="23" dur="500"/>
+                                        <p:cTn id="21" dur="500"/>
                                         <p:tgtEl>
                                           <p:spTgt spid="9"/>
                                         </p:tgtEl>
@@ -12591,7 +12620,15 @@
           <a:p>
             <a:pPr algn="ctr"/>
             <a:r>
-              <a:rPr lang="es-CL" dirty="0"/>
+              <a:rPr lang="es-CL" dirty="0">
+                <a:effectLst>
+                  <a:outerShdw blurRad="38100" dist="38100" dir="2700000" algn="tl">
+                    <a:srgbClr val="000000">
+                      <a:alpha val="43137"/>
+                    </a:srgbClr>
+                  </a:outerShdw>
+                </a:effectLst>
+              </a:rPr>
               <a:t>Desarrollo</a:t>
             </a:r>
           </a:p>
@@ -12610,7 +12647,7 @@
           <p:nvPr>
             <p:extLst>
               <p:ext uri="{D42A27DB-BD31-4B8C-83A1-F6EECF244321}">
-                <p14:modId xmlns:p14="http://schemas.microsoft.com/office/powerpoint/2010/main" val="1676812129"/>
+                <p14:modId xmlns:p14="http://schemas.microsoft.com/office/powerpoint/2010/main" val="2455095198"/>
               </p:ext>
             </p:extLst>
           </p:nvPr>
@@ -12834,33 +12871,15 @@
                                   </p:childTnLst>
                                 </p:cTn>
                               </p:par>
-                            </p:childTnLst>
-                          </p:cTn>
-                        </p:par>
-                      </p:childTnLst>
-                    </p:cTn>
-                  </p:par>
-                  <p:par>
-                    <p:cTn id="7" fill="hold">
-                      <p:stCondLst>
-                        <p:cond delay="indefinite"/>
-                      </p:stCondLst>
-                      <p:childTnLst>
-                        <p:par>
-                          <p:cTn id="8" fill="hold">
-                            <p:stCondLst>
-                              <p:cond delay="0"/>
-                            </p:stCondLst>
-                            <p:childTnLst>
                               <p:par>
-                                <p:cTn id="9" presetID="1" presetClass="entr" presetSubtype="0" fill="hold" grpId="0" nodeType="clickEffect">
+                                <p:cTn id="7" presetID="1" presetClass="entr" presetSubtype="0" fill="hold" grpId="0" nodeType="withEffect">
                                   <p:stCondLst>
                                     <p:cond delay="0"/>
                                   </p:stCondLst>
                                   <p:childTnLst>
                                     <p:set>
                                       <p:cBhvr>
-                                        <p:cTn id="10" dur="1" fill="hold">
+                                        <p:cTn id="8" dur="1" fill="hold">
                                           <p:stCondLst>
                                             <p:cond delay="0"/>
                                           </p:stCondLst>
@@ -13000,7 +13019,15 @@
           <a:p>
             <a:pPr algn="ctr"/>
             <a:r>
-              <a:rPr lang="es-CL" dirty="0"/>
+              <a:rPr lang="es-CL" dirty="0">
+                <a:effectLst>
+                  <a:outerShdw blurRad="38100" dist="38100" dir="2700000" algn="tl">
+                    <a:srgbClr val="000000">
+                      <a:alpha val="43137"/>
+                    </a:srgbClr>
+                  </a:outerShdw>
+                </a:effectLst>
+              </a:rPr>
               <a:t>Conclusiones</a:t>
             </a:r>
           </a:p>
@@ -13680,7 +13707,15 @@
           <a:p>
             <a:pPr algn="ctr"/>
             <a:r>
-              <a:rPr lang="es-CL" dirty="0"/>
+              <a:rPr lang="es-CL" dirty="0">
+                <a:effectLst>
+                  <a:outerShdw blurRad="38100" dist="38100" dir="2700000" algn="tl">
+                    <a:srgbClr val="000000">
+                      <a:alpha val="43137"/>
+                    </a:srgbClr>
+                  </a:outerShdw>
+                </a:effectLst>
+              </a:rPr>
               <a:t>Conclusiones</a:t>
             </a:r>
           </a:p>
@@ -14333,7 +14368,15 @@
           <a:p>
             <a:pPr algn="ctr"/>
             <a:r>
-              <a:rPr lang="es-CL" dirty="0"/>
+              <a:rPr lang="es-CL" dirty="0">
+                <a:effectLst>
+                  <a:outerShdw blurRad="38100" dist="38100" dir="2700000" algn="tl">
+                    <a:srgbClr val="000000">
+                      <a:alpha val="43137"/>
+                    </a:srgbClr>
+                  </a:outerShdw>
+                </a:effectLst>
+              </a:rPr>
               <a:t>Conclusiones</a:t>
             </a:r>
           </a:p>
@@ -15024,7 +15067,15 @@
           <a:p>
             <a:pPr algn="ctr"/>
             <a:r>
-              <a:rPr lang="es-CL" dirty="0"/>
+              <a:rPr lang="es-CL" dirty="0">
+                <a:effectLst>
+                  <a:outerShdw blurRad="38100" dist="38100" dir="2700000" algn="tl">
+                    <a:srgbClr val="000000">
+                      <a:alpha val="43137"/>
+                    </a:srgbClr>
+                  </a:outerShdw>
+                </a:effectLst>
+              </a:rPr>
               <a:t>Conclusiones</a:t>
             </a:r>
           </a:p>
@@ -15545,7 +15596,15 @@
           <a:p>
             <a:pPr algn="ctr"/>
             <a:r>
-              <a:rPr lang="es-CL" dirty="0"/>
+              <a:rPr lang="es-CL" dirty="0">
+                <a:effectLst>
+                  <a:outerShdw blurRad="38100" dist="38100" dir="2700000" algn="tl">
+                    <a:srgbClr val="000000">
+                      <a:alpha val="43137"/>
+                    </a:srgbClr>
+                  </a:outerShdw>
+                </a:effectLst>
+              </a:rPr>
               <a:t>Conclusiones</a:t>
             </a:r>
           </a:p>
@@ -16824,7 +16883,15 @@
           <a:p>
             <a:pPr algn="ctr"/>
             <a:r>
-              <a:rPr lang="es-CL" dirty="0"/>
+              <a:rPr lang="es-CL" dirty="0">
+                <a:effectLst>
+                  <a:outerShdw blurRad="38100" dist="38100" dir="2700000" algn="tl">
+                    <a:srgbClr val="000000">
+                      <a:alpha val="43137"/>
+                    </a:srgbClr>
+                  </a:outerShdw>
+                </a:effectLst>
+              </a:rPr>
               <a:t>Objetivos</a:t>
             </a:r>
           </a:p>
@@ -17880,7 +17947,15 @@
           <a:p>
             <a:pPr algn="ctr"/>
             <a:r>
-              <a:rPr lang="es-CL" dirty="0"/>
+              <a:rPr lang="es-CL" dirty="0">
+                <a:effectLst>
+                  <a:outerShdw blurRad="38100" dist="38100" dir="2700000" algn="tl">
+                    <a:srgbClr val="000000">
+                      <a:alpha val="43137"/>
+                    </a:srgbClr>
+                  </a:outerShdw>
+                </a:effectLst>
+              </a:rPr>
               <a:t>Situación Bajo Estudio</a:t>
             </a:r>
           </a:p>
@@ -18158,11 +18233,17 @@
         </p:nvGrpSpPr>
         <p:grpSpPr>
           <a:xfrm>
-            <a:off x="1643933" y="1547747"/>
-            <a:ext cx="6204572" cy="604851"/>
+            <a:off x="1908312" y="1503976"/>
+            <a:ext cx="6361045" cy="720749"/>
             <a:chOff x="2383945" y="97112"/>
             <a:chExt cx="1222651" cy="604851"/>
           </a:xfrm>
+          <a:solidFill>
+            <a:schemeClr val="accent5">
+              <a:lumMod val="40000"/>
+              <a:lumOff val="60000"/>
+            </a:schemeClr>
+          </a:solidFill>
           <a:effectLst>
             <a:outerShdw blurRad="254000" dist="38100" algn="l" rotWithShape="0">
               <a:prstClr val="black">
@@ -18191,6 +18272,7 @@
             <a:prstGeom prst="rect">
               <a:avLst/>
             </a:prstGeom>
+            <a:grpFill/>
           </p:spPr>
           <p:style>
             <a:lnRef idx="0">
@@ -18244,18 +18326,13 @@
           </p:nvSpPr>
           <p:spPr>
             <a:xfrm>
-              <a:off x="2425891" y="97112"/>
-              <a:ext cx="1106827" cy="604851"/>
+              <a:off x="2383945" y="97112"/>
+              <a:ext cx="1222651" cy="604851"/>
             </a:xfrm>
             <a:prstGeom prst="rect">
               <a:avLst/>
             </a:prstGeom>
-            <a:solidFill>
-              <a:schemeClr val="accent5">
-                <a:lumMod val="20000"/>
-                <a:lumOff val="80000"/>
-              </a:schemeClr>
-            </a:solidFill>
+            <a:grpFill/>
             <a:ln>
               <a:noFill/>
             </a:ln>
@@ -18297,7 +18374,7 @@
                 </a:spcAft>
               </a:pPr>
               <a:r>
-                <a:rPr lang="es-ES" sz="1600" kern="1200" dirty="0">
+                <a:rPr lang="es-ES" kern="1200" dirty="0">
                   <a:effectLst>
                     <a:outerShdw blurRad="38100" dist="38100" dir="2700000" algn="tl">
                       <a:srgbClr val="000000">
@@ -18462,11 +18539,17 @@
         </p:nvGrpSpPr>
         <p:grpSpPr>
           <a:xfrm>
-            <a:off x="2664752" y="2388394"/>
-            <a:ext cx="4389745" cy="604851"/>
-            <a:chOff x="3404765" y="937759"/>
-            <a:chExt cx="1352017" cy="604851"/>
+            <a:off x="2932043" y="2311358"/>
+            <a:ext cx="4194316" cy="747781"/>
+            <a:chOff x="3404184" y="937759"/>
+            <a:chExt cx="1374731" cy="604851"/>
           </a:xfrm>
+          <a:solidFill>
+            <a:schemeClr val="accent5">
+              <a:lumMod val="40000"/>
+              <a:lumOff val="60000"/>
+            </a:schemeClr>
+          </a:solidFill>
           <a:effectLst>
             <a:outerShdw blurRad="254000" dist="38100" algn="l" rotWithShape="0">
               <a:prstClr val="black">
@@ -18495,6 +18578,7 @@
             <a:prstGeom prst="rect">
               <a:avLst/>
             </a:prstGeom>
+            <a:grpFill/>
           </p:spPr>
           <p:style>
             <a:lnRef idx="0">
@@ -18548,18 +18632,13 @@
           </p:nvSpPr>
           <p:spPr>
             <a:xfrm>
-              <a:off x="3468911" y="937759"/>
-              <a:ext cx="1075242" cy="604851"/>
+              <a:off x="3404184" y="937759"/>
+              <a:ext cx="1374731" cy="604851"/>
             </a:xfrm>
             <a:prstGeom prst="rect">
               <a:avLst/>
             </a:prstGeom>
-            <a:solidFill>
-              <a:schemeClr val="accent5">
-                <a:lumMod val="20000"/>
-                <a:lumOff val="80000"/>
-              </a:schemeClr>
-            </a:solidFill>
+            <a:grpFill/>
             <a:ln>
               <a:noFill/>
             </a:ln>
@@ -18601,7 +18680,7 @@
                 </a:spcAft>
               </a:pPr>
               <a:r>
-                <a:rPr lang="es-ES" sz="1600" kern="1200" dirty="0">
+                <a:rPr lang="es-ES" kern="1200" dirty="0">
                   <a:effectLst>
                     <a:outerShdw blurRad="38100" dist="38100" dir="2700000" algn="tl">
                       <a:srgbClr val="000000">
@@ -18613,7 +18692,7 @@
                 <a:t>En junio nace </a:t>
               </a:r>
               <a:r>
-                <a:rPr lang="es-ES" sz="1600" kern="1200" dirty="0" err="1">
+                <a:rPr lang="es-ES" kern="1200" dirty="0" err="1">
                   <a:effectLst>
                     <a:outerShdw blurRad="38100" dist="38100" dir="2700000" algn="tl">
                       <a:srgbClr val="000000">
@@ -18625,7 +18704,7 @@
                 <a:t>Zofri</a:t>
               </a:r>
               <a:r>
-                <a:rPr lang="es-ES" sz="1600" kern="1200" dirty="0">
+                <a:rPr lang="es-ES" kern="1200" dirty="0">
                   <a:effectLst>
                     <a:outerShdw blurRad="38100" dist="38100" dir="2700000" algn="tl">
                       <a:srgbClr val="000000">
@@ -18790,11 +18869,17 @@
         </p:nvGrpSpPr>
         <p:grpSpPr>
           <a:xfrm>
-            <a:off x="3550894" y="3229041"/>
-            <a:ext cx="4217973" cy="604851"/>
+            <a:off x="3925956" y="3157668"/>
+            <a:ext cx="4343401" cy="748353"/>
             <a:chOff x="4290908" y="1778406"/>
             <a:chExt cx="1509772" cy="604851"/>
           </a:xfrm>
+          <a:solidFill>
+            <a:schemeClr val="accent5">
+              <a:lumMod val="40000"/>
+              <a:lumOff val="60000"/>
+            </a:schemeClr>
+          </a:solidFill>
           <a:effectLst>
             <a:outerShdw blurRad="254000" dist="38100" algn="l" rotWithShape="0">
               <a:prstClr val="black">
@@ -18818,11 +18903,12 @@
           <p:spPr>
             <a:xfrm>
               <a:off x="4290908" y="1778406"/>
-              <a:ext cx="777579" cy="604851"/>
+              <a:ext cx="1509772" cy="604851"/>
             </a:xfrm>
             <a:prstGeom prst="rect">
               <a:avLst/>
             </a:prstGeom>
+            <a:grpFill/>
           </p:spPr>
           <p:style>
             <a:lnRef idx="0">
@@ -18876,18 +18962,13 @@
           </p:nvSpPr>
           <p:spPr>
             <a:xfrm>
-              <a:off x="4418690" y="1778406"/>
-              <a:ext cx="1381990" cy="604851"/>
+              <a:off x="4290908" y="1778406"/>
+              <a:ext cx="1509772" cy="604851"/>
             </a:xfrm>
             <a:prstGeom prst="rect">
               <a:avLst/>
             </a:prstGeom>
-            <a:solidFill>
-              <a:schemeClr val="accent5">
-                <a:lumMod val="20000"/>
-                <a:lumOff val="80000"/>
-              </a:schemeClr>
-            </a:solidFill>
+            <a:grpFill/>
             <a:ln>
               <a:noFill/>
             </a:ln>
@@ -18929,7 +19010,7 @@
                 </a:spcAft>
               </a:pPr>
               <a:r>
-                <a:rPr lang="es-ES" sz="1600" kern="1200" dirty="0" err="1">
+                <a:rPr lang="es-ES" kern="1200" dirty="0" err="1">
                   <a:effectLst>
                     <a:outerShdw blurRad="38100" dist="38100" dir="2700000" algn="tl">
                       <a:srgbClr val="000000">
@@ -18941,7 +19022,7 @@
                 <a:t>Zofri</a:t>
               </a:r>
               <a:r>
-                <a:rPr lang="es-ES" sz="1600" kern="1200" dirty="0">
+                <a:rPr lang="es-ES" kern="1200" dirty="0">
                   <a:effectLst>
                     <a:outerShdw blurRad="38100" dist="38100" dir="2700000" algn="tl">
                       <a:srgbClr val="000000">
@@ -19118,11 +19199,17 @@
         </p:nvGrpSpPr>
         <p:grpSpPr>
           <a:xfrm>
-            <a:off x="4901847" y="4069689"/>
-            <a:ext cx="4838700" cy="604851"/>
+            <a:off x="4949913" y="3998317"/>
+            <a:ext cx="5426152" cy="741362"/>
             <a:chOff x="5284144" y="2619054"/>
             <a:chExt cx="1032368" cy="604851"/>
           </a:xfrm>
+          <a:solidFill>
+            <a:schemeClr val="accent5">
+              <a:lumMod val="40000"/>
+              <a:lumOff val="60000"/>
+            </a:schemeClr>
+          </a:solidFill>
           <a:effectLst>
             <a:outerShdw blurRad="254000" dist="38100" algn="l" rotWithShape="0">
               <a:prstClr val="black">
@@ -19151,6 +19238,7 @@
             <a:prstGeom prst="rect">
               <a:avLst/>
             </a:prstGeom>
+            <a:grpFill/>
           </p:spPr>
           <p:style>
             <a:lnRef idx="0">
@@ -19210,12 +19298,7 @@
             <a:prstGeom prst="rect">
               <a:avLst/>
             </a:prstGeom>
-            <a:solidFill>
-              <a:schemeClr val="accent5">
-                <a:lumMod val="20000"/>
-                <a:lumOff val="80000"/>
-              </a:schemeClr>
-            </a:solidFill>
+            <a:grpFill/>
             <a:ln>
               <a:noFill/>
             </a:ln>
@@ -19257,7 +19340,7 @@
                 </a:spcAft>
               </a:pPr>
               <a:r>
-                <a:rPr lang="es-ES" sz="1600" kern="1200" dirty="0">
+                <a:rPr lang="es-ES" kern="1200" dirty="0">
                   <a:effectLst>
                     <a:outerShdw blurRad="38100" dist="38100" dir="2700000" algn="tl">
                       <a:srgbClr val="000000">
@@ -19282,7 +19365,7 @@
                 </a:spcAft>
               </a:pPr>
               <a:r>
-                <a:rPr lang="es-ES" sz="1600" kern="1200" dirty="0">
+                <a:rPr lang="es-ES" kern="1200" dirty="0">
                   <a:effectLst>
                     <a:outerShdw blurRad="38100" dist="38100" dir="2700000" algn="tl">
                       <a:srgbClr val="000000">
@@ -19412,11 +19495,17 @@
         </p:nvGrpSpPr>
         <p:grpSpPr>
           <a:xfrm>
-            <a:off x="5537365" y="4910336"/>
-            <a:ext cx="4838700" cy="604851"/>
-            <a:chOff x="6277379" y="3459701"/>
-            <a:chExt cx="777579" cy="604851"/>
+            <a:off x="5903842" y="4831975"/>
+            <a:ext cx="5943601" cy="755341"/>
+            <a:chOff x="6277379" y="3381341"/>
+            <a:chExt cx="777579" cy="683212"/>
           </a:xfrm>
+          <a:solidFill>
+            <a:schemeClr val="accent5">
+              <a:lumMod val="40000"/>
+              <a:lumOff val="60000"/>
+            </a:schemeClr>
+          </a:solidFill>
           <a:effectLst>
             <a:outerShdw blurRad="254000" dist="38100" algn="l" rotWithShape="0">
               <a:prstClr val="black">
@@ -19445,6 +19534,7 @@
             <a:prstGeom prst="rect">
               <a:avLst/>
             </a:prstGeom>
+            <a:grpFill/>
           </p:spPr>
           <p:style>
             <a:lnRef idx="0">
@@ -19498,18 +19588,13 @@
           </p:nvSpPr>
           <p:spPr>
             <a:xfrm>
-              <a:off x="6338225" y="3459701"/>
-              <a:ext cx="700813" cy="604851"/>
+              <a:off x="6277379" y="3381341"/>
+              <a:ext cx="777579" cy="683212"/>
             </a:xfrm>
             <a:prstGeom prst="rect">
               <a:avLst/>
             </a:prstGeom>
-            <a:solidFill>
-              <a:schemeClr val="accent5">
-                <a:lumMod val="20000"/>
-                <a:lumOff val="80000"/>
-              </a:schemeClr>
-            </a:solidFill>
+            <a:grpFill/>
             <a:ln>
               <a:noFill/>
             </a:ln>
@@ -19551,7 +19636,7 @@
                 </a:spcAft>
               </a:pPr>
               <a:r>
-                <a:rPr lang="es-ES" sz="1600" kern="1200" dirty="0">
+                <a:rPr lang="es-ES" kern="1200" dirty="0">
                   <a:effectLst>
                     <a:outerShdw blurRad="38100" dist="38100" dir="2700000" algn="tl">
                       <a:srgbClr val="000000">
@@ -19560,7 +19645,7 @@
                     </a:outerShdw>
                   </a:effectLst>
                 </a:rPr>
-                <a:t>Nace ZOFRI S.A., con un contrato de Concesión con el Estado por 40 años</a:t>
+                <a:t>Nace ZOFRI S.A. con un contrato de Concesión con el Estado por 40 años</a:t>
               </a:r>
             </a:p>
           </p:txBody>
@@ -19728,11 +19813,17 @@
         </p:nvGrpSpPr>
         <p:grpSpPr>
           <a:xfrm>
-            <a:off x="6921147" y="5757217"/>
-            <a:ext cx="3851628" cy="604851"/>
-            <a:chOff x="6277379" y="3459701"/>
-            <a:chExt cx="777579" cy="604851"/>
+            <a:off x="6921147" y="5685845"/>
+            <a:ext cx="4926296" cy="748353"/>
+            <a:chOff x="6277379" y="3388329"/>
+            <a:chExt cx="777579" cy="676223"/>
           </a:xfrm>
+          <a:solidFill>
+            <a:schemeClr val="accent5">
+              <a:lumMod val="40000"/>
+              <a:lumOff val="60000"/>
+            </a:schemeClr>
+          </a:solidFill>
           <a:effectLst>
             <a:outerShdw blurRad="254000" dist="38100" algn="l" rotWithShape="0">
               <a:prstClr val="black">
@@ -19761,6 +19852,7 @@
             <a:prstGeom prst="rect">
               <a:avLst/>
             </a:prstGeom>
+            <a:grpFill/>
           </p:spPr>
           <p:style>
             <a:lnRef idx="0">
@@ -19814,18 +19906,13 @@
           </p:nvSpPr>
           <p:spPr>
             <a:xfrm>
-              <a:off x="6277379" y="3459701"/>
-              <a:ext cx="777579" cy="604851"/>
+              <a:off x="6277379" y="3388329"/>
+              <a:ext cx="777579" cy="676223"/>
             </a:xfrm>
             <a:prstGeom prst="rect">
               <a:avLst/>
             </a:prstGeom>
-            <a:solidFill>
-              <a:schemeClr val="accent5">
-                <a:lumMod val="20000"/>
-                <a:lumOff val="80000"/>
-              </a:schemeClr>
-            </a:solidFill>
+            <a:grpFill/>
             <a:ln>
               <a:noFill/>
             </a:ln>
@@ -19867,7 +19954,7 @@
                 </a:spcAft>
               </a:pPr>
               <a:r>
-                <a:rPr lang="es-ES" sz="1600" kern="1200" dirty="0">
+                <a:rPr lang="es-ES" kern="1200" dirty="0">
                   <a:effectLst>
                     <a:outerShdw blurRad="38100" dist="38100" dir="2700000" algn="tl">
                       <a:srgbClr val="000000">
@@ -19876,7 +19963,32 @@
                     </a:outerShdw>
                   </a:effectLst>
                 </a:rPr>
-                <a:t>Gestiones para extender contrato de Concesión (actual expira en 2030)</a:t>
+                <a:t>Gestiones para extender contrato de </a:t>
+              </a:r>
+            </a:p>
+            <a:p>
+              <a:pPr marL="0" lvl="1" algn="ctr" defTabSz="311150">
+                <a:lnSpc>
+                  <a:spcPct val="90000"/>
+                </a:lnSpc>
+                <a:spcBef>
+                  <a:spcPct val="0"/>
+                </a:spcBef>
+                <a:spcAft>
+                  <a:spcPct val="15000"/>
+                </a:spcAft>
+              </a:pPr>
+              <a:r>
+                <a:rPr lang="es-ES" kern="1200" dirty="0">
+                  <a:effectLst>
+                    <a:outerShdw blurRad="38100" dist="38100" dir="2700000" algn="tl">
+                      <a:srgbClr val="000000">
+                        <a:alpha val="43137"/>
+                      </a:srgbClr>
+                    </a:outerShdw>
+                  </a:effectLst>
+                </a:rPr>
+                <a:t>Concesión (actual expira en 2030)</a:t>
               </a:r>
             </a:p>
           </p:txBody>
@@ -20520,7 +20632,15 @@
           <a:p>
             <a:pPr algn="ctr"/>
             <a:r>
-              <a:rPr lang="es-CL" dirty="0"/>
+              <a:rPr lang="es-CL" dirty="0">
+                <a:effectLst>
+                  <a:outerShdw blurRad="38100" dist="38100" dir="2700000" algn="tl">
+                    <a:srgbClr val="000000">
+                      <a:alpha val="43137"/>
+                    </a:srgbClr>
+                  </a:outerShdw>
+                </a:effectLst>
+              </a:rPr>
               <a:t>Situación Bajo Estudio</a:t>
             </a:r>
           </a:p>
@@ -20880,7 +21000,15 @@
           <a:p>
             <a:pPr algn="ctr"/>
             <a:r>
-              <a:rPr lang="es-CL" dirty="0"/>
+              <a:rPr lang="es-CL" dirty="0">
+                <a:effectLst>
+                  <a:outerShdw blurRad="38100" dist="38100" dir="2700000" algn="tl">
+                    <a:srgbClr val="000000">
+                      <a:alpha val="43137"/>
+                    </a:srgbClr>
+                  </a:outerShdw>
+                </a:effectLst>
+              </a:rPr>
               <a:t>Situación Bajo Estudio</a:t>
             </a:r>
           </a:p>
@@ -22347,7 +22475,15 @@
           <a:p>
             <a:pPr algn="ctr"/>
             <a:r>
-              <a:rPr lang="es-CL" dirty="0"/>
+              <a:rPr lang="es-CL" dirty="0">
+                <a:effectLst>
+                  <a:outerShdw blurRad="38100" dist="38100" dir="2700000" algn="tl">
+                    <a:srgbClr val="000000">
+                      <a:alpha val="43137"/>
+                    </a:srgbClr>
+                  </a:outerShdw>
+                </a:effectLst>
+              </a:rPr>
               <a:t>Situación Bajo Estudio</a:t>
             </a:r>
           </a:p>
@@ -23593,7 +23729,15 @@
           <a:p>
             <a:pPr algn="ctr"/>
             <a:r>
-              <a:rPr lang="es-CL" dirty="0"/>
+              <a:rPr lang="es-CL" dirty="0">
+                <a:effectLst>
+                  <a:outerShdw blurRad="38100" dist="38100" dir="2700000" algn="tl">
+                    <a:srgbClr val="000000">
+                      <a:alpha val="43137"/>
+                    </a:srgbClr>
+                  </a:outerShdw>
+                </a:effectLst>
+              </a:rPr>
               <a:t>Situación Bajo Estudio</a:t>
             </a:r>
           </a:p>
@@ -24297,6 +24441,102 @@
           </p:txBody>
         </p:sp>
       </p:grpSp>
+      <p:sp>
+        <p:nvSpPr>
+          <p:cNvPr id="15" name="Rectángulo 14">
+            <a:extLst>
+              <a:ext uri="{FF2B5EF4-FFF2-40B4-BE49-F238E27FC236}">
+                <a16:creationId xmlns:a16="http://schemas.microsoft.com/office/drawing/2014/main" id="{3C7A9C04-DE9E-449F-A4A7-E5C0B96C6F90}"/>
+              </a:ext>
+            </a:extLst>
+          </p:cNvPr>
+          <p:cNvSpPr/>
+          <p:nvPr/>
+        </p:nvSpPr>
+        <p:spPr>
+          <a:xfrm>
+            <a:off x="10008704" y="5277678"/>
+            <a:ext cx="1753193" cy="1195168"/>
+          </a:xfrm>
+          <a:prstGeom prst="rect">
+            <a:avLst/>
+          </a:prstGeom>
+          <a:solidFill>
+            <a:schemeClr val="accent5">
+              <a:lumMod val="40000"/>
+              <a:lumOff val="60000"/>
+            </a:schemeClr>
+          </a:solidFill>
+          <a:ln>
+            <a:noFill/>
+          </a:ln>
+          <a:effectLst>
+            <a:outerShdw blurRad="254000" dist="38100" algn="l" rotWithShape="0">
+              <a:prstClr val="black">
+                <a:alpha val="40000"/>
+              </a:prstClr>
+            </a:outerShdw>
+          </a:effectLst>
+        </p:spPr>
+        <p:style>
+          <a:lnRef idx="2">
+            <a:schemeClr val="accent1">
+              <a:shade val="50000"/>
+            </a:schemeClr>
+          </a:lnRef>
+          <a:fillRef idx="1">
+            <a:schemeClr val="accent1"/>
+          </a:fillRef>
+          <a:effectRef idx="0">
+            <a:schemeClr val="accent1"/>
+          </a:effectRef>
+          <a:fontRef idx="minor">
+            <a:schemeClr val="lt1"/>
+          </a:fontRef>
+        </p:style>
+        <p:txBody>
+          <a:bodyPr rtlCol="0" anchor="ctr"/>
+          <a:lstStyle/>
+          <a:p>
+            <a:pPr algn="ctr"/>
+            <a:r>
+              <a:rPr lang="es-CL" sz="2000" dirty="0">
+                <a:ln w="0"/>
+                <a:solidFill>
+                  <a:schemeClr val="tx1"/>
+                </a:solidFill>
+                <a:effectLst>
+                  <a:outerShdw blurRad="50800" dist="38100" algn="l" rotWithShape="0">
+                    <a:prstClr val="black">
+                      <a:alpha val="40000"/>
+                    </a:prstClr>
+                  </a:outerShdw>
+                </a:effectLst>
+              </a:rPr>
+              <a:t>Memoria</a:t>
+            </a:r>
+          </a:p>
+          <a:p>
+            <a:pPr algn="ctr"/>
+            <a:r>
+              <a:rPr lang="es-CL" sz="2000" dirty="0">
+                <a:ln w="0"/>
+                <a:solidFill>
+                  <a:schemeClr val="tx1"/>
+                </a:solidFill>
+                <a:effectLst>
+                  <a:outerShdw blurRad="50800" dist="38100" algn="l" rotWithShape="0">
+                    <a:prstClr val="black">
+                      <a:alpha val="40000"/>
+                    </a:prstClr>
+                  </a:outerShdw>
+                </a:effectLst>
+              </a:rPr>
+              <a:t>2017</a:t>
+            </a:r>
+          </a:p>
+        </p:txBody>
+      </p:sp>
     </p:spTree>
     <p:extLst>
       <p:ext uri="{BB962C8B-B14F-4D97-AF65-F5344CB8AC3E}">
@@ -24399,6 +24639,33 @@
                                   </p:childTnLst>
                                 </p:cTn>
                               </p:par>
+                              <p:par>
+                                <p:cTn id="11" presetID="1" presetClass="entr" presetSubtype="0" fill="hold" grpId="0" nodeType="withEffect">
+                                  <p:stCondLst>
+                                    <p:cond delay="0"/>
+                                  </p:stCondLst>
+                                  <p:childTnLst>
+                                    <p:set>
+                                      <p:cBhvr>
+                                        <p:cTn id="12" dur="1" fill="hold">
+                                          <p:stCondLst>
+                                            <p:cond delay="0"/>
+                                          </p:stCondLst>
+                                        </p:cTn>
+                                        <p:tgtEl>
+                                          <p:spTgt spid="15"/>
+                                        </p:tgtEl>
+                                        <p:attrNameLst>
+                                          <p:attrName>style.visibility</p:attrName>
+                                        </p:attrNameLst>
+                                      </p:cBhvr>
+                                      <p:to>
+                                        <p:strVal val="visible"/>
+                                      </p:to>
+                                    </p:set>
+                                  </p:childTnLst>
+                                </p:cTn>
+                              </p:par>
                             </p:childTnLst>
                           </p:cTn>
                         </p:par>
@@ -24426,6 +24693,9 @@
         </p:cTn>
       </p:par>
     </p:tnLst>
+    <p:bldLst>
+      <p:bldP spid="15" grpId="0" animBg="1"/>
+    </p:bldLst>
   </p:timing>
 </p:sld>
 </file>
@@ -24488,7 +24758,15 @@
           <a:p>
             <a:pPr algn="ctr"/>
             <a:r>
-              <a:rPr lang="es-CL" dirty="0"/>
+              <a:rPr lang="es-CL" dirty="0">
+                <a:effectLst>
+                  <a:outerShdw blurRad="38100" dist="38100" dir="2700000" algn="tl">
+                    <a:srgbClr val="000000">
+                      <a:alpha val="43137"/>
+                    </a:srgbClr>
+                  </a:outerShdw>
+                </a:effectLst>
+              </a:rPr>
               <a:t>Situación Bajo Estudio</a:t>
             </a:r>
           </a:p>
@@ -26481,7 +26759,15 @@
           <a:p>
             <a:pPr algn="ctr"/>
             <a:r>
-              <a:rPr lang="es-CL" dirty="0"/>
+              <a:rPr lang="es-CL" dirty="0">
+                <a:effectLst>
+                  <a:outerShdw blurRad="38100" dist="38100" dir="2700000" algn="tl">
+                    <a:srgbClr val="000000">
+                      <a:alpha val="43137"/>
+                    </a:srgbClr>
+                  </a:outerShdw>
+                </a:effectLst>
+              </a:rPr>
               <a:t>Situación bajo estudio</a:t>
             </a:r>
           </a:p>
@@ -26501,7 +26787,7 @@
         </p:nvSpPr>
         <p:spPr>
           <a:xfrm>
-            <a:off x="495300" y="1699592"/>
+            <a:off x="495301" y="1570687"/>
             <a:ext cx="2136498" cy="2499846"/>
           </a:xfrm>
           <a:prstGeom prst="flowChartProcess">
@@ -26573,7 +26859,7 @@
         </p:nvSpPr>
         <p:spPr>
           <a:xfrm>
-            <a:off x="2761525" y="1699592"/>
+            <a:off x="2761526" y="1570687"/>
             <a:ext cx="2136498" cy="2499846"/>
           </a:xfrm>
           <a:prstGeom prst="flowChartProcess">
@@ -26622,7 +26908,22 @@
                   </a:outerShdw>
                 </a:effectLst>
               </a:rPr>
-              <a:t>Proyectos abortados obligando a su reformulación</a:t>
+              <a:t>Proyectos abortados obligando </a:t>
+            </a:r>
+          </a:p>
+          <a:p>
+            <a:pPr lvl="0" algn="ctr"/>
+            <a:r>
+              <a:rPr lang="es-CL" sz="2400" dirty="0">
+                <a:effectLst>
+                  <a:outerShdw blurRad="38100" dist="38100" dir="2700000" algn="tl">
+                    <a:srgbClr val="000000">
+                      <a:alpha val="43137"/>
+                    </a:srgbClr>
+                  </a:outerShdw>
+                </a:effectLst>
+              </a:rPr>
+              <a:t>a su reformulación</a:t>
             </a:r>
           </a:p>
         </p:txBody>
@@ -26641,7 +26942,7 @@
         </p:nvSpPr>
         <p:spPr>
           <a:xfrm>
-            <a:off x="5027750" y="1699593"/>
+            <a:off x="5027751" y="1570688"/>
             <a:ext cx="2136498" cy="2499845"/>
           </a:xfrm>
           <a:prstGeom prst="flowChartProcess">
@@ -26709,7 +27010,7 @@
         </p:nvSpPr>
         <p:spPr>
           <a:xfrm>
-            <a:off x="7293975" y="1699593"/>
+            <a:off x="7293976" y="1570688"/>
             <a:ext cx="2136498" cy="2499845"/>
           </a:xfrm>
           <a:prstGeom prst="flowChartProcess">
@@ -26777,8 +27078,8 @@
         </p:nvSpPr>
         <p:spPr>
           <a:xfrm>
-            <a:off x="495300" y="5327373"/>
-            <a:ext cx="4402724" cy="1273452"/>
+            <a:off x="495300" y="5128046"/>
+            <a:ext cx="4402724" cy="1485284"/>
           </a:xfrm>
           <a:prstGeom prst="roundRect">
             <a:avLst/>
@@ -26810,7 +27111,7 @@
           <a:p>
             <a:pPr algn="ctr"/>
             <a:r>
-              <a:rPr lang="es-CL" sz="2000" dirty="0">
+              <a:rPr lang="es-CL" sz="2400" dirty="0">
                 <a:effectLst>
                   <a:outerShdw blurRad="38100" dist="38100" dir="2700000" algn="tl">
                     <a:srgbClr val="000000">
@@ -26819,7 +27120,22 @@
                   </a:outerShdw>
                 </a:effectLst>
               </a:rPr>
-              <a:t>Se requiere de guías formales como apoyo a los ejecutivos de ZOFRI S.A. para la gestión de proyectos informáticos</a:t>
+              <a:t>Se requiere de una guía como apoyo para la gestión de </a:t>
+            </a:r>
+          </a:p>
+          <a:p>
+            <a:pPr algn="ctr"/>
+            <a:r>
+              <a:rPr lang="es-CL" sz="2400" dirty="0">
+                <a:effectLst>
+                  <a:outerShdw blurRad="38100" dist="38100" dir="2700000" algn="tl">
+                    <a:srgbClr val="000000">
+                      <a:alpha val="43137"/>
+                    </a:srgbClr>
+                  </a:outerShdw>
+                </a:effectLst>
+              </a:rPr>
+              <a:t>proyectos informáticos</a:t>
             </a:r>
           </a:p>
         </p:txBody>
@@ -26838,7 +27154,7 @@
         </p:nvSpPr>
         <p:spPr>
           <a:xfrm>
-            <a:off x="942610" y="4495049"/>
+            <a:off x="937436" y="4330933"/>
             <a:ext cx="3518452" cy="536713"/>
           </a:xfrm>
           <a:prstGeom prst="flowChartMerge">
@@ -26895,8 +27211,8 @@
         </p:nvSpPr>
         <p:spPr>
           <a:xfrm>
-            <a:off x="5027749" y="5328771"/>
-            <a:ext cx="4402724" cy="1273452"/>
+            <a:off x="5027750" y="5135418"/>
+            <a:ext cx="4402724" cy="1485284"/>
           </a:xfrm>
           <a:prstGeom prst="roundRect">
             <a:avLst/>
@@ -26928,7 +27244,7 @@
           <a:p>
             <a:pPr algn="ctr"/>
             <a:r>
-              <a:rPr lang="es-CL" sz="2000" dirty="0"/>
+              <a:rPr lang="es-CL" sz="2400" dirty="0"/>
               <a:t>Diseñar un plan de implementación para el Manual de Buenas Prácticas</a:t>
             </a:r>
           </a:p>
@@ -26948,7 +27264,7 @@
         </p:nvSpPr>
         <p:spPr>
           <a:xfrm>
-            <a:off x="5465679" y="4504836"/>
+            <a:off x="5469886" y="4330932"/>
             <a:ext cx="3518452" cy="536713"/>
           </a:xfrm>
           <a:prstGeom prst="flowChartMerge">

</xml_diff>

<commit_message>
Mejoras a la presentación
</commit_message>
<xml_diff>
--- a/2018/TT IQQ 2018 Camara y Garay.pptx
+++ b/2018/TT IQQ 2018 Camara y Garay.pptx
@@ -2974,7 +2974,7 @@
           <a:p>
             <a:fld id="{889AAA34-CE1E-48C9-A4CD-CFA775F628BC}" type="datetimeFigureOut">
               <a:rPr lang="es-CL" smtClean="0"/>
-              <a:t>13-12-2018</a:t>
+              <a:t>17-12-2018</a:t>
             </a:fld>
             <a:endParaRPr lang="es-CL"/>
           </a:p>
@@ -3791,7 +3791,7 @@
           <a:p>
             <a:fld id="{3BE2AC6D-F750-44BB-A0B8-07BFEA35E468}" type="datetimeFigureOut">
               <a:rPr lang="es-CL" smtClean="0"/>
-              <a:t>13-12-2018</a:t>
+              <a:t>17-12-2018</a:t>
             </a:fld>
             <a:endParaRPr lang="es-CL"/>
           </a:p>
@@ -4042,7 +4042,7 @@
           <a:p>
             <a:fld id="{3BE2AC6D-F750-44BB-A0B8-07BFEA35E468}" type="datetimeFigureOut">
               <a:rPr lang="es-CL" smtClean="0"/>
-              <a:t>13-12-2018</a:t>
+              <a:t>17-12-2018</a:t>
             </a:fld>
             <a:endParaRPr lang="es-CL"/>
           </a:p>
@@ -4356,7 +4356,7 @@
           <a:p>
             <a:fld id="{3BE2AC6D-F750-44BB-A0B8-07BFEA35E468}" type="datetimeFigureOut">
               <a:rPr lang="es-CL" smtClean="0"/>
-              <a:t>13-12-2018</a:t>
+              <a:t>17-12-2018</a:t>
             </a:fld>
             <a:endParaRPr lang="es-CL"/>
           </a:p>
@@ -4697,7 +4697,7 @@
           <a:p>
             <a:fld id="{3BE2AC6D-F750-44BB-A0B8-07BFEA35E468}" type="datetimeFigureOut">
               <a:rPr lang="es-CL" smtClean="0"/>
-              <a:t>13-12-2018</a:t>
+              <a:t>17-12-2018</a:t>
             </a:fld>
             <a:endParaRPr lang="es-CL"/>
           </a:p>
@@ -5011,7 +5011,7 @@
           <a:p>
             <a:fld id="{3BE2AC6D-F750-44BB-A0B8-07BFEA35E468}" type="datetimeFigureOut">
               <a:rPr lang="es-CL" smtClean="0"/>
-              <a:t>13-12-2018</a:t>
+              <a:t>17-12-2018</a:t>
             </a:fld>
             <a:endParaRPr lang="es-CL"/>
           </a:p>
@@ -5404,7 +5404,7 @@
           <a:p>
             <a:fld id="{3BE2AC6D-F750-44BB-A0B8-07BFEA35E468}" type="datetimeFigureOut">
               <a:rPr lang="es-CL" smtClean="0"/>
-              <a:t>13-12-2018</a:t>
+              <a:t>17-12-2018</a:t>
             </a:fld>
             <a:endParaRPr lang="es-CL"/>
           </a:p>
@@ -5574,7 +5574,7 @@
           <a:p>
             <a:fld id="{3BE2AC6D-F750-44BB-A0B8-07BFEA35E468}" type="datetimeFigureOut">
               <a:rPr lang="es-CL" smtClean="0"/>
-              <a:t>13-12-2018</a:t>
+              <a:t>17-12-2018</a:t>
             </a:fld>
             <a:endParaRPr lang="es-CL"/>
           </a:p>
@@ -5754,7 +5754,7 @@
           <a:p>
             <a:fld id="{3BE2AC6D-F750-44BB-A0B8-07BFEA35E468}" type="datetimeFigureOut">
               <a:rPr lang="es-CL" smtClean="0"/>
-              <a:t>13-12-2018</a:t>
+              <a:t>17-12-2018</a:t>
             </a:fld>
             <a:endParaRPr lang="es-CL"/>
           </a:p>
@@ -6160,7 +6160,7 @@
           <a:p>
             <a:fld id="{3BE2AC6D-F750-44BB-A0B8-07BFEA35E468}" type="datetimeFigureOut">
               <a:rPr lang="es-CL" smtClean="0"/>
-              <a:t>13-12-2018</a:t>
+              <a:t>17-12-2018</a:t>
             </a:fld>
             <a:endParaRPr lang="es-CL"/>
           </a:p>
@@ -6392,7 +6392,7 @@
           <a:p>
             <a:fld id="{3BE2AC6D-F750-44BB-A0B8-07BFEA35E468}" type="datetimeFigureOut">
               <a:rPr lang="es-CL" smtClean="0"/>
-              <a:t>13-12-2018</a:t>
+              <a:t>17-12-2018</a:t>
             </a:fld>
             <a:endParaRPr lang="es-CL"/>
           </a:p>
@@ -6766,7 +6766,7 @@
           <a:p>
             <a:fld id="{3BE2AC6D-F750-44BB-A0B8-07BFEA35E468}" type="datetimeFigureOut">
               <a:rPr lang="es-CL" smtClean="0"/>
-              <a:t>13-12-2018</a:t>
+              <a:t>17-12-2018</a:t>
             </a:fld>
             <a:endParaRPr lang="es-CL"/>
           </a:p>
@@ -6889,7 +6889,7 @@
           <a:p>
             <a:fld id="{3BE2AC6D-F750-44BB-A0B8-07BFEA35E468}" type="datetimeFigureOut">
               <a:rPr lang="es-CL" smtClean="0"/>
-              <a:t>13-12-2018</a:t>
+              <a:t>17-12-2018</a:t>
             </a:fld>
             <a:endParaRPr lang="es-CL"/>
           </a:p>
@@ -6984,7 +6984,7 @@
           <a:p>
             <a:fld id="{3BE2AC6D-F750-44BB-A0B8-07BFEA35E468}" type="datetimeFigureOut">
               <a:rPr lang="es-CL" smtClean="0"/>
-              <a:t>13-12-2018</a:t>
+              <a:t>17-12-2018</a:t>
             </a:fld>
             <a:endParaRPr lang="es-CL"/>
           </a:p>
@@ -7239,7 +7239,7 @@
           <a:p>
             <a:fld id="{3BE2AC6D-F750-44BB-A0B8-07BFEA35E468}" type="datetimeFigureOut">
               <a:rPr lang="es-CL" smtClean="0"/>
-              <a:t>13-12-2018</a:t>
+              <a:t>17-12-2018</a:t>
             </a:fld>
             <a:endParaRPr lang="es-CL"/>
           </a:p>
@@ -7502,7 +7502,7 @@
           <a:p>
             <a:fld id="{3BE2AC6D-F750-44BB-A0B8-07BFEA35E468}" type="datetimeFigureOut">
               <a:rPr lang="es-CL" smtClean="0"/>
-              <a:t>13-12-2018</a:t>
+              <a:t>17-12-2018</a:t>
             </a:fld>
             <a:endParaRPr lang="es-CL"/>
           </a:p>
@@ -8245,7 +8245,7 @@
           <a:p>
             <a:fld id="{3BE2AC6D-F750-44BB-A0B8-07BFEA35E468}" type="datetimeFigureOut">
               <a:rPr lang="es-CL" smtClean="0"/>
-              <a:t>13-12-2018</a:t>
+              <a:t>17-12-2018</a:t>
             </a:fld>
             <a:endParaRPr lang="es-CL"/>
           </a:p>
@@ -14471,7 +14471,7 @@
                   </a:outerShdw>
                 </a:effectLst>
               </a:rPr>
-              <a:t>plan de implementación del manual </a:t>
+              <a:t>plan de implementación del Manual </a:t>
             </a:r>
           </a:p>
           <a:p>
@@ -14490,7 +14490,7 @@
                   </a:outerShdw>
                 </a:effectLst>
               </a:rPr>
-              <a:t>de buenas prácticas</a:t>
+              <a:t>de Buenas Prácticas</a:t>
             </a:r>
           </a:p>
         </p:txBody>
@@ -17243,7 +17243,7 @@
               </a:pPr>
               <a:r>
                 <a:rPr lang="es-CL" sz="2400" dirty="0"/>
-                <a:t>Desarrollar los elementos centrales del manual de buenas prácticas</a:t>
+                <a:t>Desarrollar los elementos centrales del Manual de Buenas Prácticas</a:t>
               </a:r>
               <a:endParaRPr lang="es-CL" sz="2400" kern="1200" dirty="0"/>
             </a:p>
@@ -17377,7 +17377,7 @@
               </a:pPr>
               <a:r>
                 <a:rPr lang="es-CL" sz="2400" dirty="0"/>
-                <a:t>plan de implementación del manual de buenas prácticas</a:t>
+                <a:t>plan de implementación del Manual de Buenas Prácticas</a:t>
               </a:r>
               <a:endParaRPr lang="es-CL" sz="2400" kern="1200" dirty="0"/>
             </a:p>
@@ -24340,6 +24340,9 @@
                 </a:pPr>
                 <a:r>
                   <a:rPr lang="es-CL" sz="2000" dirty="0">
+                    <a:solidFill>
+                      <a:srgbClr val="0070C0"/>
+                    </a:solidFill>
                     <a:effectLst>
                       <a:outerShdw blurRad="50800" dist="38100" algn="l" rotWithShape="0">
                         <a:prstClr val="black">
@@ -24348,7 +24351,73 @@
                       </a:outerShdw>
                     </a:effectLst>
                   </a:rPr>
-                  <a:t>Gestionar y liderar una plataforma de servicios para facilitar negocios en Sudamérica, aportando el conocimiento y la experiencia para entregarles a nuestros clientes: usuarios y visitantes, la mejor combinación de factores, procesos y soluciones, que satisfagan sus necesidades, teniendo como pilar fundamental el sentido de ética en los negocios y asumiendo un alto compromiso con la generación de valor para accionistas, clientes, colaboradores, comunidad y entorno</a:t>
+                  <a:t>Gestionar y liderar una plataforma de servicios para facilitar negocios en Sudamérica</a:t>
+                </a:r>
+                <a:r>
+                  <a:rPr lang="es-CL" sz="2000" dirty="0">
+                    <a:effectLst>
+                      <a:outerShdw blurRad="50800" dist="38100" algn="l" rotWithShape="0">
+                        <a:prstClr val="black">
+                          <a:alpha val="40000"/>
+                        </a:prstClr>
+                      </a:outerShdw>
+                    </a:effectLst>
+                  </a:rPr>
+                  <a:t>, aportando el conocimiento y la experiencia para </a:t>
+                </a:r>
+                <a:r>
+                  <a:rPr lang="es-CL" sz="2000" dirty="0">
+                    <a:solidFill>
+                      <a:srgbClr val="0070C0"/>
+                    </a:solidFill>
+                    <a:effectLst>
+                      <a:outerShdw blurRad="50800" dist="38100" algn="l" rotWithShape="0">
+                        <a:prstClr val="black">
+                          <a:alpha val="40000"/>
+                        </a:prstClr>
+                      </a:outerShdw>
+                    </a:effectLst>
+                  </a:rPr>
+                  <a:t>entregarles a nuestros clientes</a:t>
+                </a:r>
+                <a:r>
+                  <a:rPr lang="es-CL" sz="2000" dirty="0">
+                    <a:effectLst>
+                      <a:outerShdw blurRad="50800" dist="38100" algn="l" rotWithShape="0">
+                        <a:prstClr val="black">
+                          <a:alpha val="40000"/>
+                        </a:prstClr>
+                      </a:outerShdw>
+                    </a:effectLst>
+                  </a:rPr>
+                  <a:t>: usuarios y visitantes, la mejor combinación de factores, procesos y </a:t>
+                </a:r>
+                <a:r>
+                  <a:rPr lang="es-CL" sz="2000" dirty="0">
+                    <a:solidFill>
+                      <a:srgbClr val="0070C0"/>
+                    </a:solidFill>
+                    <a:effectLst>
+                      <a:outerShdw blurRad="50800" dist="38100" algn="l" rotWithShape="0">
+                        <a:prstClr val="black">
+                          <a:alpha val="40000"/>
+                        </a:prstClr>
+                      </a:outerShdw>
+                    </a:effectLst>
+                  </a:rPr>
+                  <a:t>soluciones, que satisfagan sus necesidades, teniendo como pilar fundamental el sentido de ética en los negocios</a:t>
+                </a:r>
+                <a:r>
+                  <a:rPr lang="es-CL" sz="2000" dirty="0">
+                    <a:effectLst>
+                      <a:outerShdw blurRad="50800" dist="38100" algn="l" rotWithShape="0">
+                        <a:prstClr val="black">
+                          <a:alpha val="40000"/>
+                        </a:prstClr>
+                      </a:outerShdw>
+                    </a:effectLst>
+                  </a:rPr>
+                  <a:t> y asumiendo un alto compromiso con la generación de valor para accionistas, clientes, colaboradores, comunidad y entorno</a:t>
                 </a:r>
                 <a:endParaRPr lang="es-CL" sz="2000" kern="1200" dirty="0">
                   <a:effectLst>

</xml_diff>

<commit_message>
Se corrige uso de mayúsculas en frase Buenas Prácticas
</commit_message>
<xml_diff>
--- a/2018/TT IQQ 2018 Camara y Garay.pptx
+++ b/2018/TT IQQ 2018 Camara y Garay.pptx
@@ -10642,7 +10642,7 @@
         </p:nvSpPr>
         <p:spPr>
           <a:xfrm>
-            <a:off x="5108715" y="4581441"/>
+            <a:off x="5075287" y="4590889"/>
             <a:ext cx="4462672" cy="557093"/>
           </a:xfrm>
           <a:prstGeom prst="roundRect">
@@ -10722,7 +10722,7 @@
         </p:nvSpPr>
         <p:spPr>
           <a:xfrm>
-            <a:off x="5108715" y="5316473"/>
+            <a:off x="5075287" y="5333908"/>
             <a:ext cx="4462672" cy="557093"/>
           </a:xfrm>
           <a:prstGeom prst="roundRect">
@@ -10802,7 +10802,7 @@
         </p:nvSpPr>
         <p:spPr>
           <a:xfrm>
-            <a:off x="5108715" y="6073881"/>
+            <a:off x="5075287" y="6073881"/>
             <a:ext cx="4462672" cy="557093"/>
           </a:xfrm>
           <a:prstGeom prst="roundRect">
@@ -12647,13 +12647,13 @@
           <p:nvPr>
             <p:extLst>
               <p:ext uri="{D42A27DB-BD31-4B8C-83A1-F6EECF244321}">
-                <p14:modId xmlns:p14="http://schemas.microsoft.com/office/powerpoint/2010/main" val="2455095198"/>
+                <p14:modId xmlns:p14="http://schemas.microsoft.com/office/powerpoint/2010/main" val="2690743163"/>
               </p:ext>
             </p:extLst>
           </p:nvPr>
         </p:nvGraphicFramePr>
         <p:xfrm>
-          <a:off x="337930" y="1427942"/>
+          <a:off x="495299" y="1441893"/>
           <a:ext cx="9959009" cy="3313023"/>
         </p:xfrm>
         <a:graphic>
@@ -12676,7 +12676,7 @@
         </p:nvSpPr>
         <p:spPr>
           <a:xfrm>
-            <a:off x="2665341" y="4944024"/>
+            <a:off x="2951091" y="4944024"/>
             <a:ext cx="2314161" cy="1333872"/>
           </a:xfrm>
           <a:prstGeom prst="roundRect">
@@ -12752,7 +12752,7 @@
         </p:nvSpPr>
         <p:spPr>
           <a:xfrm>
-            <a:off x="5776289" y="4944024"/>
+            <a:off x="5642939" y="4944024"/>
             <a:ext cx="2314161" cy="1333872"/>
           </a:xfrm>
           <a:prstGeom prst="roundRect">
@@ -13810,7 +13810,7 @@
                   </a:outerShdw>
                 </a:effectLst>
               </a:rPr>
-              <a:t>del manual de buenas prácticas</a:t>
+              <a:t>del Manual de Buenas Prácticas</a:t>
             </a:r>
           </a:p>
         </p:txBody>
@@ -14669,7 +14669,7 @@
                   </a:outerShdw>
                 </a:effectLst>
               </a:rPr>
-              <a:t>El enfoque en los factores críticos, sostendrá en el tiempo a las buenas prácticas</a:t>
+              <a:t>El enfoque en los factores críticos, sostendrá en el tiempo a las Buenas Prácticas</a:t>
             </a:r>
           </a:p>
         </p:txBody>
@@ -15907,6 +15907,13 @@
             <a:avLst/>
           </a:prstGeom>
           <a:ln/>
+          <a:effectLst>
+            <a:outerShdw blurRad="254000" dist="38100" algn="l" rotWithShape="0">
+              <a:prstClr val="black">
+                <a:alpha val="40000"/>
+              </a:prstClr>
+            </a:outerShdw>
+          </a:effectLst>
         </p:spPr>
         <p:style>
           <a:lnRef idx="0">
@@ -16918,6 +16925,13 @@
             <a:avLst/>
           </a:prstGeom>
           <a:ln/>
+          <a:effectLst>
+            <a:outerShdw blurRad="254000" dist="38100" algn="l" rotWithShape="0">
+              <a:prstClr val="black">
+                <a:alpha val="40000"/>
+              </a:prstClr>
+            </a:outerShdw>
+          </a:effectLst>
         </p:spPr>
         <p:style>
           <a:lnRef idx="0">
@@ -17114,7 +17128,7 @@
               </a:pPr>
               <a:r>
                 <a:rPr lang="es-CL" sz="2400" dirty="0"/>
-                <a:t>Identificar los factores críticos que influyen en las buenas prácticas del área bajo estudio</a:t>
+                <a:t>Identificar los factores críticos que influyen en las Buenas Prácticas del área bajo estudio</a:t>
               </a:r>
               <a:endParaRPr lang="es-CL" sz="2400" kern="1200" dirty="0"/>
             </a:p>
@@ -27154,6 +27168,13 @@
             <a:avLst/>
           </a:prstGeom>
           <a:ln/>
+          <a:effectLst>
+            <a:outerShdw blurRad="254000" dist="38100" algn="l" rotWithShape="0">
+              <a:prstClr val="black">
+                <a:alpha val="40000"/>
+              </a:prstClr>
+            </a:outerShdw>
+          </a:effectLst>
         </p:spPr>
         <p:style>
           <a:lnRef idx="0">
@@ -27287,6 +27308,13 @@
             <a:avLst/>
           </a:prstGeom>
           <a:ln/>
+          <a:effectLst>
+            <a:outerShdw blurRad="254000" dist="38100" algn="l" rotWithShape="0">
+              <a:prstClr val="black">
+                <a:alpha val="40000"/>
+              </a:prstClr>
+            </a:outerShdw>
+          </a:effectLst>
         </p:spPr>
         <p:style>
           <a:lnRef idx="0">

</xml_diff>

<commit_message>
Se cambian algunas animaciones
</commit_message>
<xml_diff>
--- a/2018/TT IQQ 2018 Camara y Garay.pptx
+++ b/2018/TT IQQ 2018 Camara y Garay.pptx
@@ -136,2750 +136,6 @@
 </p:presentation>
 </file>
 
-<file path=ppt/diagrams/colors1.xml><?xml version="1.0" encoding="utf-8"?>
-<dgm:colorsDef xmlns:dgm="http://schemas.openxmlformats.org/drawingml/2006/diagram" xmlns:a="http://schemas.openxmlformats.org/drawingml/2006/main" uniqueId="urn:microsoft.com/office/officeart/2005/8/colors/accent1_2">
-  <dgm:title val=""/>
-  <dgm:desc val=""/>
-  <dgm:catLst>
-    <dgm:cat type="accent1" pri="11200"/>
-  </dgm:catLst>
-  <dgm:styleLbl name="node0">
-    <dgm:fillClrLst meth="repeat">
-      <a:schemeClr val="accent1"/>
-    </dgm:fillClrLst>
-    <dgm:linClrLst meth="repeat">
-      <a:schemeClr val="lt1"/>
-    </dgm:linClrLst>
-    <dgm:effectClrLst/>
-    <dgm:txLinClrLst/>
-    <dgm:txFillClrLst/>
-    <dgm:txEffectClrLst/>
-  </dgm:styleLbl>
-  <dgm:styleLbl name="alignNode1">
-    <dgm:fillClrLst meth="repeat">
-      <a:schemeClr val="accent1"/>
-    </dgm:fillClrLst>
-    <dgm:linClrLst meth="repeat">
-      <a:schemeClr val="accent1"/>
-    </dgm:linClrLst>
-    <dgm:effectClrLst/>
-    <dgm:txLinClrLst/>
-    <dgm:txFillClrLst/>
-    <dgm:txEffectClrLst/>
-  </dgm:styleLbl>
-  <dgm:styleLbl name="node1">
-    <dgm:fillClrLst meth="repeat">
-      <a:schemeClr val="accent1"/>
-    </dgm:fillClrLst>
-    <dgm:linClrLst meth="repeat">
-      <a:schemeClr val="lt1"/>
-    </dgm:linClrLst>
-    <dgm:effectClrLst/>
-    <dgm:txLinClrLst/>
-    <dgm:txFillClrLst/>
-    <dgm:txEffectClrLst/>
-  </dgm:styleLbl>
-  <dgm:styleLbl name="lnNode1">
-    <dgm:fillClrLst meth="repeat">
-      <a:schemeClr val="accent1"/>
-    </dgm:fillClrLst>
-    <dgm:linClrLst meth="repeat">
-      <a:schemeClr val="lt1"/>
-    </dgm:linClrLst>
-    <dgm:effectClrLst/>
-    <dgm:txLinClrLst/>
-    <dgm:txFillClrLst/>
-    <dgm:txEffectClrLst/>
-  </dgm:styleLbl>
-  <dgm:styleLbl name="vennNode1">
-    <dgm:fillClrLst meth="repeat">
-      <a:schemeClr val="accent1">
-        <a:alpha val="50000"/>
-      </a:schemeClr>
-    </dgm:fillClrLst>
-    <dgm:linClrLst meth="repeat">
-      <a:schemeClr val="lt1"/>
-    </dgm:linClrLst>
-    <dgm:effectClrLst/>
-    <dgm:txLinClrLst/>
-    <dgm:txFillClrLst/>
-    <dgm:txEffectClrLst/>
-  </dgm:styleLbl>
-  <dgm:styleLbl name="node2">
-    <dgm:fillClrLst meth="repeat">
-      <a:schemeClr val="accent1"/>
-    </dgm:fillClrLst>
-    <dgm:linClrLst meth="repeat">
-      <a:schemeClr val="lt1"/>
-    </dgm:linClrLst>
-    <dgm:effectClrLst/>
-    <dgm:txLinClrLst/>
-    <dgm:txFillClrLst/>
-    <dgm:txEffectClrLst/>
-  </dgm:styleLbl>
-  <dgm:styleLbl name="node3">
-    <dgm:fillClrLst meth="repeat">
-      <a:schemeClr val="accent1"/>
-    </dgm:fillClrLst>
-    <dgm:linClrLst meth="repeat">
-      <a:schemeClr val="lt1"/>
-    </dgm:linClrLst>
-    <dgm:effectClrLst/>
-    <dgm:txLinClrLst/>
-    <dgm:txFillClrLst/>
-    <dgm:txEffectClrLst/>
-  </dgm:styleLbl>
-  <dgm:styleLbl name="node4">
-    <dgm:fillClrLst meth="repeat">
-      <a:schemeClr val="accent1"/>
-    </dgm:fillClrLst>
-    <dgm:linClrLst meth="repeat">
-      <a:schemeClr val="lt1"/>
-    </dgm:linClrLst>
-    <dgm:effectClrLst/>
-    <dgm:txLinClrLst/>
-    <dgm:txFillClrLst/>
-    <dgm:txEffectClrLst/>
-  </dgm:styleLbl>
-  <dgm:styleLbl name="fgImgPlace1">
-    <dgm:fillClrLst meth="repeat">
-      <a:schemeClr val="accent1">
-        <a:tint val="50000"/>
-      </a:schemeClr>
-    </dgm:fillClrLst>
-    <dgm:linClrLst meth="repeat">
-      <a:schemeClr val="lt1"/>
-    </dgm:linClrLst>
-    <dgm:effectClrLst/>
-    <dgm:txLinClrLst/>
-    <dgm:txFillClrLst meth="repeat">
-      <a:schemeClr val="lt1"/>
-    </dgm:txFillClrLst>
-    <dgm:txEffectClrLst/>
-  </dgm:styleLbl>
-  <dgm:styleLbl name="alignImgPlace1">
-    <dgm:fillClrLst meth="repeat">
-      <a:schemeClr val="accent1">
-        <a:tint val="50000"/>
-      </a:schemeClr>
-    </dgm:fillClrLst>
-    <dgm:linClrLst meth="repeat">
-      <a:schemeClr val="lt1"/>
-    </dgm:linClrLst>
-    <dgm:effectClrLst/>
-    <dgm:txLinClrLst/>
-    <dgm:txFillClrLst meth="repeat">
-      <a:schemeClr val="lt1"/>
-    </dgm:txFillClrLst>
-    <dgm:txEffectClrLst/>
-  </dgm:styleLbl>
-  <dgm:styleLbl name="bgImgPlace1">
-    <dgm:fillClrLst meth="repeat">
-      <a:schemeClr val="accent1">
-        <a:tint val="50000"/>
-      </a:schemeClr>
-    </dgm:fillClrLst>
-    <dgm:linClrLst meth="repeat">
-      <a:schemeClr val="lt1"/>
-    </dgm:linClrLst>
-    <dgm:effectClrLst/>
-    <dgm:txLinClrLst/>
-    <dgm:txFillClrLst meth="repeat">
-      <a:schemeClr val="lt1"/>
-    </dgm:txFillClrLst>
-    <dgm:txEffectClrLst/>
-  </dgm:styleLbl>
-  <dgm:styleLbl name="sibTrans2D1">
-    <dgm:fillClrLst meth="repeat">
-      <a:schemeClr val="accent1">
-        <a:tint val="60000"/>
-      </a:schemeClr>
-    </dgm:fillClrLst>
-    <dgm:linClrLst meth="repeat">
-      <a:schemeClr val="accent1">
-        <a:tint val="60000"/>
-      </a:schemeClr>
-    </dgm:linClrLst>
-    <dgm:effectClrLst/>
-    <dgm:txLinClrLst/>
-    <dgm:txFillClrLst/>
-    <dgm:txEffectClrLst/>
-  </dgm:styleLbl>
-  <dgm:styleLbl name="fgSibTrans2D1">
-    <dgm:fillClrLst meth="repeat">
-      <a:schemeClr val="accent1">
-        <a:tint val="60000"/>
-      </a:schemeClr>
-    </dgm:fillClrLst>
-    <dgm:linClrLst meth="repeat">
-      <a:schemeClr val="accent1">
-        <a:tint val="60000"/>
-      </a:schemeClr>
-    </dgm:linClrLst>
-    <dgm:effectClrLst/>
-    <dgm:txLinClrLst/>
-    <dgm:txFillClrLst/>
-    <dgm:txEffectClrLst/>
-  </dgm:styleLbl>
-  <dgm:styleLbl name="bgSibTrans2D1">
-    <dgm:fillClrLst meth="repeat">
-      <a:schemeClr val="accent1">
-        <a:tint val="60000"/>
-      </a:schemeClr>
-    </dgm:fillClrLst>
-    <dgm:linClrLst meth="repeat">
-      <a:schemeClr val="accent1">
-        <a:tint val="60000"/>
-      </a:schemeClr>
-    </dgm:linClrLst>
-    <dgm:effectClrLst/>
-    <dgm:txLinClrLst/>
-    <dgm:txFillClrLst/>
-    <dgm:txEffectClrLst/>
-  </dgm:styleLbl>
-  <dgm:styleLbl name="sibTrans1D1">
-    <dgm:fillClrLst meth="repeat">
-      <a:schemeClr val="accent1"/>
-    </dgm:fillClrLst>
-    <dgm:linClrLst meth="repeat">
-      <a:schemeClr val="accent1"/>
-    </dgm:linClrLst>
-    <dgm:effectClrLst/>
-    <dgm:txLinClrLst/>
-    <dgm:txFillClrLst meth="repeat">
-      <a:schemeClr val="tx1"/>
-    </dgm:txFillClrLst>
-    <dgm:txEffectClrLst/>
-  </dgm:styleLbl>
-  <dgm:styleLbl name="callout">
-    <dgm:fillClrLst meth="repeat">
-      <a:schemeClr val="accent1"/>
-    </dgm:fillClrLst>
-    <dgm:linClrLst meth="repeat">
-      <a:schemeClr val="accent1">
-        <a:tint val="50000"/>
-      </a:schemeClr>
-    </dgm:linClrLst>
-    <dgm:effectClrLst/>
-    <dgm:txLinClrLst/>
-    <dgm:txFillClrLst meth="repeat">
-      <a:schemeClr val="tx1"/>
-    </dgm:txFillClrLst>
-    <dgm:txEffectClrLst/>
-  </dgm:styleLbl>
-  <dgm:styleLbl name="asst0">
-    <dgm:fillClrLst meth="repeat">
-      <a:schemeClr val="accent1"/>
-    </dgm:fillClrLst>
-    <dgm:linClrLst meth="repeat">
-      <a:schemeClr val="lt1"/>
-    </dgm:linClrLst>
-    <dgm:effectClrLst/>
-    <dgm:txLinClrLst/>
-    <dgm:txFillClrLst/>
-    <dgm:txEffectClrLst/>
-  </dgm:styleLbl>
-  <dgm:styleLbl name="asst1">
-    <dgm:fillClrLst meth="repeat">
-      <a:schemeClr val="accent1"/>
-    </dgm:fillClrLst>
-    <dgm:linClrLst meth="repeat">
-      <a:schemeClr val="lt1"/>
-    </dgm:linClrLst>
-    <dgm:effectClrLst/>
-    <dgm:txLinClrLst/>
-    <dgm:txFillClrLst/>
-    <dgm:txEffectClrLst/>
-  </dgm:styleLbl>
-  <dgm:styleLbl name="asst2">
-    <dgm:fillClrLst meth="repeat">
-      <a:schemeClr val="accent1"/>
-    </dgm:fillClrLst>
-    <dgm:linClrLst meth="repeat">
-      <a:schemeClr val="lt1"/>
-    </dgm:linClrLst>
-    <dgm:effectClrLst/>
-    <dgm:txLinClrLst/>
-    <dgm:txFillClrLst/>
-    <dgm:txEffectClrLst/>
-  </dgm:styleLbl>
-  <dgm:styleLbl name="asst3">
-    <dgm:fillClrLst meth="repeat">
-      <a:schemeClr val="accent1"/>
-    </dgm:fillClrLst>
-    <dgm:linClrLst meth="repeat">
-      <a:schemeClr val="lt1"/>
-    </dgm:linClrLst>
-    <dgm:effectClrLst/>
-    <dgm:txLinClrLst/>
-    <dgm:txFillClrLst/>
-    <dgm:txEffectClrLst/>
-  </dgm:styleLbl>
-  <dgm:styleLbl name="asst4">
-    <dgm:fillClrLst meth="repeat">
-      <a:schemeClr val="accent1"/>
-    </dgm:fillClrLst>
-    <dgm:linClrLst meth="repeat">
-      <a:schemeClr val="lt1"/>
-    </dgm:linClrLst>
-    <dgm:effectClrLst/>
-    <dgm:txLinClrLst/>
-    <dgm:txFillClrLst/>
-    <dgm:txEffectClrLst/>
-  </dgm:styleLbl>
-  <dgm:styleLbl name="parChTrans2D1">
-    <dgm:fillClrLst meth="repeat">
-      <a:schemeClr val="accent1">
-        <a:tint val="60000"/>
-      </a:schemeClr>
-    </dgm:fillClrLst>
-    <dgm:linClrLst meth="repeat">
-      <a:schemeClr val="accent1">
-        <a:tint val="60000"/>
-      </a:schemeClr>
-    </dgm:linClrLst>
-    <dgm:effectClrLst/>
-    <dgm:txLinClrLst/>
-    <dgm:txFillClrLst meth="repeat">
-      <a:schemeClr val="lt1"/>
-    </dgm:txFillClrLst>
-    <dgm:txEffectClrLst/>
-  </dgm:styleLbl>
-  <dgm:styleLbl name="parChTrans2D2">
-    <dgm:fillClrLst meth="repeat">
-      <a:schemeClr val="accent1"/>
-    </dgm:fillClrLst>
-    <dgm:linClrLst meth="repeat">
-      <a:schemeClr val="accent1"/>
-    </dgm:linClrLst>
-    <dgm:effectClrLst/>
-    <dgm:txLinClrLst/>
-    <dgm:txFillClrLst meth="repeat">
-      <a:schemeClr val="lt1"/>
-    </dgm:txFillClrLst>
-    <dgm:txEffectClrLst/>
-  </dgm:styleLbl>
-  <dgm:styleLbl name="parChTrans2D3">
-    <dgm:fillClrLst meth="repeat">
-      <a:schemeClr val="accent1"/>
-    </dgm:fillClrLst>
-    <dgm:linClrLst meth="repeat">
-      <a:schemeClr val="accent1"/>
-    </dgm:linClrLst>
-    <dgm:effectClrLst/>
-    <dgm:txLinClrLst/>
-    <dgm:txFillClrLst meth="repeat">
-      <a:schemeClr val="lt1"/>
-    </dgm:txFillClrLst>
-    <dgm:txEffectClrLst/>
-  </dgm:styleLbl>
-  <dgm:styleLbl name="parChTrans2D4">
-    <dgm:fillClrLst meth="repeat">
-      <a:schemeClr val="accent1"/>
-    </dgm:fillClrLst>
-    <dgm:linClrLst meth="repeat">
-      <a:schemeClr val="accent1"/>
-    </dgm:linClrLst>
-    <dgm:effectClrLst/>
-    <dgm:txLinClrLst/>
-    <dgm:txFillClrLst meth="repeat">
-      <a:schemeClr val="lt1"/>
-    </dgm:txFillClrLst>
-    <dgm:txEffectClrLst/>
-  </dgm:styleLbl>
-  <dgm:styleLbl name="parChTrans1D1">
-    <dgm:fillClrLst meth="repeat">
-      <a:schemeClr val="accent1"/>
-    </dgm:fillClrLst>
-    <dgm:linClrLst meth="repeat">
-      <a:schemeClr val="accent1">
-        <a:shade val="60000"/>
-      </a:schemeClr>
-    </dgm:linClrLst>
-    <dgm:effectClrLst/>
-    <dgm:txLinClrLst/>
-    <dgm:txFillClrLst meth="repeat">
-      <a:schemeClr val="tx1"/>
-    </dgm:txFillClrLst>
-    <dgm:txEffectClrLst/>
-  </dgm:styleLbl>
-  <dgm:styleLbl name="parChTrans1D2">
-    <dgm:fillClrLst meth="repeat">
-      <a:schemeClr val="accent1"/>
-    </dgm:fillClrLst>
-    <dgm:linClrLst meth="repeat">
-      <a:schemeClr val="accent1">
-        <a:shade val="60000"/>
-      </a:schemeClr>
-    </dgm:linClrLst>
-    <dgm:effectClrLst/>
-    <dgm:txLinClrLst/>
-    <dgm:txFillClrLst meth="repeat">
-      <a:schemeClr val="tx1"/>
-    </dgm:txFillClrLst>
-    <dgm:txEffectClrLst/>
-  </dgm:styleLbl>
-  <dgm:styleLbl name="parChTrans1D3">
-    <dgm:fillClrLst meth="repeat">
-      <a:schemeClr val="accent1"/>
-    </dgm:fillClrLst>
-    <dgm:linClrLst meth="repeat">
-      <a:schemeClr val="accent1">
-        <a:shade val="80000"/>
-      </a:schemeClr>
-    </dgm:linClrLst>
-    <dgm:effectClrLst/>
-    <dgm:txLinClrLst/>
-    <dgm:txFillClrLst meth="repeat">
-      <a:schemeClr val="tx1"/>
-    </dgm:txFillClrLst>
-    <dgm:txEffectClrLst/>
-  </dgm:styleLbl>
-  <dgm:styleLbl name="parChTrans1D4">
-    <dgm:fillClrLst meth="repeat">
-      <a:schemeClr val="accent1"/>
-    </dgm:fillClrLst>
-    <dgm:linClrLst meth="repeat">
-      <a:schemeClr val="accent1">
-        <a:shade val="80000"/>
-      </a:schemeClr>
-    </dgm:linClrLst>
-    <dgm:effectClrLst/>
-    <dgm:txLinClrLst/>
-    <dgm:txFillClrLst meth="repeat">
-      <a:schemeClr val="tx1"/>
-    </dgm:txFillClrLst>
-    <dgm:txEffectClrLst/>
-  </dgm:styleLbl>
-  <dgm:styleLbl name="fgAcc1">
-    <dgm:fillClrLst meth="repeat">
-      <a:schemeClr val="lt1">
-        <a:alpha val="90000"/>
-      </a:schemeClr>
-    </dgm:fillClrLst>
-    <dgm:linClrLst meth="repeat">
-      <a:schemeClr val="accent1"/>
-    </dgm:linClrLst>
-    <dgm:effectClrLst/>
-    <dgm:txLinClrLst/>
-    <dgm:txFillClrLst meth="repeat">
-      <a:schemeClr val="dk1"/>
-    </dgm:txFillClrLst>
-    <dgm:txEffectClrLst/>
-  </dgm:styleLbl>
-  <dgm:styleLbl name="conFgAcc1">
-    <dgm:fillClrLst meth="repeat">
-      <a:schemeClr val="lt1">
-        <a:alpha val="90000"/>
-      </a:schemeClr>
-    </dgm:fillClrLst>
-    <dgm:linClrLst meth="repeat">
-      <a:schemeClr val="accent1"/>
-    </dgm:linClrLst>
-    <dgm:effectClrLst/>
-    <dgm:txLinClrLst/>
-    <dgm:txFillClrLst meth="repeat">
-      <a:schemeClr val="dk1"/>
-    </dgm:txFillClrLst>
-    <dgm:txEffectClrLst/>
-  </dgm:styleLbl>
-  <dgm:styleLbl name="alignAcc1">
-    <dgm:fillClrLst meth="repeat">
-      <a:schemeClr val="lt1">
-        <a:alpha val="90000"/>
-      </a:schemeClr>
-    </dgm:fillClrLst>
-    <dgm:linClrLst meth="repeat">
-      <a:schemeClr val="accent1"/>
-    </dgm:linClrLst>
-    <dgm:effectClrLst/>
-    <dgm:txLinClrLst/>
-    <dgm:txFillClrLst meth="repeat">
-      <a:schemeClr val="dk1"/>
-    </dgm:txFillClrLst>
-    <dgm:txEffectClrLst/>
-  </dgm:styleLbl>
-  <dgm:styleLbl name="trAlignAcc1">
-    <dgm:fillClrLst meth="repeat">
-      <a:schemeClr val="lt1">
-        <a:alpha val="40000"/>
-      </a:schemeClr>
-    </dgm:fillClrLst>
-    <dgm:linClrLst meth="repeat">
-      <a:schemeClr val="accent1"/>
-    </dgm:linClrLst>
-    <dgm:effectClrLst/>
-    <dgm:txLinClrLst/>
-    <dgm:txFillClrLst meth="repeat">
-      <a:schemeClr val="dk1"/>
-    </dgm:txFillClrLst>
-    <dgm:txEffectClrLst/>
-  </dgm:styleLbl>
-  <dgm:styleLbl name="bgAcc1">
-    <dgm:fillClrLst meth="repeat">
-      <a:schemeClr val="lt1">
-        <a:alpha val="90000"/>
-      </a:schemeClr>
-    </dgm:fillClrLst>
-    <dgm:linClrLst meth="repeat">
-      <a:schemeClr val="accent1"/>
-    </dgm:linClrLst>
-    <dgm:effectClrLst/>
-    <dgm:txLinClrLst/>
-    <dgm:txFillClrLst meth="repeat">
-      <a:schemeClr val="dk1"/>
-    </dgm:txFillClrLst>
-    <dgm:txEffectClrLst/>
-  </dgm:styleLbl>
-  <dgm:styleLbl name="solidFgAcc1">
-    <dgm:fillClrLst meth="repeat">
-      <a:schemeClr val="lt1"/>
-    </dgm:fillClrLst>
-    <dgm:linClrLst meth="repeat">
-      <a:schemeClr val="accent1"/>
-    </dgm:linClrLst>
-    <dgm:effectClrLst/>
-    <dgm:txLinClrLst/>
-    <dgm:txFillClrLst meth="repeat">
-      <a:schemeClr val="dk1"/>
-    </dgm:txFillClrLst>
-    <dgm:txEffectClrLst/>
-  </dgm:styleLbl>
-  <dgm:styleLbl name="solidAlignAcc1">
-    <dgm:fillClrLst meth="repeat">
-      <a:schemeClr val="lt1"/>
-    </dgm:fillClrLst>
-    <dgm:linClrLst meth="repeat">
-      <a:schemeClr val="accent1"/>
-    </dgm:linClrLst>
-    <dgm:effectClrLst/>
-    <dgm:txLinClrLst/>
-    <dgm:txFillClrLst meth="repeat">
-      <a:schemeClr val="dk1"/>
-    </dgm:txFillClrLst>
-    <dgm:txEffectClrLst/>
-  </dgm:styleLbl>
-  <dgm:styleLbl name="solidBgAcc1">
-    <dgm:fillClrLst meth="repeat">
-      <a:schemeClr val="lt1"/>
-    </dgm:fillClrLst>
-    <dgm:linClrLst meth="repeat">
-      <a:schemeClr val="accent1"/>
-    </dgm:linClrLst>
-    <dgm:effectClrLst/>
-    <dgm:txLinClrLst/>
-    <dgm:txFillClrLst meth="repeat">
-      <a:schemeClr val="dk1"/>
-    </dgm:txFillClrLst>
-    <dgm:txEffectClrLst/>
-  </dgm:styleLbl>
-  <dgm:styleLbl name="fgAccFollowNode1">
-    <dgm:fillClrLst meth="repeat">
-      <a:schemeClr val="accent1">
-        <a:alpha val="90000"/>
-        <a:tint val="40000"/>
-      </a:schemeClr>
-    </dgm:fillClrLst>
-    <dgm:linClrLst meth="repeat">
-      <a:schemeClr val="accent1">
-        <a:alpha val="90000"/>
-        <a:tint val="40000"/>
-      </a:schemeClr>
-    </dgm:linClrLst>
-    <dgm:effectClrLst/>
-    <dgm:txLinClrLst/>
-    <dgm:txFillClrLst meth="repeat">
-      <a:schemeClr val="dk1"/>
-    </dgm:txFillClrLst>
-    <dgm:txEffectClrLst/>
-  </dgm:styleLbl>
-  <dgm:styleLbl name="alignAccFollowNode1">
-    <dgm:fillClrLst meth="repeat">
-      <a:schemeClr val="accent1">
-        <a:alpha val="90000"/>
-        <a:tint val="40000"/>
-      </a:schemeClr>
-    </dgm:fillClrLst>
-    <dgm:linClrLst meth="repeat">
-      <a:schemeClr val="accent1">
-        <a:alpha val="90000"/>
-        <a:tint val="40000"/>
-      </a:schemeClr>
-    </dgm:linClrLst>
-    <dgm:effectClrLst/>
-    <dgm:txLinClrLst/>
-    <dgm:txFillClrLst meth="repeat">
-      <a:schemeClr val="dk1"/>
-    </dgm:txFillClrLst>
-    <dgm:txEffectClrLst/>
-  </dgm:styleLbl>
-  <dgm:styleLbl name="bgAccFollowNode1">
-    <dgm:fillClrLst meth="repeat">
-      <a:schemeClr val="accent1">
-        <a:alpha val="90000"/>
-        <a:tint val="40000"/>
-      </a:schemeClr>
-    </dgm:fillClrLst>
-    <dgm:linClrLst meth="repeat">
-      <a:schemeClr val="accent1">
-        <a:alpha val="90000"/>
-        <a:tint val="40000"/>
-      </a:schemeClr>
-    </dgm:linClrLst>
-    <dgm:effectClrLst/>
-    <dgm:txLinClrLst/>
-    <dgm:txFillClrLst meth="repeat">
-      <a:schemeClr val="dk1"/>
-    </dgm:txFillClrLst>
-    <dgm:txEffectClrLst/>
-  </dgm:styleLbl>
-  <dgm:styleLbl name="fgAcc0">
-    <dgm:fillClrLst meth="repeat">
-      <a:schemeClr val="lt1">
-        <a:alpha val="90000"/>
-      </a:schemeClr>
-    </dgm:fillClrLst>
-    <dgm:linClrLst meth="repeat">
-      <a:schemeClr val="accent1"/>
-    </dgm:linClrLst>
-    <dgm:effectClrLst/>
-    <dgm:txLinClrLst/>
-    <dgm:txFillClrLst meth="repeat">
-      <a:schemeClr val="dk1"/>
-    </dgm:txFillClrLst>
-    <dgm:txEffectClrLst/>
-  </dgm:styleLbl>
-  <dgm:styleLbl name="fgAcc2">
-    <dgm:fillClrLst meth="repeat">
-      <a:schemeClr val="lt1">
-        <a:alpha val="90000"/>
-      </a:schemeClr>
-    </dgm:fillClrLst>
-    <dgm:linClrLst meth="repeat">
-      <a:schemeClr val="accent1"/>
-    </dgm:linClrLst>
-    <dgm:effectClrLst/>
-    <dgm:txLinClrLst/>
-    <dgm:txFillClrLst meth="repeat">
-      <a:schemeClr val="dk1"/>
-    </dgm:txFillClrLst>
-    <dgm:txEffectClrLst/>
-  </dgm:styleLbl>
-  <dgm:styleLbl name="fgAcc3">
-    <dgm:fillClrLst meth="repeat">
-      <a:schemeClr val="lt1">
-        <a:alpha val="90000"/>
-      </a:schemeClr>
-    </dgm:fillClrLst>
-    <dgm:linClrLst meth="repeat">
-      <a:schemeClr val="accent1"/>
-    </dgm:linClrLst>
-    <dgm:effectClrLst/>
-    <dgm:txLinClrLst/>
-    <dgm:txFillClrLst meth="repeat">
-      <a:schemeClr val="dk1"/>
-    </dgm:txFillClrLst>
-    <dgm:txEffectClrLst/>
-  </dgm:styleLbl>
-  <dgm:styleLbl name="fgAcc4">
-    <dgm:fillClrLst meth="repeat">
-      <a:schemeClr val="lt1">
-        <a:alpha val="90000"/>
-      </a:schemeClr>
-    </dgm:fillClrLst>
-    <dgm:linClrLst meth="repeat">
-      <a:schemeClr val="accent1"/>
-    </dgm:linClrLst>
-    <dgm:effectClrLst/>
-    <dgm:txLinClrLst/>
-    <dgm:txFillClrLst meth="repeat">
-      <a:schemeClr val="dk1"/>
-    </dgm:txFillClrLst>
-    <dgm:txEffectClrLst/>
-  </dgm:styleLbl>
-  <dgm:styleLbl name="bgShp">
-    <dgm:fillClrLst meth="repeat">
-      <a:schemeClr val="accent1">
-        <a:tint val="40000"/>
-      </a:schemeClr>
-    </dgm:fillClrLst>
-    <dgm:linClrLst meth="repeat">
-      <a:schemeClr val="accent1"/>
-    </dgm:linClrLst>
-    <dgm:effectClrLst/>
-    <dgm:txLinClrLst/>
-    <dgm:txFillClrLst meth="repeat">
-      <a:schemeClr val="dk1"/>
-    </dgm:txFillClrLst>
-    <dgm:txEffectClrLst/>
-  </dgm:styleLbl>
-  <dgm:styleLbl name="dkBgShp">
-    <dgm:fillClrLst meth="repeat">
-      <a:schemeClr val="accent1">
-        <a:shade val="80000"/>
-      </a:schemeClr>
-    </dgm:fillClrLst>
-    <dgm:linClrLst meth="repeat">
-      <a:schemeClr val="accent1"/>
-    </dgm:linClrLst>
-    <dgm:effectClrLst/>
-    <dgm:txLinClrLst/>
-    <dgm:txFillClrLst meth="repeat">
-      <a:schemeClr val="lt1"/>
-    </dgm:txFillClrLst>
-    <dgm:txEffectClrLst/>
-  </dgm:styleLbl>
-  <dgm:styleLbl name="trBgShp">
-    <dgm:fillClrLst meth="repeat">
-      <a:schemeClr val="accent1">
-        <a:tint val="50000"/>
-        <a:alpha val="40000"/>
-      </a:schemeClr>
-    </dgm:fillClrLst>
-    <dgm:linClrLst meth="repeat">
-      <a:schemeClr val="accent1"/>
-    </dgm:linClrLst>
-    <dgm:effectClrLst/>
-    <dgm:txLinClrLst/>
-    <dgm:txFillClrLst meth="repeat">
-      <a:schemeClr val="lt1"/>
-    </dgm:txFillClrLst>
-    <dgm:txEffectClrLst/>
-  </dgm:styleLbl>
-  <dgm:styleLbl name="fgShp">
-    <dgm:fillClrLst meth="repeat">
-      <a:schemeClr val="accent1">
-        <a:tint val="60000"/>
-      </a:schemeClr>
-    </dgm:fillClrLst>
-    <dgm:linClrLst meth="repeat">
-      <a:schemeClr val="lt1"/>
-    </dgm:linClrLst>
-    <dgm:effectClrLst/>
-    <dgm:txLinClrLst/>
-    <dgm:txFillClrLst meth="repeat">
-      <a:schemeClr val="dk1"/>
-    </dgm:txFillClrLst>
-    <dgm:txEffectClrLst/>
-  </dgm:styleLbl>
-  <dgm:styleLbl name="revTx">
-    <dgm:fillClrLst meth="repeat">
-      <a:schemeClr val="lt1">
-        <a:alpha val="0"/>
-      </a:schemeClr>
-    </dgm:fillClrLst>
-    <dgm:linClrLst meth="repeat">
-      <a:schemeClr val="dk1">
-        <a:alpha val="0"/>
-      </a:schemeClr>
-    </dgm:linClrLst>
-    <dgm:effectClrLst/>
-    <dgm:txLinClrLst/>
-    <dgm:txFillClrLst meth="repeat">
-      <a:schemeClr val="tx1"/>
-    </dgm:txFillClrLst>
-    <dgm:txEffectClrLst/>
-  </dgm:styleLbl>
-</dgm:colorsDef>
-</file>
-
-<file path=ppt/diagrams/data1.xml><?xml version="1.0" encoding="utf-8"?>
-<dgm:dataModel xmlns:dgm="http://schemas.openxmlformats.org/drawingml/2006/diagram" xmlns:a="http://schemas.openxmlformats.org/drawingml/2006/main">
-  <dgm:ptLst>
-    <dgm:pt modelId="{CF762F7D-123D-4212-870C-FD96D7D097CB}" type="doc">
-      <dgm:prSet loTypeId="urn:microsoft.com/office/officeart/2005/8/layout/hProcess9" loCatId="process" qsTypeId="urn:microsoft.com/office/officeart/2005/8/quickstyle/simple4" qsCatId="simple" csTypeId="urn:microsoft.com/office/officeart/2005/8/colors/accent1_2" csCatId="accent1" phldr="1"/>
-      <dgm:spPr/>
-    </dgm:pt>
-    <dgm:pt modelId="{D1D3BC1D-B96C-4F6B-8BE8-FC4250CCB966}">
-      <dgm:prSet phldrT="[Texto]" custT="1">
-        <dgm:style>
-          <a:lnRef idx="2">
-            <a:schemeClr val="accent1"/>
-          </a:lnRef>
-          <a:fillRef idx="1">
-            <a:schemeClr val="lt1"/>
-          </a:fillRef>
-          <a:effectRef idx="0">
-            <a:schemeClr val="accent1"/>
-          </a:effectRef>
-          <a:fontRef idx="minor">
-            <a:schemeClr val="dk1"/>
-          </a:fontRef>
-        </dgm:style>
-      </dgm:prSet>
-      <dgm:spPr>
-        <a:ln w="28575"/>
-        <a:effectLst>
-          <a:outerShdw blurRad="254000" dist="38100" algn="l" rotWithShape="0">
-            <a:prstClr val="black">
-              <a:alpha val="40000"/>
-            </a:prstClr>
-          </a:outerShdw>
-        </a:effectLst>
-      </dgm:spPr>
-      <dgm:t>
-        <a:bodyPr/>
-        <a:lstStyle/>
-        <a:p>
-          <a:r>
-            <a:rPr lang="es-CL" sz="2400" dirty="0">
-              <a:effectLst>
-                <a:outerShdw blurRad="50800" dist="38100" algn="l" rotWithShape="0">
-                  <a:prstClr val="black">
-                    <a:alpha val="40000"/>
-                  </a:prstClr>
-                </a:outerShdw>
-              </a:effectLst>
-            </a:rPr>
-            <a:t>Presentación del Manual</a:t>
-          </a:r>
-        </a:p>
-      </dgm:t>
-    </dgm:pt>
-    <dgm:pt modelId="{3183EAC4-AF16-4414-9E3B-4643173A89FD}" type="parTrans" cxnId="{AA9F3DD8-3B4B-460D-A510-97996F75D304}">
-      <dgm:prSet/>
-      <dgm:spPr/>
-      <dgm:t>
-        <a:bodyPr/>
-        <a:lstStyle/>
-        <a:p>
-          <a:endParaRPr lang="es-CL"/>
-        </a:p>
-      </dgm:t>
-    </dgm:pt>
-    <dgm:pt modelId="{A21266FA-4D5D-4235-B017-9D00F70B0039}" type="sibTrans" cxnId="{AA9F3DD8-3B4B-460D-A510-97996F75D304}">
-      <dgm:prSet/>
-      <dgm:spPr/>
-      <dgm:t>
-        <a:bodyPr/>
-        <a:lstStyle/>
-        <a:p>
-          <a:endParaRPr lang="es-CL"/>
-        </a:p>
-      </dgm:t>
-    </dgm:pt>
-    <dgm:pt modelId="{A86DF4D5-71FD-4EA7-BE75-2258A0E7DB1A}">
-      <dgm:prSet phldrT="[Texto]" custT="1">
-        <dgm:style>
-          <a:lnRef idx="2">
-            <a:schemeClr val="accent1"/>
-          </a:lnRef>
-          <a:fillRef idx="1">
-            <a:schemeClr val="lt1"/>
-          </a:fillRef>
-          <a:effectRef idx="0">
-            <a:schemeClr val="accent1"/>
-          </a:effectRef>
-          <a:fontRef idx="minor">
-            <a:schemeClr val="dk1"/>
-          </a:fontRef>
-        </dgm:style>
-      </dgm:prSet>
-      <dgm:spPr>
-        <a:ln w="28575"/>
-        <a:effectLst>
-          <a:outerShdw blurRad="254000" dist="38100" algn="l" rotWithShape="0">
-            <a:prstClr val="black">
-              <a:alpha val="40000"/>
-            </a:prstClr>
-          </a:outerShdw>
-        </a:effectLst>
-      </dgm:spPr>
-      <dgm:t>
-        <a:bodyPr/>
-        <a:lstStyle/>
-        <a:p>
-          <a:r>
-            <a:rPr lang="es-CL" sz="2400" dirty="0">
-              <a:effectLst>
-                <a:outerShdw blurRad="50800" dist="38100" algn="l" rotWithShape="0">
-                  <a:prstClr val="black">
-                    <a:alpha val="40000"/>
-                  </a:prstClr>
-                </a:outerShdw>
-              </a:effectLst>
-            </a:rPr>
-            <a:t>Socialización</a:t>
-          </a:r>
-        </a:p>
-      </dgm:t>
-    </dgm:pt>
-    <dgm:pt modelId="{44B17F7F-238A-47A3-9012-081354DFBC58}" type="parTrans" cxnId="{3F1C630D-3AAE-4281-91B9-575710CC7BC0}">
-      <dgm:prSet/>
-      <dgm:spPr/>
-      <dgm:t>
-        <a:bodyPr/>
-        <a:lstStyle/>
-        <a:p>
-          <a:endParaRPr lang="es-CL"/>
-        </a:p>
-      </dgm:t>
-    </dgm:pt>
-    <dgm:pt modelId="{904FCF99-CD58-4830-9922-27F54A9D85DB}" type="sibTrans" cxnId="{3F1C630D-3AAE-4281-91B9-575710CC7BC0}">
-      <dgm:prSet/>
-      <dgm:spPr/>
-      <dgm:t>
-        <a:bodyPr/>
-        <a:lstStyle/>
-        <a:p>
-          <a:endParaRPr lang="es-CL"/>
-        </a:p>
-      </dgm:t>
-    </dgm:pt>
-    <dgm:pt modelId="{17481399-549C-460A-B5C5-FE82E1E54138}">
-      <dgm:prSet phldrT="[Texto]" custT="1">
-        <dgm:style>
-          <a:lnRef idx="2">
-            <a:schemeClr val="accent1"/>
-          </a:lnRef>
-          <a:fillRef idx="1">
-            <a:schemeClr val="lt1"/>
-          </a:fillRef>
-          <a:effectRef idx="0">
-            <a:schemeClr val="accent1"/>
-          </a:effectRef>
-          <a:fontRef idx="minor">
-            <a:schemeClr val="dk1"/>
-          </a:fontRef>
-        </dgm:style>
-      </dgm:prSet>
-      <dgm:spPr>
-        <a:ln w="28575"/>
-        <a:effectLst>
-          <a:outerShdw blurRad="254000" dist="38100" algn="l" rotWithShape="0">
-            <a:prstClr val="black">
-              <a:alpha val="40000"/>
-            </a:prstClr>
-          </a:outerShdw>
-        </a:effectLst>
-      </dgm:spPr>
-      <dgm:t>
-        <a:bodyPr/>
-        <a:lstStyle/>
-        <a:p>
-          <a:pPr>
-            <a:lnSpc>
-              <a:spcPct val="100000"/>
-            </a:lnSpc>
-            <a:spcAft>
-              <a:spcPts val="0"/>
-            </a:spcAft>
-          </a:pPr>
-          <a:r>
-            <a:rPr lang="es-CL" sz="2400" dirty="0">
-              <a:effectLst>
-                <a:outerShdw blurRad="50800" dist="38100" algn="l" rotWithShape="0">
-                  <a:prstClr val="black">
-                    <a:alpha val="40000"/>
-                  </a:prstClr>
-                </a:outerShdw>
-              </a:effectLst>
-            </a:rPr>
-            <a:t>Marcha </a:t>
-          </a:r>
-        </a:p>
-        <a:p>
-          <a:pPr>
-            <a:lnSpc>
-              <a:spcPct val="100000"/>
-            </a:lnSpc>
-            <a:spcAft>
-              <a:spcPts val="0"/>
-            </a:spcAft>
-          </a:pPr>
-          <a:r>
-            <a:rPr lang="es-CL" sz="2400" dirty="0">
-              <a:effectLst>
-                <a:outerShdw blurRad="50800" dist="38100" algn="l" rotWithShape="0">
-                  <a:prstClr val="black">
-                    <a:alpha val="40000"/>
-                  </a:prstClr>
-                </a:outerShdw>
-              </a:effectLst>
-            </a:rPr>
-            <a:t>Blanca</a:t>
-          </a:r>
-        </a:p>
-      </dgm:t>
-    </dgm:pt>
-    <dgm:pt modelId="{42575126-66DC-44C5-BED2-6B0E285416E3}" type="parTrans" cxnId="{1C0202FB-4C30-407A-AD98-CC4A41E311BD}">
-      <dgm:prSet/>
-      <dgm:spPr/>
-      <dgm:t>
-        <a:bodyPr/>
-        <a:lstStyle/>
-        <a:p>
-          <a:endParaRPr lang="es-CL"/>
-        </a:p>
-      </dgm:t>
-    </dgm:pt>
-    <dgm:pt modelId="{3A964228-19FB-4671-A451-A46E1991AE09}" type="sibTrans" cxnId="{1C0202FB-4C30-407A-AD98-CC4A41E311BD}">
-      <dgm:prSet/>
-      <dgm:spPr/>
-      <dgm:t>
-        <a:bodyPr/>
-        <a:lstStyle/>
-        <a:p>
-          <a:endParaRPr lang="es-CL"/>
-        </a:p>
-      </dgm:t>
-    </dgm:pt>
-    <dgm:pt modelId="{347A2E49-31C0-4C28-BC24-397B475E5D21}">
-      <dgm:prSet phldrT="[Texto]" custT="1">
-        <dgm:style>
-          <a:lnRef idx="2">
-            <a:schemeClr val="accent1"/>
-          </a:lnRef>
-          <a:fillRef idx="1">
-            <a:schemeClr val="lt1"/>
-          </a:fillRef>
-          <a:effectRef idx="0">
-            <a:schemeClr val="accent1"/>
-          </a:effectRef>
-          <a:fontRef idx="minor">
-            <a:schemeClr val="dk1"/>
-          </a:fontRef>
-        </dgm:style>
-      </dgm:prSet>
-      <dgm:spPr>
-        <a:ln w="28575"/>
-        <a:effectLst>
-          <a:outerShdw blurRad="254000" dist="38100" algn="l" rotWithShape="0">
-            <a:prstClr val="black">
-              <a:alpha val="40000"/>
-            </a:prstClr>
-          </a:outerShdw>
-        </a:effectLst>
-      </dgm:spPr>
-      <dgm:t>
-        <a:bodyPr/>
-        <a:lstStyle/>
-        <a:p>
-          <a:r>
-            <a:rPr lang="es-CL" sz="2400" dirty="0">
-              <a:effectLst>
-                <a:outerShdw blurRad="50800" dist="38100" algn="l" rotWithShape="0">
-                  <a:prstClr val="black">
-                    <a:alpha val="40000"/>
-                  </a:prstClr>
-                </a:outerShdw>
-              </a:effectLst>
-            </a:rPr>
-            <a:t>Definición de Política</a:t>
-          </a:r>
-        </a:p>
-      </dgm:t>
-    </dgm:pt>
-    <dgm:pt modelId="{64E2B4F6-458B-4314-A203-52161FC9DED1}" type="parTrans" cxnId="{C194CC4D-4ECD-4E6C-8A04-60E97585C62D}">
-      <dgm:prSet/>
-      <dgm:spPr/>
-      <dgm:t>
-        <a:bodyPr/>
-        <a:lstStyle/>
-        <a:p>
-          <a:endParaRPr lang="es-CL"/>
-        </a:p>
-      </dgm:t>
-    </dgm:pt>
-    <dgm:pt modelId="{39746C12-A2C2-44DB-BFFA-053985D04C63}" type="sibTrans" cxnId="{C194CC4D-4ECD-4E6C-8A04-60E97585C62D}">
-      <dgm:prSet/>
-      <dgm:spPr/>
-      <dgm:t>
-        <a:bodyPr/>
-        <a:lstStyle/>
-        <a:p>
-          <a:endParaRPr lang="es-CL"/>
-        </a:p>
-      </dgm:t>
-    </dgm:pt>
-    <dgm:pt modelId="{D16B27AD-CA1C-4BC8-9572-0E21A6CF16B6}" type="pres">
-      <dgm:prSet presAssocID="{CF762F7D-123D-4212-870C-FD96D7D097CB}" presName="CompostProcess" presStyleCnt="0">
-        <dgm:presLayoutVars>
-          <dgm:dir/>
-          <dgm:resizeHandles val="exact"/>
-        </dgm:presLayoutVars>
-      </dgm:prSet>
-      <dgm:spPr/>
-    </dgm:pt>
-    <dgm:pt modelId="{465066AC-E412-411B-9F3A-3866139EA821}" type="pres">
-      <dgm:prSet presAssocID="{CF762F7D-123D-4212-870C-FD96D7D097CB}" presName="arrow" presStyleLbl="bgShp" presStyleIdx="0" presStyleCnt="1"/>
-      <dgm:spPr/>
-    </dgm:pt>
-    <dgm:pt modelId="{85A39B1B-3575-4408-B51F-1FD6AF492835}" type="pres">
-      <dgm:prSet presAssocID="{CF762F7D-123D-4212-870C-FD96D7D097CB}" presName="linearProcess" presStyleCnt="0"/>
-      <dgm:spPr/>
-    </dgm:pt>
-    <dgm:pt modelId="{91398163-AA9A-475A-8AD2-2C6D3E09FDD5}" type="pres">
-      <dgm:prSet presAssocID="{D1D3BC1D-B96C-4F6B-8BE8-FC4250CCB966}" presName="textNode" presStyleLbl="node1" presStyleIdx="0" presStyleCnt="4">
-        <dgm:presLayoutVars>
-          <dgm:bulletEnabled val="1"/>
-        </dgm:presLayoutVars>
-      </dgm:prSet>
-      <dgm:spPr/>
-    </dgm:pt>
-    <dgm:pt modelId="{1F49095F-776E-4B00-AD73-2678502EDAB8}" type="pres">
-      <dgm:prSet presAssocID="{A21266FA-4D5D-4235-B017-9D00F70B0039}" presName="sibTrans" presStyleCnt="0"/>
-      <dgm:spPr/>
-    </dgm:pt>
-    <dgm:pt modelId="{E63B98BD-8AB2-47CA-8990-789C16510929}" type="pres">
-      <dgm:prSet presAssocID="{A86DF4D5-71FD-4EA7-BE75-2258A0E7DB1A}" presName="textNode" presStyleLbl="node1" presStyleIdx="1" presStyleCnt="4">
-        <dgm:presLayoutVars>
-          <dgm:bulletEnabled val="1"/>
-        </dgm:presLayoutVars>
-      </dgm:prSet>
-      <dgm:spPr/>
-    </dgm:pt>
-    <dgm:pt modelId="{19A541BE-2A4B-46FE-8995-471CE203C701}" type="pres">
-      <dgm:prSet presAssocID="{904FCF99-CD58-4830-9922-27F54A9D85DB}" presName="sibTrans" presStyleCnt="0"/>
-      <dgm:spPr/>
-    </dgm:pt>
-    <dgm:pt modelId="{CC2277CE-30B9-465B-8C9A-335A7CD03AEB}" type="pres">
-      <dgm:prSet presAssocID="{347A2E49-31C0-4C28-BC24-397B475E5D21}" presName="textNode" presStyleLbl="node1" presStyleIdx="2" presStyleCnt="4">
-        <dgm:presLayoutVars>
-          <dgm:bulletEnabled val="1"/>
-        </dgm:presLayoutVars>
-      </dgm:prSet>
-      <dgm:spPr/>
-    </dgm:pt>
-    <dgm:pt modelId="{6F5CE5B4-1442-4B08-8F1D-3C838A1F2C82}" type="pres">
-      <dgm:prSet presAssocID="{39746C12-A2C2-44DB-BFFA-053985D04C63}" presName="sibTrans" presStyleCnt="0"/>
-      <dgm:spPr/>
-    </dgm:pt>
-    <dgm:pt modelId="{D51159D7-5249-4C18-86F8-F27B46708FCB}" type="pres">
-      <dgm:prSet presAssocID="{17481399-549C-460A-B5C5-FE82E1E54138}" presName="textNode" presStyleLbl="node1" presStyleIdx="3" presStyleCnt="4">
-        <dgm:presLayoutVars>
-          <dgm:bulletEnabled val="1"/>
-        </dgm:presLayoutVars>
-      </dgm:prSet>
-      <dgm:spPr/>
-    </dgm:pt>
-  </dgm:ptLst>
-  <dgm:cxnLst>
-    <dgm:cxn modelId="{3F1C630D-3AAE-4281-91B9-575710CC7BC0}" srcId="{CF762F7D-123D-4212-870C-FD96D7D097CB}" destId="{A86DF4D5-71FD-4EA7-BE75-2258A0E7DB1A}" srcOrd="1" destOrd="0" parTransId="{44B17F7F-238A-47A3-9012-081354DFBC58}" sibTransId="{904FCF99-CD58-4830-9922-27F54A9D85DB}"/>
-    <dgm:cxn modelId="{F01B1615-BD07-4819-B3D6-F248D34372CF}" type="presOf" srcId="{347A2E49-31C0-4C28-BC24-397B475E5D21}" destId="{CC2277CE-30B9-465B-8C9A-335A7CD03AEB}" srcOrd="0" destOrd="0" presId="urn:microsoft.com/office/officeart/2005/8/layout/hProcess9"/>
-    <dgm:cxn modelId="{5460DF3F-0C0B-4EE3-9E88-0D618F9CA1E6}" type="presOf" srcId="{CF762F7D-123D-4212-870C-FD96D7D097CB}" destId="{D16B27AD-CA1C-4BC8-9572-0E21A6CF16B6}" srcOrd="0" destOrd="0" presId="urn:microsoft.com/office/officeart/2005/8/layout/hProcess9"/>
-    <dgm:cxn modelId="{BC614669-4EAB-41F9-9737-BFADA26BCC62}" type="presOf" srcId="{D1D3BC1D-B96C-4F6B-8BE8-FC4250CCB966}" destId="{91398163-AA9A-475A-8AD2-2C6D3E09FDD5}" srcOrd="0" destOrd="0" presId="urn:microsoft.com/office/officeart/2005/8/layout/hProcess9"/>
-    <dgm:cxn modelId="{C194CC4D-4ECD-4E6C-8A04-60E97585C62D}" srcId="{CF762F7D-123D-4212-870C-FD96D7D097CB}" destId="{347A2E49-31C0-4C28-BC24-397B475E5D21}" srcOrd="2" destOrd="0" parTransId="{64E2B4F6-458B-4314-A203-52161FC9DED1}" sibTransId="{39746C12-A2C2-44DB-BFFA-053985D04C63}"/>
-    <dgm:cxn modelId="{291B8671-7B9F-4A93-87E9-2E99C8CCB161}" type="presOf" srcId="{17481399-549C-460A-B5C5-FE82E1E54138}" destId="{D51159D7-5249-4C18-86F8-F27B46708FCB}" srcOrd="0" destOrd="0" presId="urn:microsoft.com/office/officeart/2005/8/layout/hProcess9"/>
-    <dgm:cxn modelId="{AA9F3DD8-3B4B-460D-A510-97996F75D304}" srcId="{CF762F7D-123D-4212-870C-FD96D7D097CB}" destId="{D1D3BC1D-B96C-4F6B-8BE8-FC4250CCB966}" srcOrd="0" destOrd="0" parTransId="{3183EAC4-AF16-4414-9E3B-4643173A89FD}" sibTransId="{A21266FA-4D5D-4235-B017-9D00F70B0039}"/>
-    <dgm:cxn modelId="{C67F64EF-7EEE-4720-97C0-0144A1827207}" type="presOf" srcId="{A86DF4D5-71FD-4EA7-BE75-2258A0E7DB1A}" destId="{E63B98BD-8AB2-47CA-8990-789C16510929}" srcOrd="0" destOrd="0" presId="urn:microsoft.com/office/officeart/2005/8/layout/hProcess9"/>
-    <dgm:cxn modelId="{1C0202FB-4C30-407A-AD98-CC4A41E311BD}" srcId="{CF762F7D-123D-4212-870C-FD96D7D097CB}" destId="{17481399-549C-460A-B5C5-FE82E1E54138}" srcOrd="3" destOrd="0" parTransId="{42575126-66DC-44C5-BED2-6B0E285416E3}" sibTransId="{3A964228-19FB-4671-A451-A46E1991AE09}"/>
-    <dgm:cxn modelId="{5740386D-C2C2-462A-8AA1-3E600FE92449}" type="presParOf" srcId="{D16B27AD-CA1C-4BC8-9572-0E21A6CF16B6}" destId="{465066AC-E412-411B-9F3A-3866139EA821}" srcOrd="0" destOrd="0" presId="urn:microsoft.com/office/officeart/2005/8/layout/hProcess9"/>
-    <dgm:cxn modelId="{97697E1A-4382-4B9D-B189-D5E2A15FE3F1}" type="presParOf" srcId="{D16B27AD-CA1C-4BC8-9572-0E21A6CF16B6}" destId="{85A39B1B-3575-4408-B51F-1FD6AF492835}" srcOrd="1" destOrd="0" presId="urn:microsoft.com/office/officeart/2005/8/layout/hProcess9"/>
-    <dgm:cxn modelId="{23B72431-A64F-4545-AF4F-B309F3B666E3}" type="presParOf" srcId="{85A39B1B-3575-4408-B51F-1FD6AF492835}" destId="{91398163-AA9A-475A-8AD2-2C6D3E09FDD5}" srcOrd="0" destOrd="0" presId="urn:microsoft.com/office/officeart/2005/8/layout/hProcess9"/>
-    <dgm:cxn modelId="{AA621F93-44AD-4401-8FE7-D349374C6EA7}" type="presParOf" srcId="{85A39B1B-3575-4408-B51F-1FD6AF492835}" destId="{1F49095F-776E-4B00-AD73-2678502EDAB8}" srcOrd="1" destOrd="0" presId="urn:microsoft.com/office/officeart/2005/8/layout/hProcess9"/>
-    <dgm:cxn modelId="{F1BEBFAF-5CC5-4481-A31E-C046AD874102}" type="presParOf" srcId="{85A39B1B-3575-4408-B51F-1FD6AF492835}" destId="{E63B98BD-8AB2-47CA-8990-789C16510929}" srcOrd="2" destOrd="0" presId="urn:microsoft.com/office/officeart/2005/8/layout/hProcess9"/>
-    <dgm:cxn modelId="{341EB654-22F7-4D6D-ADDD-8153A58FCA64}" type="presParOf" srcId="{85A39B1B-3575-4408-B51F-1FD6AF492835}" destId="{19A541BE-2A4B-46FE-8995-471CE203C701}" srcOrd="3" destOrd="0" presId="urn:microsoft.com/office/officeart/2005/8/layout/hProcess9"/>
-    <dgm:cxn modelId="{1E0C9799-DAED-46D8-94E5-654C9B36BA79}" type="presParOf" srcId="{85A39B1B-3575-4408-B51F-1FD6AF492835}" destId="{CC2277CE-30B9-465B-8C9A-335A7CD03AEB}" srcOrd="4" destOrd="0" presId="urn:microsoft.com/office/officeart/2005/8/layout/hProcess9"/>
-    <dgm:cxn modelId="{AB2083A7-63B9-4086-BF5D-D43ADC0AA8E8}" type="presParOf" srcId="{85A39B1B-3575-4408-B51F-1FD6AF492835}" destId="{6F5CE5B4-1442-4B08-8F1D-3C838A1F2C82}" srcOrd="5" destOrd="0" presId="urn:microsoft.com/office/officeart/2005/8/layout/hProcess9"/>
-    <dgm:cxn modelId="{BD3ED272-ACC2-497F-9E4B-EE50277DF384}" type="presParOf" srcId="{85A39B1B-3575-4408-B51F-1FD6AF492835}" destId="{D51159D7-5249-4C18-86F8-F27B46708FCB}" srcOrd="6" destOrd="0" presId="urn:microsoft.com/office/officeart/2005/8/layout/hProcess9"/>
-  </dgm:cxnLst>
-  <dgm:bg/>
-  <dgm:whole/>
-  <dgm:extLst>
-    <a:ext uri="http://schemas.microsoft.com/office/drawing/2008/diagram">
-      <dsp:dataModelExt xmlns:dsp="http://schemas.microsoft.com/office/drawing/2008/diagram" relId="rId6" minVer="http://schemas.openxmlformats.org/drawingml/2006/diagram"/>
-    </a:ext>
-  </dgm:extLst>
-</dgm:dataModel>
-</file>
-
-<file path=ppt/diagrams/drawing1.xml><?xml version="1.0" encoding="utf-8"?>
-<dsp:drawing xmlns:dgm="http://schemas.openxmlformats.org/drawingml/2006/diagram" xmlns:dsp="http://schemas.microsoft.com/office/drawing/2008/diagram" xmlns:a="http://schemas.openxmlformats.org/drawingml/2006/main">
-  <dsp:spTree>
-    <dsp:nvGrpSpPr>
-      <dsp:cNvPr id="0" name=""/>
-      <dsp:cNvGrpSpPr/>
-    </dsp:nvGrpSpPr>
-    <dsp:grpSpPr/>
-    <dsp:sp modelId="{465066AC-E412-411B-9F3A-3866139EA821}">
-      <dsp:nvSpPr>
-        <dsp:cNvPr id="0" name=""/>
-        <dsp:cNvSpPr/>
-      </dsp:nvSpPr>
-      <dsp:spPr>
-        <a:xfrm>
-          <a:off x="746925" y="0"/>
-          <a:ext cx="8465157" cy="3313023"/>
-        </a:xfrm>
-        <a:prstGeom prst="rightArrow">
-          <a:avLst/>
-        </a:prstGeom>
-        <a:solidFill>
-          <a:schemeClr val="accent1">
-            <a:tint val="40000"/>
-            <a:hueOff val="0"/>
-            <a:satOff val="0"/>
-            <a:lumOff val="0"/>
-            <a:alphaOff val="0"/>
-          </a:schemeClr>
-        </a:solidFill>
-        <a:ln>
-          <a:noFill/>
-        </a:ln>
-        <a:effectLst>
-          <a:outerShdw blurRad="38100" dist="25400" dir="5400000" rotWithShape="0">
-            <a:srgbClr val="000000">
-              <a:alpha val="35000"/>
-            </a:srgbClr>
-          </a:outerShdw>
-        </a:effectLst>
-      </dsp:spPr>
-      <dsp:style>
-        <a:lnRef idx="0">
-          <a:scrgbClr r="0" g="0" b="0"/>
-        </a:lnRef>
-        <a:fillRef idx="1">
-          <a:scrgbClr r="0" g="0" b="0"/>
-        </a:fillRef>
-        <a:effectRef idx="2">
-          <a:scrgbClr r="0" g="0" b="0"/>
-        </a:effectRef>
-        <a:fontRef idx="minor"/>
-      </dsp:style>
-    </dsp:sp>
-    <dsp:sp modelId="{91398163-AA9A-475A-8AD2-2C6D3E09FDD5}">
-      <dsp:nvSpPr>
-        <dsp:cNvPr id="0" name=""/>
-        <dsp:cNvSpPr/>
-      </dsp:nvSpPr>
-      <dsp:spPr>
-        <a:xfrm>
-          <a:off x="3403" y="993906"/>
-          <a:ext cx="2211600" cy="1325209"/>
-        </a:xfrm>
-        <a:prstGeom prst="roundRect">
-          <a:avLst/>
-        </a:prstGeom>
-        <a:solidFill>
-          <a:schemeClr val="lt1"/>
-        </a:solidFill>
-        <a:ln w="28575" cap="rnd" cmpd="sng" algn="ctr">
-          <a:solidFill>
-            <a:schemeClr val="accent1"/>
-          </a:solidFill>
-          <a:prstDash val="solid"/>
-        </a:ln>
-        <a:effectLst>
-          <a:outerShdw blurRad="254000" dist="38100" algn="l" rotWithShape="0">
-            <a:prstClr val="black">
-              <a:alpha val="40000"/>
-            </a:prstClr>
-          </a:outerShdw>
-        </a:effectLst>
-      </dsp:spPr>
-      <dsp:style>
-        <a:lnRef idx="2">
-          <a:schemeClr val="accent1"/>
-        </a:lnRef>
-        <a:fillRef idx="1">
-          <a:schemeClr val="lt1"/>
-        </a:fillRef>
-        <a:effectRef idx="0">
-          <a:schemeClr val="accent1"/>
-        </a:effectRef>
-        <a:fontRef idx="minor">
-          <a:schemeClr val="dk1"/>
-        </a:fontRef>
-      </dsp:style>
-      <dsp:txBody>
-        <a:bodyPr spcFirstLastPara="0" vert="horz" wrap="square" lIns="91440" tIns="91440" rIns="91440" bIns="91440" numCol="1" spcCol="1270" anchor="ctr" anchorCtr="0">
-          <a:noAutofit/>
-        </a:bodyPr>
-        <a:lstStyle/>
-        <a:p>
-          <a:pPr marL="0" lvl="0" indent="0" algn="ctr" defTabSz="1066800">
-            <a:lnSpc>
-              <a:spcPct val="90000"/>
-            </a:lnSpc>
-            <a:spcBef>
-              <a:spcPct val="0"/>
-            </a:spcBef>
-            <a:spcAft>
-              <a:spcPct val="35000"/>
-            </a:spcAft>
-            <a:buNone/>
-          </a:pPr>
-          <a:r>
-            <a:rPr lang="es-CL" sz="2400" kern="1200" dirty="0">
-              <a:effectLst>
-                <a:outerShdw blurRad="50800" dist="38100" algn="l" rotWithShape="0">
-                  <a:prstClr val="black">
-                    <a:alpha val="40000"/>
-                  </a:prstClr>
-                </a:outerShdw>
-              </a:effectLst>
-            </a:rPr>
-            <a:t>Presentación del Manual</a:t>
-          </a:r>
-        </a:p>
-      </dsp:txBody>
-      <dsp:txXfrm>
-        <a:off x="68094" y="1058597"/>
-        <a:ext cx="2082218" cy="1195827"/>
-      </dsp:txXfrm>
-    </dsp:sp>
-    <dsp:sp modelId="{E63B98BD-8AB2-47CA-8990-789C16510929}">
-      <dsp:nvSpPr>
-        <dsp:cNvPr id="0" name=""/>
-        <dsp:cNvSpPr/>
-      </dsp:nvSpPr>
-      <dsp:spPr>
-        <a:xfrm>
-          <a:off x="2583604" y="993906"/>
-          <a:ext cx="2211600" cy="1325209"/>
-        </a:xfrm>
-        <a:prstGeom prst="roundRect">
-          <a:avLst/>
-        </a:prstGeom>
-        <a:solidFill>
-          <a:schemeClr val="lt1"/>
-        </a:solidFill>
-        <a:ln w="28575" cap="rnd" cmpd="sng" algn="ctr">
-          <a:solidFill>
-            <a:schemeClr val="accent1"/>
-          </a:solidFill>
-          <a:prstDash val="solid"/>
-        </a:ln>
-        <a:effectLst>
-          <a:outerShdw blurRad="254000" dist="38100" algn="l" rotWithShape="0">
-            <a:prstClr val="black">
-              <a:alpha val="40000"/>
-            </a:prstClr>
-          </a:outerShdw>
-        </a:effectLst>
-      </dsp:spPr>
-      <dsp:style>
-        <a:lnRef idx="2">
-          <a:schemeClr val="accent1"/>
-        </a:lnRef>
-        <a:fillRef idx="1">
-          <a:schemeClr val="lt1"/>
-        </a:fillRef>
-        <a:effectRef idx="0">
-          <a:schemeClr val="accent1"/>
-        </a:effectRef>
-        <a:fontRef idx="minor">
-          <a:schemeClr val="dk1"/>
-        </a:fontRef>
-      </dsp:style>
-      <dsp:txBody>
-        <a:bodyPr spcFirstLastPara="0" vert="horz" wrap="square" lIns="91440" tIns="91440" rIns="91440" bIns="91440" numCol="1" spcCol="1270" anchor="ctr" anchorCtr="0">
-          <a:noAutofit/>
-        </a:bodyPr>
-        <a:lstStyle/>
-        <a:p>
-          <a:pPr marL="0" lvl="0" indent="0" algn="ctr" defTabSz="1066800">
-            <a:lnSpc>
-              <a:spcPct val="90000"/>
-            </a:lnSpc>
-            <a:spcBef>
-              <a:spcPct val="0"/>
-            </a:spcBef>
-            <a:spcAft>
-              <a:spcPct val="35000"/>
-            </a:spcAft>
-            <a:buNone/>
-          </a:pPr>
-          <a:r>
-            <a:rPr lang="es-CL" sz="2400" kern="1200" dirty="0">
-              <a:effectLst>
-                <a:outerShdw blurRad="50800" dist="38100" algn="l" rotWithShape="0">
-                  <a:prstClr val="black">
-                    <a:alpha val="40000"/>
-                  </a:prstClr>
-                </a:outerShdw>
-              </a:effectLst>
-            </a:rPr>
-            <a:t>Socialización</a:t>
-          </a:r>
-        </a:p>
-      </dsp:txBody>
-      <dsp:txXfrm>
-        <a:off x="2648295" y="1058597"/>
-        <a:ext cx="2082218" cy="1195827"/>
-      </dsp:txXfrm>
-    </dsp:sp>
-    <dsp:sp modelId="{CC2277CE-30B9-465B-8C9A-335A7CD03AEB}">
-      <dsp:nvSpPr>
-        <dsp:cNvPr id="0" name=""/>
-        <dsp:cNvSpPr/>
-      </dsp:nvSpPr>
-      <dsp:spPr>
-        <a:xfrm>
-          <a:off x="5163804" y="993906"/>
-          <a:ext cx="2211600" cy="1325209"/>
-        </a:xfrm>
-        <a:prstGeom prst="roundRect">
-          <a:avLst/>
-        </a:prstGeom>
-        <a:solidFill>
-          <a:schemeClr val="lt1"/>
-        </a:solidFill>
-        <a:ln w="28575" cap="rnd" cmpd="sng" algn="ctr">
-          <a:solidFill>
-            <a:schemeClr val="accent1"/>
-          </a:solidFill>
-          <a:prstDash val="solid"/>
-        </a:ln>
-        <a:effectLst>
-          <a:outerShdw blurRad="254000" dist="38100" algn="l" rotWithShape="0">
-            <a:prstClr val="black">
-              <a:alpha val="40000"/>
-            </a:prstClr>
-          </a:outerShdw>
-        </a:effectLst>
-      </dsp:spPr>
-      <dsp:style>
-        <a:lnRef idx="2">
-          <a:schemeClr val="accent1"/>
-        </a:lnRef>
-        <a:fillRef idx="1">
-          <a:schemeClr val="lt1"/>
-        </a:fillRef>
-        <a:effectRef idx="0">
-          <a:schemeClr val="accent1"/>
-        </a:effectRef>
-        <a:fontRef idx="minor">
-          <a:schemeClr val="dk1"/>
-        </a:fontRef>
-      </dsp:style>
-      <dsp:txBody>
-        <a:bodyPr spcFirstLastPara="0" vert="horz" wrap="square" lIns="91440" tIns="91440" rIns="91440" bIns="91440" numCol="1" spcCol="1270" anchor="ctr" anchorCtr="0">
-          <a:noAutofit/>
-        </a:bodyPr>
-        <a:lstStyle/>
-        <a:p>
-          <a:pPr marL="0" lvl="0" indent="0" algn="ctr" defTabSz="1066800">
-            <a:lnSpc>
-              <a:spcPct val="90000"/>
-            </a:lnSpc>
-            <a:spcBef>
-              <a:spcPct val="0"/>
-            </a:spcBef>
-            <a:spcAft>
-              <a:spcPct val="35000"/>
-            </a:spcAft>
-            <a:buNone/>
-          </a:pPr>
-          <a:r>
-            <a:rPr lang="es-CL" sz="2400" kern="1200" dirty="0">
-              <a:effectLst>
-                <a:outerShdw blurRad="50800" dist="38100" algn="l" rotWithShape="0">
-                  <a:prstClr val="black">
-                    <a:alpha val="40000"/>
-                  </a:prstClr>
-                </a:outerShdw>
-              </a:effectLst>
-            </a:rPr>
-            <a:t>Definición de Política</a:t>
-          </a:r>
-        </a:p>
-      </dsp:txBody>
-      <dsp:txXfrm>
-        <a:off x="5228495" y="1058597"/>
-        <a:ext cx="2082218" cy="1195827"/>
-      </dsp:txXfrm>
-    </dsp:sp>
-    <dsp:sp modelId="{D51159D7-5249-4C18-86F8-F27B46708FCB}">
-      <dsp:nvSpPr>
-        <dsp:cNvPr id="0" name=""/>
-        <dsp:cNvSpPr/>
-      </dsp:nvSpPr>
-      <dsp:spPr>
-        <a:xfrm>
-          <a:off x="7744004" y="993906"/>
-          <a:ext cx="2211600" cy="1325209"/>
-        </a:xfrm>
-        <a:prstGeom prst="roundRect">
-          <a:avLst/>
-        </a:prstGeom>
-        <a:solidFill>
-          <a:schemeClr val="lt1"/>
-        </a:solidFill>
-        <a:ln w="28575" cap="rnd" cmpd="sng" algn="ctr">
-          <a:solidFill>
-            <a:schemeClr val="accent1"/>
-          </a:solidFill>
-          <a:prstDash val="solid"/>
-        </a:ln>
-        <a:effectLst>
-          <a:outerShdw blurRad="254000" dist="38100" algn="l" rotWithShape="0">
-            <a:prstClr val="black">
-              <a:alpha val="40000"/>
-            </a:prstClr>
-          </a:outerShdw>
-        </a:effectLst>
-      </dsp:spPr>
-      <dsp:style>
-        <a:lnRef idx="2">
-          <a:schemeClr val="accent1"/>
-        </a:lnRef>
-        <a:fillRef idx="1">
-          <a:schemeClr val="lt1"/>
-        </a:fillRef>
-        <a:effectRef idx="0">
-          <a:schemeClr val="accent1"/>
-        </a:effectRef>
-        <a:fontRef idx="minor">
-          <a:schemeClr val="dk1"/>
-        </a:fontRef>
-      </dsp:style>
-      <dsp:txBody>
-        <a:bodyPr spcFirstLastPara="0" vert="horz" wrap="square" lIns="91440" tIns="91440" rIns="91440" bIns="91440" numCol="1" spcCol="1270" anchor="ctr" anchorCtr="0">
-          <a:noAutofit/>
-        </a:bodyPr>
-        <a:lstStyle/>
-        <a:p>
-          <a:pPr marL="0" lvl="0" indent="0" algn="ctr" defTabSz="1066800">
-            <a:lnSpc>
-              <a:spcPct val="100000"/>
-            </a:lnSpc>
-            <a:spcBef>
-              <a:spcPct val="0"/>
-            </a:spcBef>
-            <a:spcAft>
-              <a:spcPts val="0"/>
-            </a:spcAft>
-            <a:buNone/>
-          </a:pPr>
-          <a:r>
-            <a:rPr lang="es-CL" sz="2400" kern="1200" dirty="0">
-              <a:effectLst>
-                <a:outerShdw blurRad="50800" dist="38100" algn="l" rotWithShape="0">
-                  <a:prstClr val="black">
-                    <a:alpha val="40000"/>
-                  </a:prstClr>
-                </a:outerShdw>
-              </a:effectLst>
-            </a:rPr>
-            <a:t>Marcha </a:t>
-          </a:r>
-        </a:p>
-        <a:p>
-          <a:pPr marL="0" lvl="0" indent="0" algn="ctr" defTabSz="1066800">
-            <a:lnSpc>
-              <a:spcPct val="100000"/>
-            </a:lnSpc>
-            <a:spcBef>
-              <a:spcPct val="0"/>
-            </a:spcBef>
-            <a:spcAft>
-              <a:spcPts val="0"/>
-            </a:spcAft>
-            <a:buNone/>
-          </a:pPr>
-          <a:r>
-            <a:rPr lang="es-CL" sz="2400" kern="1200" dirty="0">
-              <a:effectLst>
-                <a:outerShdw blurRad="50800" dist="38100" algn="l" rotWithShape="0">
-                  <a:prstClr val="black">
-                    <a:alpha val="40000"/>
-                  </a:prstClr>
-                </a:outerShdw>
-              </a:effectLst>
-            </a:rPr>
-            <a:t>Blanca</a:t>
-          </a:r>
-        </a:p>
-      </dsp:txBody>
-      <dsp:txXfrm>
-        <a:off x="7808695" y="1058597"/>
-        <a:ext cx="2082218" cy="1195827"/>
-      </dsp:txXfrm>
-    </dsp:sp>
-  </dsp:spTree>
-</dsp:drawing>
-</file>
-
-<file path=ppt/diagrams/layout1.xml><?xml version="1.0" encoding="utf-8"?>
-<dgm:layoutDef xmlns:dgm="http://schemas.openxmlformats.org/drawingml/2006/diagram" xmlns:a="http://schemas.openxmlformats.org/drawingml/2006/main" uniqueId="urn:microsoft.com/office/officeart/2005/8/layout/hProcess9">
-  <dgm:title val=""/>
-  <dgm:desc val=""/>
-  <dgm:catLst>
-    <dgm:cat type="process" pri="5000"/>
-    <dgm:cat type="convert" pri="13000"/>
-  </dgm:catLst>
-  <dgm:sampData useDef="1">
-    <dgm:dataModel>
-      <dgm:ptLst/>
-      <dgm:bg/>
-      <dgm:whole/>
-    </dgm:dataModel>
-  </dgm:sampData>
-  <dgm:styleData>
-    <dgm:dataModel>
-      <dgm:ptLst>
-        <dgm:pt modelId="0" type="doc"/>
-        <dgm:pt modelId="1"/>
-        <dgm:pt modelId="2"/>
-      </dgm:ptLst>
-      <dgm:cxnLst>
-        <dgm:cxn modelId="3" srcId="0" destId="1" srcOrd="0" destOrd="0"/>
-        <dgm:cxn modelId="4" srcId="0" destId="2" srcOrd="1" destOrd="0"/>
-      </dgm:cxnLst>
-      <dgm:bg/>
-      <dgm:whole/>
-    </dgm:dataModel>
-  </dgm:styleData>
-  <dgm:clrData>
-    <dgm:dataModel>
-      <dgm:ptLst>
-        <dgm:pt modelId="0" type="doc"/>
-        <dgm:pt modelId="1"/>
-        <dgm:pt modelId="2"/>
-        <dgm:pt modelId="3"/>
-        <dgm:pt modelId="4"/>
-      </dgm:ptLst>
-      <dgm:cxnLst>
-        <dgm:cxn modelId="5" srcId="0" destId="1" srcOrd="0" destOrd="0"/>
-        <dgm:cxn modelId="6" srcId="0" destId="2" srcOrd="1" destOrd="0"/>
-        <dgm:cxn modelId="7" srcId="0" destId="3" srcOrd="2" destOrd="0"/>
-        <dgm:cxn modelId="8" srcId="0" destId="4" srcOrd="3" destOrd="0"/>
-      </dgm:cxnLst>
-      <dgm:bg/>
-      <dgm:whole/>
-    </dgm:dataModel>
-  </dgm:clrData>
-  <dgm:layoutNode name="CompostProcess">
-    <dgm:varLst>
-      <dgm:dir/>
-      <dgm:resizeHandles val="exact"/>
-    </dgm:varLst>
-    <dgm:alg type="composite">
-      <dgm:param type="horzAlign" val="ctr"/>
-      <dgm:param type="vertAlign" val="mid"/>
-    </dgm:alg>
-    <dgm:shape xmlns:r="http://schemas.openxmlformats.org/officeDocument/2006/relationships" r:blip="">
-      <dgm:adjLst/>
-    </dgm:shape>
-    <dgm:presOf/>
-    <dgm:constrLst>
-      <dgm:constr type="w" for="ch" forName="arrow" refType="w" fact="0.85"/>
-      <dgm:constr type="h" for="ch" forName="arrow" refType="h"/>
-      <dgm:constr type="ctrX" for="ch" forName="arrow" refType="w" fact="0.5"/>
-      <dgm:constr type="ctrY" for="ch" forName="arrow" refType="h" fact="0.5"/>
-      <dgm:constr type="w" for="ch" forName="linearProcess" refType="w"/>
-      <dgm:constr type="h" for="ch" forName="linearProcess" refType="h" fact="0.4"/>
-      <dgm:constr type="ctrX" for="ch" forName="linearProcess" refType="w" fact="0.5"/>
-      <dgm:constr type="ctrY" for="ch" forName="linearProcess" refType="h" fact="0.5"/>
-    </dgm:constrLst>
-    <dgm:ruleLst/>
-    <dgm:layoutNode name="arrow" styleLbl="bgShp">
-      <dgm:alg type="sp"/>
-      <dgm:choose name="Name0">
-        <dgm:if name="Name1" func="var" arg="dir" op="equ" val="norm">
-          <dgm:shape xmlns:r="http://schemas.openxmlformats.org/officeDocument/2006/relationships" type="rightArrow" r:blip="">
-            <dgm:adjLst/>
-          </dgm:shape>
-        </dgm:if>
-        <dgm:else name="Name2">
-          <dgm:shape xmlns:r="http://schemas.openxmlformats.org/officeDocument/2006/relationships" type="leftArrow" r:blip="">
-            <dgm:adjLst/>
-          </dgm:shape>
-        </dgm:else>
-      </dgm:choose>
-      <dgm:presOf/>
-      <dgm:constrLst/>
-      <dgm:ruleLst/>
-    </dgm:layoutNode>
-    <dgm:layoutNode name="linearProcess">
-      <dgm:choose name="Name3">
-        <dgm:if name="Name4" func="var" arg="dir" op="equ" val="norm">
-          <dgm:alg type="lin"/>
-        </dgm:if>
-        <dgm:else name="Name5">
-          <dgm:alg type="lin">
-            <dgm:param type="linDir" val="fromR"/>
-          </dgm:alg>
-        </dgm:else>
-      </dgm:choose>
-      <dgm:shape xmlns:r="http://schemas.openxmlformats.org/officeDocument/2006/relationships" r:blip="">
-        <dgm:adjLst/>
-      </dgm:shape>
-      <dgm:presOf/>
-      <dgm:constrLst>
-        <dgm:constr type="userA" for="ch" ptType="node" refType="w"/>
-        <dgm:constr type="h" for="ch" ptType="node" refType="h"/>
-        <dgm:constr type="w" for="ch" ptType="node" op="equ"/>
-        <dgm:constr type="w" for="ch" forName="sibTrans" refType="w" fact="0.05"/>
-        <dgm:constr type="primFontSz" for="ch" ptType="node" op="equ" val="65"/>
-      </dgm:constrLst>
-      <dgm:ruleLst/>
-      <dgm:forEach name="Name6" axis="ch" ptType="node">
-        <dgm:layoutNode name="textNode" styleLbl="node1">
-          <dgm:varLst>
-            <dgm:bulletEnabled val="1"/>
-          </dgm:varLst>
-          <dgm:alg type="tx"/>
-          <dgm:shape xmlns:r="http://schemas.openxmlformats.org/officeDocument/2006/relationships" type="roundRect" r:blip="">
-            <dgm:adjLst/>
-          </dgm:shape>
-          <dgm:presOf axis="desOrSelf" ptType="node"/>
-          <dgm:constrLst>
-            <dgm:constr type="userA"/>
-            <dgm:constr type="w" refType="userA" fact="0.3"/>
-            <dgm:constr type="tMarg" refType="primFontSz" fact="0.3"/>
-            <dgm:constr type="bMarg" refType="primFontSz" fact="0.3"/>
-            <dgm:constr type="lMarg" refType="primFontSz" fact="0.3"/>
-            <dgm:constr type="rMarg" refType="primFontSz" fact="0.3"/>
-          </dgm:constrLst>
-          <dgm:ruleLst>
-            <dgm:rule type="w" val="NaN" fact="1" max="NaN"/>
-            <dgm:rule type="primFontSz" val="5" fact="NaN" max="NaN"/>
-          </dgm:ruleLst>
-        </dgm:layoutNode>
-        <dgm:forEach name="Name7" axis="followSib" ptType="sibTrans" cnt="1">
-          <dgm:layoutNode name="sibTrans">
-            <dgm:alg type="sp"/>
-            <dgm:shape xmlns:r="http://schemas.openxmlformats.org/officeDocument/2006/relationships" r:blip="">
-              <dgm:adjLst/>
-            </dgm:shape>
-            <dgm:presOf/>
-            <dgm:constrLst/>
-            <dgm:ruleLst/>
-          </dgm:layoutNode>
-        </dgm:forEach>
-      </dgm:forEach>
-    </dgm:layoutNode>
-  </dgm:layoutNode>
-</dgm:layoutDef>
-</file>
-
-<file path=ppt/diagrams/quickStyle1.xml><?xml version="1.0" encoding="utf-8"?>
-<dgm:styleDef xmlns:dgm="http://schemas.openxmlformats.org/drawingml/2006/diagram" xmlns:a="http://schemas.openxmlformats.org/drawingml/2006/main" uniqueId="urn:microsoft.com/office/officeart/2005/8/quickstyle/simple4">
-  <dgm:title val=""/>
-  <dgm:desc val=""/>
-  <dgm:catLst>
-    <dgm:cat type="simple" pri="10400"/>
-  </dgm:catLst>
-  <dgm:scene3d>
-    <a:camera prst="orthographicFront"/>
-    <a:lightRig rig="threePt" dir="t"/>
-  </dgm:scene3d>
-  <dgm:styleLbl name="node0">
-    <dgm:scene3d>
-      <a:camera prst="orthographicFront"/>
-      <a:lightRig rig="threePt" dir="t"/>
-    </dgm:scene3d>
-    <dgm:sp3d/>
-    <dgm:txPr/>
-    <dgm:style>
-      <a:lnRef idx="0">
-        <a:scrgbClr r="0" g="0" b="0"/>
-      </a:lnRef>
-      <a:fillRef idx="3">
-        <a:scrgbClr r="0" g="0" b="0"/>
-      </a:fillRef>
-      <a:effectRef idx="2">
-        <a:scrgbClr r="0" g="0" b="0"/>
-      </a:effectRef>
-      <a:fontRef idx="minor">
-        <a:schemeClr val="lt1"/>
-      </a:fontRef>
-    </dgm:style>
-  </dgm:styleLbl>
-  <dgm:styleLbl name="lnNode1">
-    <dgm:scene3d>
-      <a:camera prst="orthographicFront"/>
-      <a:lightRig rig="threePt" dir="t"/>
-    </dgm:scene3d>
-    <dgm:sp3d/>
-    <dgm:txPr/>
-    <dgm:style>
-      <a:lnRef idx="1">
-        <a:scrgbClr r="0" g="0" b="0"/>
-      </a:lnRef>
-      <a:fillRef idx="3">
-        <a:scrgbClr r="0" g="0" b="0"/>
-      </a:fillRef>
-      <a:effectRef idx="2">
-        <a:scrgbClr r="0" g="0" b="0"/>
-      </a:effectRef>
-      <a:fontRef idx="minor">
-        <a:schemeClr val="lt1"/>
-      </a:fontRef>
-    </dgm:style>
-  </dgm:styleLbl>
-  <dgm:styleLbl name="vennNode1">
-    <dgm:scene3d>
-      <a:camera prst="orthographicFront"/>
-      <a:lightRig rig="threePt" dir="t"/>
-    </dgm:scene3d>
-    <dgm:sp3d/>
-    <dgm:txPr/>
-    <dgm:style>
-      <a:lnRef idx="0">
-        <a:scrgbClr r="0" g="0" b="0"/>
-      </a:lnRef>
-      <a:fillRef idx="3">
-        <a:scrgbClr r="0" g="0" b="0"/>
-      </a:fillRef>
-      <a:effectRef idx="0">
-        <a:scrgbClr r="0" g="0" b="0"/>
-      </a:effectRef>
-      <a:fontRef idx="minor">
-        <a:schemeClr val="tx1"/>
-      </a:fontRef>
-    </dgm:style>
-  </dgm:styleLbl>
-  <dgm:styleLbl name="alignNode1">
-    <dgm:scene3d>
-      <a:camera prst="orthographicFront"/>
-      <a:lightRig rig="threePt" dir="t"/>
-    </dgm:scene3d>
-    <dgm:sp3d/>
-    <dgm:txPr/>
-    <dgm:style>
-      <a:lnRef idx="1">
-        <a:scrgbClr r="0" g="0" b="0"/>
-      </a:lnRef>
-      <a:fillRef idx="3">
-        <a:scrgbClr r="0" g="0" b="0"/>
-      </a:fillRef>
-      <a:effectRef idx="2">
-        <a:scrgbClr r="0" g="0" b="0"/>
-      </a:effectRef>
-      <a:fontRef idx="minor">
-        <a:schemeClr val="lt1"/>
-      </a:fontRef>
-    </dgm:style>
-  </dgm:styleLbl>
-  <dgm:styleLbl name="node1">
-    <dgm:scene3d>
-      <a:camera prst="orthographicFront"/>
-      <a:lightRig rig="threePt" dir="t"/>
-    </dgm:scene3d>
-    <dgm:sp3d/>
-    <dgm:txPr/>
-    <dgm:style>
-      <a:lnRef idx="0">
-        <a:scrgbClr r="0" g="0" b="0"/>
-      </a:lnRef>
-      <a:fillRef idx="3">
-        <a:scrgbClr r="0" g="0" b="0"/>
-      </a:fillRef>
-      <a:effectRef idx="2">
-        <a:scrgbClr r="0" g="0" b="0"/>
-      </a:effectRef>
-      <a:fontRef idx="minor">
-        <a:schemeClr val="lt1"/>
-      </a:fontRef>
-    </dgm:style>
-  </dgm:styleLbl>
-  <dgm:styleLbl name="node2">
-    <dgm:scene3d>
-      <a:camera prst="orthographicFront"/>
-      <a:lightRig rig="threePt" dir="t"/>
-    </dgm:scene3d>
-    <dgm:sp3d/>
-    <dgm:txPr/>
-    <dgm:style>
-      <a:lnRef idx="0">
-        <a:scrgbClr r="0" g="0" b="0"/>
-      </a:lnRef>
-      <a:fillRef idx="3">
-        <a:scrgbClr r="0" g="0" b="0"/>
-      </a:fillRef>
-      <a:effectRef idx="2">
-        <a:scrgbClr r="0" g="0" b="0"/>
-      </a:effectRef>
-      <a:fontRef idx="minor">
-        <a:schemeClr val="lt1"/>
-      </a:fontRef>
-    </dgm:style>
-  </dgm:styleLbl>
-  <dgm:styleLbl name="node3">
-    <dgm:scene3d>
-      <a:camera prst="orthographicFront"/>
-      <a:lightRig rig="threePt" dir="t"/>
-    </dgm:scene3d>
-    <dgm:sp3d/>
-    <dgm:txPr/>
-    <dgm:style>
-      <a:lnRef idx="0">
-        <a:scrgbClr r="0" g="0" b="0"/>
-      </a:lnRef>
-      <a:fillRef idx="3">
-        <a:scrgbClr r="0" g="0" b="0"/>
-      </a:fillRef>
-      <a:effectRef idx="2">
-        <a:scrgbClr r="0" g="0" b="0"/>
-      </a:effectRef>
-      <a:fontRef idx="minor">
-        <a:schemeClr val="lt1"/>
-      </a:fontRef>
-    </dgm:style>
-  </dgm:styleLbl>
-  <dgm:styleLbl name="node4">
-    <dgm:scene3d>
-      <a:camera prst="orthographicFront"/>
-      <a:lightRig rig="threePt" dir="t"/>
-    </dgm:scene3d>
-    <dgm:sp3d/>
-    <dgm:txPr/>
-    <dgm:style>
-      <a:lnRef idx="0">
-        <a:scrgbClr r="0" g="0" b="0"/>
-      </a:lnRef>
-      <a:fillRef idx="3">
-        <a:scrgbClr r="0" g="0" b="0"/>
-      </a:fillRef>
-      <a:effectRef idx="2">
-        <a:scrgbClr r="0" g="0" b="0"/>
-      </a:effectRef>
-      <a:fontRef idx="minor">
-        <a:schemeClr val="lt1"/>
-      </a:fontRef>
-    </dgm:style>
-  </dgm:styleLbl>
-  <dgm:styleLbl name="fgImgPlace1">
-    <dgm:scene3d>
-      <a:camera prst="orthographicFront"/>
-      <a:lightRig rig="threePt" dir="t"/>
-    </dgm:scene3d>
-    <dgm:sp3d/>
-    <dgm:txPr/>
-    <dgm:style>
-      <a:lnRef idx="0">
-        <a:scrgbClr r="0" g="0" b="0"/>
-      </a:lnRef>
-      <a:fillRef idx="1">
-        <a:scrgbClr r="0" g="0" b="0"/>
-      </a:fillRef>
-      <a:effectRef idx="2">
-        <a:scrgbClr r="0" g="0" b="0"/>
-      </a:effectRef>
-      <a:fontRef idx="minor"/>
-    </dgm:style>
-  </dgm:styleLbl>
-  <dgm:styleLbl name="alignImgPlace1">
-    <dgm:scene3d>
-      <a:camera prst="orthographicFront"/>
-      <a:lightRig rig="threePt" dir="t"/>
-    </dgm:scene3d>
-    <dgm:sp3d/>
-    <dgm:txPr/>
-    <dgm:style>
-      <a:lnRef idx="0">
-        <a:scrgbClr r="0" g="0" b="0"/>
-      </a:lnRef>
-      <a:fillRef idx="1">
-        <a:scrgbClr r="0" g="0" b="0"/>
-      </a:fillRef>
-      <a:effectRef idx="2">
-        <a:scrgbClr r="0" g="0" b="0"/>
-      </a:effectRef>
-      <a:fontRef idx="minor"/>
-    </dgm:style>
-  </dgm:styleLbl>
-  <dgm:styleLbl name="bgImgPlace1">
-    <dgm:scene3d>
-      <a:camera prst="orthographicFront"/>
-      <a:lightRig rig="threePt" dir="t"/>
-    </dgm:scene3d>
-    <dgm:sp3d/>
-    <dgm:txPr/>
-    <dgm:style>
-      <a:lnRef idx="0">
-        <a:scrgbClr r="0" g="0" b="0"/>
-      </a:lnRef>
-      <a:fillRef idx="1">
-        <a:scrgbClr r="0" g="0" b="0"/>
-      </a:fillRef>
-      <a:effectRef idx="2">
-        <a:scrgbClr r="0" g="0" b="0"/>
-      </a:effectRef>
-      <a:fontRef idx="minor"/>
-    </dgm:style>
-  </dgm:styleLbl>
-  <dgm:styleLbl name="sibTrans2D1">
-    <dgm:scene3d>
-      <a:camera prst="orthographicFront"/>
-      <a:lightRig rig="threePt" dir="t"/>
-    </dgm:scene3d>
-    <dgm:sp3d/>
-    <dgm:txPr/>
-    <dgm:style>
-      <a:lnRef idx="0">
-        <a:scrgbClr r="0" g="0" b="0"/>
-      </a:lnRef>
-      <a:fillRef idx="3">
-        <a:scrgbClr r="0" g="0" b="0"/>
-      </a:fillRef>
-      <a:effectRef idx="2">
-        <a:scrgbClr r="0" g="0" b="0"/>
-      </a:effectRef>
-      <a:fontRef idx="minor">
-        <a:schemeClr val="lt1"/>
-      </a:fontRef>
-    </dgm:style>
-  </dgm:styleLbl>
-  <dgm:styleLbl name="fgSibTrans2D1">
-    <dgm:scene3d>
-      <a:camera prst="orthographicFront"/>
-      <a:lightRig rig="threePt" dir="t"/>
-    </dgm:scene3d>
-    <dgm:sp3d/>
-    <dgm:txPr/>
-    <dgm:style>
-      <a:lnRef idx="0">
-        <a:scrgbClr r="0" g="0" b="0"/>
-      </a:lnRef>
-      <a:fillRef idx="3">
-        <a:scrgbClr r="0" g="0" b="0"/>
-      </a:fillRef>
-      <a:effectRef idx="2">
-        <a:scrgbClr r="0" g="0" b="0"/>
-      </a:effectRef>
-      <a:fontRef idx="minor">
-        <a:schemeClr val="lt1"/>
-      </a:fontRef>
-    </dgm:style>
-  </dgm:styleLbl>
-  <dgm:styleLbl name="bgSibTrans2D1">
-    <dgm:scene3d>
-      <a:camera prst="orthographicFront"/>
-      <a:lightRig rig="threePt" dir="t"/>
-    </dgm:scene3d>
-    <dgm:sp3d/>
-    <dgm:txPr/>
-    <dgm:style>
-      <a:lnRef idx="0">
-        <a:scrgbClr r="0" g="0" b="0"/>
-      </a:lnRef>
-      <a:fillRef idx="3">
-        <a:scrgbClr r="0" g="0" b="0"/>
-      </a:fillRef>
-      <a:effectRef idx="2">
-        <a:scrgbClr r="0" g="0" b="0"/>
-      </a:effectRef>
-      <a:fontRef idx="minor">
-        <a:schemeClr val="lt1"/>
-      </a:fontRef>
-    </dgm:style>
-  </dgm:styleLbl>
-  <dgm:styleLbl name="sibTrans1D1">
-    <dgm:scene3d>
-      <a:camera prst="orthographicFront"/>
-      <a:lightRig rig="threePt" dir="t"/>
-    </dgm:scene3d>
-    <dgm:sp3d/>
-    <dgm:txPr/>
-    <dgm:style>
-      <a:lnRef idx="1">
-        <a:scrgbClr r="0" g="0" b="0"/>
-      </a:lnRef>
-      <a:fillRef idx="0">
-        <a:scrgbClr r="0" g="0" b="0"/>
-      </a:fillRef>
-      <a:effectRef idx="0">
-        <a:scrgbClr r="0" g="0" b="0"/>
-      </a:effectRef>
-      <a:fontRef idx="minor"/>
-    </dgm:style>
-  </dgm:styleLbl>
-  <dgm:styleLbl name="callout">
-    <dgm:scene3d>
-      <a:camera prst="orthographicFront"/>
-      <a:lightRig rig="threePt" dir="t"/>
-    </dgm:scene3d>
-    <dgm:sp3d/>
-    <dgm:txPr/>
-    <dgm:style>
-      <a:lnRef idx="2">
-        <a:scrgbClr r="0" g="0" b="0"/>
-      </a:lnRef>
-      <a:fillRef idx="1">
-        <a:scrgbClr r="0" g="0" b="0"/>
-      </a:fillRef>
-      <a:effectRef idx="1">
-        <a:scrgbClr r="0" g="0" b="0"/>
-      </a:effectRef>
-      <a:fontRef idx="minor"/>
-    </dgm:style>
-  </dgm:styleLbl>
-  <dgm:styleLbl name="asst0">
-    <dgm:scene3d>
-      <a:camera prst="orthographicFront"/>
-      <a:lightRig rig="threePt" dir="t"/>
-    </dgm:scene3d>
-    <dgm:sp3d/>
-    <dgm:txPr/>
-    <dgm:style>
-      <a:lnRef idx="0">
-        <a:scrgbClr r="0" g="0" b="0"/>
-      </a:lnRef>
-      <a:fillRef idx="3">
-        <a:scrgbClr r="0" g="0" b="0"/>
-      </a:fillRef>
-      <a:effectRef idx="2">
-        <a:scrgbClr r="0" g="0" b="0"/>
-      </a:effectRef>
-      <a:fontRef idx="minor">
-        <a:schemeClr val="lt1"/>
-      </a:fontRef>
-    </dgm:style>
-  </dgm:styleLbl>
-  <dgm:styleLbl name="asst1">
-    <dgm:scene3d>
-      <a:camera prst="orthographicFront"/>
-      <a:lightRig rig="threePt" dir="t"/>
-    </dgm:scene3d>
-    <dgm:sp3d/>
-    <dgm:txPr/>
-    <dgm:style>
-      <a:lnRef idx="0">
-        <a:scrgbClr r="0" g="0" b="0"/>
-      </a:lnRef>
-      <a:fillRef idx="3">
-        <a:scrgbClr r="0" g="0" b="0"/>
-      </a:fillRef>
-      <a:effectRef idx="2">
-        <a:scrgbClr r="0" g="0" b="0"/>
-      </a:effectRef>
-      <a:fontRef idx="minor">
-        <a:schemeClr val="lt1"/>
-      </a:fontRef>
-    </dgm:style>
-  </dgm:styleLbl>
-  <dgm:styleLbl name="asst2">
-    <dgm:scene3d>
-      <a:camera prst="orthographicFront"/>
-      <a:lightRig rig="threePt" dir="t"/>
-    </dgm:scene3d>
-    <dgm:sp3d/>
-    <dgm:txPr/>
-    <dgm:style>
-      <a:lnRef idx="0">
-        <a:scrgbClr r="0" g="0" b="0"/>
-      </a:lnRef>
-      <a:fillRef idx="3">
-        <a:scrgbClr r="0" g="0" b="0"/>
-      </a:fillRef>
-      <a:effectRef idx="2">
-        <a:scrgbClr r="0" g="0" b="0"/>
-      </a:effectRef>
-      <a:fontRef idx="minor">
-        <a:schemeClr val="lt1"/>
-      </a:fontRef>
-    </dgm:style>
-  </dgm:styleLbl>
-  <dgm:styleLbl name="asst3">
-    <dgm:scene3d>
-      <a:camera prst="orthographicFront"/>
-      <a:lightRig rig="threePt" dir="t"/>
-    </dgm:scene3d>
-    <dgm:sp3d/>
-    <dgm:txPr/>
-    <dgm:style>
-      <a:lnRef idx="0">
-        <a:scrgbClr r="0" g="0" b="0"/>
-      </a:lnRef>
-      <a:fillRef idx="3">
-        <a:scrgbClr r="0" g="0" b="0"/>
-      </a:fillRef>
-      <a:effectRef idx="2">
-        <a:scrgbClr r="0" g="0" b="0"/>
-      </a:effectRef>
-      <a:fontRef idx="minor">
-        <a:schemeClr val="lt1"/>
-      </a:fontRef>
-    </dgm:style>
-  </dgm:styleLbl>
-  <dgm:styleLbl name="asst4">
-    <dgm:scene3d>
-      <a:camera prst="orthographicFront"/>
-      <a:lightRig rig="threePt" dir="t"/>
-    </dgm:scene3d>
-    <dgm:sp3d/>
-    <dgm:txPr/>
-    <dgm:style>
-      <a:lnRef idx="0">
-        <a:scrgbClr r="0" g="0" b="0"/>
-      </a:lnRef>
-      <a:fillRef idx="3">
-        <a:scrgbClr r="0" g="0" b="0"/>
-      </a:fillRef>
-      <a:effectRef idx="2">
-        <a:scrgbClr r="0" g="0" b="0"/>
-      </a:effectRef>
-      <a:fontRef idx="minor">
-        <a:schemeClr val="lt1"/>
-      </a:fontRef>
-    </dgm:style>
-  </dgm:styleLbl>
-  <dgm:styleLbl name="parChTrans2D1">
-    <dgm:scene3d>
-      <a:camera prst="orthographicFront"/>
-      <a:lightRig rig="threePt" dir="t"/>
-    </dgm:scene3d>
-    <dgm:sp3d/>
-    <dgm:txPr/>
-    <dgm:style>
-      <a:lnRef idx="0">
-        <a:scrgbClr r="0" g="0" b="0"/>
-      </a:lnRef>
-      <a:fillRef idx="3">
-        <a:scrgbClr r="0" g="0" b="0"/>
-      </a:fillRef>
-      <a:effectRef idx="2">
-        <a:scrgbClr r="0" g="0" b="0"/>
-      </a:effectRef>
-      <a:fontRef idx="minor">
-        <a:schemeClr val="lt1"/>
-      </a:fontRef>
-    </dgm:style>
-  </dgm:styleLbl>
-  <dgm:styleLbl name="parChTrans2D2">
-    <dgm:scene3d>
-      <a:camera prst="orthographicFront"/>
-      <a:lightRig rig="threePt" dir="t"/>
-    </dgm:scene3d>
-    <dgm:sp3d/>
-    <dgm:txPr/>
-    <dgm:style>
-      <a:lnRef idx="0">
-        <a:scrgbClr r="0" g="0" b="0"/>
-      </a:lnRef>
-      <a:fillRef idx="3">
-        <a:scrgbClr r="0" g="0" b="0"/>
-      </a:fillRef>
-      <a:effectRef idx="2">
-        <a:scrgbClr r="0" g="0" b="0"/>
-      </a:effectRef>
-      <a:fontRef idx="minor">
-        <a:schemeClr val="lt1"/>
-      </a:fontRef>
-    </dgm:style>
-  </dgm:styleLbl>
-  <dgm:styleLbl name="parChTrans2D3">
-    <dgm:scene3d>
-      <a:camera prst="orthographicFront"/>
-      <a:lightRig rig="threePt" dir="t"/>
-    </dgm:scene3d>
-    <dgm:sp3d/>
-    <dgm:txPr/>
-    <dgm:style>
-      <a:lnRef idx="1">
-        <a:scrgbClr r="0" g="0" b="0"/>
-      </a:lnRef>
-      <a:fillRef idx="3">
-        <a:scrgbClr r="0" g="0" b="0"/>
-      </a:fillRef>
-      <a:effectRef idx="2">
-        <a:scrgbClr r="0" g="0" b="0"/>
-      </a:effectRef>
-      <a:fontRef idx="minor">
-        <a:schemeClr val="lt1"/>
-      </a:fontRef>
-    </dgm:style>
-  </dgm:styleLbl>
-  <dgm:styleLbl name="parChTrans2D4">
-    <dgm:scene3d>
-      <a:camera prst="orthographicFront"/>
-      <a:lightRig rig="threePt" dir="t"/>
-    </dgm:scene3d>
-    <dgm:sp3d/>
-    <dgm:txPr/>
-    <dgm:style>
-      <a:lnRef idx="1">
-        <a:scrgbClr r="0" g="0" b="0"/>
-      </a:lnRef>
-      <a:fillRef idx="3">
-        <a:scrgbClr r="0" g="0" b="0"/>
-      </a:fillRef>
-      <a:effectRef idx="2">
-        <a:scrgbClr r="0" g="0" b="0"/>
-      </a:effectRef>
-      <a:fontRef idx="minor">
-        <a:schemeClr val="lt1"/>
-      </a:fontRef>
-    </dgm:style>
-  </dgm:styleLbl>
-  <dgm:styleLbl name="parChTrans1D1">
-    <dgm:scene3d>
-      <a:camera prst="orthographicFront"/>
-      <a:lightRig rig="threePt" dir="t"/>
-    </dgm:scene3d>
-    <dgm:sp3d/>
-    <dgm:txPr/>
-    <dgm:style>
-      <a:lnRef idx="1">
-        <a:scrgbClr r="0" g="0" b="0"/>
-      </a:lnRef>
-      <a:fillRef idx="0">
-        <a:scrgbClr r="0" g="0" b="0"/>
-      </a:fillRef>
-      <a:effectRef idx="0">
-        <a:scrgbClr r="0" g="0" b="0"/>
-      </a:effectRef>
-      <a:fontRef idx="minor"/>
-    </dgm:style>
-  </dgm:styleLbl>
-  <dgm:styleLbl name="parChTrans1D2">
-    <dgm:scene3d>
-      <a:camera prst="orthographicFront"/>
-      <a:lightRig rig="threePt" dir="t"/>
-    </dgm:scene3d>
-    <dgm:sp3d/>
-    <dgm:txPr/>
-    <dgm:style>
-      <a:lnRef idx="1">
-        <a:scrgbClr r="0" g="0" b="0"/>
-      </a:lnRef>
-      <a:fillRef idx="0">
-        <a:scrgbClr r="0" g="0" b="0"/>
-      </a:fillRef>
-      <a:effectRef idx="0">
-        <a:scrgbClr r="0" g="0" b="0"/>
-      </a:effectRef>
-      <a:fontRef idx="minor"/>
-    </dgm:style>
-  </dgm:styleLbl>
-  <dgm:styleLbl name="parChTrans1D3">
-    <dgm:scene3d>
-      <a:camera prst="orthographicFront"/>
-      <a:lightRig rig="threePt" dir="t"/>
-    </dgm:scene3d>
-    <dgm:sp3d/>
-    <dgm:txPr/>
-    <dgm:style>
-      <a:lnRef idx="1">
-        <a:scrgbClr r="0" g="0" b="0"/>
-      </a:lnRef>
-      <a:fillRef idx="0">
-        <a:scrgbClr r="0" g="0" b="0"/>
-      </a:fillRef>
-      <a:effectRef idx="0">
-        <a:scrgbClr r="0" g="0" b="0"/>
-      </a:effectRef>
-      <a:fontRef idx="minor"/>
-    </dgm:style>
-  </dgm:styleLbl>
-  <dgm:styleLbl name="parChTrans1D4">
-    <dgm:scene3d>
-      <a:camera prst="orthographicFront"/>
-      <a:lightRig rig="threePt" dir="t"/>
-    </dgm:scene3d>
-    <dgm:sp3d/>
-    <dgm:txPr/>
-    <dgm:style>
-      <a:lnRef idx="1">
-        <a:scrgbClr r="0" g="0" b="0"/>
-      </a:lnRef>
-      <a:fillRef idx="0">
-        <a:scrgbClr r="0" g="0" b="0"/>
-      </a:fillRef>
-      <a:effectRef idx="0">
-        <a:scrgbClr r="0" g="0" b="0"/>
-      </a:effectRef>
-      <a:fontRef idx="minor"/>
-    </dgm:style>
-  </dgm:styleLbl>
-  <dgm:styleLbl name="fgAcc1">
-    <dgm:scene3d>
-      <a:camera prst="orthographicFront"/>
-      <a:lightRig rig="threePt" dir="t"/>
-    </dgm:scene3d>
-    <dgm:sp3d/>
-    <dgm:txPr/>
-    <dgm:style>
-      <a:lnRef idx="1">
-        <a:scrgbClr r="0" g="0" b="0"/>
-      </a:lnRef>
-      <a:fillRef idx="1">
-        <a:scrgbClr r="0" g="0" b="0"/>
-      </a:fillRef>
-      <a:effectRef idx="0">
-        <a:scrgbClr r="0" g="0" b="0"/>
-      </a:effectRef>
-      <a:fontRef idx="minor"/>
-    </dgm:style>
-  </dgm:styleLbl>
-  <dgm:styleLbl name="conFgAcc1">
-    <dgm:scene3d>
-      <a:camera prst="orthographicFront"/>
-      <a:lightRig rig="threePt" dir="t"/>
-    </dgm:scene3d>
-    <dgm:sp3d/>
-    <dgm:txPr/>
-    <dgm:style>
-      <a:lnRef idx="1">
-        <a:scrgbClr r="0" g="0" b="0"/>
-      </a:lnRef>
-      <a:fillRef idx="1">
-        <a:scrgbClr r="0" g="0" b="0"/>
-      </a:fillRef>
-      <a:effectRef idx="0">
-        <a:scrgbClr r="0" g="0" b="0"/>
-      </a:effectRef>
-      <a:fontRef idx="minor"/>
-    </dgm:style>
-  </dgm:styleLbl>
-  <dgm:styleLbl name="alignAcc1">
-    <dgm:scene3d>
-      <a:camera prst="orthographicFront"/>
-      <a:lightRig rig="threePt" dir="t"/>
-    </dgm:scene3d>
-    <dgm:sp3d/>
-    <dgm:txPr/>
-    <dgm:style>
-      <a:lnRef idx="1">
-        <a:scrgbClr r="0" g="0" b="0"/>
-      </a:lnRef>
-      <a:fillRef idx="1">
-        <a:scrgbClr r="0" g="0" b="0"/>
-      </a:fillRef>
-      <a:effectRef idx="0">
-        <a:scrgbClr r="0" g="0" b="0"/>
-      </a:effectRef>
-      <a:fontRef idx="minor"/>
-    </dgm:style>
-  </dgm:styleLbl>
-  <dgm:styleLbl name="trAlignAcc1">
-    <dgm:scene3d>
-      <a:camera prst="orthographicFront"/>
-      <a:lightRig rig="threePt" dir="t"/>
-    </dgm:scene3d>
-    <dgm:sp3d/>
-    <dgm:txPr/>
-    <dgm:style>
-      <a:lnRef idx="1">
-        <a:scrgbClr r="0" g="0" b="0"/>
-      </a:lnRef>
-      <a:fillRef idx="1">
-        <a:scrgbClr r="0" g="0" b="0"/>
-      </a:fillRef>
-      <a:effectRef idx="0">
-        <a:scrgbClr r="0" g="0" b="0"/>
-      </a:effectRef>
-      <a:fontRef idx="minor"/>
-    </dgm:style>
-  </dgm:styleLbl>
-  <dgm:styleLbl name="bgAcc1">
-    <dgm:scene3d>
-      <a:camera prst="orthographicFront"/>
-      <a:lightRig rig="threePt" dir="t"/>
-    </dgm:scene3d>
-    <dgm:sp3d/>
-    <dgm:txPr/>
-    <dgm:style>
-      <a:lnRef idx="1">
-        <a:scrgbClr r="0" g="0" b="0"/>
-      </a:lnRef>
-      <a:fillRef idx="1">
-        <a:scrgbClr r="0" g="0" b="0"/>
-      </a:fillRef>
-      <a:effectRef idx="0">
-        <a:scrgbClr r="0" g="0" b="0"/>
-      </a:effectRef>
-      <a:fontRef idx="minor"/>
-    </dgm:style>
-  </dgm:styleLbl>
-  <dgm:styleLbl name="solidFgAcc1">
-    <dgm:scene3d>
-      <a:camera prst="orthographicFront"/>
-      <a:lightRig rig="threePt" dir="t"/>
-    </dgm:scene3d>
-    <dgm:sp3d/>
-    <dgm:txPr/>
-    <dgm:style>
-      <a:lnRef idx="1">
-        <a:scrgbClr r="0" g="0" b="0"/>
-      </a:lnRef>
-      <a:fillRef idx="1">
-        <a:scrgbClr r="0" g="0" b="0"/>
-      </a:fillRef>
-      <a:effectRef idx="0">
-        <a:scrgbClr r="0" g="0" b="0"/>
-      </a:effectRef>
-      <a:fontRef idx="minor"/>
-    </dgm:style>
-  </dgm:styleLbl>
-  <dgm:styleLbl name="solidAlignAcc1">
-    <dgm:scene3d>
-      <a:camera prst="orthographicFront"/>
-      <a:lightRig rig="threePt" dir="t"/>
-    </dgm:scene3d>
-    <dgm:sp3d/>
-    <dgm:txPr/>
-    <dgm:style>
-      <a:lnRef idx="1">
-        <a:scrgbClr r="0" g="0" b="0"/>
-      </a:lnRef>
-      <a:fillRef idx="1">
-        <a:scrgbClr r="0" g="0" b="0"/>
-      </a:fillRef>
-      <a:effectRef idx="0">
-        <a:scrgbClr r="0" g="0" b="0"/>
-      </a:effectRef>
-      <a:fontRef idx="minor"/>
-    </dgm:style>
-  </dgm:styleLbl>
-  <dgm:styleLbl name="solidBgAcc1">
-    <dgm:scene3d>
-      <a:camera prst="orthographicFront"/>
-      <a:lightRig rig="threePt" dir="t"/>
-    </dgm:scene3d>
-    <dgm:sp3d/>
-    <dgm:txPr/>
-    <dgm:style>
-      <a:lnRef idx="1">
-        <a:scrgbClr r="0" g="0" b="0"/>
-      </a:lnRef>
-      <a:fillRef idx="1">
-        <a:scrgbClr r="0" g="0" b="0"/>
-      </a:fillRef>
-      <a:effectRef idx="0">
-        <a:scrgbClr r="0" g="0" b="0"/>
-      </a:effectRef>
-      <a:fontRef idx="minor"/>
-    </dgm:style>
-  </dgm:styleLbl>
-  <dgm:styleLbl name="fgAccFollowNode1">
-    <dgm:scene3d>
-      <a:camera prst="orthographicFront"/>
-      <a:lightRig rig="threePt" dir="t"/>
-    </dgm:scene3d>
-    <dgm:sp3d/>
-    <dgm:txPr/>
-    <dgm:style>
-      <a:lnRef idx="1">
-        <a:scrgbClr r="0" g="0" b="0"/>
-      </a:lnRef>
-      <a:fillRef idx="1">
-        <a:scrgbClr r="0" g="0" b="0"/>
-      </a:fillRef>
-      <a:effectRef idx="0">
-        <a:scrgbClr r="0" g="0" b="0"/>
-      </a:effectRef>
-      <a:fontRef idx="minor"/>
-    </dgm:style>
-  </dgm:styleLbl>
-  <dgm:styleLbl name="alignAccFollowNode1">
-    <dgm:scene3d>
-      <a:camera prst="orthographicFront"/>
-      <a:lightRig rig="threePt" dir="t"/>
-    </dgm:scene3d>
-    <dgm:sp3d/>
-    <dgm:txPr/>
-    <dgm:style>
-      <a:lnRef idx="1">
-        <a:scrgbClr r="0" g="0" b="0"/>
-      </a:lnRef>
-      <a:fillRef idx="1">
-        <a:scrgbClr r="0" g="0" b="0"/>
-      </a:fillRef>
-      <a:effectRef idx="0">
-        <a:scrgbClr r="0" g="0" b="0"/>
-      </a:effectRef>
-      <a:fontRef idx="minor"/>
-    </dgm:style>
-  </dgm:styleLbl>
-  <dgm:styleLbl name="bgAccFollowNode1">
-    <dgm:scene3d>
-      <a:camera prst="orthographicFront"/>
-      <a:lightRig rig="threePt" dir="t"/>
-    </dgm:scene3d>
-    <dgm:sp3d/>
-    <dgm:txPr/>
-    <dgm:style>
-      <a:lnRef idx="1">
-        <a:scrgbClr r="0" g="0" b="0"/>
-      </a:lnRef>
-      <a:fillRef idx="1">
-        <a:scrgbClr r="0" g="0" b="0"/>
-      </a:fillRef>
-      <a:effectRef idx="0">
-        <a:scrgbClr r="0" g="0" b="0"/>
-      </a:effectRef>
-      <a:fontRef idx="minor"/>
-    </dgm:style>
-  </dgm:styleLbl>
-  <dgm:styleLbl name="fgAcc0">
-    <dgm:scene3d>
-      <a:camera prst="orthographicFront"/>
-      <a:lightRig rig="threePt" dir="t"/>
-    </dgm:scene3d>
-    <dgm:sp3d/>
-    <dgm:txPr/>
-    <dgm:style>
-      <a:lnRef idx="1">
-        <a:scrgbClr r="0" g="0" b="0"/>
-      </a:lnRef>
-      <a:fillRef idx="1">
-        <a:scrgbClr r="0" g="0" b="0"/>
-      </a:fillRef>
-      <a:effectRef idx="0">
-        <a:scrgbClr r="0" g="0" b="0"/>
-      </a:effectRef>
-      <a:fontRef idx="minor"/>
-    </dgm:style>
-  </dgm:styleLbl>
-  <dgm:styleLbl name="fgAcc2">
-    <dgm:scene3d>
-      <a:camera prst="orthographicFront"/>
-      <a:lightRig rig="threePt" dir="t"/>
-    </dgm:scene3d>
-    <dgm:sp3d/>
-    <dgm:txPr/>
-    <dgm:style>
-      <a:lnRef idx="1">
-        <a:scrgbClr r="0" g="0" b="0"/>
-      </a:lnRef>
-      <a:fillRef idx="1">
-        <a:scrgbClr r="0" g="0" b="0"/>
-      </a:fillRef>
-      <a:effectRef idx="0">
-        <a:scrgbClr r="0" g="0" b="0"/>
-      </a:effectRef>
-      <a:fontRef idx="minor"/>
-    </dgm:style>
-  </dgm:styleLbl>
-  <dgm:styleLbl name="fgAcc3">
-    <dgm:scene3d>
-      <a:camera prst="orthographicFront"/>
-      <a:lightRig rig="threePt" dir="t"/>
-    </dgm:scene3d>
-    <dgm:sp3d/>
-    <dgm:txPr/>
-    <dgm:style>
-      <a:lnRef idx="1">
-        <a:scrgbClr r="0" g="0" b="0"/>
-      </a:lnRef>
-      <a:fillRef idx="1">
-        <a:scrgbClr r="0" g="0" b="0"/>
-      </a:fillRef>
-      <a:effectRef idx="0">
-        <a:scrgbClr r="0" g="0" b="0"/>
-      </a:effectRef>
-      <a:fontRef idx="minor"/>
-    </dgm:style>
-  </dgm:styleLbl>
-  <dgm:styleLbl name="fgAcc4">
-    <dgm:scene3d>
-      <a:camera prst="orthographicFront"/>
-      <a:lightRig rig="threePt" dir="t"/>
-    </dgm:scene3d>
-    <dgm:sp3d/>
-    <dgm:txPr/>
-    <dgm:style>
-      <a:lnRef idx="1">
-        <a:scrgbClr r="0" g="0" b="0"/>
-      </a:lnRef>
-      <a:fillRef idx="1">
-        <a:scrgbClr r="0" g="0" b="0"/>
-      </a:fillRef>
-      <a:effectRef idx="0">
-        <a:scrgbClr r="0" g="0" b="0"/>
-      </a:effectRef>
-      <a:fontRef idx="minor"/>
-    </dgm:style>
-  </dgm:styleLbl>
-  <dgm:styleLbl name="bgShp">
-    <dgm:scene3d>
-      <a:camera prst="orthographicFront"/>
-      <a:lightRig rig="threePt" dir="t"/>
-    </dgm:scene3d>
-    <dgm:sp3d/>
-    <dgm:txPr/>
-    <dgm:style>
-      <a:lnRef idx="0">
-        <a:scrgbClr r="0" g="0" b="0"/>
-      </a:lnRef>
-      <a:fillRef idx="1">
-        <a:scrgbClr r="0" g="0" b="0"/>
-      </a:fillRef>
-      <a:effectRef idx="2">
-        <a:scrgbClr r="0" g="0" b="0"/>
-      </a:effectRef>
-      <a:fontRef idx="minor"/>
-    </dgm:style>
-  </dgm:styleLbl>
-  <dgm:styleLbl name="dkBgShp">
-    <dgm:scene3d>
-      <a:camera prst="orthographicFront"/>
-      <a:lightRig rig="threePt" dir="t"/>
-    </dgm:scene3d>
-    <dgm:sp3d/>
-    <dgm:txPr/>
-    <dgm:style>
-      <a:lnRef idx="0">
-        <a:scrgbClr r="0" g="0" b="0"/>
-      </a:lnRef>
-      <a:fillRef idx="1">
-        <a:scrgbClr r="0" g="0" b="0"/>
-      </a:fillRef>
-      <a:effectRef idx="2">
-        <a:scrgbClr r="0" g="0" b="0"/>
-      </a:effectRef>
-      <a:fontRef idx="minor"/>
-    </dgm:style>
-  </dgm:styleLbl>
-  <dgm:styleLbl name="trBgShp">
-    <dgm:scene3d>
-      <a:camera prst="orthographicFront"/>
-      <a:lightRig rig="threePt" dir="t"/>
-    </dgm:scene3d>
-    <dgm:sp3d/>
-    <dgm:txPr/>
-    <dgm:style>
-      <a:lnRef idx="0">
-        <a:scrgbClr r="0" g="0" b="0"/>
-      </a:lnRef>
-      <a:fillRef idx="1">
-        <a:scrgbClr r="0" g="0" b="0"/>
-      </a:fillRef>
-      <a:effectRef idx="0">
-        <a:scrgbClr r="0" g="0" b="0"/>
-      </a:effectRef>
-      <a:fontRef idx="minor"/>
-    </dgm:style>
-  </dgm:styleLbl>
-  <dgm:styleLbl name="fgShp">
-    <dgm:scene3d>
-      <a:camera prst="orthographicFront"/>
-      <a:lightRig rig="threePt" dir="t"/>
-    </dgm:scene3d>
-    <dgm:sp3d/>
-    <dgm:txPr/>
-    <dgm:style>
-      <a:lnRef idx="0">
-        <a:scrgbClr r="0" g="0" b="0"/>
-      </a:lnRef>
-      <a:fillRef idx="3">
-        <a:scrgbClr r="0" g="0" b="0"/>
-      </a:fillRef>
-      <a:effectRef idx="2">
-        <a:scrgbClr r="0" g="0" b="0"/>
-      </a:effectRef>
-      <a:fontRef idx="minor"/>
-    </dgm:style>
-  </dgm:styleLbl>
-  <dgm:styleLbl name="revTx">
-    <dgm:scene3d>
-      <a:camera prst="orthographicFront"/>
-      <a:lightRig rig="threePt" dir="t"/>
-    </dgm:scene3d>
-    <dgm:sp3d/>
-    <dgm:txPr/>
-    <dgm:style>
-      <a:lnRef idx="0">
-        <a:scrgbClr r="0" g="0" b="0"/>
-      </a:lnRef>
-      <a:fillRef idx="0">
-        <a:scrgbClr r="0" g="0" b="0"/>
-      </a:fillRef>
-      <a:effectRef idx="0">
-        <a:scrgbClr r="0" g="0" b="0"/>
-      </a:effectRef>
-      <a:fontRef idx="minor"/>
-    </dgm:style>
-  </dgm:styleLbl>
-</dgm:styleDef>
-</file>
-
 <file path=ppt/handoutMasters/handoutMaster1.xml><?xml version="1.0" encoding="utf-8"?>
 <p:handoutMaster xmlns:a="http://schemas.openxmlformats.org/drawingml/2006/main" xmlns:r="http://schemas.openxmlformats.org/officeDocument/2006/relationships" xmlns:p="http://schemas.openxmlformats.org/presentationml/2006/main">
   <p:cSld>
@@ -2974,7 +230,7 @@
           <a:p>
             <a:fld id="{889AAA34-CE1E-48C9-A4CD-CFA775F628BC}" type="datetimeFigureOut">
               <a:rPr lang="es-CL" smtClean="0"/>
-              <a:t>17-12-2018</a:t>
+              <a:t>18-12-2018</a:t>
             </a:fld>
             <a:endParaRPr lang="es-CL"/>
           </a:p>
@@ -3791,7 +1047,7 @@
           <a:p>
             <a:fld id="{3BE2AC6D-F750-44BB-A0B8-07BFEA35E468}" type="datetimeFigureOut">
               <a:rPr lang="es-CL" smtClean="0"/>
-              <a:t>17-12-2018</a:t>
+              <a:t>18-12-2018</a:t>
             </a:fld>
             <a:endParaRPr lang="es-CL"/>
           </a:p>
@@ -4042,7 +1298,7 @@
           <a:p>
             <a:fld id="{3BE2AC6D-F750-44BB-A0B8-07BFEA35E468}" type="datetimeFigureOut">
               <a:rPr lang="es-CL" smtClean="0"/>
-              <a:t>17-12-2018</a:t>
+              <a:t>18-12-2018</a:t>
             </a:fld>
             <a:endParaRPr lang="es-CL"/>
           </a:p>
@@ -4356,7 +1612,7 @@
           <a:p>
             <a:fld id="{3BE2AC6D-F750-44BB-A0B8-07BFEA35E468}" type="datetimeFigureOut">
               <a:rPr lang="es-CL" smtClean="0"/>
-              <a:t>17-12-2018</a:t>
+              <a:t>18-12-2018</a:t>
             </a:fld>
             <a:endParaRPr lang="es-CL"/>
           </a:p>
@@ -4697,7 +1953,7 @@
           <a:p>
             <a:fld id="{3BE2AC6D-F750-44BB-A0B8-07BFEA35E468}" type="datetimeFigureOut">
               <a:rPr lang="es-CL" smtClean="0"/>
-              <a:t>17-12-2018</a:t>
+              <a:t>18-12-2018</a:t>
             </a:fld>
             <a:endParaRPr lang="es-CL"/>
           </a:p>
@@ -5011,7 +2267,7 @@
           <a:p>
             <a:fld id="{3BE2AC6D-F750-44BB-A0B8-07BFEA35E468}" type="datetimeFigureOut">
               <a:rPr lang="es-CL" smtClean="0"/>
-              <a:t>17-12-2018</a:t>
+              <a:t>18-12-2018</a:t>
             </a:fld>
             <a:endParaRPr lang="es-CL"/>
           </a:p>
@@ -5404,7 +2660,7 @@
           <a:p>
             <a:fld id="{3BE2AC6D-F750-44BB-A0B8-07BFEA35E468}" type="datetimeFigureOut">
               <a:rPr lang="es-CL" smtClean="0"/>
-              <a:t>17-12-2018</a:t>
+              <a:t>18-12-2018</a:t>
             </a:fld>
             <a:endParaRPr lang="es-CL"/>
           </a:p>
@@ -5574,7 +2830,7 @@
           <a:p>
             <a:fld id="{3BE2AC6D-F750-44BB-A0B8-07BFEA35E468}" type="datetimeFigureOut">
               <a:rPr lang="es-CL" smtClean="0"/>
-              <a:t>17-12-2018</a:t>
+              <a:t>18-12-2018</a:t>
             </a:fld>
             <a:endParaRPr lang="es-CL"/>
           </a:p>
@@ -5754,7 +3010,7 @@
           <a:p>
             <a:fld id="{3BE2AC6D-F750-44BB-A0B8-07BFEA35E468}" type="datetimeFigureOut">
               <a:rPr lang="es-CL" smtClean="0"/>
-              <a:t>17-12-2018</a:t>
+              <a:t>18-12-2018</a:t>
             </a:fld>
             <a:endParaRPr lang="es-CL"/>
           </a:p>
@@ -6160,7 +3416,7 @@
           <a:p>
             <a:fld id="{3BE2AC6D-F750-44BB-A0B8-07BFEA35E468}" type="datetimeFigureOut">
               <a:rPr lang="es-CL" smtClean="0"/>
-              <a:t>17-12-2018</a:t>
+              <a:t>18-12-2018</a:t>
             </a:fld>
             <a:endParaRPr lang="es-CL"/>
           </a:p>
@@ -6392,7 +3648,7 @@
           <a:p>
             <a:fld id="{3BE2AC6D-F750-44BB-A0B8-07BFEA35E468}" type="datetimeFigureOut">
               <a:rPr lang="es-CL" smtClean="0"/>
-              <a:t>17-12-2018</a:t>
+              <a:t>18-12-2018</a:t>
             </a:fld>
             <a:endParaRPr lang="es-CL"/>
           </a:p>
@@ -6766,7 +4022,7 @@
           <a:p>
             <a:fld id="{3BE2AC6D-F750-44BB-A0B8-07BFEA35E468}" type="datetimeFigureOut">
               <a:rPr lang="es-CL" smtClean="0"/>
-              <a:t>17-12-2018</a:t>
+              <a:t>18-12-2018</a:t>
             </a:fld>
             <a:endParaRPr lang="es-CL"/>
           </a:p>
@@ -6889,7 +4145,7 @@
           <a:p>
             <a:fld id="{3BE2AC6D-F750-44BB-A0B8-07BFEA35E468}" type="datetimeFigureOut">
               <a:rPr lang="es-CL" smtClean="0"/>
-              <a:t>17-12-2018</a:t>
+              <a:t>18-12-2018</a:t>
             </a:fld>
             <a:endParaRPr lang="es-CL"/>
           </a:p>
@@ -6984,7 +4240,7 @@
           <a:p>
             <a:fld id="{3BE2AC6D-F750-44BB-A0B8-07BFEA35E468}" type="datetimeFigureOut">
               <a:rPr lang="es-CL" smtClean="0"/>
-              <a:t>17-12-2018</a:t>
+              <a:t>18-12-2018</a:t>
             </a:fld>
             <a:endParaRPr lang="es-CL"/>
           </a:p>
@@ -7239,7 +4495,7 @@
           <a:p>
             <a:fld id="{3BE2AC6D-F750-44BB-A0B8-07BFEA35E468}" type="datetimeFigureOut">
               <a:rPr lang="es-CL" smtClean="0"/>
-              <a:t>17-12-2018</a:t>
+              <a:t>18-12-2018</a:t>
             </a:fld>
             <a:endParaRPr lang="es-CL"/>
           </a:p>
@@ -7502,7 +4758,7 @@
           <a:p>
             <a:fld id="{3BE2AC6D-F750-44BB-A0B8-07BFEA35E468}" type="datetimeFigureOut">
               <a:rPr lang="es-CL" smtClean="0"/>
-              <a:t>17-12-2018</a:t>
+              <a:t>18-12-2018</a:t>
             </a:fld>
             <a:endParaRPr lang="es-CL"/>
           </a:p>
@@ -8245,7 +5501,7 @@
           <a:p>
             <a:fld id="{3BE2AC6D-F750-44BB-A0B8-07BFEA35E468}" type="datetimeFigureOut">
               <a:rPr lang="es-CL" smtClean="0"/>
-              <a:t>17-12-2018</a:t>
+              <a:t>18-12-2018</a:t>
             </a:fld>
             <a:endParaRPr lang="es-CL"/>
           </a:p>
@@ -11173,7 +8429,7 @@
                                           </p:stCondLst>
                                         </p:cTn>
                                         <p:tgtEl>
-                                          <p:spTgt spid="12"/>
+                                          <p:spTgt spid="11"/>
                                         </p:tgtEl>
                                         <p:attrNameLst>
                                           <p:attrName>style.visibility</p:attrName>
@@ -11218,34 +8474,7 @@
                                           </p:stCondLst>
                                         </p:cTn>
                                         <p:tgtEl>
-                                          <p:spTgt spid="15"/>
-                                        </p:tgtEl>
-                                        <p:attrNameLst>
-                                          <p:attrName>style.visibility</p:attrName>
-                                        </p:attrNameLst>
-                                      </p:cBhvr>
-                                      <p:to>
-                                        <p:strVal val="visible"/>
-                                      </p:to>
-                                    </p:set>
-                                  </p:childTnLst>
-                                </p:cTn>
-                              </p:par>
-                              <p:par>
-                                <p:cTn id="11" presetID="1" presetClass="entr" presetSubtype="0" fill="hold" grpId="0" nodeType="withEffect">
-                                  <p:stCondLst>
-                                    <p:cond delay="0"/>
-                                  </p:stCondLst>
-                                  <p:childTnLst>
-                                    <p:set>
-                                      <p:cBhvr>
-                                        <p:cTn id="12" dur="1" fill="hold">
-                                          <p:stCondLst>
-                                            <p:cond delay="0"/>
-                                          </p:stCondLst>
-                                        </p:cTn>
-                                        <p:tgtEl>
-                                          <p:spTgt spid="13"/>
+                                          <p:spTgt spid="12"/>
                                         </p:tgtEl>
                                         <p:attrNameLst>
                                           <p:attrName>style.visibility</p:attrName>
@@ -11265,19 +8494,46 @@
                     </p:cTn>
                   </p:par>
                   <p:par>
-                    <p:cTn id="13" fill="hold">
+                    <p:cTn id="11" fill="hold">
                       <p:stCondLst>
                         <p:cond delay="indefinite"/>
                       </p:stCondLst>
                       <p:childTnLst>
                         <p:par>
-                          <p:cTn id="14" fill="hold">
+                          <p:cTn id="12" fill="hold">
                             <p:stCondLst>
                               <p:cond delay="0"/>
                             </p:stCondLst>
                             <p:childTnLst>
                               <p:par>
-                                <p:cTn id="15" presetID="1" presetClass="entr" presetSubtype="0" fill="hold" grpId="0" nodeType="clickEffect">
+                                <p:cTn id="13" presetID="1" presetClass="entr" presetSubtype="0" fill="hold" grpId="0" nodeType="clickEffect">
+                                  <p:stCondLst>
+                                    <p:cond delay="0"/>
+                                  </p:stCondLst>
+                                  <p:childTnLst>
+                                    <p:set>
+                                      <p:cBhvr>
+                                        <p:cTn id="14" dur="1" fill="hold">
+                                          <p:stCondLst>
+                                            <p:cond delay="0"/>
+                                          </p:stCondLst>
+                                        </p:cTn>
+                                        <p:tgtEl>
+                                          <p:spTgt spid="13"/>
+                                        </p:tgtEl>
+                                        <p:attrNameLst>
+                                          <p:attrName>style.visibility</p:attrName>
+                                        </p:attrNameLst>
+                                      </p:cBhvr>
+                                      <p:to>
+                                        <p:strVal val="visible"/>
+                                      </p:to>
+                                    </p:set>
+                                  </p:childTnLst>
+                                </p:cTn>
+                              </p:par>
+                              <p:par>
+                                <p:cTn id="15" presetID="1" presetClass="entr" presetSubtype="0" fill="hold" grpId="0" nodeType="withEffect">
                                   <p:stCondLst>
                                     <p:cond delay="0"/>
                                   </p:stCondLst>
@@ -11290,7 +8546,7 @@
                                           </p:stCondLst>
                                         </p:cTn>
                                         <p:tgtEl>
-                                          <p:spTgt spid="5"/>
+                                          <p:spTgt spid="15"/>
                                         </p:tgtEl>
                                         <p:attrNameLst>
                                           <p:attrName>style.visibility</p:attrName>
@@ -11335,7 +8591,7 @@
                                           </p:stCondLst>
                                         </p:cTn>
                                         <p:tgtEl>
-                                          <p:spTgt spid="6"/>
+                                          <p:spTgt spid="5"/>
                                         </p:tgtEl>
                                         <p:attrNameLst>
                                           <p:attrName>style.visibility</p:attrName>
@@ -11380,7 +8636,7 @@
                                           </p:stCondLst>
                                         </p:cTn>
                                         <p:tgtEl>
-                                          <p:spTgt spid="7"/>
+                                          <p:spTgt spid="6"/>
                                         </p:tgtEl>
                                         <p:attrNameLst>
                                           <p:attrName>style.visibility</p:attrName>
@@ -11425,7 +8681,7 @@
                                           </p:stCondLst>
                                         </p:cTn>
                                         <p:tgtEl>
-                                          <p:spTgt spid="8"/>
+                                          <p:spTgt spid="7"/>
                                         </p:tgtEl>
                                         <p:attrNameLst>
                                           <p:attrName>style.visibility</p:attrName>
@@ -11470,7 +8726,7 @@
                                           </p:stCondLst>
                                         </p:cTn>
                                         <p:tgtEl>
-                                          <p:spTgt spid="9"/>
+                                          <p:spTgt spid="8"/>
                                         </p:tgtEl>
                                         <p:attrNameLst>
                                           <p:attrName>style.visibility</p:attrName>
@@ -11510,6 +8766,51 @@
                                     <p:set>
                                       <p:cBhvr>
                                         <p:cTn id="36" dur="1" fill="hold">
+                                          <p:stCondLst>
+                                            <p:cond delay="0"/>
+                                          </p:stCondLst>
+                                        </p:cTn>
+                                        <p:tgtEl>
+                                          <p:spTgt spid="9"/>
+                                        </p:tgtEl>
+                                        <p:attrNameLst>
+                                          <p:attrName>style.visibility</p:attrName>
+                                        </p:attrNameLst>
+                                      </p:cBhvr>
+                                      <p:to>
+                                        <p:strVal val="visible"/>
+                                      </p:to>
+                                    </p:set>
+                                  </p:childTnLst>
+                                </p:cTn>
+                              </p:par>
+                            </p:childTnLst>
+                          </p:cTn>
+                        </p:par>
+                      </p:childTnLst>
+                    </p:cTn>
+                  </p:par>
+                  <p:par>
+                    <p:cTn id="37" fill="hold">
+                      <p:stCondLst>
+                        <p:cond delay="indefinite"/>
+                      </p:stCondLst>
+                      <p:childTnLst>
+                        <p:par>
+                          <p:cTn id="38" fill="hold">
+                            <p:stCondLst>
+                              <p:cond delay="0"/>
+                            </p:stCondLst>
+                            <p:childTnLst>
+                              <p:par>
+                                <p:cTn id="39" presetID="1" presetClass="entr" presetSubtype="0" fill="hold" grpId="0" nodeType="clickEffect">
+                                  <p:stCondLst>
+                                    <p:cond delay="0"/>
+                                  </p:stCondLst>
+                                  <p:childTnLst>
+                                    <p:set>
+                                      <p:cBhvr>
+                                        <p:cTn id="40" dur="1" fill="hold">
                                           <p:stCondLst>
                                             <p:cond delay="0"/>
                                           </p:stCondLst>
@@ -11562,6 +8863,7 @@
       <p:bldP spid="8" grpId="0" animBg="1"/>
       <p:bldP spid="9" grpId="0" animBg="1"/>
       <p:bldP spid="10" grpId="0" animBg="1"/>
+      <p:bldP spid="11" grpId="0" animBg="1"/>
       <p:bldP spid="12" grpId="0" animBg="1"/>
       <p:bldP spid="13" grpId="0" animBg="1"/>
       <p:bldP spid="15" grpId="0" animBg="1"/>
@@ -12373,15 +9675,33 @@
                                   </p:childTnLst>
                                 </p:cTn>
                               </p:par>
+                            </p:childTnLst>
+                          </p:cTn>
+                        </p:par>
+                      </p:childTnLst>
+                    </p:cTn>
+                  </p:par>
+                  <p:par>
+                    <p:cTn id="11" fill="hold">
+                      <p:stCondLst>
+                        <p:cond delay="indefinite"/>
+                      </p:stCondLst>
+                      <p:childTnLst>
+                        <p:par>
+                          <p:cTn id="12" fill="hold">
+                            <p:stCondLst>
+                              <p:cond delay="0"/>
+                            </p:stCondLst>
+                            <p:childTnLst>
                               <p:par>
-                                <p:cTn id="11" presetID="1" presetClass="entr" presetSubtype="0" fill="hold" grpId="0" nodeType="withEffect">
+                                <p:cTn id="13" presetID="1" presetClass="entr" presetSubtype="0" fill="hold" grpId="0" nodeType="clickEffect">
                                   <p:stCondLst>
                                     <p:cond delay="0"/>
                                   </p:stCondLst>
                                   <p:childTnLst>
                                     <p:set>
                                       <p:cBhvr>
-                                        <p:cTn id="12" dur="1" fill="hold">
+                                        <p:cTn id="14" dur="1" fill="hold">
                                           <p:stCondLst>
                                             <p:cond delay="0"/>
                                           </p:stCondLst>
@@ -12407,26 +9727,26 @@
                     </p:cTn>
                   </p:par>
                   <p:par>
-                    <p:cTn id="13" fill="hold">
+                    <p:cTn id="15" fill="hold">
                       <p:stCondLst>
                         <p:cond delay="indefinite"/>
                       </p:stCondLst>
                       <p:childTnLst>
                         <p:par>
-                          <p:cTn id="14" fill="hold">
+                          <p:cTn id="16" fill="hold">
                             <p:stCondLst>
                               <p:cond delay="0"/>
                             </p:stCondLst>
                             <p:childTnLst>
                               <p:par>
-                                <p:cTn id="15" presetID="1" presetClass="entr" presetSubtype="0" fill="hold" grpId="0" nodeType="clickEffect">
+                                <p:cTn id="17" presetID="1" presetClass="entr" presetSubtype="0" fill="hold" grpId="0" nodeType="clickEffect">
                                   <p:stCondLst>
                                     <p:cond delay="0"/>
                                   </p:stCondLst>
                                   <p:childTnLst>
                                     <p:set>
                                       <p:cBhvr>
-                                        <p:cTn id="16" dur="1" fill="hold">
+                                        <p:cTn id="18" dur="1" fill="hold">
                                           <p:stCondLst>
                                             <p:cond delay="0"/>
                                           </p:stCondLst>
@@ -12452,26 +9772,26 @@
                     </p:cTn>
                   </p:par>
                   <p:par>
-                    <p:cTn id="17" fill="hold">
+                    <p:cTn id="19" fill="hold">
                       <p:stCondLst>
                         <p:cond delay="indefinite"/>
                       </p:stCondLst>
                       <p:childTnLst>
                         <p:par>
-                          <p:cTn id="18" fill="hold">
+                          <p:cTn id="20" fill="hold">
                             <p:stCondLst>
                               <p:cond delay="0"/>
                             </p:stCondLst>
                             <p:childTnLst>
                               <p:par>
-                                <p:cTn id="19" presetID="10" presetClass="entr" presetSubtype="0" fill="hold" nodeType="clickEffect">
+                                <p:cTn id="21" presetID="10" presetClass="entr" presetSubtype="0" fill="hold" nodeType="clickEffect">
                                   <p:stCondLst>
                                     <p:cond delay="0"/>
                                   </p:stCondLst>
                                   <p:childTnLst>
                                     <p:set>
                                       <p:cBhvr>
-                                        <p:cTn id="20" dur="1" fill="hold">
+                                        <p:cTn id="22" dur="1" fill="hold">
                                           <p:stCondLst>
                                             <p:cond delay="0"/>
                                           </p:stCondLst>
@@ -12489,7 +9809,7 @@
                                     </p:set>
                                     <p:animEffect transition="in" filter="fade">
                                       <p:cBhvr>
-                                        <p:cTn id="21" dur="500"/>
+                                        <p:cTn id="23" dur="500"/>
                                         <p:tgtEl>
                                           <p:spTgt spid="9"/>
                                         </p:tgtEl>
@@ -12634,34 +9954,758 @@
           </a:p>
         </p:txBody>
       </p:sp>
-      <p:graphicFrame>
-        <p:nvGraphicFramePr>
-          <p:cNvPr id="5" name="Diagrama 4">
+      <p:sp>
+        <p:nvSpPr>
+          <p:cNvPr id="8" name="Flecha: a la derecha 7">
             <a:extLst>
               <a:ext uri="{FF2B5EF4-FFF2-40B4-BE49-F238E27FC236}">
-                <a16:creationId xmlns:a16="http://schemas.microsoft.com/office/drawing/2014/main" id="{7A541F89-1B3C-4998-9F2C-0994B2C38C37}"/>
+                <a16:creationId xmlns:a16="http://schemas.microsoft.com/office/drawing/2014/main" id="{6AFC443B-7446-4B68-819E-53714271C0DF}"/>
               </a:ext>
             </a:extLst>
           </p:cNvPr>
-          <p:cNvGraphicFramePr/>
-          <p:nvPr>
-            <p:extLst>
-              <p:ext uri="{D42A27DB-BD31-4B8C-83A1-F6EECF244321}">
-                <p14:modId xmlns:p14="http://schemas.microsoft.com/office/powerpoint/2010/main" val="2690743163"/>
-              </p:ext>
-            </p:extLst>
-          </p:nvPr>
-        </p:nvGraphicFramePr>
-        <p:xfrm>
-          <a:off x="495299" y="1441893"/>
-          <a:ext cx="9959009" cy="3313023"/>
-        </p:xfrm>
-        <a:graphic>
-          <a:graphicData uri="http://schemas.openxmlformats.org/drawingml/2006/diagram">
-            <dgm:relIds xmlns:dgm="http://schemas.openxmlformats.org/drawingml/2006/diagram" xmlns:r="http://schemas.openxmlformats.org/officeDocument/2006/relationships" r:dm="rId2" r:lo="rId3" r:qs="rId4" r:cs="rId5"/>
-          </a:graphicData>
-        </a:graphic>
-      </p:graphicFrame>
+          <p:cNvSpPr/>
+          <p:nvPr/>
+        </p:nvSpPr>
+        <p:spPr>
+          <a:xfrm>
+            <a:off x="1242224" y="1441893"/>
+            <a:ext cx="8465157" cy="3313023"/>
+          </a:xfrm>
+          <a:prstGeom prst="rightArrow">
+            <a:avLst/>
+          </a:prstGeom>
+        </p:spPr>
+        <p:style>
+          <a:lnRef idx="0">
+            <a:schemeClr val="accent1">
+              <a:hueOff val="0"/>
+              <a:satOff val="0"/>
+              <a:lumOff val="0"/>
+              <a:alphaOff val="0"/>
+            </a:schemeClr>
+          </a:lnRef>
+          <a:fillRef idx="1">
+            <a:schemeClr val="accent1">
+              <a:tint val="40000"/>
+              <a:hueOff val="0"/>
+              <a:satOff val="0"/>
+              <a:lumOff val="0"/>
+              <a:alphaOff val="0"/>
+            </a:schemeClr>
+          </a:fillRef>
+          <a:effectRef idx="2">
+            <a:schemeClr val="accent1">
+              <a:tint val="40000"/>
+              <a:hueOff val="0"/>
+              <a:satOff val="0"/>
+              <a:lumOff val="0"/>
+              <a:alphaOff val="0"/>
+            </a:schemeClr>
+          </a:effectRef>
+          <a:fontRef idx="minor">
+            <a:schemeClr val="dk1">
+              <a:hueOff val="0"/>
+              <a:satOff val="0"/>
+              <a:lumOff val="0"/>
+              <a:alphaOff val="0"/>
+            </a:schemeClr>
+          </a:fontRef>
+        </p:style>
+      </p:sp>
+      <p:sp>
+        <p:nvSpPr>
+          <p:cNvPr id="9" name="Forma libre: forma 8">
+            <a:extLst>
+              <a:ext uri="{FF2B5EF4-FFF2-40B4-BE49-F238E27FC236}">
+                <a16:creationId xmlns:a16="http://schemas.microsoft.com/office/drawing/2014/main" id="{A512748E-6040-42BC-B310-1A1707C89DBD}"/>
+              </a:ext>
+            </a:extLst>
+          </p:cNvPr>
+          <p:cNvSpPr/>
+          <p:nvPr/>
+        </p:nvSpPr>
+        <p:spPr>
+          <a:xfrm>
+            <a:off x="498702" y="2435799"/>
+            <a:ext cx="2211600" cy="1325209"/>
+          </a:xfrm>
+          <a:custGeom>
+            <a:avLst/>
+            <a:gdLst>
+              <a:gd name="connsiteX0" fmla="*/ 0 w 2211600"/>
+              <a:gd name="connsiteY0" fmla="*/ 220873 h 1325209"/>
+              <a:gd name="connsiteX1" fmla="*/ 220873 w 2211600"/>
+              <a:gd name="connsiteY1" fmla="*/ 0 h 1325209"/>
+              <a:gd name="connsiteX2" fmla="*/ 1990727 w 2211600"/>
+              <a:gd name="connsiteY2" fmla="*/ 0 h 1325209"/>
+              <a:gd name="connsiteX3" fmla="*/ 2211600 w 2211600"/>
+              <a:gd name="connsiteY3" fmla="*/ 220873 h 1325209"/>
+              <a:gd name="connsiteX4" fmla="*/ 2211600 w 2211600"/>
+              <a:gd name="connsiteY4" fmla="*/ 1104336 h 1325209"/>
+              <a:gd name="connsiteX5" fmla="*/ 1990727 w 2211600"/>
+              <a:gd name="connsiteY5" fmla="*/ 1325209 h 1325209"/>
+              <a:gd name="connsiteX6" fmla="*/ 220873 w 2211600"/>
+              <a:gd name="connsiteY6" fmla="*/ 1325209 h 1325209"/>
+              <a:gd name="connsiteX7" fmla="*/ 0 w 2211600"/>
+              <a:gd name="connsiteY7" fmla="*/ 1104336 h 1325209"/>
+              <a:gd name="connsiteX8" fmla="*/ 0 w 2211600"/>
+              <a:gd name="connsiteY8" fmla="*/ 220873 h 1325209"/>
+            </a:gdLst>
+            <a:ahLst/>
+            <a:cxnLst>
+              <a:cxn ang="0">
+                <a:pos x="connsiteX0" y="connsiteY0"/>
+              </a:cxn>
+              <a:cxn ang="0">
+                <a:pos x="connsiteX1" y="connsiteY1"/>
+              </a:cxn>
+              <a:cxn ang="0">
+                <a:pos x="connsiteX2" y="connsiteY2"/>
+              </a:cxn>
+              <a:cxn ang="0">
+                <a:pos x="connsiteX3" y="connsiteY3"/>
+              </a:cxn>
+              <a:cxn ang="0">
+                <a:pos x="connsiteX4" y="connsiteY4"/>
+              </a:cxn>
+              <a:cxn ang="0">
+                <a:pos x="connsiteX5" y="connsiteY5"/>
+              </a:cxn>
+              <a:cxn ang="0">
+                <a:pos x="connsiteX6" y="connsiteY6"/>
+              </a:cxn>
+              <a:cxn ang="0">
+                <a:pos x="connsiteX7" y="connsiteY7"/>
+              </a:cxn>
+              <a:cxn ang="0">
+                <a:pos x="connsiteX8" y="connsiteY8"/>
+              </a:cxn>
+            </a:cxnLst>
+            <a:rect l="l" t="t" r="r" b="b"/>
+            <a:pathLst>
+              <a:path w="2211600" h="1325209">
+                <a:moveTo>
+                  <a:pt x="0" y="220873"/>
+                </a:moveTo>
+                <a:cubicBezTo>
+                  <a:pt x="0" y="98888"/>
+                  <a:pt x="98888" y="0"/>
+                  <a:pt x="220873" y="0"/>
+                </a:cubicBezTo>
+                <a:lnTo>
+                  <a:pt x="1990727" y="0"/>
+                </a:lnTo>
+                <a:cubicBezTo>
+                  <a:pt x="2112712" y="0"/>
+                  <a:pt x="2211600" y="98888"/>
+                  <a:pt x="2211600" y="220873"/>
+                </a:cubicBezTo>
+                <a:lnTo>
+                  <a:pt x="2211600" y="1104336"/>
+                </a:lnTo>
+                <a:cubicBezTo>
+                  <a:pt x="2211600" y="1226321"/>
+                  <a:pt x="2112712" y="1325209"/>
+                  <a:pt x="1990727" y="1325209"/>
+                </a:cubicBezTo>
+                <a:lnTo>
+                  <a:pt x="220873" y="1325209"/>
+                </a:lnTo>
+                <a:cubicBezTo>
+                  <a:pt x="98888" y="1325209"/>
+                  <a:pt x="0" y="1226321"/>
+                  <a:pt x="0" y="1104336"/>
+                </a:cubicBezTo>
+                <a:lnTo>
+                  <a:pt x="0" y="220873"/>
+                </a:lnTo>
+                <a:close/>
+              </a:path>
+            </a:pathLst>
+          </a:custGeom>
+          <a:ln w="28575"/>
+          <a:effectLst>
+            <a:outerShdw blurRad="254000" dist="38100" algn="l" rotWithShape="0">
+              <a:prstClr val="black">
+                <a:alpha val="40000"/>
+              </a:prstClr>
+            </a:outerShdw>
+          </a:effectLst>
+        </p:spPr>
+        <p:style>
+          <a:lnRef idx="2">
+            <a:schemeClr val="accent1"/>
+          </a:lnRef>
+          <a:fillRef idx="1">
+            <a:schemeClr val="lt1"/>
+          </a:fillRef>
+          <a:effectRef idx="0">
+            <a:schemeClr val="accent1"/>
+          </a:effectRef>
+          <a:fontRef idx="minor">
+            <a:schemeClr val="dk1"/>
+          </a:fontRef>
+        </p:style>
+        <p:txBody>
+          <a:bodyPr spcFirstLastPara="0" vert="horz" wrap="square" lIns="156131" tIns="156131" rIns="156131" bIns="156131" numCol="1" spcCol="1270" anchor="ctr" anchorCtr="0">
+            <a:noAutofit/>
+          </a:bodyPr>
+          <a:lstStyle/>
+          <a:p>
+            <a:pPr marL="0" lvl="0" indent="0" algn="ctr" defTabSz="1066800">
+              <a:lnSpc>
+                <a:spcPct val="90000"/>
+              </a:lnSpc>
+              <a:spcBef>
+                <a:spcPct val="0"/>
+              </a:spcBef>
+              <a:spcAft>
+                <a:spcPct val="35000"/>
+              </a:spcAft>
+              <a:buNone/>
+            </a:pPr>
+            <a:r>
+              <a:rPr lang="es-CL" sz="2400" kern="1200" dirty="0">
+                <a:effectLst>
+                  <a:outerShdw blurRad="50800" dist="38100" algn="l" rotWithShape="0">
+                    <a:prstClr val="black">
+                      <a:alpha val="40000"/>
+                    </a:prstClr>
+                  </a:outerShdw>
+                </a:effectLst>
+              </a:rPr>
+              <a:t>Presentación del Manual</a:t>
+            </a:r>
+          </a:p>
+        </p:txBody>
+      </p:sp>
+      <p:sp>
+        <p:nvSpPr>
+          <p:cNvPr id="10" name="Forma libre: forma 9">
+            <a:extLst>
+              <a:ext uri="{FF2B5EF4-FFF2-40B4-BE49-F238E27FC236}">
+                <a16:creationId xmlns:a16="http://schemas.microsoft.com/office/drawing/2014/main" id="{D08186DF-2880-4830-8391-59EE9FBD619D}"/>
+              </a:ext>
+            </a:extLst>
+          </p:cNvPr>
+          <p:cNvSpPr/>
+          <p:nvPr/>
+        </p:nvSpPr>
+        <p:spPr>
+          <a:xfrm>
+            <a:off x="3078903" y="2435799"/>
+            <a:ext cx="2211600" cy="1325209"/>
+          </a:xfrm>
+          <a:custGeom>
+            <a:avLst/>
+            <a:gdLst>
+              <a:gd name="connsiteX0" fmla="*/ 0 w 2211600"/>
+              <a:gd name="connsiteY0" fmla="*/ 220873 h 1325209"/>
+              <a:gd name="connsiteX1" fmla="*/ 220873 w 2211600"/>
+              <a:gd name="connsiteY1" fmla="*/ 0 h 1325209"/>
+              <a:gd name="connsiteX2" fmla="*/ 1990727 w 2211600"/>
+              <a:gd name="connsiteY2" fmla="*/ 0 h 1325209"/>
+              <a:gd name="connsiteX3" fmla="*/ 2211600 w 2211600"/>
+              <a:gd name="connsiteY3" fmla="*/ 220873 h 1325209"/>
+              <a:gd name="connsiteX4" fmla="*/ 2211600 w 2211600"/>
+              <a:gd name="connsiteY4" fmla="*/ 1104336 h 1325209"/>
+              <a:gd name="connsiteX5" fmla="*/ 1990727 w 2211600"/>
+              <a:gd name="connsiteY5" fmla="*/ 1325209 h 1325209"/>
+              <a:gd name="connsiteX6" fmla="*/ 220873 w 2211600"/>
+              <a:gd name="connsiteY6" fmla="*/ 1325209 h 1325209"/>
+              <a:gd name="connsiteX7" fmla="*/ 0 w 2211600"/>
+              <a:gd name="connsiteY7" fmla="*/ 1104336 h 1325209"/>
+              <a:gd name="connsiteX8" fmla="*/ 0 w 2211600"/>
+              <a:gd name="connsiteY8" fmla="*/ 220873 h 1325209"/>
+            </a:gdLst>
+            <a:ahLst/>
+            <a:cxnLst>
+              <a:cxn ang="0">
+                <a:pos x="connsiteX0" y="connsiteY0"/>
+              </a:cxn>
+              <a:cxn ang="0">
+                <a:pos x="connsiteX1" y="connsiteY1"/>
+              </a:cxn>
+              <a:cxn ang="0">
+                <a:pos x="connsiteX2" y="connsiteY2"/>
+              </a:cxn>
+              <a:cxn ang="0">
+                <a:pos x="connsiteX3" y="connsiteY3"/>
+              </a:cxn>
+              <a:cxn ang="0">
+                <a:pos x="connsiteX4" y="connsiteY4"/>
+              </a:cxn>
+              <a:cxn ang="0">
+                <a:pos x="connsiteX5" y="connsiteY5"/>
+              </a:cxn>
+              <a:cxn ang="0">
+                <a:pos x="connsiteX6" y="connsiteY6"/>
+              </a:cxn>
+              <a:cxn ang="0">
+                <a:pos x="connsiteX7" y="connsiteY7"/>
+              </a:cxn>
+              <a:cxn ang="0">
+                <a:pos x="connsiteX8" y="connsiteY8"/>
+              </a:cxn>
+            </a:cxnLst>
+            <a:rect l="l" t="t" r="r" b="b"/>
+            <a:pathLst>
+              <a:path w="2211600" h="1325209">
+                <a:moveTo>
+                  <a:pt x="0" y="220873"/>
+                </a:moveTo>
+                <a:cubicBezTo>
+                  <a:pt x="0" y="98888"/>
+                  <a:pt x="98888" y="0"/>
+                  <a:pt x="220873" y="0"/>
+                </a:cubicBezTo>
+                <a:lnTo>
+                  <a:pt x="1990727" y="0"/>
+                </a:lnTo>
+                <a:cubicBezTo>
+                  <a:pt x="2112712" y="0"/>
+                  <a:pt x="2211600" y="98888"/>
+                  <a:pt x="2211600" y="220873"/>
+                </a:cubicBezTo>
+                <a:lnTo>
+                  <a:pt x="2211600" y="1104336"/>
+                </a:lnTo>
+                <a:cubicBezTo>
+                  <a:pt x="2211600" y="1226321"/>
+                  <a:pt x="2112712" y="1325209"/>
+                  <a:pt x="1990727" y="1325209"/>
+                </a:cubicBezTo>
+                <a:lnTo>
+                  <a:pt x="220873" y="1325209"/>
+                </a:lnTo>
+                <a:cubicBezTo>
+                  <a:pt x="98888" y="1325209"/>
+                  <a:pt x="0" y="1226321"/>
+                  <a:pt x="0" y="1104336"/>
+                </a:cubicBezTo>
+                <a:lnTo>
+                  <a:pt x="0" y="220873"/>
+                </a:lnTo>
+                <a:close/>
+              </a:path>
+            </a:pathLst>
+          </a:custGeom>
+          <a:ln w="28575"/>
+          <a:effectLst>
+            <a:outerShdw blurRad="254000" dist="38100" algn="l" rotWithShape="0">
+              <a:prstClr val="black">
+                <a:alpha val="40000"/>
+              </a:prstClr>
+            </a:outerShdw>
+          </a:effectLst>
+        </p:spPr>
+        <p:style>
+          <a:lnRef idx="2">
+            <a:schemeClr val="accent1"/>
+          </a:lnRef>
+          <a:fillRef idx="1">
+            <a:schemeClr val="lt1"/>
+          </a:fillRef>
+          <a:effectRef idx="0">
+            <a:schemeClr val="accent1"/>
+          </a:effectRef>
+          <a:fontRef idx="minor">
+            <a:schemeClr val="dk1"/>
+          </a:fontRef>
+        </p:style>
+        <p:txBody>
+          <a:bodyPr spcFirstLastPara="0" vert="horz" wrap="square" lIns="156131" tIns="156131" rIns="156131" bIns="156131" numCol="1" spcCol="1270" anchor="ctr" anchorCtr="0">
+            <a:noAutofit/>
+          </a:bodyPr>
+          <a:lstStyle/>
+          <a:p>
+            <a:pPr marL="0" lvl="0" indent="0" algn="ctr" defTabSz="1066800">
+              <a:lnSpc>
+                <a:spcPct val="90000"/>
+              </a:lnSpc>
+              <a:spcBef>
+                <a:spcPct val="0"/>
+              </a:spcBef>
+              <a:spcAft>
+                <a:spcPct val="35000"/>
+              </a:spcAft>
+              <a:buNone/>
+            </a:pPr>
+            <a:r>
+              <a:rPr lang="es-CL" sz="2400" kern="1200" dirty="0">
+                <a:effectLst>
+                  <a:outerShdw blurRad="50800" dist="38100" algn="l" rotWithShape="0">
+                    <a:prstClr val="black">
+                      <a:alpha val="40000"/>
+                    </a:prstClr>
+                  </a:outerShdw>
+                </a:effectLst>
+              </a:rPr>
+              <a:t>Socialización</a:t>
+            </a:r>
+          </a:p>
+        </p:txBody>
+      </p:sp>
+      <p:sp>
+        <p:nvSpPr>
+          <p:cNvPr id="11" name="Forma libre: forma 10">
+            <a:extLst>
+              <a:ext uri="{FF2B5EF4-FFF2-40B4-BE49-F238E27FC236}">
+                <a16:creationId xmlns:a16="http://schemas.microsoft.com/office/drawing/2014/main" id="{65053D37-0CBC-4A53-84D7-889E6326E964}"/>
+              </a:ext>
+            </a:extLst>
+          </p:cNvPr>
+          <p:cNvSpPr/>
+          <p:nvPr/>
+        </p:nvSpPr>
+        <p:spPr>
+          <a:xfrm>
+            <a:off x="5659103" y="2435799"/>
+            <a:ext cx="2211600" cy="1325209"/>
+          </a:xfrm>
+          <a:custGeom>
+            <a:avLst/>
+            <a:gdLst>
+              <a:gd name="connsiteX0" fmla="*/ 0 w 2211600"/>
+              <a:gd name="connsiteY0" fmla="*/ 220873 h 1325209"/>
+              <a:gd name="connsiteX1" fmla="*/ 220873 w 2211600"/>
+              <a:gd name="connsiteY1" fmla="*/ 0 h 1325209"/>
+              <a:gd name="connsiteX2" fmla="*/ 1990727 w 2211600"/>
+              <a:gd name="connsiteY2" fmla="*/ 0 h 1325209"/>
+              <a:gd name="connsiteX3" fmla="*/ 2211600 w 2211600"/>
+              <a:gd name="connsiteY3" fmla="*/ 220873 h 1325209"/>
+              <a:gd name="connsiteX4" fmla="*/ 2211600 w 2211600"/>
+              <a:gd name="connsiteY4" fmla="*/ 1104336 h 1325209"/>
+              <a:gd name="connsiteX5" fmla="*/ 1990727 w 2211600"/>
+              <a:gd name="connsiteY5" fmla="*/ 1325209 h 1325209"/>
+              <a:gd name="connsiteX6" fmla="*/ 220873 w 2211600"/>
+              <a:gd name="connsiteY6" fmla="*/ 1325209 h 1325209"/>
+              <a:gd name="connsiteX7" fmla="*/ 0 w 2211600"/>
+              <a:gd name="connsiteY7" fmla="*/ 1104336 h 1325209"/>
+              <a:gd name="connsiteX8" fmla="*/ 0 w 2211600"/>
+              <a:gd name="connsiteY8" fmla="*/ 220873 h 1325209"/>
+            </a:gdLst>
+            <a:ahLst/>
+            <a:cxnLst>
+              <a:cxn ang="0">
+                <a:pos x="connsiteX0" y="connsiteY0"/>
+              </a:cxn>
+              <a:cxn ang="0">
+                <a:pos x="connsiteX1" y="connsiteY1"/>
+              </a:cxn>
+              <a:cxn ang="0">
+                <a:pos x="connsiteX2" y="connsiteY2"/>
+              </a:cxn>
+              <a:cxn ang="0">
+                <a:pos x="connsiteX3" y="connsiteY3"/>
+              </a:cxn>
+              <a:cxn ang="0">
+                <a:pos x="connsiteX4" y="connsiteY4"/>
+              </a:cxn>
+              <a:cxn ang="0">
+                <a:pos x="connsiteX5" y="connsiteY5"/>
+              </a:cxn>
+              <a:cxn ang="0">
+                <a:pos x="connsiteX6" y="connsiteY6"/>
+              </a:cxn>
+              <a:cxn ang="0">
+                <a:pos x="connsiteX7" y="connsiteY7"/>
+              </a:cxn>
+              <a:cxn ang="0">
+                <a:pos x="connsiteX8" y="connsiteY8"/>
+              </a:cxn>
+            </a:cxnLst>
+            <a:rect l="l" t="t" r="r" b="b"/>
+            <a:pathLst>
+              <a:path w="2211600" h="1325209">
+                <a:moveTo>
+                  <a:pt x="0" y="220873"/>
+                </a:moveTo>
+                <a:cubicBezTo>
+                  <a:pt x="0" y="98888"/>
+                  <a:pt x="98888" y="0"/>
+                  <a:pt x="220873" y="0"/>
+                </a:cubicBezTo>
+                <a:lnTo>
+                  <a:pt x="1990727" y="0"/>
+                </a:lnTo>
+                <a:cubicBezTo>
+                  <a:pt x="2112712" y="0"/>
+                  <a:pt x="2211600" y="98888"/>
+                  <a:pt x="2211600" y="220873"/>
+                </a:cubicBezTo>
+                <a:lnTo>
+                  <a:pt x="2211600" y="1104336"/>
+                </a:lnTo>
+                <a:cubicBezTo>
+                  <a:pt x="2211600" y="1226321"/>
+                  <a:pt x="2112712" y="1325209"/>
+                  <a:pt x="1990727" y="1325209"/>
+                </a:cubicBezTo>
+                <a:lnTo>
+                  <a:pt x="220873" y="1325209"/>
+                </a:lnTo>
+                <a:cubicBezTo>
+                  <a:pt x="98888" y="1325209"/>
+                  <a:pt x="0" y="1226321"/>
+                  <a:pt x="0" y="1104336"/>
+                </a:cubicBezTo>
+                <a:lnTo>
+                  <a:pt x="0" y="220873"/>
+                </a:lnTo>
+                <a:close/>
+              </a:path>
+            </a:pathLst>
+          </a:custGeom>
+          <a:ln w="28575"/>
+          <a:effectLst>
+            <a:outerShdw blurRad="254000" dist="38100" algn="l" rotWithShape="0">
+              <a:prstClr val="black">
+                <a:alpha val="40000"/>
+              </a:prstClr>
+            </a:outerShdw>
+          </a:effectLst>
+        </p:spPr>
+        <p:style>
+          <a:lnRef idx="2">
+            <a:schemeClr val="accent1"/>
+          </a:lnRef>
+          <a:fillRef idx="1">
+            <a:schemeClr val="lt1"/>
+          </a:fillRef>
+          <a:effectRef idx="0">
+            <a:schemeClr val="accent1"/>
+          </a:effectRef>
+          <a:fontRef idx="minor">
+            <a:schemeClr val="dk1"/>
+          </a:fontRef>
+        </p:style>
+        <p:txBody>
+          <a:bodyPr spcFirstLastPara="0" vert="horz" wrap="square" lIns="156131" tIns="156131" rIns="156131" bIns="156131" numCol="1" spcCol="1270" anchor="ctr" anchorCtr="0">
+            <a:noAutofit/>
+          </a:bodyPr>
+          <a:lstStyle/>
+          <a:p>
+            <a:pPr marL="0" lvl="0" indent="0" algn="ctr" defTabSz="1066800">
+              <a:lnSpc>
+                <a:spcPct val="90000"/>
+              </a:lnSpc>
+              <a:spcBef>
+                <a:spcPct val="0"/>
+              </a:spcBef>
+              <a:spcAft>
+                <a:spcPct val="35000"/>
+              </a:spcAft>
+              <a:buNone/>
+            </a:pPr>
+            <a:r>
+              <a:rPr lang="es-CL" sz="2400" kern="1200" dirty="0">
+                <a:effectLst>
+                  <a:outerShdw blurRad="50800" dist="38100" algn="l" rotWithShape="0">
+                    <a:prstClr val="black">
+                      <a:alpha val="40000"/>
+                    </a:prstClr>
+                  </a:outerShdw>
+                </a:effectLst>
+              </a:rPr>
+              <a:t>Definición de Política</a:t>
+            </a:r>
+          </a:p>
+        </p:txBody>
+      </p:sp>
+      <p:sp>
+        <p:nvSpPr>
+          <p:cNvPr id="12" name="Forma libre: forma 11">
+            <a:extLst>
+              <a:ext uri="{FF2B5EF4-FFF2-40B4-BE49-F238E27FC236}">
+                <a16:creationId xmlns:a16="http://schemas.microsoft.com/office/drawing/2014/main" id="{C49E3656-0020-47ED-A638-1C8CDFAA4318}"/>
+              </a:ext>
+            </a:extLst>
+          </p:cNvPr>
+          <p:cNvSpPr/>
+          <p:nvPr/>
+        </p:nvSpPr>
+        <p:spPr>
+          <a:xfrm>
+            <a:off x="8239303" y="2435799"/>
+            <a:ext cx="2211600" cy="1325209"/>
+          </a:xfrm>
+          <a:custGeom>
+            <a:avLst/>
+            <a:gdLst>
+              <a:gd name="connsiteX0" fmla="*/ 0 w 2211600"/>
+              <a:gd name="connsiteY0" fmla="*/ 220873 h 1325209"/>
+              <a:gd name="connsiteX1" fmla="*/ 220873 w 2211600"/>
+              <a:gd name="connsiteY1" fmla="*/ 0 h 1325209"/>
+              <a:gd name="connsiteX2" fmla="*/ 1990727 w 2211600"/>
+              <a:gd name="connsiteY2" fmla="*/ 0 h 1325209"/>
+              <a:gd name="connsiteX3" fmla="*/ 2211600 w 2211600"/>
+              <a:gd name="connsiteY3" fmla="*/ 220873 h 1325209"/>
+              <a:gd name="connsiteX4" fmla="*/ 2211600 w 2211600"/>
+              <a:gd name="connsiteY4" fmla="*/ 1104336 h 1325209"/>
+              <a:gd name="connsiteX5" fmla="*/ 1990727 w 2211600"/>
+              <a:gd name="connsiteY5" fmla="*/ 1325209 h 1325209"/>
+              <a:gd name="connsiteX6" fmla="*/ 220873 w 2211600"/>
+              <a:gd name="connsiteY6" fmla="*/ 1325209 h 1325209"/>
+              <a:gd name="connsiteX7" fmla="*/ 0 w 2211600"/>
+              <a:gd name="connsiteY7" fmla="*/ 1104336 h 1325209"/>
+              <a:gd name="connsiteX8" fmla="*/ 0 w 2211600"/>
+              <a:gd name="connsiteY8" fmla="*/ 220873 h 1325209"/>
+            </a:gdLst>
+            <a:ahLst/>
+            <a:cxnLst>
+              <a:cxn ang="0">
+                <a:pos x="connsiteX0" y="connsiteY0"/>
+              </a:cxn>
+              <a:cxn ang="0">
+                <a:pos x="connsiteX1" y="connsiteY1"/>
+              </a:cxn>
+              <a:cxn ang="0">
+                <a:pos x="connsiteX2" y="connsiteY2"/>
+              </a:cxn>
+              <a:cxn ang="0">
+                <a:pos x="connsiteX3" y="connsiteY3"/>
+              </a:cxn>
+              <a:cxn ang="0">
+                <a:pos x="connsiteX4" y="connsiteY4"/>
+              </a:cxn>
+              <a:cxn ang="0">
+                <a:pos x="connsiteX5" y="connsiteY5"/>
+              </a:cxn>
+              <a:cxn ang="0">
+                <a:pos x="connsiteX6" y="connsiteY6"/>
+              </a:cxn>
+              <a:cxn ang="0">
+                <a:pos x="connsiteX7" y="connsiteY7"/>
+              </a:cxn>
+              <a:cxn ang="0">
+                <a:pos x="connsiteX8" y="connsiteY8"/>
+              </a:cxn>
+            </a:cxnLst>
+            <a:rect l="l" t="t" r="r" b="b"/>
+            <a:pathLst>
+              <a:path w="2211600" h="1325209">
+                <a:moveTo>
+                  <a:pt x="0" y="220873"/>
+                </a:moveTo>
+                <a:cubicBezTo>
+                  <a:pt x="0" y="98888"/>
+                  <a:pt x="98888" y="0"/>
+                  <a:pt x="220873" y="0"/>
+                </a:cubicBezTo>
+                <a:lnTo>
+                  <a:pt x="1990727" y="0"/>
+                </a:lnTo>
+                <a:cubicBezTo>
+                  <a:pt x="2112712" y="0"/>
+                  <a:pt x="2211600" y="98888"/>
+                  <a:pt x="2211600" y="220873"/>
+                </a:cubicBezTo>
+                <a:lnTo>
+                  <a:pt x="2211600" y="1104336"/>
+                </a:lnTo>
+                <a:cubicBezTo>
+                  <a:pt x="2211600" y="1226321"/>
+                  <a:pt x="2112712" y="1325209"/>
+                  <a:pt x="1990727" y="1325209"/>
+                </a:cubicBezTo>
+                <a:lnTo>
+                  <a:pt x="220873" y="1325209"/>
+                </a:lnTo>
+                <a:cubicBezTo>
+                  <a:pt x="98888" y="1325209"/>
+                  <a:pt x="0" y="1226321"/>
+                  <a:pt x="0" y="1104336"/>
+                </a:cubicBezTo>
+                <a:lnTo>
+                  <a:pt x="0" y="220873"/>
+                </a:lnTo>
+                <a:close/>
+              </a:path>
+            </a:pathLst>
+          </a:custGeom>
+          <a:ln w="28575"/>
+          <a:effectLst>
+            <a:outerShdw blurRad="254000" dist="38100" algn="l" rotWithShape="0">
+              <a:prstClr val="black">
+                <a:alpha val="40000"/>
+              </a:prstClr>
+            </a:outerShdw>
+          </a:effectLst>
+        </p:spPr>
+        <p:style>
+          <a:lnRef idx="2">
+            <a:schemeClr val="accent1"/>
+          </a:lnRef>
+          <a:fillRef idx="1">
+            <a:schemeClr val="lt1"/>
+          </a:fillRef>
+          <a:effectRef idx="0">
+            <a:schemeClr val="accent1"/>
+          </a:effectRef>
+          <a:fontRef idx="minor">
+            <a:schemeClr val="dk1"/>
+          </a:fontRef>
+        </p:style>
+        <p:txBody>
+          <a:bodyPr spcFirstLastPara="0" vert="horz" wrap="square" lIns="156131" tIns="156131" rIns="156131" bIns="156131" numCol="1" spcCol="1270" anchor="ctr" anchorCtr="0">
+            <a:noAutofit/>
+          </a:bodyPr>
+          <a:lstStyle/>
+          <a:p>
+            <a:pPr marL="0" lvl="0" indent="0" algn="ctr" defTabSz="1066800">
+              <a:lnSpc>
+                <a:spcPct val="100000"/>
+              </a:lnSpc>
+              <a:spcBef>
+                <a:spcPct val="0"/>
+              </a:spcBef>
+              <a:spcAft>
+                <a:spcPts val="0"/>
+              </a:spcAft>
+              <a:buNone/>
+            </a:pPr>
+            <a:r>
+              <a:rPr lang="es-CL" sz="2400" kern="1200" dirty="0">
+                <a:effectLst>
+                  <a:outerShdw blurRad="50800" dist="38100" algn="l" rotWithShape="0">
+                    <a:prstClr val="black">
+                      <a:alpha val="40000"/>
+                    </a:prstClr>
+                  </a:outerShdw>
+                </a:effectLst>
+              </a:rPr>
+              <a:t>Marcha </a:t>
+            </a:r>
+          </a:p>
+          <a:p>
+            <a:pPr marL="0" lvl="0" indent="0" algn="ctr" defTabSz="1066800">
+              <a:lnSpc>
+                <a:spcPct val="100000"/>
+              </a:lnSpc>
+              <a:spcBef>
+                <a:spcPct val="0"/>
+              </a:spcBef>
+              <a:spcAft>
+                <a:spcPts val="0"/>
+              </a:spcAft>
+              <a:buNone/>
+            </a:pPr>
+            <a:r>
+              <a:rPr lang="es-CL" sz="2400" kern="1200" dirty="0">
+                <a:effectLst>
+                  <a:outerShdw blurRad="50800" dist="38100" algn="l" rotWithShape="0">
+                    <a:prstClr val="black">
+                      <a:alpha val="40000"/>
+                    </a:prstClr>
+                  </a:outerShdw>
+                </a:effectLst>
+              </a:rPr>
+              <a:t>Blanca</a:t>
+            </a:r>
+          </a:p>
+        </p:txBody>
+      </p:sp>
       <p:sp>
         <p:nvSpPr>
           <p:cNvPr id="6" name="Rectángulo: esquinas redondeadas 5">
@@ -12858,6 +10902,213 @@
                                           </p:stCondLst>
                                         </p:cTn>
                                         <p:tgtEl>
+                                          <p:spTgt spid="9"/>
+                                        </p:tgtEl>
+                                        <p:attrNameLst>
+                                          <p:attrName>style.visibility</p:attrName>
+                                        </p:attrNameLst>
+                                      </p:cBhvr>
+                                      <p:to>
+                                        <p:strVal val="visible"/>
+                                      </p:to>
+                                    </p:set>
+                                  </p:childTnLst>
+                                </p:cTn>
+                              </p:par>
+                              <p:par>
+                                <p:cTn id="7" presetID="1" presetClass="entr" presetSubtype="0" fill="hold" nodeType="withEffect">
+                                  <p:stCondLst>
+                                    <p:cond delay="0"/>
+                                  </p:stCondLst>
+                                  <p:childTnLst>
+                                    <p:set>
+                                      <p:cBhvr>
+                                        <p:cTn id="8" dur="1" fill="hold">
+                                          <p:stCondLst>
+                                            <p:cond delay="0"/>
+                                          </p:stCondLst>
+                                        </p:cTn>
+                                        <p:tgtEl>
+                                          <p:spTgt spid="8"/>
+                                        </p:tgtEl>
+                                        <p:attrNameLst>
+                                          <p:attrName>style.visibility</p:attrName>
+                                        </p:attrNameLst>
+                                      </p:cBhvr>
+                                      <p:to>
+                                        <p:strVal val="visible"/>
+                                      </p:to>
+                                    </p:set>
+                                  </p:childTnLst>
+                                </p:cTn>
+                              </p:par>
+                            </p:childTnLst>
+                          </p:cTn>
+                        </p:par>
+                      </p:childTnLst>
+                    </p:cTn>
+                  </p:par>
+                  <p:par>
+                    <p:cTn id="9" fill="hold">
+                      <p:stCondLst>
+                        <p:cond delay="indefinite"/>
+                      </p:stCondLst>
+                      <p:childTnLst>
+                        <p:par>
+                          <p:cTn id="10" fill="hold">
+                            <p:stCondLst>
+                              <p:cond delay="0"/>
+                            </p:stCondLst>
+                            <p:childTnLst>
+                              <p:par>
+                                <p:cTn id="11" presetID="1" presetClass="entr" presetSubtype="0" fill="hold" grpId="0" nodeType="clickEffect">
+                                  <p:stCondLst>
+                                    <p:cond delay="0"/>
+                                  </p:stCondLst>
+                                  <p:childTnLst>
+                                    <p:set>
+                                      <p:cBhvr>
+                                        <p:cTn id="12" dur="1" fill="hold">
+                                          <p:stCondLst>
+                                            <p:cond delay="0"/>
+                                          </p:stCondLst>
+                                        </p:cTn>
+                                        <p:tgtEl>
+                                          <p:spTgt spid="10"/>
+                                        </p:tgtEl>
+                                        <p:attrNameLst>
+                                          <p:attrName>style.visibility</p:attrName>
+                                        </p:attrNameLst>
+                                      </p:cBhvr>
+                                      <p:to>
+                                        <p:strVal val="visible"/>
+                                      </p:to>
+                                    </p:set>
+                                  </p:childTnLst>
+                                </p:cTn>
+                              </p:par>
+                            </p:childTnLst>
+                          </p:cTn>
+                        </p:par>
+                      </p:childTnLst>
+                    </p:cTn>
+                  </p:par>
+                  <p:par>
+                    <p:cTn id="13" fill="hold">
+                      <p:stCondLst>
+                        <p:cond delay="indefinite"/>
+                      </p:stCondLst>
+                      <p:childTnLst>
+                        <p:par>
+                          <p:cTn id="14" fill="hold">
+                            <p:stCondLst>
+                              <p:cond delay="0"/>
+                            </p:stCondLst>
+                            <p:childTnLst>
+                              <p:par>
+                                <p:cTn id="15" presetID="1" presetClass="entr" presetSubtype="0" fill="hold" grpId="0" nodeType="clickEffect">
+                                  <p:stCondLst>
+                                    <p:cond delay="0"/>
+                                  </p:stCondLst>
+                                  <p:childTnLst>
+                                    <p:set>
+                                      <p:cBhvr>
+                                        <p:cTn id="16" dur="1" fill="hold">
+                                          <p:stCondLst>
+                                            <p:cond delay="0"/>
+                                          </p:stCondLst>
+                                        </p:cTn>
+                                        <p:tgtEl>
+                                          <p:spTgt spid="11"/>
+                                        </p:tgtEl>
+                                        <p:attrNameLst>
+                                          <p:attrName>style.visibility</p:attrName>
+                                        </p:attrNameLst>
+                                      </p:cBhvr>
+                                      <p:to>
+                                        <p:strVal val="visible"/>
+                                      </p:to>
+                                    </p:set>
+                                  </p:childTnLst>
+                                </p:cTn>
+                              </p:par>
+                            </p:childTnLst>
+                          </p:cTn>
+                        </p:par>
+                      </p:childTnLst>
+                    </p:cTn>
+                  </p:par>
+                  <p:par>
+                    <p:cTn id="17" fill="hold">
+                      <p:stCondLst>
+                        <p:cond delay="indefinite"/>
+                      </p:stCondLst>
+                      <p:childTnLst>
+                        <p:par>
+                          <p:cTn id="18" fill="hold">
+                            <p:stCondLst>
+                              <p:cond delay="0"/>
+                            </p:stCondLst>
+                            <p:childTnLst>
+                              <p:par>
+                                <p:cTn id="19" presetID="1" presetClass="entr" presetSubtype="0" fill="hold" grpId="0" nodeType="clickEffect">
+                                  <p:stCondLst>
+                                    <p:cond delay="0"/>
+                                  </p:stCondLst>
+                                  <p:childTnLst>
+                                    <p:set>
+                                      <p:cBhvr>
+                                        <p:cTn id="20" dur="1" fill="hold">
+                                          <p:stCondLst>
+                                            <p:cond delay="0"/>
+                                          </p:stCondLst>
+                                        </p:cTn>
+                                        <p:tgtEl>
+                                          <p:spTgt spid="12"/>
+                                        </p:tgtEl>
+                                        <p:attrNameLst>
+                                          <p:attrName>style.visibility</p:attrName>
+                                        </p:attrNameLst>
+                                      </p:cBhvr>
+                                      <p:to>
+                                        <p:strVal val="visible"/>
+                                      </p:to>
+                                    </p:set>
+                                  </p:childTnLst>
+                                </p:cTn>
+                              </p:par>
+                            </p:childTnLst>
+                          </p:cTn>
+                        </p:par>
+                      </p:childTnLst>
+                    </p:cTn>
+                  </p:par>
+                  <p:par>
+                    <p:cTn id="21" fill="hold">
+                      <p:stCondLst>
+                        <p:cond delay="indefinite"/>
+                      </p:stCondLst>
+                      <p:childTnLst>
+                        <p:par>
+                          <p:cTn id="22" fill="hold">
+                            <p:stCondLst>
+                              <p:cond delay="0"/>
+                            </p:stCondLst>
+                            <p:childTnLst>
+                              <p:par>
+                                <p:cTn id="23" presetID="1" presetClass="entr" presetSubtype="0" fill="hold" grpId="0" nodeType="clickEffect">
+                                  <p:stCondLst>
+                                    <p:cond delay="0"/>
+                                  </p:stCondLst>
+                                  <p:childTnLst>
+                                    <p:set>
+                                      <p:cBhvr>
+                                        <p:cTn id="24" dur="1" fill="hold">
+                                          <p:stCondLst>
+                                            <p:cond delay="0"/>
+                                          </p:stCondLst>
+                                        </p:cTn>
+                                        <p:tgtEl>
                                           <p:spTgt spid="6"/>
                                         </p:tgtEl>
                                         <p:attrNameLst>
@@ -12871,15 +11122,33 @@
                                   </p:childTnLst>
                                 </p:cTn>
                               </p:par>
+                            </p:childTnLst>
+                          </p:cTn>
+                        </p:par>
+                      </p:childTnLst>
+                    </p:cTn>
+                  </p:par>
+                  <p:par>
+                    <p:cTn id="25" fill="hold">
+                      <p:stCondLst>
+                        <p:cond delay="indefinite"/>
+                      </p:stCondLst>
+                      <p:childTnLst>
+                        <p:par>
+                          <p:cTn id="26" fill="hold">
+                            <p:stCondLst>
+                              <p:cond delay="0"/>
+                            </p:stCondLst>
+                            <p:childTnLst>
                               <p:par>
-                                <p:cTn id="7" presetID="1" presetClass="entr" presetSubtype="0" fill="hold" grpId="0" nodeType="withEffect">
+                                <p:cTn id="27" presetID="1" presetClass="entr" presetSubtype="0" fill="hold" grpId="0" nodeType="clickEffect">
                                   <p:stCondLst>
                                     <p:cond delay="0"/>
                                   </p:stCondLst>
                                   <p:childTnLst>
                                     <p:set>
                                       <p:cBhvr>
-                                        <p:cTn id="8" dur="1" fill="hold">
+                                        <p:cTn id="28" dur="1" fill="hold">
                                           <p:stCondLst>
                                             <p:cond delay="0"/>
                                           </p:stCondLst>
@@ -12926,6 +11195,10 @@
       </p:par>
     </p:tnLst>
     <p:bldLst>
+      <p:bldP spid="9" grpId="0" animBg="1"/>
+      <p:bldP spid="10" grpId="0" animBg="1"/>
+      <p:bldP spid="11" grpId="0" animBg="1"/>
+      <p:bldP spid="12" grpId="0" animBg="1"/>
       <p:bldP spid="6" grpId="0" animBg="1"/>
       <p:bldP spid="7" grpId="0" animBg="1"/>
     </p:bldLst>
@@ -15363,6 +13636,51 @@
                                           </p:stCondLst>
                                         </p:cTn>
                                         <p:tgtEl>
+                                          <p:spTgt spid="5"/>
+                                        </p:tgtEl>
+                                        <p:attrNameLst>
+                                          <p:attrName>style.visibility</p:attrName>
+                                        </p:attrNameLst>
+                                      </p:cBhvr>
+                                      <p:to>
+                                        <p:strVal val="visible"/>
+                                      </p:to>
+                                    </p:set>
+                                  </p:childTnLst>
+                                </p:cTn>
+                              </p:par>
+                            </p:childTnLst>
+                          </p:cTn>
+                        </p:par>
+                      </p:childTnLst>
+                    </p:cTn>
+                  </p:par>
+                  <p:par>
+                    <p:cTn id="7" fill="hold">
+                      <p:stCondLst>
+                        <p:cond delay="indefinite"/>
+                      </p:stCondLst>
+                      <p:childTnLst>
+                        <p:par>
+                          <p:cTn id="8" fill="hold">
+                            <p:stCondLst>
+                              <p:cond delay="0"/>
+                            </p:stCondLst>
+                            <p:childTnLst>
+                              <p:par>
+                                <p:cTn id="9" presetID="1" presetClass="entr" presetSubtype="0" fill="hold" grpId="0" nodeType="clickEffect">
+                                  <p:stCondLst>
+                                    <p:cond delay="0"/>
+                                  </p:stCondLst>
+                                  <p:childTnLst>
+                                    <p:set>
+                                      <p:cBhvr>
+                                        <p:cTn id="10" dur="1" fill="hold">
+                                          <p:stCondLst>
+                                            <p:cond delay="0"/>
+                                          </p:stCondLst>
+                                        </p:cTn>
+                                        <p:tgtEl>
                                           <p:spTgt spid="10"/>
                                         </p:tgtEl>
                                         <p:attrNameLst>
@@ -15377,14 +13695,14 @@
                                 </p:cTn>
                               </p:par>
                               <p:par>
-                                <p:cTn id="7" presetID="1" presetClass="entr" presetSubtype="0" fill="hold" grpId="0" nodeType="withEffect">
+                                <p:cTn id="11" presetID="1" presetClass="entr" presetSubtype="0" fill="hold" grpId="0" nodeType="withEffect">
                                   <p:stCondLst>
                                     <p:cond delay="0"/>
                                   </p:stCondLst>
                                   <p:childTnLst>
                                     <p:set>
                                       <p:cBhvr>
-                                        <p:cTn id="8" dur="1" fill="hold">
+                                        <p:cTn id="12" dur="1" fill="hold">
                                           <p:stCondLst>
                                             <p:cond delay="0"/>
                                           </p:stCondLst>
@@ -15410,26 +13728,26 @@
                     </p:cTn>
                   </p:par>
                   <p:par>
-                    <p:cTn id="9" fill="hold">
+                    <p:cTn id="13" fill="hold">
                       <p:stCondLst>
                         <p:cond delay="indefinite"/>
                       </p:stCondLst>
                       <p:childTnLst>
                         <p:par>
-                          <p:cTn id="10" fill="hold">
+                          <p:cTn id="14" fill="hold">
                             <p:stCondLst>
                               <p:cond delay="0"/>
                             </p:stCondLst>
                             <p:childTnLst>
                               <p:par>
-                                <p:cTn id="11" presetID="10" presetClass="entr" presetSubtype="0" fill="hold" nodeType="clickEffect">
+                                <p:cTn id="15" presetID="10" presetClass="entr" presetSubtype="0" fill="hold" nodeType="clickEffect">
                                   <p:stCondLst>
                                     <p:cond delay="0"/>
                                   </p:stCondLst>
                                   <p:childTnLst>
                                     <p:set>
                                       <p:cBhvr>
-                                        <p:cTn id="12" dur="1" fill="hold">
+                                        <p:cTn id="16" dur="1" fill="hold">
                                           <p:stCondLst>
                                             <p:cond delay="0"/>
                                           </p:stCondLst>
@@ -15447,7 +13765,7 @@
                                     </p:set>
                                     <p:animEffect transition="in" filter="fade">
                                       <p:cBhvr>
-                                        <p:cTn id="13" dur="500"/>
+                                        <p:cTn id="17" dur="500"/>
                                         <p:tgtEl>
                                           <p:spTgt spid="14"/>
                                         </p:tgtEl>
@@ -15484,6 +13802,7 @@
       </p:par>
     </p:tnLst>
     <p:bldLst>
+      <p:bldP spid="5" grpId="0" animBg="1"/>
       <p:bldP spid="6" grpId="0" animBg="1"/>
       <p:bldP spid="10" grpId="0" animBg="1"/>
     </p:bldLst>
@@ -16052,7 +14371,7 @@
                                           </p:stCondLst>
                                         </p:cTn>
                                         <p:tgtEl>
-                                          <p:spTgt spid="13"/>
+                                          <p:spTgt spid="12"/>
                                         </p:tgtEl>
                                         <p:attrNameLst>
                                           <p:attrName>style.visibility</p:attrName>
@@ -16097,7 +14416,7 @@
                                           </p:stCondLst>
                                         </p:cTn>
                                         <p:tgtEl>
-                                          <p:spTgt spid="14"/>
+                                          <p:spTgt spid="13"/>
                                         </p:tgtEl>
                                         <p:attrNameLst>
                                           <p:attrName>style.visibility</p:attrName>
@@ -16142,7 +14461,7 @@
                                           </p:stCondLst>
                                         </p:cTn>
                                         <p:tgtEl>
-                                          <p:spTgt spid="15"/>
+                                          <p:spTgt spid="14"/>
                                         </p:tgtEl>
                                         <p:attrNameLst>
                                           <p:attrName>style.visibility</p:attrName>
@@ -16187,6 +14506,51 @@
                                           </p:stCondLst>
                                         </p:cTn>
                                         <p:tgtEl>
+                                          <p:spTgt spid="15"/>
+                                        </p:tgtEl>
+                                        <p:attrNameLst>
+                                          <p:attrName>style.visibility</p:attrName>
+                                        </p:attrNameLst>
+                                      </p:cBhvr>
+                                      <p:to>
+                                        <p:strVal val="visible"/>
+                                      </p:to>
+                                    </p:set>
+                                  </p:childTnLst>
+                                </p:cTn>
+                              </p:par>
+                            </p:childTnLst>
+                          </p:cTn>
+                        </p:par>
+                      </p:childTnLst>
+                    </p:cTn>
+                  </p:par>
+                  <p:par>
+                    <p:cTn id="19" fill="hold">
+                      <p:stCondLst>
+                        <p:cond delay="indefinite"/>
+                      </p:stCondLst>
+                      <p:childTnLst>
+                        <p:par>
+                          <p:cTn id="20" fill="hold">
+                            <p:stCondLst>
+                              <p:cond delay="0"/>
+                            </p:stCondLst>
+                            <p:childTnLst>
+                              <p:par>
+                                <p:cTn id="21" presetID="1" presetClass="entr" presetSubtype="0" fill="hold" grpId="0" nodeType="clickEffect">
+                                  <p:stCondLst>
+                                    <p:cond delay="0"/>
+                                  </p:stCondLst>
+                                  <p:childTnLst>
+                                    <p:set>
+                                      <p:cBhvr>
+                                        <p:cTn id="22" dur="1" fill="hold">
+                                          <p:stCondLst>
+                                            <p:cond delay="0"/>
+                                          </p:stCondLst>
+                                        </p:cTn>
+                                        <p:tgtEl>
                                           <p:spTgt spid="17"/>
                                         </p:tgtEl>
                                         <p:attrNameLst>
@@ -16201,14 +14565,14 @@
                                 </p:cTn>
                               </p:par>
                               <p:par>
-                                <p:cTn id="19" presetID="1" presetClass="entr" presetSubtype="0" fill="hold" grpId="0" nodeType="withEffect">
+                                <p:cTn id="23" presetID="1" presetClass="entr" presetSubtype="0" fill="hold" grpId="0" nodeType="withEffect">
                                   <p:stCondLst>
                                     <p:cond delay="0"/>
                                   </p:stCondLst>
                                   <p:childTnLst>
                                     <p:set>
                                       <p:cBhvr>
-                                        <p:cTn id="20" dur="1" fill="hold">
+                                        <p:cTn id="24" dur="1" fill="hold">
                                           <p:stCondLst>
                                             <p:cond delay="0"/>
                                           </p:stCondLst>
@@ -16255,6 +14619,7 @@
       </p:par>
     </p:tnLst>
     <p:bldLst>
+      <p:bldP spid="12" grpId="0" animBg="1"/>
       <p:bldP spid="13" grpId="0" animBg="1"/>
       <p:bldP spid="14" grpId="0" animBg="1"/>
       <p:bldP spid="15" grpId="0" animBg="1"/>
@@ -27429,7 +25794,7 @@
                                           </p:stCondLst>
                                         </p:cTn>
                                         <p:tgtEl>
-                                          <p:spTgt spid="13"/>
+                                          <p:spTgt spid="12"/>
                                         </p:tgtEl>
                                         <p:attrNameLst>
                                           <p:attrName>style.visibility</p:attrName>
@@ -27474,7 +25839,7 @@
                                           </p:stCondLst>
                                         </p:cTn>
                                         <p:tgtEl>
-                                          <p:spTgt spid="14"/>
+                                          <p:spTgt spid="13"/>
                                         </p:tgtEl>
                                         <p:attrNameLst>
                                           <p:attrName>style.visibility</p:attrName>
@@ -27519,7 +25884,7 @@
                                           </p:stCondLst>
                                         </p:cTn>
                                         <p:tgtEl>
-                                          <p:spTgt spid="15"/>
+                                          <p:spTgt spid="14"/>
                                         </p:tgtEl>
                                         <p:attrNameLst>
                                           <p:attrName>style.visibility</p:attrName>
@@ -27564,6 +25929,51 @@
                                           </p:stCondLst>
                                         </p:cTn>
                                         <p:tgtEl>
+                                          <p:spTgt spid="15"/>
+                                        </p:tgtEl>
+                                        <p:attrNameLst>
+                                          <p:attrName>style.visibility</p:attrName>
+                                        </p:attrNameLst>
+                                      </p:cBhvr>
+                                      <p:to>
+                                        <p:strVal val="visible"/>
+                                      </p:to>
+                                    </p:set>
+                                  </p:childTnLst>
+                                </p:cTn>
+                              </p:par>
+                            </p:childTnLst>
+                          </p:cTn>
+                        </p:par>
+                      </p:childTnLst>
+                    </p:cTn>
+                  </p:par>
+                  <p:par>
+                    <p:cTn id="19" fill="hold">
+                      <p:stCondLst>
+                        <p:cond delay="indefinite"/>
+                      </p:stCondLst>
+                      <p:childTnLst>
+                        <p:par>
+                          <p:cTn id="20" fill="hold">
+                            <p:stCondLst>
+                              <p:cond delay="0"/>
+                            </p:stCondLst>
+                            <p:childTnLst>
+                              <p:par>
+                                <p:cTn id="21" presetID="1" presetClass="entr" presetSubtype="0" fill="hold" grpId="0" nodeType="clickEffect">
+                                  <p:stCondLst>
+                                    <p:cond delay="0"/>
+                                  </p:stCondLst>
+                                  <p:childTnLst>
+                                    <p:set>
+                                      <p:cBhvr>
+                                        <p:cTn id="22" dur="1" fill="hold">
+                                          <p:stCondLst>
+                                            <p:cond delay="0"/>
+                                          </p:stCondLst>
+                                        </p:cTn>
+                                        <p:tgtEl>
                                           <p:spTgt spid="17"/>
                                         </p:tgtEl>
                                         <p:attrNameLst>
@@ -27578,14 +25988,14 @@
                                 </p:cTn>
                               </p:par>
                               <p:par>
-                                <p:cTn id="19" presetID="1" presetClass="entr" presetSubtype="0" fill="hold" grpId="0" nodeType="withEffect">
+                                <p:cTn id="23" presetID="1" presetClass="entr" presetSubtype="0" fill="hold" grpId="0" nodeType="withEffect">
                                   <p:stCondLst>
                                     <p:cond delay="0"/>
                                   </p:stCondLst>
                                   <p:childTnLst>
                                     <p:set>
                                       <p:cBhvr>
-                                        <p:cTn id="20" dur="1" fill="hold">
+                                        <p:cTn id="24" dur="1" fill="hold">
                                           <p:stCondLst>
                                             <p:cond delay="0"/>
                                           </p:stCondLst>
@@ -27611,26 +26021,26 @@
                     </p:cTn>
                   </p:par>
                   <p:par>
-                    <p:cTn id="21" fill="hold">
+                    <p:cTn id="25" fill="hold">
                       <p:stCondLst>
                         <p:cond delay="indefinite"/>
                       </p:stCondLst>
                       <p:childTnLst>
                         <p:par>
-                          <p:cTn id="22" fill="hold">
+                          <p:cTn id="26" fill="hold">
                             <p:stCondLst>
                               <p:cond delay="0"/>
                             </p:stCondLst>
                             <p:childTnLst>
                               <p:par>
-                                <p:cTn id="23" presetID="1" presetClass="entr" presetSubtype="0" fill="hold" grpId="0" nodeType="clickEffect">
+                                <p:cTn id="27" presetID="1" presetClass="entr" presetSubtype="0" fill="hold" grpId="0" nodeType="clickEffect">
                                   <p:stCondLst>
                                     <p:cond delay="0"/>
                                   </p:stCondLst>
                                   <p:childTnLst>
                                     <p:set>
                                       <p:cBhvr>
-                                        <p:cTn id="24" dur="1" fill="hold">
+                                        <p:cTn id="28" dur="1" fill="hold">
                                           <p:stCondLst>
                                             <p:cond delay="0"/>
                                           </p:stCondLst>
@@ -27650,14 +26060,14 @@
                                 </p:cTn>
                               </p:par>
                               <p:par>
-                                <p:cTn id="25" presetID="1" presetClass="entr" presetSubtype="0" fill="hold" grpId="0" nodeType="withEffect">
+                                <p:cTn id="29" presetID="1" presetClass="entr" presetSubtype="0" fill="hold" grpId="0" nodeType="withEffect">
                                   <p:stCondLst>
                                     <p:cond delay="0"/>
                                   </p:stCondLst>
                                   <p:childTnLst>
                                     <p:set>
                                       <p:cBhvr>
-                                        <p:cTn id="26" dur="1" fill="hold">
+                                        <p:cTn id="30" dur="1" fill="hold">
                                           <p:stCondLst>
                                             <p:cond delay="0"/>
                                           </p:stCondLst>
@@ -27704,6 +26114,7 @@
       </p:par>
     </p:tnLst>
     <p:bldLst>
+      <p:bldP spid="12" grpId="0" animBg="1"/>
       <p:bldP spid="13" grpId="0" animBg="1"/>
       <p:bldP spid="14" grpId="0" animBg="1"/>
       <p:bldP spid="15" grpId="0" animBg="1"/>

</xml_diff>

<commit_message>
Ajustes a la presentación y al guión
</commit_message>
<xml_diff>
--- a/2018/TT IQQ 2018 Camara y Garay.pptx
+++ b/2018/TT IQQ 2018 Camara y Garay.pptx
@@ -11764,6 +11764,51 @@
                                           </p:stCondLst>
                                         </p:cTn>
                                         <p:tgtEl>
+                                          <p:spTgt spid="5"/>
+                                        </p:tgtEl>
+                                        <p:attrNameLst>
+                                          <p:attrName>style.visibility</p:attrName>
+                                        </p:attrNameLst>
+                                      </p:cBhvr>
+                                      <p:to>
+                                        <p:strVal val="visible"/>
+                                      </p:to>
+                                    </p:set>
+                                  </p:childTnLst>
+                                </p:cTn>
+                              </p:par>
+                            </p:childTnLst>
+                          </p:cTn>
+                        </p:par>
+                      </p:childTnLst>
+                    </p:cTn>
+                  </p:par>
+                  <p:par>
+                    <p:cTn id="7" fill="hold">
+                      <p:stCondLst>
+                        <p:cond delay="indefinite"/>
+                      </p:stCondLst>
+                      <p:childTnLst>
+                        <p:par>
+                          <p:cTn id="8" fill="hold">
+                            <p:stCondLst>
+                              <p:cond delay="0"/>
+                            </p:stCondLst>
+                            <p:childTnLst>
+                              <p:par>
+                                <p:cTn id="9" presetID="1" presetClass="entr" presetSubtype="0" fill="hold" grpId="0" nodeType="clickEffect">
+                                  <p:stCondLst>
+                                    <p:cond delay="0"/>
+                                  </p:stCondLst>
+                                  <p:childTnLst>
+                                    <p:set>
+                                      <p:cBhvr>
+                                        <p:cTn id="10" dur="1" fill="hold">
+                                          <p:stCondLst>
+                                            <p:cond delay="0"/>
+                                          </p:stCondLst>
+                                        </p:cTn>
+                                        <p:tgtEl>
                                           <p:spTgt spid="6"/>
                                         </p:tgtEl>
                                         <p:attrNameLst>
@@ -11778,14 +11823,14 @@
                                 </p:cTn>
                               </p:par>
                               <p:par>
-                                <p:cTn id="7" presetID="1" presetClass="entr" presetSubtype="0" fill="hold" grpId="0" nodeType="withEffect">
+                                <p:cTn id="11" presetID="1" presetClass="entr" presetSubtype="0" fill="hold" grpId="0" nodeType="withEffect">
                                   <p:stCondLst>
                                     <p:cond delay="0"/>
                                   </p:stCondLst>
                                   <p:childTnLst>
                                     <p:set>
                                       <p:cBhvr>
-                                        <p:cTn id="8" dur="1" fill="hold">
+                                        <p:cTn id="12" dur="1" fill="hold">
                                           <p:stCondLst>
                                             <p:cond delay="0"/>
                                           </p:stCondLst>
@@ -11811,26 +11856,26 @@
                     </p:cTn>
                   </p:par>
                   <p:par>
-                    <p:cTn id="9" fill="hold">
+                    <p:cTn id="13" fill="hold">
                       <p:stCondLst>
                         <p:cond delay="indefinite"/>
                       </p:stCondLst>
                       <p:childTnLst>
                         <p:par>
-                          <p:cTn id="10" fill="hold">
+                          <p:cTn id="14" fill="hold">
                             <p:stCondLst>
                               <p:cond delay="0"/>
                             </p:stCondLst>
                             <p:childTnLst>
                               <p:par>
-                                <p:cTn id="11" presetID="1" presetClass="entr" presetSubtype="0" fill="hold" grpId="0" nodeType="clickEffect">
+                                <p:cTn id="15" presetID="1" presetClass="entr" presetSubtype="0" fill="hold" grpId="0" nodeType="clickEffect">
                                   <p:stCondLst>
                                     <p:cond delay="0"/>
                                   </p:stCondLst>
                                   <p:childTnLst>
                                     <p:set>
                                       <p:cBhvr>
-                                        <p:cTn id="12" dur="1" fill="hold">
+                                        <p:cTn id="16" dur="1" fill="hold">
                                           <p:stCondLst>
                                             <p:cond delay="0"/>
                                           </p:stCondLst>
@@ -11850,14 +11895,14 @@
                                 </p:cTn>
                               </p:par>
                               <p:par>
-                                <p:cTn id="13" presetID="1" presetClass="entr" presetSubtype="0" fill="hold" grpId="0" nodeType="withEffect">
+                                <p:cTn id="17" presetID="1" presetClass="entr" presetSubtype="0" fill="hold" grpId="0" nodeType="withEffect">
                                   <p:stCondLst>
                                     <p:cond delay="0"/>
                                   </p:stCondLst>
                                   <p:childTnLst>
                                     <p:set>
                                       <p:cBhvr>
-                                        <p:cTn id="14" dur="1" fill="hold">
+                                        <p:cTn id="18" dur="1" fill="hold">
                                           <p:stCondLst>
                                             <p:cond delay="0"/>
                                           </p:stCondLst>
@@ -11904,6 +11949,7 @@
       </p:par>
     </p:tnLst>
     <p:bldLst>
+      <p:bldP spid="5" grpId="0" animBg="1"/>
       <p:bldP spid="6" grpId="0" animBg="1"/>
       <p:bldP spid="7" grpId="0" animBg="1"/>
       <p:bldP spid="10" grpId="0" animBg="1"/>
@@ -12433,6 +12479,51 @@
                                           </p:stCondLst>
                                         </p:cTn>
                                         <p:tgtEl>
+                                          <p:spTgt spid="5"/>
+                                        </p:tgtEl>
+                                        <p:attrNameLst>
+                                          <p:attrName>style.visibility</p:attrName>
+                                        </p:attrNameLst>
+                                      </p:cBhvr>
+                                      <p:to>
+                                        <p:strVal val="visible"/>
+                                      </p:to>
+                                    </p:set>
+                                  </p:childTnLst>
+                                </p:cTn>
+                              </p:par>
+                            </p:childTnLst>
+                          </p:cTn>
+                        </p:par>
+                      </p:childTnLst>
+                    </p:cTn>
+                  </p:par>
+                  <p:par>
+                    <p:cTn id="7" fill="hold">
+                      <p:stCondLst>
+                        <p:cond delay="indefinite"/>
+                      </p:stCondLst>
+                      <p:childTnLst>
+                        <p:par>
+                          <p:cTn id="8" fill="hold">
+                            <p:stCondLst>
+                              <p:cond delay="0"/>
+                            </p:stCondLst>
+                            <p:childTnLst>
+                              <p:par>
+                                <p:cTn id="9" presetID="1" presetClass="entr" presetSubtype="0" fill="hold" grpId="0" nodeType="clickEffect">
+                                  <p:stCondLst>
+                                    <p:cond delay="0"/>
+                                  </p:stCondLst>
+                                  <p:childTnLst>
+                                    <p:set>
+                                      <p:cBhvr>
+                                        <p:cTn id="10" dur="1" fill="hold">
+                                          <p:stCondLst>
+                                            <p:cond delay="0"/>
+                                          </p:stCondLst>
+                                        </p:cTn>
+                                        <p:tgtEl>
                                           <p:spTgt spid="10"/>
                                         </p:tgtEl>
                                         <p:attrNameLst>
@@ -12447,14 +12538,14 @@
                                 </p:cTn>
                               </p:par>
                               <p:par>
-                                <p:cTn id="7" presetID="1" presetClass="entr" presetSubtype="0" fill="hold" grpId="0" nodeType="withEffect">
+                                <p:cTn id="11" presetID="1" presetClass="entr" presetSubtype="0" fill="hold" grpId="0" nodeType="withEffect">
                                   <p:stCondLst>
                                     <p:cond delay="0"/>
                                   </p:stCondLst>
                                   <p:childTnLst>
                                     <p:set>
                                       <p:cBhvr>
-                                        <p:cTn id="8" dur="1" fill="hold">
+                                        <p:cTn id="12" dur="1" fill="hold">
                                           <p:stCondLst>
                                             <p:cond delay="0"/>
                                           </p:stCondLst>
@@ -12480,26 +12571,26 @@
                     </p:cTn>
                   </p:par>
                   <p:par>
-                    <p:cTn id="9" fill="hold">
+                    <p:cTn id="13" fill="hold">
                       <p:stCondLst>
                         <p:cond delay="indefinite"/>
                       </p:stCondLst>
                       <p:childTnLst>
                         <p:par>
-                          <p:cTn id="10" fill="hold">
+                          <p:cTn id="14" fill="hold">
                             <p:stCondLst>
                               <p:cond delay="0"/>
                             </p:stCondLst>
                             <p:childTnLst>
                               <p:par>
-                                <p:cTn id="11" presetID="1" presetClass="entr" presetSubtype="0" fill="hold" grpId="0" nodeType="clickEffect">
+                                <p:cTn id="15" presetID="1" presetClass="entr" presetSubtype="0" fill="hold" grpId="0" nodeType="clickEffect">
                                   <p:stCondLst>
                                     <p:cond delay="0"/>
                                   </p:stCondLst>
                                   <p:childTnLst>
                                     <p:set>
                                       <p:cBhvr>
-                                        <p:cTn id="12" dur="1" fill="hold">
+                                        <p:cTn id="16" dur="1" fill="hold">
                                           <p:stCondLst>
                                             <p:cond delay="0"/>
                                           </p:stCondLst>
@@ -12519,14 +12610,14 @@
                                 </p:cTn>
                               </p:par>
                               <p:par>
-                                <p:cTn id="13" presetID="1" presetClass="entr" presetSubtype="0" fill="hold" grpId="0" nodeType="withEffect">
+                                <p:cTn id="17" presetID="1" presetClass="entr" presetSubtype="0" fill="hold" grpId="0" nodeType="withEffect">
                                   <p:stCondLst>
                                     <p:cond delay="0"/>
                                   </p:stCondLst>
                                   <p:childTnLst>
                                     <p:set>
                                       <p:cBhvr>
-                                        <p:cTn id="14" dur="1" fill="hold">
+                                        <p:cTn id="18" dur="1" fill="hold">
                                           <p:stCondLst>
                                             <p:cond delay="0"/>
                                           </p:stCondLst>
@@ -12573,6 +12664,7 @@
       </p:par>
     </p:tnLst>
     <p:bldLst>
+      <p:bldP spid="5" grpId="0" animBg="1"/>
       <p:bldP spid="6" grpId="0" animBg="1"/>
       <p:bldP spid="7" grpId="0" animBg="1"/>
       <p:bldP spid="10" grpId="0" animBg="1"/>
@@ -13132,6 +13224,51 @@
                                           </p:stCondLst>
                                         </p:cTn>
                                         <p:tgtEl>
+                                          <p:spTgt spid="5"/>
+                                        </p:tgtEl>
+                                        <p:attrNameLst>
+                                          <p:attrName>style.visibility</p:attrName>
+                                        </p:attrNameLst>
+                                      </p:cBhvr>
+                                      <p:to>
+                                        <p:strVal val="visible"/>
+                                      </p:to>
+                                    </p:set>
+                                  </p:childTnLst>
+                                </p:cTn>
+                              </p:par>
+                            </p:childTnLst>
+                          </p:cTn>
+                        </p:par>
+                      </p:childTnLst>
+                    </p:cTn>
+                  </p:par>
+                  <p:par>
+                    <p:cTn id="7" fill="hold">
+                      <p:stCondLst>
+                        <p:cond delay="indefinite"/>
+                      </p:stCondLst>
+                      <p:childTnLst>
+                        <p:par>
+                          <p:cTn id="8" fill="hold">
+                            <p:stCondLst>
+                              <p:cond delay="0"/>
+                            </p:stCondLst>
+                            <p:childTnLst>
+                              <p:par>
+                                <p:cTn id="9" presetID="1" presetClass="entr" presetSubtype="0" fill="hold" grpId="0" nodeType="clickEffect">
+                                  <p:stCondLst>
+                                    <p:cond delay="0"/>
+                                  </p:stCondLst>
+                                  <p:childTnLst>
+                                    <p:set>
+                                      <p:cBhvr>
+                                        <p:cTn id="10" dur="1" fill="hold">
+                                          <p:stCondLst>
+                                            <p:cond delay="0"/>
+                                          </p:stCondLst>
+                                        </p:cTn>
+                                        <p:tgtEl>
                                           <p:spTgt spid="11"/>
                                         </p:tgtEl>
                                         <p:attrNameLst>
@@ -13146,14 +13283,14 @@
                                 </p:cTn>
                               </p:par>
                               <p:par>
-                                <p:cTn id="7" presetID="1" presetClass="entr" presetSubtype="0" fill="hold" grpId="0" nodeType="withEffect">
+                                <p:cTn id="11" presetID="1" presetClass="entr" presetSubtype="0" fill="hold" grpId="0" nodeType="withEffect">
                                   <p:stCondLst>
                                     <p:cond delay="0"/>
                                   </p:stCondLst>
                                   <p:childTnLst>
                                     <p:set>
                                       <p:cBhvr>
-                                        <p:cTn id="8" dur="1" fill="hold">
+                                        <p:cTn id="12" dur="1" fill="hold">
                                           <p:stCondLst>
                                             <p:cond delay="0"/>
                                           </p:stCondLst>
@@ -13179,26 +13316,26 @@
                     </p:cTn>
                   </p:par>
                   <p:par>
-                    <p:cTn id="9" fill="hold">
+                    <p:cTn id="13" fill="hold">
                       <p:stCondLst>
                         <p:cond delay="indefinite"/>
                       </p:stCondLst>
                       <p:childTnLst>
                         <p:par>
-                          <p:cTn id="10" fill="hold">
+                          <p:cTn id="14" fill="hold">
                             <p:stCondLst>
                               <p:cond delay="0"/>
                             </p:stCondLst>
                             <p:childTnLst>
                               <p:par>
-                                <p:cTn id="11" presetID="1" presetClass="entr" presetSubtype="0" fill="hold" grpId="0" nodeType="clickEffect">
+                                <p:cTn id="15" presetID="1" presetClass="entr" presetSubtype="0" fill="hold" grpId="0" nodeType="clickEffect">
                                   <p:stCondLst>
                                     <p:cond delay="0"/>
                                   </p:stCondLst>
                                   <p:childTnLst>
                                     <p:set>
                                       <p:cBhvr>
-                                        <p:cTn id="12" dur="1" fill="hold">
+                                        <p:cTn id="16" dur="1" fill="hold">
                                           <p:stCondLst>
                                             <p:cond delay="0"/>
                                           </p:stCondLst>
@@ -13218,14 +13355,14 @@
                                 </p:cTn>
                               </p:par>
                               <p:par>
-                                <p:cTn id="13" presetID="1" presetClass="entr" presetSubtype="0" fill="hold" grpId="0" nodeType="withEffect">
+                                <p:cTn id="17" presetID="1" presetClass="entr" presetSubtype="0" fill="hold" grpId="0" nodeType="withEffect">
                                   <p:stCondLst>
                                     <p:cond delay="0"/>
                                   </p:stCondLst>
                                   <p:childTnLst>
                                     <p:set>
                                       <p:cBhvr>
-                                        <p:cTn id="14" dur="1" fill="hold">
+                                        <p:cTn id="18" dur="1" fill="hold">
                                           <p:stCondLst>
                                             <p:cond delay="0"/>
                                           </p:stCondLst>
@@ -13272,6 +13409,7 @@
       </p:par>
     </p:tnLst>
     <p:bldLst>
+      <p:bldP spid="5" grpId="0" animBg="1"/>
       <p:bldP spid="6" grpId="0" animBg="1"/>
       <p:bldP spid="7" grpId="0" animBg="1"/>
       <p:bldP spid="11" grpId="0" animBg="1"/>

</xml_diff>

<commit_message>
Se aplican mejoras de MGR
</commit_message>
<xml_diff>
--- a/2018/TT IQQ 2018 Camara y Garay.pptx
+++ b/2018/TT IQQ 2018 Camara y Garay.pptx
@@ -134,6 +134,12 @@
     </p:ext>
   </p:extLst>
 </p:presentation>
+</file>
+
+<file path=ppt/commentAuthors.xml><?xml version="1.0" encoding="utf-8"?>
+<p:cmAuthorLst xmlns:a="http://schemas.openxmlformats.org/drawingml/2006/main" xmlns:r="http://schemas.openxmlformats.org/officeDocument/2006/relationships" xmlns:p="http://schemas.openxmlformats.org/presentationml/2006/main">
+  <p:cmAuthor id="1" name="Manuel Garay Riquelme" initials="" lastIdx="0" clrIdx="0"/>
+</p:cmAuthorLst>
 </file>
 
 <file path=ppt/handoutMasters/handoutMaster1.xml><?xml version="1.0" encoding="utf-8"?>
@@ -7093,22 +7099,21 @@
                   <a:schemeClr val="tx1"/>
                 </a:solidFill>
               </a:rPr>
-              <a:t>Recoger opinión de Expertos</a:t>
+              <a:t>Recoger opinión </a:t>
             </a:r>
-          </a:p>
-          <a:p>
-            <a:pPr marL="285750" indent="-285750">
-              <a:buFont typeface="Arial" panose="020B0604020202020204" pitchFamily="34" charset="0"/>
-              <a:buChar char="•"/>
-            </a:pPr>
             <a:r>
-              <a:rPr lang="es-CL" sz="2000" dirty="0">
+              <a:rPr lang="es-CL" sz="2000">
                 <a:solidFill>
                   <a:schemeClr val="tx1"/>
                 </a:solidFill>
               </a:rPr>
-              <a:t>Factores Críticos para ZOFRI S.A.</a:t>
+              <a:t>de Expertos</a:t>
             </a:r>
+            <a:endParaRPr lang="es-CL" sz="2000" dirty="0">
+              <a:solidFill>
+                <a:schemeClr val="tx1"/>
+              </a:solidFill>
+            </a:endParaRPr>
           </a:p>
         </p:txBody>
       </p:sp>
@@ -17071,7 +17076,7 @@
       </p:sp>
       <p:grpSp>
         <p:nvGrpSpPr>
-          <p:cNvPr id="25" name="Grupo 24">
+          <p:cNvPr id="25" name="Grupo 82">
             <a:extLst>
               <a:ext uri="{FF2B5EF4-FFF2-40B4-BE49-F238E27FC236}">
                 <a16:creationId xmlns:a16="http://schemas.microsoft.com/office/drawing/2014/main" id="{719BD3DE-0E4B-4446-B37B-E813E222EBB9}"/>
@@ -17083,8 +17088,8 @@
         </p:nvGrpSpPr>
         <p:grpSpPr>
           <a:xfrm>
-            <a:off x="2932043" y="2311358"/>
-            <a:ext cx="4194316" cy="747781"/>
+            <a:off x="2932042" y="2311358"/>
+            <a:ext cx="5973419" cy="747781"/>
             <a:chOff x="3404184" y="937759"/>
             <a:chExt cx="1374731" cy="604851"/>
           </a:xfrm>
@@ -17104,7 +17109,7 @@
         </p:grpSpPr>
         <p:sp>
           <p:nvSpPr>
-            <p:cNvPr id="46" name="Rectángulo 45">
+            <p:cNvPr id="46" name="Rectángulo 83">
               <a:extLst>
                 <a:ext uri="{FF2B5EF4-FFF2-40B4-BE49-F238E27FC236}">
                   <a16:creationId xmlns:a16="http://schemas.microsoft.com/office/drawing/2014/main" id="{10583DA3-27AD-4B8E-877C-C0A102EA5ECE}"/>
@@ -17164,7 +17169,7 @@
         </p:sp>
         <p:sp>
           <p:nvSpPr>
-            <p:cNvPr id="47" name="CuadroTexto 46">
+            <p:cNvPr id="47" name="CuadroTexto 84">
               <a:extLst>
                 <a:ext uri="{FF2B5EF4-FFF2-40B4-BE49-F238E27FC236}">
                   <a16:creationId xmlns:a16="http://schemas.microsoft.com/office/drawing/2014/main" id="{6CCE5AAA-CEDD-4BC2-AA13-13C68790B0DD}"/>
@@ -17233,20 +17238,21 @@
                     </a:outerShdw>
                   </a:effectLst>
                 </a:rPr>
-                <a:t>En junio nace </a:t>
+                <a:t>Ante necesidad demográfica de un polo de desarrollo,</a:t>
               </a:r>
-              <a:r>
-                <a:rPr lang="es-ES" kern="1200" dirty="0" err="1">
-                  <a:effectLst>
-                    <a:outerShdw blurRad="38100" dist="38100" dir="2700000" algn="tl">
-                      <a:srgbClr val="000000">
-                        <a:alpha val="43137"/>
-                      </a:srgbClr>
-                    </a:outerShdw>
-                  </a:effectLst>
-                </a:rPr>
-                <a:t>Zofri</a:t>
-              </a:r>
+            </a:p>
+            <a:p>
+              <a:pPr marL="0" lvl="1" algn="ctr" defTabSz="444500">
+                <a:lnSpc>
+                  <a:spcPct val="90000"/>
+                </a:lnSpc>
+                <a:spcBef>
+                  <a:spcPct val="0"/>
+                </a:spcBef>
+                <a:spcAft>
+                  <a:spcPct val="15000"/>
+                </a:spcAft>
+              </a:pPr>
               <a:r>
                 <a:rPr lang="es-ES" kern="1200" dirty="0">
                   <a:effectLst>
@@ -17257,7 +17263,7 @@
                     </a:outerShdw>
                   </a:effectLst>
                 </a:rPr>
-                <a:t>, con el DL 1055</a:t>
+                <a:t>en junio nace Zofri en galpón en P. Lynch</a:t>
               </a:r>
             </a:p>
           </p:txBody>
@@ -22653,7 +22659,7 @@
                     </a:outerShdw>
                   </a:effectLst>
                 </a:rPr>
-                <a:t>Ser la más eficiente y sostenible plataforma de negocios de Sudamérica, con las mejores oportunidades y soluciones para sus clientes: usuarios y visitantes</a:t>
+                <a:t>Ser la más eficiente y sostenible plataforma de negocios de Sudamérica, con las mejores oportunidades y soluciones para sus clientes</a:t>
               </a:r>
               <a:endParaRPr lang="es-CL" sz="2000" kern="1200" dirty="0">
                 <a:effectLst>
@@ -23068,7 +23074,7 @@
         </p:nvSpPr>
         <p:spPr>
           <a:xfrm>
-            <a:off x="10008704" y="5277678"/>
+            <a:off x="9880724" y="1442768"/>
             <a:ext cx="1753193" cy="1195168"/>
           </a:xfrm>
           <a:prstGeom prst="rect">
@@ -23153,7 +23159,7 @@
     </p:spTree>
     <p:extLst>
       <p:ext uri="{BB962C8B-B14F-4D97-AF65-F5344CB8AC3E}">
-        <p14:creationId xmlns:p14="http://schemas.microsoft.com/office/powerpoint/2010/main" val="354556331"/>
+        <p14:creationId xmlns:p14="http://schemas.microsoft.com/office/powerpoint/2010/main" val="3705618856"/>
       </p:ext>
     </p:extLst>
   </p:cSld>
@@ -23181,7 +23187,7 @@
                             </p:stCondLst>
                             <p:childTnLst>
                               <p:par>
-                                <p:cTn id="5" presetID="1" presetClass="entr" presetSubtype="0" fill="hold" nodeType="clickEffect">
+                                <p:cTn id="5" presetID="1" presetClass="entr" presetSubtype="0" fill="hold" grpId="0" nodeType="clickEffect">
                                   <p:stCondLst>
                                     <p:cond delay="0"/>
                                   </p:stCondLst>
@@ -23194,7 +23200,7 @@
                                           </p:stCondLst>
                                         </p:cTn>
                                         <p:tgtEl>
-                                          <p:spTgt spid="3"/>
+                                          <p:spTgt spid="15"/>
                                         </p:tgtEl>
                                         <p:attrNameLst>
                                           <p:attrName>style.visibility</p:attrName>
@@ -23239,7 +23245,7 @@
                                           </p:stCondLst>
                                         </p:cTn>
                                         <p:tgtEl>
-                                          <p:spTgt spid="5"/>
+                                          <p:spTgt spid="2"/>
                                         </p:tgtEl>
                                         <p:attrNameLst>
                                           <p:attrName>style.visibility</p:attrName>
@@ -23252,21 +23258,84 @@
                                   </p:childTnLst>
                                 </p:cTn>
                               </p:par>
+                            </p:childTnLst>
+                          </p:cTn>
+                        </p:par>
+                      </p:childTnLst>
+                    </p:cTn>
+                  </p:par>
+                  <p:par>
+                    <p:cTn id="11" fill="hold">
+                      <p:stCondLst>
+                        <p:cond delay="indefinite"/>
+                      </p:stCondLst>
+                      <p:childTnLst>
+                        <p:par>
+                          <p:cTn id="12" fill="hold">
+                            <p:stCondLst>
+                              <p:cond delay="0"/>
+                            </p:stCondLst>
+                            <p:childTnLst>
                               <p:par>
-                                <p:cTn id="11" presetID="1" presetClass="entr" presetSubtype="0" fill="hold" grpId="0" nodeType="withEffect">
+                                <p:cTn id="13" presetID="1" presetClass="entr" presetSubtype="0" fill="hold" nodeType="clickEffect">
                                   <p:stCondLst>
                                     <p:cond delay="0"/>
                                   </p:stCondLst>
                                   <p:childTnLst>
                                     <p:set>
                                       <p:cBhvr>
-                                        <p:cTn id="12" dur="1" fill="hold">
+                                        <p:cTn id="14" dur="1" fill="hold">
                                           <p:stCondLst>
                                             <p:cond delay="0"/>
                                           </p:stCondLst>
                                         </p:cTn>
                                         <p:tgtEl>
-                                          <p:spTgt spid="15"/>
+                                          <p:spTgt spid="3"/>
+                                        </p:tgtEl>
+                                        <p:attrNameLst>
+                                          <p:attrName>style.visibility</p:attrName>
+                                        </p:attrNameLst>
+                                      </p:cBhvr>
+                                      <p:to>
+                                        <p:strVal val="visible"/>
+                                      </p:to>
+                                    </p:set>
+                                  </p:childTnLst>
+                                </p:cTn>
+                              </p:par>
+                            </p:childTnLst>
+                          </p:cTn>
+                        </p:par>
+                      </p:childTnLst>
+                    </p:cTn>
+                  </p:par>
+                  <p:par>
+                    <p:cTn id="15" fill="hold">
+                      <p:stCondLst>
+                        <p:cond delay="indefinite"/>
+                      </p:stCondLst>
+                      <p:childTnLst>
+                        <p:par>
+                          <p:cTn id="16" fill="hold">
+                            <p:stCondLst>
+                              <p:cond delay="0"/>
+                            </p:stCondLst>
+                            <p:childTnLst>
+                              <p:par>
+                                <p:cTn id="17" presetID="1" presetClass="entr" presetSubtype="0" fill="hold" nodeType="clickEffect">
+                                  <p:stCondLst>
+                                    <p:cond delay="0"/>
+                                  </p:stCondLst>
+                                  <p:childTnLst>
+                                    <p:set>
+                                      <p:cBhvr>
+                                        <p:cTn id="18" dur="1" fill="hold">
+                                          <p:stCondLst>
+                                            <p:cond delay="0"/>
+                                          </p:stCondLst>
+                                        </p:cTn>
+                                        <p:tgtEl>
+                                          <p:spTgt spid="5"/>
                                         </p:tgtEl>
                                         <p:attrNameLst>
                                           <p:attrName>style.visibility</p:attrName>

</xml_diff>

<commit_message>
Se corrige título en lámia de la Conclusión del Objetivo General
</commit_message>
<xml_diff>
--- a/2018/TT IQQ 2018 Camara y Garay.pptx
+++ b/2018/TT IQQ 2018 Camara y Garay.pptx
@@ -6567,6 +6567,14 @@
   <p:clrMapOvr>
     <a:masterClrMapping/>
   </p:clrMapOvr>
+  <mc:AlternateContent xmlns:mc="http://schemas.openxmlformats.org/markup-compatibility/2006">
+    <mc:Choice xmlns:p14="http://schemas.microsoft.com/office/powerpoint/2010/main" Requires="p14">
+      <p:transition spd="slow" p14:dur="2000" advTm="2287"/>
+    </mc:Choice>
+    <mc:Fallback>
+      <p:transition spd="slow" advTm="2287"/>
+    </mc:Fallback>
+  </mc:AlternateContent>
 </p:sld>
 </file>
 
@@ -7304,6 +7312,9 @@
         </p:txBody>
       </p:sp>
     </p:spTree>
+    <p:custDataLst>
+      <p:tags r:id="rId1"/>
+    </p:custDataLst>
     <p:extLst>
       <p:ext uri="{BB962C8B-B14F-4D97-AF65-F5344CB8AC3E}">
         <p14:creationId xmlns:p14="http://schemas.microsoft.com/office/powerpoint/2010/main" val="697346698"/>
@@ -7313,6 +7324,14 @@
   <p:clrMapOvr>
     <a:masterClrMapping/>
   </p:clrMapOvr>
+  <mc:AlternateContent xmlns:mc="http://schemas.openxmlformats.org/markup-compatibility/2006">
+    <mc:Choice xmlns:p14="http://schemas.microsoft.com/office/powerpoint/2010/main" Requires="p14">
+      <p:transition spd="slow" p14:dur="2000" advTm="1118"/>
+    </mc:Choice>
+    <mc:Fallback>
+      <p:transition spd="slow" advTm="1118"/>
+    </mc:Fallback>
+  </mc:AlternateContent>
   <p:timing>
     <p:tnLst>
       <p:par>
@@ -7903,7 +7922,7 @@
         </p:nvSpPr>
         <p:spPr>
           <a:xfrm>
-            <a:off x="5075287" y="4590889"/>
+            <a:off x="5075287" y="4583922"/>
             <a:ext cx="4462672" cy="557093"/>
           </a:xfrm>
           <a:prstGeom prst="roundRect">
@@ -8400,6 +8419,14 @@
   <p:clrMapOvr>
     <a:masterClrMapping/>
   </p:clrMapOvr>
+  <mc:AlternateContent xmlns:mc="http://schemas.openxmlformats.org/markup-compatibility/2006">
+    <mc:Choice xmlns:p14="http://schemas.microsoft.com/office/powerpoint/2010/main" Requires="p14">
+      <p:transition spd="slow" p14:dur="2000" advTm="12496"/>
+    </mc:Choice>
+    <mc:Fallback>
+      <p:transition spd="slow" advTm="12496"/>
+    </mc:Fallback>
+  </mc:AlternateContent>
   <p:timing>
     <p:tnLst>
       <p:par>
@@ -9588,6 +9615,14 @@
   <p:clrMapOvr>
     <a:masterClrMapping/>
   </p:clrMapOvr>
+  <mc:AlternateContent xmlns:mc="http://schemas.openxmlformats.org/markup-compatibility/2006">
+    <mc:Choice xmlns:p14="http://schemas.microsoft.com/office/powerpoint/2010/main" Requires="p14">
+      <p:transition spd="slow" p14:dur="2000" advTm="235"/>
+    </mc:Choice>
+    <mc:Fallback>
+      <p:transition spd="slow" advTm="235"/>
+    </mc:Fallback>
+  </mc:AlternateContent>
   <p:timing>
     <p:tnLst>
       <p:par>
@@ -10919,6 +10954,14 @@
   <p:clrMapOvr>
     <a:masterClrMapping/>
   </p:clrMapOvr>
+  <mc:AlternateContent xmlns:mc="http://schemas.openxmlformats.org/markup-compatibility/2006">
+    <mc:Choice xmlns:p14="http://schemas.microsoft.com/office/powerpoint/2010/main" Requires="p14">
+      <p:transition spd="slow" p14:dur="2000" advTm="183"/>
+    </mc:Choice>
+    <mc:Fallback>
+      <p:transition spd="slow" advTm="183"/>
+    </mc:Fallback>
+  </mc:AlternateContent>
   <p:timing>
     <p:tnLst>
       <p:par>
@@ -11726,6 +11769,9 @@
         </p:txBody>
       </p:sp>
     </p:spTree>
+    <p:custDataLst>
+      <p:tags r:id="rId1"/>
+    </p:custDataLst>
     <p:extLst>
       <p:ext uri="{BB962C8B-B14F-4D97-AF65-F5344CB8AC3E}">
         <p14:creationId xmlns:p14="http://schemas.microsoft.com/office/powerpoint/2010/main" val="2891704333"/>
@@ -11735,6 +11781,14 @@
   <p:clrMapOvr>
     <a:masterClrMapping/>
   </p:clrMapOvr>
+  <mc:AlternateContent xmlns:mc="http://schemas.openxmlformats.org/markup-compatibility/2006">
+    <mc:Choice xmlns:p14="http://schemas.microsoft.com/office/powerpoint/2010/main" Requires="p14">
+      <p:transition spd="slow" p14:dur="2000" advTm="35771"/>
+    </mc:Choice>
+    <mc:Fallback>
+      <p:transition spd="slow" advTm="35771"/>
+    </mc:Fallback>
+  </mc:AlternateContent>
   <p:timing>
     <p:tnLst>
       <p:par>
@@ -12450,6 +12504,14 @@
   <p:clrMapOvr>
     <a:masterClrMapping/>
   </p:clrMapOvr>
+  <mc:AlternateContent xmlns:mc="http://schemas.openxmlformats.org/markup-compatibility/2006">
+    <mc:Choice xmlns:p14="http://schemas.microsoft.com/office/powerpoint/2010/main" Requires="p14">
+      <p:transition spd="slow" p14:dur="2000" advTm="432"/>
+    </mc:Choice>
+    <mc:Fallback>
+      <p:transition spd="slow" advTm="432"/>
+    </mc:Fallback>
+  </mc:AlternateContent>
   <p:timing>
     <p:tnLst>
       <p:par>
@@ -13186,6 +13248,9 @@
         </p:txBody>
       </p:sp>
     </p:spTree>
+    <p:custDataLst>
+      <p:tags r:id="rId1"/>
+    </p:custDataLst>
     <p:extLst>
       <p:ext uri="{BB962C8B-B14F-4D97-AF65-F5344CB8AC3E}">
         <p14:creationId xmlns:p14="http://schemas.microsoft.com/office/powerpoint/2010/main" val="2744671481"/>
@@ -13195,6 +13260,14 @@
   <p:clrMapOvr>
     <a:masterClrMapping/>
   </p:clrMapOvr>
+  <mc:AlternateContent xmlns:mc="http://schemas.openxmlformats.org/markup-compatibility/2006">
+    <mc:Choice xmlns:p14="http://schemas.microsoft.com/office/powerpoint/2010/main" Requires="p14">
+      <p:transition spd="slow" p14:dur="2000" advTm="2143"/>
+    </mc:Choice>
+    <mc:Fallback>
+      <p:transition spd="slow" advTm="2143"/>
+    </mc:Fallback>
+  </mc:AlternateContent>
   <p:timing>
     <p:tnLst>
       <p:par>
@@ -13463,8 +13536,12 @@
           <a:lstStyle/>
           <a:p>
             <a:r>
+              <a:rPr lang="es-CL"/>
+              <a:t>Objetivo </a:t>
+            </a:r>
+            <a:r>
               <a:rPr lang="es-CL" dirty="0"/>
-              <a:t>Conclusión General</a:t>
+              <a:t>General</a:t>
             </a:r>
           </a:p>
         </p:txBody>
@@ -16140,6 +16217,9 @@
         </p:txBody>
       </p:sp>
     </p:spTree>
+    <p:custDataLst>
+      <p:tags r:id="rId1"/>
+    </p:custDataLst>
     <p:extLst>
       <p:ext uri="{BB962C8B-B14F-4D97-AF65-F5344CB8AC3E}">
         <p14:creationId xmlns:p14="http://schemas.microsoft.com/office/powerpoint/2010/main" val="1940363962"/>
@@ -16149,6 +16229,14 @@
   <p:clrMapOvr>
     <a:masterClrMapping/>
   </p:clrMapOvr>
+  <mc:AlternateContent xmlns:mc="http://schemas.openxmlformats.org/markup-compatibility/2006">
+    <mc:Choice xmlns:p14="http://schemas.microsoft.com/office/powerpoint/2010/main" Requires="p14">
+      <p:transition spd="slow" p14:dur="2000" advTm="1014"/>
+    </mc:Choice>
+    <mc:Fallback>
+      <p:transition spd="slow" advTm="1014"/>
+    </mc:Fallback>
+  </mc:AlternateContent>
   <p:timing>
     <p:tnLst>
       <p:par>
@@ -18545,6 +18633,9 @@
         </p:sp>
       </p:grpSp>
     </p:spTree>
+    <p:custDataLst>
+      <p:tags r:id="rId1"/>
+    </p:custDataLst>
     <p:extLst>
       <p:ext uri="{BB962C8B-B14F-4D97-AF65-F5344CB8AC3E}">
         <p14:creationId xmlns:p14="http://schemas.microsoft.com/office/powerpoint/2010/main" val="2469421026"/>
@@ -18554,6 +18645,14 @@
   <p:clrMapOvr>
     <a:masterClrMapping/>
   </p:clrMapOvr>
+  <mc:AlternateContent xmlns:mc="http://schemas.openxmlformats.org/markup-compatibility/2006">
+    <mc:Choice xmlns:p14="http://schemas.microsoft.com/office/powerpoint/2010/main" Requires="p14">
+      <p:transition spd="slow" p14:dur="2000" advTm="1106"/>
+    </mc:Choice>
+    <mc:Fallback>
+      <p:transition spd="slow" advTm="1106"/>
+    </mc:Fallback>
+  </mc:AlternateContent>
   <p:timing>
     <p:tnLst>
       <p:par>
@@ -19211,7 +19310,7 @@
           <p:nvPr/>
         </p:nvPicPr>
         <p:blipFill>
-          <a:blip r:embed="rId2">
+          <a:blip r:embed="rId3">
             <a:extLst>
               <a:ext uri="{28A0092B-C50C-407E-A947-70E740481C1C}">
                 <a14:useLocalDpi xmlns:a14="http://schemas.microsoft.com/office/drawing/2010/main" val="0"/>
@@ -19247,7 +19346,7 @@
           <p:nvPr/>
         </p:nvPicPr>
         <p:blipFill>
-          <a:blip r:embed="rId3">
+          <a:blip r:embed="rId4">
             <a:extLst>
               <a:ext uri="{28A0092B-C50C-407E-A947-70E740481C1C}">
                 <a14:useLocalDpi xmlns:a14="http://schemas.microsoft.com/office/drawing/2010/main" val="0"/>
@@ -19283,7 +19382,7 @@
           <p:nvPr/>
         </p:nvPicPr>
         <p:blipFill>
-          <a:blip r:embed="rId4">
+          <a:blip r:embed="rId5">
             <a:extLst>
               <a:ext uri="{28A0092B-C50C-407E-A947-70E740481C1C}">
                 <a14:useLocalDpi xmlns:a14="http://schemas.microsoft.com/office/drawing/2010/main" val="0"/>
@@ -19319,7 +19418,7 @@
           <p:nvPr/>
         </p:nvPicPr>
         <p:blipFill>
-          <a:blip r:embed="rId5">
+          <a:blip r:embed="rId6">
             <a:extLst>
               <a:ext uri="{28A0092B-C50C-407E-A947-70E740481C1C}">
                 <a14:useLocalDpi xmlns:a14="http://schemas.microsoft.com/office/drawing/2010/main" val="0"/>
@@ -19341,6 +19440,9 @@
         </p:spPr>
       </p:pic>
     </p:spTree>
+    <p:custDataLst>
+      <p:tags r:id="rId1"/>
+    </p:custDataLst>
     <p:extLst>
       <p:ext uri="{BB962C8B-B14F-4D97-AF65-F5344CB8AC3E}">
         <p14:creationId xmlns:p14="http://schemas.microsoft.com/office/powerpoint/2010/main" val="2532238134"/>
@@ -19350,6 +19452,14 @@
   <p:clrMapOvr>
     <a:masterClrMapping/>
   </p:clrMapOvr>
+  <mc:AlternateContent xmlns:mc="http://schemas.openxmlformats.org/markup-compatibility/2006">
+    <mc:Choice xmlns:p14="http://schemas.microsoft.com/office/powerpoint/2010/main" Requires="p14">
+      <p:transition spd="slow" p14:dur="2000" advTm="384"/>
+    </mc:Choice>
+    <mc:Fallback>
+      <p:transition spd="slow" advTm="384"/>
+    </mc:Fallback>
+  </mc:AlternateContent>
   <p:timing>
     <p:tnLst>
       <p:par>
@@ -19579,7 +19689,7 @@
           <p:nvPr/>
         </p:nvPicPr>
         <p:blipFill>
-          <a:blip r:embed="rId2"/>
+          <a:blip r:embed="rId3"/>
           <a:stretch>
             <a:fillRect/>
           </a:stretch>
@@ -19609,7 +19719,7 @@
           <p:nvPr/>
         </p:nvPicPr>
         <p:blipFill>
-          <a:blip r:embed="rId3">
+          <a:blip r:embed="rId4">
             <a:extLst>
               <a:ext uri="{28A0092B-C50C-407E-A947-70E740481C1C}">
                 <a14:useLocalDpi xmlns:a14="http://schemas.microsoft.com/office/drawing/2010/main" val="0"/>
@@ -19653,7 +19763,7 @@
           <p:nvPr/>
         </p:nvPicPr>
         <p:blipFill>
-          <a:blip r:embed="rId4">
+          <a:blip r:embed="rId5">
             <a:extLst>
               <a:ext uri="{28A0092B-C50C-407E-A947-70E740481C1C}">
                 <a14:useLocalDpi xmlns:a14="http://schemas.microsoft.com/office/drawing/2010/main" val="0"/>
@@ -20123,7 +20233,7 @@
           <p:nvPr/>
         </p:nvPicPr>
         <p:blipFill>
-          <a:blip r:embed="rId5" cstate="print"/>
+          <a:blip r:embed="rId6" cstate="print"/>
           <a:stretch>
             <a:fillRect/>
           </a:stretch>
@@ -20153,7 +20263,7 @@
           <p:nvPr/>
         </p:nvPicPr>
         <p:blipFill>
-          <a:blip r:embed="rId6" cstate="print"/>
+          <a:blip r:embed="rId7" cstate="print"/>
           <a:stretch>
             <a:fillRect/>
           </a:stretch>
@@ -20183,7 +20293,7 @@
           <p:nvPr/>
         </p:nvPicPr>
         <p:blipFill>
-          <a:blip r:embed="rId7" cstate="print"/>
+          <a:blip r:embed="rId8" cstate="print"/>
           <a:stretch>
             <a:fillRect/>
           </a:stretch>
@@ -20213,7 +20323,7 @@
           <p:nvPr/>
         </p:nvPicPr>
         <p:blipFill>
-          <a:blip r:embed="rId8" cstate="print"/>
+          <a:blip r:embed="rId9" cstate="print"/>
           <a:stretch>
             <a:fillRect/>
           </a:stretch>
@@ -20243,7 +20353,7 @@
           <p:nvPr/>
         </p:nvPicPr>
         <p:blipFill>
-          <a:blip r:embed="rId9" cstate="print"/>
+          <a:blip r:embed="rId10" cstate="print"/>
           <a:stretch>
             <a:fillRect/>
           </a:stretch>
@@ -20273,7 +20383,7 @@
           <p:nvPr/>
         </p:nvPicPr>
         <p:blipFill>
-          <a:blip r:embed="rId10" cstate="print"/>
+          <a:blip r:embed="rId11" cstate="print"/>
           <a:stretch>
             <a:fillRect/>
           </a:stretch>
@@ -20303,7 +20413,7 @@
           <p:nvPr/>
         </p:nvPicPr>
         <p:blipFill>
-          <a:blip r:embed="rId11" cstate="print"/>
+          <a:blip r:embed="rId12" cstate="print"/>
           <a:stretch>
             <a:fillRect/>
           </a:stretch>
@@ -20333,7 +20443,7 @@
           <p:nvPr/>
         </p:nvPicPr>
         <p:blipFill>
-          <a:blip r:embed="rId12" cstate="print"/>
+          <a:blip r:embed="rId13" cstate="print"/>
           <a:stretch>
             <a:fillRect/>
           </a:stretch>
@@ -20363,7 +20473,7 @@
           <p:nvPr/>
         </p:nvPicPr>
         <p:blipFill>
-          <a:blip r:embed="rId13"/>
+          <a:blip r:embed="rId14"/>
           <a:stretch>
             <a:fillRect/>
           </a:stretch>
@@ -20497,6 +20607,9 @@
         </p:txBody>
       </p:sp>
     </p:spTree>
+    <p:custDataLst>
+      <p:tags r:id="rId1"/>
+    </p:custDataLst>
     <p:extLst>
       <p:ext uri="{BB962C8B-B14F-4D97-AF65-F5344CB8AC3E}">
         <p14:creationId xmlns:p14="http://schemas.microsoft.com/office/powerpoint/2010/main" val="527160576"/>
@@ -20506,6 +20619,14 @@
   <p:clrMapOvr>
     <a:masterClrMapping/>
   </p:clrMapOvr>
+  <mc:AlternateContent xmlns:mc="http://schemas.openxmlformats.org/markup-compatibility/2006">
+    <mc:Choice xmlns:p14="http://schemas.microsoft.com/office/powerpoint/2010/main" Requires="p14">
+      <p:transition spd="slow" p14:dur="2000" advTm="526"/>
+    </mc:Choice>
+    <mc:Fallback>
+      <p:transition spd="slow" advTm="526"/>
+    </mc:Fallback>
+  </mc:AlternateContent>
   <p:timing>
     <p:tnLst>
       <p:par>
@@ -21809,6 +21930,9 @@
         </p:txBody>
       </p:sp>
     </p:spTree>
+    <p:custDataLst>
+      <p:tags r:id="rId1"/>
+    </p:custDataLst>
     <p:extLst>
       <p:ext uri="{BB962C8B-B14F-4D97-AF65-F5344CB8AC3E}">
         <p14:creationId xmlns:p14="http://schemas.microsoft.com/office/powerpoint/2010/main" val="3782300075"/>
@@ -21818,6 +21942,14 @@
   <p:clrMapOvr>
     <a:masterClrMapping/>
   </p:clrMapOvr>
+  <mc:AlternateContent xmlns:mc="http://schemas.openxmlformats.org/markup-compatibility/2006">
+    <mc:Choice xmlns:p14="http://schemas.microsoft.com/office/powerpoint/2010/main" Requires="p14">
+      <p:transition spd="slow" p14:dur="2000" advTm="1829"/>
+    </mc:Choice>
+    <mc:Fallback>
+      <p:transition spd="slow" advTm="1829"/>
+    </mc:Fallback>
+  </mc:AlternateContent>
   <p:timing>
     <p:tnLst>
       <p:par>
@@ -23157,6 +23289,9 @@
         </p:txBody>
       </p:sp>
     </p:spTree>
+    <p:custDataLst>
+      <p:tags r:id="rId1"/>
+    </p:custDataLst>
     <p:extLst>
       <p:ext uri="{BB962C8B-B14F-4D97-AF65-F5344CB8AC3E}">
         <p14:creationId xmlns:p14="http://schemas.microsoft.com/office/powerpoint/2010/main" val="3705618856"/>
@@ -23166,6 +23301,14 @@
   <p:clrMapOvr>
     <a:masterClrMapping/>
   </p:clrMapOvr>
+  <mc:AlternateContent xmlns:mc="http://schemas.openxmlformats.org/markup-compatibility/2006">
+    <mc:Choice xmlns:p14="http://schemas.microsoft.com/office/powerpoint/2010/main" Requires="p14">
+      <p:transition spd="slow" p14:dur="2000" advTm="984"/>
+    </mc:Choice>
+    <mc:Fallback>
+      <p:transition spd="slow" advTm="984"/>
+    </mc:Fallback>
+  </mc:AlternateContent>
   <p:timing>
     <p:tnLst>
       <p:par>
@@ -24643,6 +24786,9 @@
         </p:style>
       </p:cxnSp>
     </p:spTree>
+    <p:custDataLst>
+      <p:tags r:id="rId1"/>
+    </p:custDataLst>
     <p:extLst>
       <p:ext uri="{BB962C8B-B14F-4D97-AF65-F5344CB8AC3E}">
         <p14:creationId xmlns:p14="http://schemas.microsoft.com/office/powerpoint/2010/main" val="1396446686"/>
@@ -24652,6 +24798,14 @@
   <p:clrMapOvr>
     <a:masterClrMapping/>
   </p:clrMapOvr>
+  <mc:AlternateContent xmlns:mc="http://schemas.openxmlformats.org/markup-compatibility/2006">
+    <mc:Choice xmlns:p14="http://schemas.microsoft.com/office/powerpoint/2010/main" Requires="p14">
+      <p:transition spd="slow" p14:dur="2000" advTm="1146"/>
+    </mc:Choice>
+    <mc:Fallback>
+      <p:transition spd="slow" advTm="1146"/>
+    </mc:Fallback>
+  </mc:AlternateContent>
   <p:timing>
     <p:tnLst>
       <p:par>
@@ -26004,6 +26158,9 @@
         </p:txBody>
       </p:sp>
     </p:spTree>
+    <p:custDataLst>
+      <p:tags r:id="rId1"/>
+    </p:custDataLst>
     <p:extLst>
       <p:ext uri="{BB962C8B-B14F-4D97-AF65-F5344CB8AC3E}">
         <p14:creationId xmlns:p14="http://schemas.microsoft.com/office/powerpoint/2010/main" val="267747869"/>
@@ -26013,6 +26170,14 @@
   <p:clrMapOvr>
     <a:masterClrMapping/>
   </p:clrMapOvr>
+  <mc:AlternateContent xmlns:mc="http://schemas.openxmlformats.org/markup-compatibility/2006">
+    <mc:Choice xmlns:p14="http://schemas.microsoft.com/office/powerpoint/2010/main" Requires="p14">
+      <p:transition spd="slow" p14:dur="2000" advTm="2354"/>
+    </mc:Choice>
+    <mc:Fallback>
+      <p:transition spd="slow" advTm="2354"/>
+    </mc:Fallback>
+  </mc:AlternateContent>
   <p:timing>
     <p:tnLst>
       <p:par>
@@ -26378,6 +26543,72 @@
     </p:bldLst>
   </p:timing>
 </p:sld>
+</file>
+
+<file path=ppt/tags/tag1.xml><?xml version="1.0" encoding="utf-8"?>
+<p:tagLst xmlns:a="http://schemas.openxmlformats.org/drawingml/2006/main" xmlns:r="http://schemas.openxmlformats.org/officeDocument/2006/relationships" xmlns:p="http://schemas.openxmlformats.org/presentationml/2006/main">
+  <p:tag name="TIMING" val="|0.2|0.3|0.2"/>
+</p:tagLst>
+</file>
+
+<file path=ppt/tags/tag10.xml><?xml version="1.0" encoding="utf-8"?>
+<p:tagLst xmlns:a="http://schemas.openxmlformats.org/drawingml/2006/main" xmlns:r="http://schemas.openxmlformats.org/officeDocument/2006/relationships" xmlns:p="http://schemas.openxmlformats.org/presentationml/2006/main">
+  <p:tag name="TIMING" val="|8.5|4.9|9.6"/>
+</p:tagLst>
+</file>
+
+<file path=ppt/tags/tag11.xml><?xml version="1.0" encoding="utf-8"?>
+<p:tagLst xmlns:a="http://schemas.openxmlformats.org/drawingml/2006/main" xmlns:r="http://schemas.openxmlformats.org/officeDocument/2006/relationships" xmlns:p="http://schemas.openxmlformats.org/presentationml/2006/main">
+  <p:tag name="TIMING" val="|0.5"/>
+</p:tagLst>
+</file>
+
+<file path=ppt/tags/tag2.xml><?xml version="1.0" encoding="utf-8"?>
+<p:tagLst xmlns:a="http://schemas.openxmlformats.org/drawingml/2006/main" xmlns:r="http://schemas.openxmlformats.org/officeDocument/2006/relationships" xmlns:p="http://schemas.openxmlformats.org/presentationml/2006/main">
+  <p:tag name="TIMING" val="|0.1|0.1|0.2|0.1|0.2"/>
+</p:tagLst>
+</file>
+
+<file path=ppt/tags/tag3.xml><?xml version="1.0" encoding="utf-8"?>
+<p:tagLst xmlns:a="http://schemas.openxmlformats.org/drawingml/2006/main" xmlns:r="http://schemas.openxmlformats.org/officeDocument/2006/relationships" xmlns:p="http://schemas.openxmlformats.org/presentationml/2006/main">
+  <p:tag name="TIMING" val="|0.1"/>
+</p:tagLst>
+</file>
+
+<file path=ppt/tags/tag4.xml><?xml version="1.0" encoding="utf-8"?>
+<p:tagLst xmlns:a="http://schemas.openxmlformats.org/drawingml/2006/main" xmlns:r="http://schemas.openxmlformats.org/officeDocument/2006/relationships" xmlns:p="http://schemas.openxmlformats.org/presentationml/2006/main">
+  <p:tag name="TIMING" val="|0.1|0.1"/>
+</p:tagLst>
+</file>
+
+<file path=ppt/tags/tag5.xml><?xml version="1.0" encoding="utf-8"?>
+<p:tagLst xmlns:a="http://schemas.openxmlformats.org/drawingml/2006/main" xmlns:r="http://schemas.openxmlformats.org/officeDocument/2006/relationships" xmlns:p="http://schemas.openxmlformats.org/presentationml/2006/main">
+  <p:tag name="TIMING" val="|0.1|0.1|0.3|0.2|0.1|0.1|0.1|0.1"/>
+</p:tagLst>
+</file>
+
+<file path=ppt/tags/tag6.xml><?xml version="1.0" encoding="utf-8"?>
+<p:tagLst xmlns:a="http://schemas.openxmlformats.org/drawingml/2006/main" xmlns:r="http://schemas.openxmlformats.org/officeDocument/2006/relationships" xmlns:p="http://schemas.openxmlformats.org/presentationml/2006/main">
+  <p:tag name="TIMING" val="|0.1|0.1|0.2|0.1"/>
+</p:tagLst>
+</file>
+
+<file path=ppt/tags/tag7.xml><?xml version="1.0" encoding="utf-8"?>
+<p:tagLst xmlns:a="http://schemas.openxmlformats.org/drawingml/2006/main" xmlns:r="http://schemas.openxmlformats.org/officeDocument/2006/relationships" xmlns:p="http://schemas.openxmlformats.org/presentationml/2006/main">
+  <p:tag name="TIMING" val="|0.2|0.2|0.2|0.2"/>
+</p:tagLst>
+</file>
+
+<file path=ppt/tags/tag8.xml><?xml version="1.0" encoding="utf-8"?>
+<p:tagLst xmlns:a="http://schemas.openxmlformats.org/drawingml/2006/main" xmlns:r="http://schemas.openxmlformats.org/officeDocument/2006/relationships" xmlns:p="http://schemas.openxmlformats.org/presentationml/2006/main">
+  <p:tag name="TIMING" val="|0.6|0.4|0.2|0.2|0.2|0.2"/>
+</p:tagLst>
+</file>
+
+<file path=ppt/tags/tag9.xml><?xml version="1.0" encoding="utf-8"?>
+<p:tagLst xmlns:a="http://schemas.openxmlformats.org/drawingml/2006/main" xmlns:r="http://schemas.openxmlformats.org/officeDocument/2006/relationships" xmlns:p="http://schemas.openxmlformats.org/presentationml/2006/main">
+  <p:tag name="TIMING" val="|0.2|0.3"/>
+</p:tagLst>
 </file>
 
 <file path=ppt/theme/theme1.xml><?xml version="1.0" encoding="utf-8"?>

</xml_diff>

<commit_message>
Se desactiva reproducción automática de las láminas
</commit_message>
<xml_diff>
--- a/2018/TT IQQ 2018 Camara y Garay.pptx
+++ b/2018/TT IQQ 2018 Camara y Garay.pptx
@@ -236,7 +236,7 @@
           <a:p>
             <a:fld id="{889AAA34-CE1E-48C9-A4CD-CFA775F628BC}" type="datetimeFigureOut">
               <a:rPr lang="es-CL" smtClean="0"/>
-              <a:t>18-12-2018</a:t>
+              <a:t>19-12-2018</a:t>
             </a:fld>
             <a:endParaRPr lang="es-CL"/>
           </a:p>
@@ -1053,7 +1053,7 @@
           <a:p>
             <a:fld id="{3BE2AC6D-F750-44BB-A0B8-07BFEA35E468}" type="datetimeFigureOut">
               <a:rPr lang="es-CL" smtClean="0"/>
-              <a:t>18-12-2018</a:t>
+              <a:t>19-12-2018</a:t>
             </a:fld>
             <a:endParaRPr lang="es-CL"/>
           </a:p>
@@ -1304,7 +1304,7 @@
           <a:p>
             <a:fld id="{3BE2AC6D-F750-44BB-A0B8-07BFEA35E468}" type="datetimeFigureOut">
               <a:rPr lang="es-CL" smtClean="0"/>
-              <a:t>18-12-2018</a:t>
+              <a:t>19-12-2018</a:t>
             </a:fld>
             <a:endParaRPr lang="es-CL"/>
           </a:p>
@@ -1618,7 +1618,7 @@
           <a:p>
             <a:fld id="{3BE2AC6D-F750-44BB-A0B8-07BFEA35E468}" type="datetimeFigureOut">
               <a:rPr lang="es-CL" smtClean="0"/>
-              <a:t>18-12-2018</a:t>
+              <a:t>19-12-2018</a:t>
             </a:fld>
             <a:endParaRPr lang="es-CL"/>
           </a:p>
@@ -1959,7 +1959,7 @@
           <a:p>
             <a:fld id="{3BE2AC6D-F750-44BB-A0B8-07BFEA35E468}" type="datetimeFigureOut">
               <a:rPr lang="es-CL" smtClean="0"/>
-              <a:t>18-12-2018</a:t>
+              <a:t>19-12-2018</a:t>
             </a:fld>
             <a:endParaRPr lang="es-CL"/>
           </a:p>
@@ -2273,7 +2273,7 @@
           <a:p>
             <a:fld id="{3BE2AC6D-F750-44BB-A0B8-07BFEA35E468}" type="datetimeFigureOut">
               <a:rPr lang="es-CL" smtClean="0"/>
-              <a:t>18-12-2018</a:t>
+              <a:t>19-12-2018</a:t>
             </a:fld>
             <a:endParaRPr lang="es-CL"/>
           </a:p>
@@ -2666,7 +2666,7 @@
           <a:p>
             <a:fld id="{3BE2AC6D-F750-44BB-A0B8-07BFEA35E468}" type="datetimeFigureOut">
               <a:rPr lang="es-CL" smtClean="0"/>
-              <a:t>18-12-2018</a:t>
+              <a:t>19-12-2018</a:t>
             </a:fld>
             <a:endParaRPr lang="es-CL"/>
           </a:p>
@@ -2836,7 +2836,7 @@
           <a:p>
             <a:fld id="{3BE2AC6D-F750-44BB-A0B8-07BFEA35E468}" type="datetimeFigureOut">
               <a:rPr lang="es-CL" smtClean="0"/>
-              <a:t>18-12-2018</a:t>
+              <a:t>19-12-2018</a:t>
             </a:fld>
             <a:endParaRPr lang="es-CL"/>
           </a:p>
@@ -3016,7 +3016,7 @@
           <a:p>
             <a:fld id="{3BE2AC6D-F750-44BB-A0B8-07BFEA35E468}" type="datetimeFigureOut">
               <a:rPr lang="es-CL" smtClean="0"/>
-              <a:t>18-12-2018</a:t>
+              <a:t>19-12-2018</a:t>
             </a:fld>
             <a:endParaRPr lang="es-CL"/>
           </a:p>
@@ -3422,7 +3422,7 @@
           <a:p>
             <a:fld id="{3BE2AC6D-F750-44BB-A0B8-07BFEA35E468}" type="datetimeFigureOut">
               <a:rPr lang="es-CL" smtClean="0"/>
-              <a:t>18-12-2018</a:t>
+              <a:t>19-12-2018</a:t>
             </a:fld>
             <a:endParaRPr lang="es-CL"/>
           </a:p>
@@ -3654,7 +3654,7 @@
           <a:p>
             <a:fld id="{3BE2AC6D-F750-44BB-A0B8-07BFEA35E468}" type="datetimeFigureOut">
               <a:rPr lang="es-CL" smtClean="0"/>
-              <a:t>18-12-2018</a:t>
+              <a:t>19-12-2018</a:t>
             </a:fld>
             <a:endParaRPr lang="es-CL"/>
           </a:p>
@@ -4028,7 +4028,7 @@
           <a:p>
             <a:fld id="{3BE2AC6D-F750-44BB-A0B8-07BFEA35E468}" type="datetimeFigureOut">
               <a:rPr lang="es-CL" smtClean="0"/>
-              <a:t>18-12-2018</a:t>
+              <a:t>19-12-2018</a:t>
             </a:fld>
             <a:endParaRPr lang="es-CL"/>
           </a:p>
@@ -4151,7 +4151,7 @@
           <a:p>
             <a:fld id="{3BE2AC6D-F750-44BB-A0B8-07BFEA35E468}" type="datetimeFigureOut">
               <a:rPr lang="es-CL" smtClean="0"/>
-              <a:t>18-12-2018</a:t>
+              <a:t>19-12-2018</a:t>
             </a:fld>
             <a:endParaRPr lang="es-CL"/>
           </a:p>
@@ -4246,7 +4246,7 @@
           <a:p>
             <a:fld id="{3BE2AC6D-F750-44BB-A0B8-07BFEA35E468}" type="datetimeFigureOut">
               <a:rPr lang="es-CL" smtClean="0"/>
-              <a:t>18-12-2018</a:t>
+              <a:t>19-12-2018</a:t>
             </a:fld>
             <a:endParaRPr lang="es-CL"/>
           </a:p>
@@ -4501,7 +4501,7 @@
           <a:p>
             <a:fld id="{3BE2AC6D-F750-44BB-A0B8-07BFEA35E468}" type="datetimeFigureOut">
               <a:rPr lang="es-CL" smtClean="0"/>
-              <a:t>18-12-2018</a:t>
+              <a:t>19-12-2018</a:t>
             </a:fld>
             <a:endParaRPr lang="es-CL"/>
           </a:p>
@@ -4764,7 +4764,7 @@
           <a:p>
             <a:fld id="{3BE2AC6D-F750-44BB-A0B8-07BFEA35E468}" type="datetimeFigureOut">
               <a:rPr lang="es-CL" smtClean="0"/>
-              <a:t>18-12-2018</a:t>
+              <a:t>19-12-2018</a:t>
             </a:fld>
             <a:endParaRPr lang="es-CL"/>
           </a:p>
@@ -5507,7 +5507,7 @@
           <a:p>
             <a:fld id="{3BE2AC6D-F750-44BB-A0B8-07BFEA35E468}" type="datetimeFigureOut">
               <a:rPr lang="es-CL" smtClean="0"/>
-              <a:t>18-12-2018</a:t>
+              <a:t>19-12-2018</a:t>
             </a:fld>
             <a:endParaRPr lang="es-CL"/>
           </a:p>
@@ -6567,11 +6567,11 @@
   <p:clrMapOvr>
     <a:masterClrMapping/>
   </p:clrMapOvr>
-  <mc:AlternateContent xmlns:mc="http://schemas.openxmlformats.org/markup-compatibility/2006">
-    <mc:Choice xmlns:p14="http://schemas.microsoft.com/office/powerpoint/2010/main" Requires="p14">
+  <mc:AlternateContent xmlns:mc="http://schemas.openxmlformats.org/markup-compatibility/2006" xmlns:p14="http://schemas.microsoft.com/office/powerpoint/2010/main">
+    <mc:Choice Requires="p14">
       <p:transition spd="slow" p14:dur="2000" advTm="2287"/>
     </mc:Choice>
-    <mc:Fallback>
+    <mc:Fallback xmlns="">
       <p:transition spd="slow" advTm="2287"/>
     </mc:Fallback>
   </mc:AlternateContent>
@@ -7324,11 +7324,11 @@
   <p:clrMapOvr>
     <a:masterClrMapping/>
   </p:clrMapOvr>
-  <mc:AlternateContent xmlns:mc="http://schemas.openxmlformats.org/markup-compatibility/2006">
-    <mc:Choice xmlns:p14="http://schemas.microsoft.com/office/powerpoint/2010/main" Requires="p14">
+  <mc:AlternateContent xmlns:mc="http://schemas.openxmlformats.org/markup-compatibility/2006" xmlns:p14="http://schemas.microsoft.com/office/powerpoint/2010/main">
+    <mc:Choice Requires="p14">
       <p:transition spd="slow" p14:dur="2000" advTm="1118"/>
     </mc:Choice>
-    <mc:Fallback>
+    <mc:Fallback xmlns="">
       <p:transition spd="slow" advTm="1118"/>
     </mc:Fallback>
   </mc:AlternateContent>
@@ -8419,11 +8419,11 @@
   <p:clrMapOvr>
     <a:masterClrMapping/>
   </p:clrMapOvr>
-  <mc:AlternateContent xmlns:mc="http://schemas.openxmlformats.org/markup-compatibility/2006">
-    <mc:Choice xmlns:p14="http://schemas.microsoft.com/office/powerpoint/2010/main" Requires="p14">
+  <mc:AlternateContent xmlns:mc="http://schemas.openxmlformats.org/markup-compatibility/2006" xmlns:p14="http://schemas.microsoft.com/office/powerpoint/2010/main">
+    <mc:Choice Requires="p14">
       <p:transition spd="slow" p14:dur="2000" advTm="12496"/>
     </mc:Choice>
-    <mc:Fallback>
+    <mc:Fallback xmlns="">
       <p:transition spd="slow" advTm="12496"/>
     </mc:Fallback>
   </mc:AlternateContent>
@@ -9615,11 +9615,11 @@
   <p:clrMapOvr>
     <a:masterClrMapping/>
   </p:clrMapOvr>
-  <mc:AlternateContent xmlns:mc="http://schemas.openxmlformats.org/markup-compatibility/2006">
-    <mc:Choice xmlns:p14="http://schemas.microsoft.com/office/powerpoint/2010/main" Requires="p14">
+  <mc:AlternateContent xmlns:mc="http://schemas.openxmlformats.org/markup-compatibility/2006" xmlns:p14="http://schemas.microsoft.com/office/powerpoint/2010/main">
+    <mc:Choice Requires="p14">
       <p:transition spd="slow" p14:dur="2000" advTm="235"/>
     </mc:Choice>
-    <mc:Fallback>
+    <mc:Fallback xmlns="">
       <p:transition spd="slow" advTm="235"/>
     </mc:Fallback>
   </mc:AlternateContent>
@@ -10954,11 +10954,11 @@
   <p:clrMapOvr>
     <a:masterClrMapping/>
   </p:clrMapOvr>
-  <mc:AlternateContent xmlns:mc="http://schemas.openxmlformats.org/markup-compatibility/2006">
-    <mc:Choice xmlns:p14="http://schemas.microsoft.com/office/powerpoint/2010/main" Requires="p14">
+  <mc:AlternateContent xmlns:mc="http://schemas.openxmlformats.org/markup-compatibility/2006" xmlns:p14="http://schemas.microsoft.com/office/powerpoint/2010/main">
+    <mc:Choice Requires="p14">
       <p:transition spd="slow" p14:dur="2000" advTm="183"/>
     </mc:Choice>
-    <mc:Fallback>
+    <mc:Fallback xmlns="">
       <p:transition spd="slow" advTm="183"/>
     </mc:Fallback>
   </mc:AlternateContent>
@@ -11781,11 +11781,11 @@
   <p:clrMapOvr>
     <a:masterClrMapping/>
   </p:clrMapOvr>
-  <mc:AlternateContent xmlns:mc="http://schemas.openxmlformats.org/markup-compatibility/2006">
-    <mc:Choice xmlns:p14="http://schemas.microsoft.com/office/powerpoint/2010/main" Requires="p14">
+  <mc:AlternateContent xmlns:mc="http://schemas.openxmlformats.org/markup-compatibility/2006" xmlns:p14="http://schemas.microsoft.com/office/powerpoint/2010/main">
+    <mc:Choice Requires="p14">
       <p:transition spd="slow" p14:dur="2000" advTm="35771"/>
     </mc:Choice>
-    <mc:Fallback>
+    <mc:Fallback xmlns="">
       <p:transition spd="slow" advTm="35771"/>
     </mc:Fallback>
   </mc:AlternateContent>
@@ -12504,11 +12504,11 @@
   <p:clrMapOvr>
     <a:masterClrMapping/>
   </p:clrMapOvr>
-  <mc:AlternateContent xmlns:mc="http://schemas.openxmlformats.org/markup-compatibility/2006">
-    <mc:Choice xmlns:p14="http://schemas.microsoft.com/office/powerpoint/2010/main" Requires="p14">
+  <mc:AlternateContent xmlns:mc="http://schemas.openxmlformats.org/markup-compatibility/2006" xmlns:p14="http://schemas.microsoft.com/office/powerpoint/2010/main">
+    <mc:Choice Requires="p14">
       <p:transition spd="slow" p14:dur="2000" advTm="432"/>
     </mc:Choice>
-    <mc:Fallback>
+    <mc:Fallback xmlns="">
       <p:transition spd="slow" advTm="432"/>
     </mc:Fallback>
   </mc:AlternateContent>
@@ -13260,11 +13260,11 @@
   <p:clrMapOvr>
     <a:masterClrMapping/>
   </p:clrMapOvr>
-  <mc:AlternateContent xmlns:mc="http://schemas.openxmlformats.org/markup-compatibility/2006">
-    <mc:Choice xmlns:p14="http://schemas.microsoft.com/office/powerpoint/2010/main" Requires="p14">
+  <mc:AlternateContent xmlns:mc="http://schemas.openxmlformats.org/markup-compatibility/2006" xmlns:p14="http://schemas.microsoft.com/office/powerpoint/2010/main">
+    <mc:Choice Requires="p14">
       <p:transition spd="slow" p14:dur="2000" advTm="2143"/>
     </mc:Choice>
-    <mc:Fallback>
+    <mc:Fallback xmlns="">
       <p:transition spd="slow" advTm="2143"/>
     </mc:Fallback>
   </mc:AlternateContent>
@@ -16229,11 +16229,11 @@
   <p:clrMapOvr>
     <a:masterClrMapping/>
   </p:clrMapOvr>
-  <mc:AlternateContent xmlns:mc="http://schemas.openxmlformats.org/markup-compatibility/2006">
-    <mc:Choice xmlns:p14="http://schemas.microsoft.com/office/powerpoint/2010/main" Requires="p14">
+  <mc:AlternateContent xmlns:mc="http://schemas.openxmlformats.org/markup-compatibility/2006" xmlns:p14="http://schemas.microsoft.com/office/powerpoint/2010/main">
+    <mc:Choice Requires="p14">
       <p:transition spd="slow" p14:dur="2000" advTm="1014"/>
     </mc:Choice>
-    <mc:Fallback>
+    <mc:Fallback xmlns="">
       <p:transition spd="slow" advTm="1014"/>
     </mc:Fallback>
   </mc:AlternateContent>
@@ -18645,11 +18645,11 @@
   <p:clrMapOvr>
     <a:masterClrMapping/>
   </p:clrMapOvr>
-  <mc:AlternateContent xmlns:mc="http://schemas.openxmlformats.org/markup-compatibility/2006">
-    <mc:Choice xmlns:p14="http://schemas.microsoft.com/office/powerpoint/2010/main" Requires="p14">
+  <mc:AlternateContent xmlns:mc="http://schemas.openxmlformats.org/markup-compatibility/2006" xmlns:p14="http://schemas.microsoft.com/office/powerpoint/2010/main">
+    <mc:Choice Requires="p14">
       <p:transition spd="slow" p14:dur="2000" advTm="1106"/>
     </mc:Choice>
-    <mc:Fallback>
+    <mc:Fallback xmlns="">
       <p:transition spd="slow" advTm="1106"/>
     </mc:Fallback>
   </mc:AlternateContent>
@@ -19452,11 +19452,11 @@
   <p:clrMapOvr>
     <a:masterClrMapping/>
   </p:clrMapOvr>
-  <mc:AlternateContent xmlns:mc="http://schemas.openxmlformats.org/markup-compatibility/2006">
-    <mc:Choice xmlns:p14="http://schemas.microsoft.com/office/powerpoint/2010/main" Requires="p14">
+  <mc:AlternateContent xmlns:mc="http://schemas.openxmlformats.org/markup-compatibility/2006" xmlns:p14="http://schemas.microsoft.com/office/powerpoint/2010/main">
+    <mc:Choice Requires="p14">
       <p:transition spd="slow" p14:dur="2000" advTm="384"/>
     </mc:Choice>
-    <mc:Fallback>
+    <mc:Fallback xmlns="">
       <p:transition spd="slow" advTm="384"/>
     </mc:Fallback>
   </mc:AlternateContent>
@@ -20619,11 +20619,11 @@
   <p:clrMapOvr>
     <a:masterClrMapping/>
   </p:clrMapOvr>
-  <mc:AlternateContent xmlns:mc="http://schemas.openxmlformats.org/markup-compatibility/2006">
-    <mc:Choice xmlns:p14="http://schemas.microsoft.com/office/powerpoint/2010/main" Requires="p14">
+  <mc:AlternateContent xmlns:mc="http://schemas.openxmlformats.org/markup-compatibility/2006" xmlns:p14="http://schemas.microsoft.com/office/powerpoint/2010/main">
+    <mc:Choice Requires="p14">
       <p:transition spd="slow" p14:dur="2000" advTm="526"/>
     </mc:Choice>
-    <mc:Fallback>
+    <mc:Fallback xmlns="">
       <p:transition spd="slow" advTm="526"/>
     </mc:Fallback>
   </mc:AlternateContent>
@@ -21942,11 +21942,11 @@
   <p:clrMapOvr>
     <a:masterClrMapping/>
   </p:clrMapOvr>
-  <mc:AlternateContent xmlns:mc="http://schemas.openxmlformats.org/markup-compatibility/2006">
-    <mc:Choice xmlns:p14="http://schemas.microsoft.com/office/powerpoint/2010/main" Requires="p14">
+  <mc:AlternateContent xmlns:mc="http://schemas.openxmlformats.org/markup-compatibility/2006" xmlns:p14="http://schemas.microsoft.com/office/powerpoint/2010/main">
+    <mc:Choice Requires="p14">
       <p:transition spd="slow" p14:dur="2000" advTm="1829"/>
     </mc:Choice>
-    <mc:Fallback>
+    <mc:Fallback xmlns="">
       <p:transition spd="slow" advTm="1829"/>
     </mc:Fallback>
   </mc:AlternateContent>
@@ -23301,11 +23301,11 @@
   <p:clrMapOvr>
     <a:masterClrMapping/>
   </p:clrMapOvr>
-  <mc:AlternateContent xmlns:mc="http://schemas.openxmlformats.org/markup-compatibility/2006">
-    <mc:Choice xmlns:p14="http://schemas.microsoft.com/office/powerpoint/2010/main" Requires="p14">
+  <mc:AlternateContent xmlns:mc="http://schemas.openxmlformats.org/markup-compatibility/2006" xmlns:p14="http://schemas.microsoft.com/office/powerpoint/2010/main">
+    <mc:Choice Requires="p14">
       <p:transition spd="slow" p14:dur="2000" advTm="984"/>
     </mc:Choice>
-    <mc:Fallback>
+    <mc:Fallback xmlns="">
       <p:transition spd="slow" advTm="984"/>
     </mc:Fallback>
   </mc:AlternateContent>
@@ -24798,11 +24798,11 @@
   <p:clrMapOvr>
     <a:masterClrMapping/>
   </p:clrMapOvr>
-  <mc:AlternateContent xmlns:mc="http://schemas.openxmlformats.org/markup-compatibility/2006">
-    <mc:Choice xmlns:p14="http://schemas.microsoft.com/office/powerpoint/2010/main" Requires="p14">
+  <mc:AlternateContent xmlns:mc="http://schemas.openxmlformats.org/markup-compatibility/2006" xmlns:p14="http://schemas.microsoft.com/office/powerpoint/2010/main">
+    <mc:Choice Requires="p14">
       <p:transition spd="slow" p14:dur="2000" advTm="1146"/>
     </mc:Choice>
-    <mc:Fallback>
+    <mc:Fallback xmlns="">
       <p:transition spd="slow" advTm="1146"/>
     </mc:Fallback>
   </mc:AlternateContent>
@@ -26170,11 +26170,11 @@
   <p:clrMapOvr>
     <a:masterClrMapping/>
   </p:clrMapOvr>
-  <mc:AlternateContent xmlns:mc="http://schemas.openxmlformats.org/markup-compatibility/2006">
-    <mc:Choice xmlns:p14="http://schemas.microsoft.com/office/powerpoint/2010/main" Requires="p14">
+  <mc:AlternateContent xmlns:mc="http://schemas.openxmlformats.org/markup-compatibility/2006" xmlns:p14="http://schemas.microsoft.com/office/powerpoint/2010/main">
+    <mc:Choice Requires="p14">
       <p:transition spd="slow" p14:dur="2000" advTm="2354"/>
     </mc:Choice>
-    <mc:Fallback>
+    <mc:Fallback xmlns="">
       <p:transition spd="slow" advTm="2354"/>
     </mc:Fallback>
   </mc:AlternateContent>

</xml_diff>

<commit_message>
Ultimos cambios en la PPT
</commit_message>
<xml_diff>
--- a/2018/TT IQQ 2018 Camara y Garay.pptx
+++ b/2018/TT IQQ 2018 Camara y Garay.pptx
@@ -134,12 +134,6 @@
     </p:ext>
   </p:extLst>
 </p:presentation>
-</file>
-
-<file path=ppt/commentAuthors.xml><?xml version="1.0" encoding="utf-8"?>
-<p:cmAuthorLst xmlns:a="http://schemas.openxmlformats.org/drawingml/2006/main" xmlns:r="http://schemas.openxmlformats.org/officeDocument/2006/relationships" xmlns:p="http://schemas.openxmlformats.org/presentationml/2006/main">
-  <p:cmAuthor id="1" name="Manuel Garay Riquelme" initials="" lastIdx="0" clrIdx="0"/>
-</p:cmAuthorLst>
 </file>
 
 <file path=ppt/handoutMasters/handoutMaster1.xml><?xml version="1.0" encoding="utf-8"?>
@@ -6567,14 +6561,6 @@
   <p:clrMapOvr>
     <a:masterClrMapping/>
   </p:clrMapOvr>
-  <mc:AlternateContent xmlns:mc="http://schemas.openxmlformats.org/markup-compatibility/2006" xmlns:p14="http://schemas.microsoft.com/office/powerpoint/2010/main">
-    <mc:Choice Requires="p14">
-      <p:transition spd="slow" p14:dur="2000" advTm="2287"/>
-    </mc:Choice>
-    <mc:Fallback xmlns="">
-      <p:transition spd="slow" advTm="2287"/>
-    </mc:Fallback>
-  </mc:AlternateContent>
 </p:sld>
 </file>
 
@@ -7107,21 +7093,8 @@
                   <a:schemeClr val="tx1"/>
                 </a:solidFill>
               </a:rPr>
-              <a:t>Recoger opinión </a:t>
+              <a:t>Recoger opinión de Expertos</a:t>
             </a:r>
-            <a:r>
-              <a:rPr lang="es-CL" sz="2000">
-                <a:solidFill>
-                  <a:schemeClr val="tx1"/>
-                </a:solidFill>
-              </a:rPr>
-              <a:t>de Expertos</a:t>
-            </a:r>
-            <a:endParaRPr lang="es-CL" sz="2000" dirty="0">
-              <a:solidFill>
-                <a:schemeClr val="tx1"/>
-              </a:solidFill>
-            </a:endParaRPr>
           </a:p>
         </p:txBody>
       </p:sp>
@@ -7312,9 +7285,6 @@
         </p:txBody>
       </p:sp>
     </p:spTree>
-    <p:custDataLst>
-      <p:tags r:id="rId1"/>
-    </p:custDataLst>
     <p:extLst>
       <p:ext uri="{BB962C8B-B14F-4D97-AF65-F5344CB8AC3E}">
         <p14:creationId xmlns:p14="http://schemas.microsoft.com/office/powerpoint/2010/main" val="697346698"/>
@@ -7324,14 +7294,6 @@
   <p:clrMapOvr>
     <a:masterClrMapping/>
   </p:clrMapOvr>
-  <mc:AlternateContent xmlns:mc="http://schemas.openxmlformats.org/markup-compatibility/2006" xmlns:p14="http://schemas.microsoft.com/office/powerpoint/2010/main">
-    <mc:Choice Requires="p14">
-      <p:transition spd="slow" p14:dur="2000" advTm="1118"/>
-    </mc:Choice>
-    <mc:Fallback xmlns="">
-      <p:transition spd="slow" advTm="1118"/>
-    </mc:Fallback>
-  </mc:AlternateContent>
   <p:timing>
     <p:tnLst>
       <p:par>
@@ -7922,7 +7884,7 @@
         </p:nvSpPr>
         <p:spPr>
           <a:xfrm>
-            <a:off x="5075287" y="4583922"/>
+            <a:off x="5075287" y="4590889"/>
             <a:ext cx="4462672" cy="557093"/>
           </a:xfrm>
           <a:prstGeom prst="roundRect">
@@ -8419,14 +8381,6 @@
   <p:clrMapOvr>
     <a:masterClrMapping/>
   </p:clrMapOvr>
-  <mc:AlternateContent xmlns:mc="http://schemas.openxmlformats.org/markup-compatibility/2006" xmlns:p14="http://schemas.microsoft.com/office/powerpoint/2010/main">
-    <mc:Choice Requires="p14">
-      <p:transition spd="slow" p14:dur="2000" advTm="12496"/>
-    </mc:Choice>
-    <mc:Fallback xmlns="">
-      <p:transition spd="slow" advTm="12496"/>
-    </mc:Fallback>
-  </mc:AlternateContent>
   <p:timing>
     <p:tnLst>
       <p:par>
@@ -9615,14 +9569,6 @@
   <p:clrMapOvr>
     <a:masterClrMapping/>
   </p:clrMapOvr>
-  <mc:AlternateContent xmlns:mc="http://schemas.openxmlformats.org/markup-compatibility/2006" xmlns:p14="http://schemas.microsoft.com/office/powerpoint/2010/main">
-    <mc:Choice Requires="p14">
-      <p:transition spd="slow" p14:dur="2000" advTm="235"/>
-    </mc:Choice>
-    <mc:Fallback xmlns="">
-      <p:transition spd="slow" advTm="235"/>
-    </mc:Fallback>
-  </mc:AlternateContent>
   <p:timing>
     <p:tnLst>
       <p:par>
@@ -10954,14 +10900,6 @@
   <p:clrMapOvr>
     <a:masterClrMapping/>
   </p:clrMapOvr>
-  <mc:AlternateContent xmlns:mc="http://schemas.openxmlformats.org/markup-compatibility/2006" xmlns:p14="http://schemas.microsoft.com/office/powerpoint/2010/main">
-    <mc:Choice Requires="p14">
-      <p:transition spd="slow" p14:dur="2000" advTm="183"/>
-    </mc:Choice>
-    <mc:Fallback xmlns="">
-      <p:transition spd="slow" advTm="183"/>
-    </mc:Fallback>
-  </mc:AlternateContent>
   <p:timing>
     <p:tnLst>
       <p:par>
@@ -11769,9 +11707,6 @@
         </p:txBody>
       </p:sp>
     </p:spTree>
-    <p:custDataLst>
-      <p:tags r:id="rId1"/>
-    </p:custDataLst>
     <p:extLst>
       <p:ext uri="{BB962C8B-B14F-4D97-AF65-F5344CB8AC3E}">
         <p14:creationId xmlns:p14="http://schemas.microsoft.com/office/powerpoint/2010/main" val="2891704333"/>
@@ -11781,14 +11716,6 @@
   <p:clrMapOvr>
     <a:masterClrMapping/>
   </p:clrMapOvr>
-  <mc:AlternateContent xmlns:mc="http://schemas.openxmlformats.org/markup-compatibility/2006" xmlns:p14="http://schemas.microsoft.com/office/powerpoint/2010/main">
-    <mc:Choice Requires="p14">
-      <p:transition spd="slow" p14:dur="2000" advTm="35771"/>
-    </mc:Choice>
-    <mc:Fallback xmlns="">
-      <p:transition spd="slow" advTm="35771"/>
-    </mc:Fallback>
-  </mc:AlternateContent>
   <p:timing>
     <p:tnLst>
       <p:par>
@@ -12504,14 +12431,6 @@
   <p:clrMapOvr>
     <a:masterClrMapping/>
   </p:clrMapOvr>
-  <mc:AlternateContent xmlns:mc="http://schemas.openxmlformats.org/markup-compatibility/2006" xmlns:p14="http://schemas.microsoft.com/office/powerpoint/2010/main">
-    <mc:Choice Requires="p14">
-      <p:transition spd="slow" p14:dur="2000" advTm="432"/>
-    </mc:Choice>
-    <mc:Fallback xmlns="">
-      <p:transition spd="slow" advTm="432"/>
-    </mc:Fallback>
-  </mc:AlternateContent>
   <p:timing>
     <p:tnLst>
       <p:par>
@@ -13248,9 +13167,6 @@
         </p:txBody>
       </p:sp>
     </p:spTree>
-    <p:custDataLst>
-      <p:tags r:id="rId1"/>
-    </p:custDataLst>
     <p:extLst>
       <p:ext uri="{BB962C8B-B14F-4D97-AF65-F5344CB8AC3E}">
         <p14:creationId xmlns:p14="http://schemas.microsoft.com/office/powerpoint/2010/main" val="2744671481"/>
@@ -13260,14 +13176,6 @@
   <p:clrMapOvr>
     <a:masterClrMapping/>
   </p:clrMapOvr>
-  <mc:AlternateContent xmlns:mc="http://schemas.openxmlformats.org/markup-compatibility/2006" xmlns:p14="http://schemas.microsoft.com/office/powerpoint/2010/main">
-    <mc:Choice Requires="p14">
-      <p:transition spd="slow" p14:dur="2000" advTm="2143"/>
-    </mc:Choice>
-    <mc:Fallback xmlns="">
-      <p:transition spd="slow" advTm="2143"/>
-    </mc:Fallback>
-  </mc:AlternateContent>
   <p:timing>
     <p:tnLst>
       <p:par>
@@ -13536,12 +13444,8 @@
           <a:lstStyle/>
           <a:p>
             <a:r>
-              <a:rPr lang="es-CL"/>
-              <a:t>Objetivo </a:t>
-            </a:r>
-            <a:r>
               <a:rPr lang="es-CL" dirty="0"/>
-              <a:t>General</a:t>
+              <a:t>Objetivo General</a:t>
             </a:r>
           </a:p>
         </p:txBody>
@@ -16217,9 +16121,6 @@
         </p:txBody>
       </p:sp>
     </p:spTree>
-    <p:custDataLst>
-      <p:tags r:id="rId1"/>
-    </p:custDataLst>
     <p:extLst>
       <p:ext uri="{BB962C8B-B14F-4D97-AF65-F5344CB8AC3E}">
         <p14:creationId xmlns:p14="http://schemas.microsoft.com/office/powerpoint/2010/main" val="1940363962"/>
@@ -16229,14 +16130,6 @@
   <p:clrMapOvr>
     <a:masterClrMapping/>
   </p:clrMapOvr>
-  <mc:AlternateContent xmlns:mc="http://schemas.openxmlformats.org/markup-compatibility/2006" xmlns:p14="http://schemas.microsoft.com/office/powerpoint/2010/main">
-    <mc:Choice Requires="p14">
-      <p:transition spd="slow" p14:dur="2000" advTm="1014"/>
-    </mc:Choice>
-    <mc:Fallback xmlns="">
-      <p:transition spd="slow" advTm="1014"/>
-    </mc:Fallback>
-  </mc:AlternateContent>
   <p:timing>
     <p:tnLst>
       <p:par>
@@ -17164,7 +17057,7 @@
       </p:sp>
       <p:grpSp>
         <p:nvGrpSpPr>
-          <p:cNvPr id="25" name="Grupo 82">
+          <p:cNvPr id="25" name="Grupo 24">
             <a:extLst>
               <a:ext uri="{FF2B5EF4-FFF2-40B4-BE49-F238E27FC236}">
                 <a16:creationId xmlns:a16="http://schemas.microsoft.com/office/drawing/2014/main" id="{719BD3DE-0E4B-4446-B37B-E813E222EBB9}"/>
@@ -17176,8 +17069,8 @@
         </p:nvGrpSpPr>
         <p:grpSpPr>
           <a:xfrm>
-            <a:off x="2932042" y="2311358"/>
-            <a:ext cx="5973419" cy="747781"/>
+            <a:off x="2932043" y="2311358"/>
+            <a:ext cx="5623234" cy="747781"/>
             <a:chOff x="3404184" y="937759"/>
             <a:chExt cx="1374731" cy="604851"/>
           </a:xfrm>
@@ -17197,7 +17090,7 @@
         </p:grpSpPr>
         <p:sp>
           <p:nvSpPr>
-            <p:cNvPr id="46" name="Rectángulo 83">
+            <p:cNvPr id="46" name="Rectángulo 45">
               <a:extLst>
                 <a:ext uri="{FF2B5EF4-FFF2-40B4-BE49-F238E27FC236}">
                   <a16:creationId xmlns:a16="http://schemas.microsoft.com/office/drawing/2014/main" id="{10583DA3-27AD-4B8E-877C-C0A102EA5ECE}"/>
@@ -17257,7 +17150,7 @@
         </p:sp>
         <p:sp>
           <p:nvSpPr>
-            <p:cNvPr id="47" name="CuadroTexto 84">
+            <p:cNvPr id="47" name="CuadroTexto 46">
               <a:extLst>
                 <a:ext uri="{FF2B5EF4-FFF2-40B4-BE49-F238E27FC236}">
                   <a16:creationId xmlns:a16="http://schemas.microsoft.com/office/drawing/2014/main" id="{6CCE5AAA-CEDD-4BC2-AA13-13C68790B0DD}"/>
@@ -17326,21 +17219,20 @@
                     </a:outerShdw>
                   </a:effectLst>
                 </a:rPr>
-                <a:t>Ante necesidad demográfica de un polo de desarrollo,</a:t>
+                <a:t>Ante necesidad demográfica de un polo de desarrollo, en junio nace </a:t>
               </a:r>
-            </a:p>
-            <a:p>
-              <a:pPr marL="0" lvl="1" algn="ctr" defTabSz="444500">
-                <a:lnSpc>
-                  <a:spcPct val="90000"/>
-                </a:lnSpc>
-                <a:spcBef>
-                  <a:spcPct val="0"/>
-                </a:spcBef>
-                <a:spcAft>
-                  <a:spcPct val="15000"/>
-                </a:spcAft>
-              </a:pPr>
+              <a:r>
+                <a:rPr lang="es-ES" kern="1200" dirty="0" err="1">
+                  <a:effectLst>
+                    <a:outerShdw blurRad="38100" dist="38100" dir="2700000" algn="tl">
+                      <a:srgbClr val="000000">
+                        <a:alpha val="43137"/>
+                      </a:srgbClr>
+                    </a:outerShdw>
+                  </a:effectLst>
+                </a:rPr>
+                <a:t>Zofri</a:t>
+              </a:r>
               <a:r>
                 <a:rPr lang="es-ES" kern="1200" dirty="0">
                   <a:effectLst>
@@ -17351,7 +17243,7 @@
                     </a:outerShdw>
                   </a:effectLst>
                 </a:rPr>
-                <a:t>en junio nace Zofri en galpón en P. Lynch</a:t>
+                <a:t> en galpón en P. Lynch</a:t>
               </a:r>
             </a:p>
           </p:txBody>
@@ -17669,7 +17561,7 @@
                     </a:outerShdw>
                   </a:effectLst>
                 </a:rPr>
-                <a:t> se traslada a Barrio el Colorado</a:t>
+                <a:t> se traslada a Barrio el Colorado a un arenal utilizado como vertedero</a:t>
               </a:r>
             </a:p>
           </p:txBody>
@@ -18283,7 +18175,7 @@
                     </a:outerShdw>
                   </a:effectLst>
                 </a:rPr>
-                <a:t>Nace ZOFRI S.A. con un contrato de Concesión con el Estado por 40 años</a:t>
+                <a:t>Nace ZOFRI S.A. a través de un contrato de Concesión con el Estado por 40 años</a:t>
               </a:r>
             </a:p>
           </p:txBody>
@@ -18633,9 +18525,6 @@
         </p:sp>
       </p:grpSp>
     </p:spTree>
-    <p:custDataLst>
-      <p:tags r:id="rId1"/>
-    </p:custDataLst>
     <p:extLst>
       <p:ext uri="{BB962C8B-B14F-4D97-AF65-F5344CB8AC3E}">
         <p14:creationId xmlns:p14="http://schemas.microsoft.com/office/powerpoint/2010/main" val="2469421026"/>
@@ -18645,14 +18534,6 @@
   <p:clrMapOvr>
     <a:masterClrMapping/>
   </p:clrMapOvr>
-  <mc:AlternateContent xmlns:mc="http://schemas.openxmlformats.org/markup-compatibility/2006" xmlns:p14="http://schemas.microsoft.com/office/powerpoint/2010/main">
-    <mc:Choice Requires="p14">
-      <p:transition spd="slow" p14:dur="2000" advTm="1106"/>
-    </mc:Choice>
-    <mc:Fallback xmlns="">
-      <p:transition spd="slow" advTm="1106"/>
-    </mc:Fallback>
-  </mc:AlternateContent>
   <p:timing>
     <p:tnLst>
       <p:par>
@@ -19310,7 +19191,7 @@
           <p:nvPr/>
         </p:nvPicPr>
         <p:blipFill>
-          <a:blip r:embed="rId3">
+          <a:blip r:embed="rId2">
             <a:extLst>
               <a:ext uri="{28A0092B-C50C-407E-A947-70E740481C1C}">
                 <a14:useLocalDpi xmlns:a14="http://schemas.microsoft.com/office/drawing/2010/main" val="0"/>
@@ -19346,7 +19227,7 @@
           <p:nvPr/>
         </p:nvPicPr>
         <p:blipFill>
-          <a:blip r:embed="rId4">
+          <a:blip r:embed="rId3">
             <a:extLst>
               <a:ext uri="{28A0092B-C50C-407E-A947-70E740481C1C}">
                 <a14:useLocalDpi xmlns:a14="http://schemas.microsoft.com/office/drawing/2010/main" val="0"/>
@@ -19382,7 +19263,7 @@
           <p:nvPr/>
         </p:nvPicPr>
         <p:blipFill>
-          <a:blip r:embed="rId5">
+          <a:blip r:embed="rId4">
             <a:extLst>
               <a:ext uri="{28A0092B-C50C-407E-A947-70E740481C1C}">
                 <a14:useLocalDpi xmlns:a14="http://schemas.microsoft.com/office/drawing/2010/main" val="0"/>
@@ -19418,7 +19299,7 @@
           <p:nvPr/>
         </p:nvPicPr>
         <p:blipFill>
-          <a:blip r:embed="rId6">
+          <a:blip r:embed="rId5">
             <a:extLst>
               <a:ext uri="{28A0092B-C50C-407E-A947-70E740481C1C}">
                 <a14:useLocalDpi xmlns:a14="http://schemas.microsoft.com/office/drawing/2010/main" val="0"/>
@@ -19440,9 +19321,6 @@
         </p:spPr>
       </p:pic>
     </p:spTree>
-    <p:custDataLst>
-      <p:tags r:id="rId1"/>
-    </p:custDataLst>
     <p:extLst>
       <p:ext uri="{BB962C8B-B14F-4D97-AF65-F5344CB8AC3E}">
         <p14:creationId xmlns:p14="http://schemas.microsoft.com/office/powerpoint/2010/main" val="2532238134"/>
@@ -19452,14 +19330,6 @@
   <p:clrMapOvr>
     <a:masterClrMapping/>
   </p:clrMapOvr>
-  <mc:AlternateContent xmlns:mc="http://schemas.openxmlformats.org/markup-compatibility/2006" xmlns:p14="http://schemas.microsoft.com/office/powerpoint/2010/main">
-    <mc:Choice Requires="p14">
-      <p:transition spd="slow" p14:dur="2000" advTm="384"/>
-    </mc:Choice>
-    <mc:Fallback xmlns="">
-      <p:transition spd="slow" advTm="384"/>
-    </mc:Fallback>
-  </mc:AlternateContent>
   <p:timing>
     <p:tnLst>
       <p:par>
@@ -19689,7 +19559,7 @@
           <p:nvPr/>
         </p:nvPicPr>
         <p:blipFill>
-          <a:blip r:embed="rId3"/>
+          <a:blip r:embed="rId2"/>
           <a:stretch>
             <a:fillRect/>
           </a:stretch>
@@ -19719,7 +19589,7 @@
           <p:nvPr/>
         </p:nvPicPr>
         <p:blipFill>
-          <a:blip r:embed="rId4">
+          <a:blip r:embed="rId3">
             <a:extLst>
               <a:ext uri="{28A0092B-C50C-407E-A947-70E740481C1C}">
                 <a14:useLocalDpi xmlns:a14="http://schemas.microsoft.com/office/drawing/2010/main" val="0"/>
@@ -19763,7 +19633,7 @@
           <p:nvPr/>
         </p:nvPicPr>
         <p:blipFill>
-          <a:blip r:embed="rId5">
+          <a:blip r:embed="rId4">
             <a:extLst>
               <a:ext uri="{28A0092B-C50C-407E-A947-70E740481C1C}">
                 <a14:useLocalDpi xmlns:a14="http://schemas.microsoft.com/office/drawing/2010/main" val="0"/>
@@ -20233,7 +20103,7 @@
           <p:nvPr/>
         </p:nvPicPr>
         <p:blipFill>
-          <a:blip r:embed="rId6" cstate="print"/>
+          <a:blip r:embed="rId5" cstate="print"/>
           <a:stretch>
             <a:fillRect/>
           </a:stretch>
@@ -20263,7 +20133,7 @@
           <p:nvPr/>
         </p:nvPicPr>
         <p:blipFill>
-          <a:blip r:embed="rId7" cstate="print"/>
+          <a:blip r:embed="rId6" cstate="print"/>
           <a:stretch>
             <a:fillRect/>
           </a:stretch>
@@ -20293,7 +20163,7 @@
           <p:nvPr/>
         </p:nvPicPr>
         <p:blipFill>
-          <a:blip r:embed="rId8" cstate="print"/>
+          <a:blip r:embed="rId7" cstate="print"/>
           <a:stretch>
             <a:fillRect/>
           </a:stretch>
@@ -20323,7 +20193,7 @@
           <p:nvPr/>
         </p:nvPicPr>
         <p:blipFill>
-          <a:blip r:embed="rId9" cstate="print"/>
+          <a:blip r:embed="rId8" cstate="print"/>
           <a:stretch>
             <a:fillRect/>
           </a:stretch>
@@ -20353,7 +20223,7 @@
           <p:nvPr/>
         </p:nvPicPr>
         <p:blipFill>
-          <a:blip r:embed="rId10" cstate="print"/>
+          <a:blip r:embed="rId9" cstate="print"/>
           <a:stretch>
             <a:fillRect/>
           </a:stretch>
@@ -20383,7 +20253,7 @@
           <p:nvPr/>
         </p:nvPicPr>
         <p:blipFill>
-          <a:blip r:embed="rId11" cstate="print"/>
+          <a:blip r:embed="rId10" cstate="print"/>
           <a:stretch>
             <a:fillRect/>
           </a:stretch>
@@ -20413,7 +20283,7 @@
           <p:nvPr/>
         </p:nvPicPr>
         <p:blipFill>
-          <a:blip r:embed="rId12" cstate="print"/>
+          <a:blip r:embed="rId11" cstate="print"/>
           <a:stretch>
             <a:fillRect/>
           </a:stretch>
@@ -20443,7 +20313,7 @@
           <p:nvPr/>
         </p:nvPicPr>
         <p:blipFill>
-          <a:blip r:embed="rId13" cstate="print"/>
+          <a:blip r:embed="rId12" cstate="print"/>
           <a:stretch>
             <a:fillRect/>
           </a:stretch>
@@ -20473,7 +20343,7 @@
           <p:nvPr/>
         </p:nvPicPr>
         <p:blipFill>
-          <a:blip r:embed="rId14"/>
+          <a:blip r:embed="rId13"/>
           <a:stretch>
             <a:fillRect/>
           </a:stretch>
@@ -20607,9 +20477,6 @@
         </p:txBody>
       </p:sp>
     </p:spTree>
-    <p:custDataLst>
-      <p:tags r:id="rId1"/>
-    </p:custDataLst>
     <p:extLst>
       <p:ext uri="{BB962C8B-B14F-4D97-AF65-F5344CB8AC3E}">
         <p14:creationId xmlns:p14="http://schemas.microsoft.com/office/powerpoint/2010/main" val="527160576"/>
@@ -20619,14 +20486,6 @@
   <p:clrMapOvr>
     <a:masterClrMapping/>
   </p:clrMapOvr>
-  <mc:AlternateContent xmlns:mc="http://schemas.openxmlformats.org/markup-compatibility/2006" xmlns:p14="http://schemas.microsoft.com/office/powerpoint/2010/main">
-    <mc:Choice Requires="p14">
-      <p:transition spd="slow" p14:dur="2000" advTm="526"/>
-    </mc:Choice>
-    <mc:Fallback xmlns="">
-      <p:transition spd="slow" advTm="526"/>
-    </mc:Fallback>
-  </mc:AlternateContent>
   <p:timing>
     <p:tnLst>
       <p:par>
@@ -21930,9 +21789,6 @@
         </p:txBody>
       </p:sp>
     </p:spTree>
-    <p:custDataLst>
-      <p:tags r:id="rId1"/>
-    </p:custDataLst>
     <p:extLst>
       <p:ext uri="{BB962C8B-B14F-4D97-AF65-F5344CB8AC3E}">
         <p14:creationId xmlns:p14="http://schemas.microsoft.com/office/powerpoint/2010/main" val="3782300075"/>
@@ -21942,14 +21798,6 @@
   <p:clrMapOvr>
     <a:masterClrMapping/>
   </p:clrMapOvr>
-  <mc:AlternateContent xmlns:mc="http://schemas.openxmlformats.org/markup-compatibility/2006" xmlns:p14="http://schemas.microsoft.com/office/powerpoint/2010/main">
-    <mc:Choice Requires="p14">
-      <p:transition spd="slow" p14:dur="2000" advTm="1829"/>
-    </mc:Choice>
-    <mc:Fallback xmlns="">
-      <p:transition spd="slow" advTm="1829"/>
-    </mc:Fallback>
-  </mc:AlternateContent>
   <p:timing>
     <p:tnLst>
       <p:par>
@@ -23289,26 +23137,15 @@
         </p:txBody>
       </p:sp>
     </p:spTree>
-    <p:custDataLst>
-      <p:tags r:id="rId1"/>
-    </p:custDataLst>
     <p:extLst>
       <p:ext uri="{BB962C8B-B14F-4D97-AF65-F5344CB8AC3E}">
-        <p14:creationId xmlns:p14="http://schemas.microsoft.com/office/powerpoint/2010/main" val="3705618856"/>
+        <p14:creationId xmlns:p14="http://schemas.microsoft.com/office/powerpoint/2010/main" val="354556331"/>
       </p:ext>
     </p:extLst>
   </p:cSld>
   <p:clrMapOvr>
     <a:masterClrMapping/>
   </p:clrMapOvr>
-  <mc:AlternateContent xmlns:mc="http://schemas.openxmlformats.org/markup-compatibility/2006" xmlns:p14="http://schemas.microsoft.com/office/powerpoint/2010/main">
-    <mc:Choice Requires="p14">
-      <p:transition spd="slow" p14:dur="2000" advTm="984"/>
-    </mc:Choice>
-    <mc:Fallback xmlns="">
-      <p:transition spd="slow" advTm="984"/>
-    </mc:Fallback>
-  </mc:AlternateContent>
   <p:timing>
     <p:tnLst>
       <p:par>
@@ -24786,9 +24623,6 @@
         </p:style>
       </p:cxnSp>
     </p:spTree>
-    <p:custDataLst>
-      <p:tags r:id="rId1"/>
-    </p:custDataLst>
     <p:extLst>
       <p:ext uri="{BB962C8B-B14F-4D97-AF65-F5344CB8AC3E}">
         <p14:creationId xmlns:p14="http://schemas.microsoft.com/office/powerpoint/2010/main" val="1396446686"/>
@@ -24798,14 +24632,6 @@
   <p:clrMapOvr>
     <a:masterClrMapping/>
   </p:clrMapOvr>
-  <mc:AlternateContent xmlns:mc="http://schemas.openxmlformats.org/markup-compatibility/2006" xmlns:p14="http://schemas.microsoft.com/office/powerpoint/2010/main">
-    <mc:Choice Requires="p14">
-      <p:transition spd="slow" p14:dur="2000" advTm="1146"/>
-    </mc:Choice>
-    <mc:Fallback xmlns="">
-      <p:transition spd="slow" advTm="1146"/>
-    </mc:Fallback>
-  </mc:AlternateContent>
   <p:timing>
     <p:tnLst>
       <p:par>
@@ -25963,7 +25789,7 @@
                   </a:outerShdw>
                 </a:effectLst>
               </a:rPr>
-              <a:t>Se requiere de una guía como apoyo para la gestión de </a:t>
+              <a:t>Manual de Buenas Prácticas aplicable a </a:t>
             </a:r>
           </a:p>
           <a:p>
@@ -26095,7 +25921,7 @@
             <a:pPr algn="ctr"/>
             <a:r>
               <a:rPr lang="es-CL" sz="2400" dirty="0"/>
-              <a:t>Diseñar un plan de implementación para el Manual de Buenas Prácticas</a:t>
+              <a:t>Plan de implementación del el Manual de Buenas Prácticas</a:t>
             </a:r>
           </a:p>
         </p:txBody>
@@ -26158,9 +25984,6 @@
         </p:txBody>
       </p:sp>
     </p:spTree>
-    <p:custDataLst>
-      <p:tags r:id="rId1"/>
-    </p:custDataLst>
     <p:extLst>
       <p:ext uri="{BB962C8B-B14F-4D97-AF65-F5344CB8AC3E}">
         <p14:creationId xmlns:p14="http://schemas.microsoft.com/office/powerpoint/2010/main" val="267747869"/>
@@ -26170,14 +25993,6 @@
   <p:clrMapOvr>
     <a:masterClrMapping/>
   </p:clrMapOvr>
-  <mc:AlternateContent xmlns:mc="http://schemas.openxmlformats.org/markup-compatibility/2006" xmlns:p14="http://schemas.microsoft.com/office/powerpoint/2010/main">
-    <mc:Choice Requires="p14">
-      <p:transition spd="slow" p14:dur="2000" advTm="2354"/>
-    </mc:Choice>
-    <mc:Fallback xmlns="">
-      <p:transition spd="slow" advTm="2354"/>
-    </mc:Fallback>
-  </mc:AlternateContent>
   <p:timing>
     <p:tnLst>
       <p:par>
@@ -26543,72 +26358,6 @@
     </p:bldLst>
   </p:timing>
 </p:sld>
-</file>
-
-<file path=ppt/tags/tag1.xml><?xml version="1.0" encoding="utf-8"?>
-<p:tagLst xmlns:a="http://schemas.openxmlformats.org/drawingml/2006/main" xmlns:r="http://schemas.openxmlformats.org/officeDocument/2006/relationships" xmlns:p="http://schemas.openxmlformats.org/presentationml/2006/main">
-  <p:tag name="TIMING" val="|0.2|0.3|0.2"/>
-</p:tagLst>
-</file>
-
-<file path=ppt/tags/tag10.xml><?xml version="1.0" encoding="utf-8"?>
-<p:tagLst xmlns:a="http://schemas.openxmlformats.org/drawingml/2006/main" xmlns:r="http://schemas.openxmlformats.org/officeDocument/2006/relationships" xmlns:p="http://schemas.openxmlformats.org/presentationml/2006/main">
-  <p:tag name="TIMING" val="|8.5|4.9|9.6"/>
-</p:tagLst>
-</file>
-
-<file path=ppt/tags/tag11.xml><?xml version="1.0" encoding="utf-8"?>
-<p:tagLst xmlns:a="http://schemas.openxmlformats.org/drawingml/2006/main" xmlns:r="http://schemas.openxmlformats.org/officeDocument/2006/relationships" xmlns:p="http://schemas.openxmlformats.org/presentationml/2006/main">
-  <p:tag name="TIMING" val="|0.5"/>
-</p:tagLst>
-</file>
-
-<file path=ppt/tags/tag2.xml><?xml version="1.0" encoding="utf-8"?>
-<p:tagLst xmlns:a="http://schemas.openxmlformats.org/drawingml/2006/main" xmlns:r="http://schemas.openxmlformats.org/officeDocument/2006/relationships" xmlns:p="http://schemas.openxmlformats.org/presentationml/2006/main">
-  <p:tag name="TIMING" val="|0.1|0.1|0.2|0.1|0.2"/>
-</p:tagLst>
-</file>
-
-<file path=ppt/tags/tag3.xml><?xml version="1.0" encoding="utf-8"?>
-<p:tagLst xmlns:a="http://schemas.openxmlformats.org/drawingml/2006/main" xmlns:r="http://schemas.openxmlformats.org/officeDocument/2006/relationships" xmlns:p="http://schemas.openxmlformats.org/presentationml/2006/main">
-  <p:tag name="TIMING" val="|0.1"/>
-</p:tagLst>
-</file>
-
-<file path=ppt/tags/tag4.xml><?xml version="1.0" encoding="utf-8"?>
-<p:tagLst xmlns:a="http://schemas.openxmlformats.org/drawingml/2006/main" xmlns:r="http://schemas.openxmlformats.org/officeDocument/2006/relationships" xmlns:p="http://schemas.openxmlformats.org/presentationml/2006/main">
-  <p:tag name="TIMING" val="|0.1|0.1"/>
-</p:tagLst>
-</file>
-
-<file path=ppt/tags/tag5.xml><?xml version="1.0" encoding="utf-8"?>
-<p:tagLst xmlns:a="http://schemas.openxmlformats.org/drawingml/2006/main" xmlns:r="http://schemas.openxmlformats.org/officeDocument/2006/relationships" xmlns:p="http://schemas.openxmlformats.org/presentationml/2006/main">
-  <p:tag name="TIMING" val="|0.1|0.1|0.3|0.2|0.1|0.1|0.1|0.1"/>
-</p:tagLst>
-</file>
-
-<file path=ppt/tags/tag6.xml><?xml version="1.0" encoding="utf-8"?>
-<p:tagLst xmlns:a="http://schemas.openxmlformats.org/drawingml/2006/main" xmlns:r="http://schemas.openxmlformats.org/officeDocument/2006/relationships" xmlns:p="http://schemas.openxmlformats.org/presentationml/2006/main">
-  <p:tag name="TIMING" val="|0.1|0.1|0.2|0.1"/>
-</p:tagLst>
-</file>
-
-<file path=ppt/tags/tag7.xml><?xml version="1.0" encoding="utf-8"?>
-<p:tagLst xmlns:a="http://schemas.openxmlformats.org/drawingml/2006/main" xmlns:r="http://schemas.openxmlformats.org/officeDocument/2006/relationships" xmlns:p="http://schemas.openxmlformats.org/presentationml/2006/main">
-  <p:tag name="TIMING" val="|0.2|0.2|0.2|0.2"/>
-</p:tagLst>
-</file>
-
-<file path=ppt/tags/tag8.xml><?xml version="1.0" encoding="utf-8"?>
-<p:tagLst xmlns:a="http://schemas.openxmlformats.org/drawingml/2006/main" xmlns:r="http://schemas.openxmlformats.org/officeDocument/2006/relationships" xmlns:p="http://schemas.openxmlformats.org/presentationml/2006/main">
-  <p:tag name="TIMING" val="|0.6|0.4|0.2|0.2|0.2|0.2"/>
-</p:tagLst>
-</file>
-
-<file path=ppt/tags/tag9.xml><?xml version="1.0" encoding="utf-8"?>
-<p:tagLst xmlns:a="http://schemas.openxmlformats.org/drawingml/2006/main" xmlns:r="http://schemas.openxmlformats.org/officeDocument/2006/relationships" xmlns:p="http://schemas.openxmlformats.org/presentationml/2006/main">
-  <p:tag name="TIMING" val="|0.2|0.3"/>
-</p:tagLst>
 </file>
 
 <file path=ppt/theme/theme1.xml><?xml version="1.0" encoding="utf-8"?>

</xml_diff>